<commit_message>
Update Ch1 ppt, add background and env setup.
</commit_message>
<xml_diff>
--- a/chapter.1/ppt/ML_CH1_Python_Basic.pptx
+++ b/chapter.1/ppt/ML_CH1_Python_Basic.pptx
@@ -10,7 +10,17 @@
     <p:sldId id="295" r:id="rId4"/>
     <p:sldId id="293" r:id="rId5"/>
     <p:sldId id="289" r:id="rId6"/>
-    <p:sldId id="294" r:id="rId7"/>
+    <p:sldId id="296" r:id="rId7"/>
+    <p:sldId id="297" r:id="rId8"/>
+    <p:sldId id="298" r:id="rId9"/>
+    <p:sldId id="299" r:id="rId10"/>
+    <p:sldId id="300" r:id="rId11"/>
+    <p:sldId id="301" r:id="rId12"/>
+    <p:sldId id="302" r:id="rId13"/>
+    <p:sldId id="303" r:id="rId14"/>
+    <p:sldId id="304" r:id="rId15"/>
+    <p:sldId id="305" r:id="rId16"/>
+    <p:sldId id="294" r:id="rId17"/>
   </p:sldIdLst>
   <p:sldSz cx="9144000" cy="6858000" type="screen4x3"/>
   <p:notesSz cx="6858000" cy="9144000"/>
@@ -7668,6 +7678,1739 @@
 </p:sld>
 </file>
 
+<file path=ppt/slides/slide10.xml><?xml version="1.0" encoding="utf-8"?>
+<p:sld xmlns:a="http://schemas.openxmlformats.org/drawingml/2006/main" xmlns:r="http://schemas.openxmlformats.org/officeDocument/2006/relationships" xmlns:p="http://schemas.openxmlformats.org/presentationml/2006/main">
+  <p:cSld>
+    <p:spTree>
+      <p:nvGrpSpPr>
+        <p:cNvPr id="1" name=""/>
+        <p:cNvGrpSpPr/>
+        <p:nvPr/>
+      </p:nvGrpSpPr>
+      <p:grpSpPr>
+        <a:xfrm>
+          <a:off x="0" y="0"/>
+          <a:ext cx="0" cy="0"/>
+          <a:chOff x="0" y="0"/>
+          <a:chExt cx="0" cy="0"/>
+        </a:xfrm>
+      </p:grpSpPr>
+      <p:sp>
+        <p:nvSpPr>
+          <p:cNvPr id="5122" name="Rectangle 2">
+            <a:extLst>
+              <a:ext uri="{FF2B5EF4-FFF2-40B4-BE49-F238E27FC236}">
+                <a16:creationId xmlns:a16="http://schemas.microsoft.com/office/drawing/2014/main" id="{DA0A6638-A01B-4ADE-AF93-1C7B857D9914}"/>
+              </a:ext>
+            </a:extLst>
+          </p:cNvPr>
+          <p:cNvSpPr>
+            <a:spLocks noGrp="1" noChangeArrowheads="1"/>
+          </p:cNvSpPr>
+          <p:nvPr>
+            <p:ph type="ctrTitle"/>
+          </p:nvPr>
+        </p:nvSpPr>
+        <p:spPr>
+          <a:xfrm>
+            <a:off x="684213" y="2133600"/>
+            <a:ext cx="7847012" cy="2159000"/>
+          </a:xfrm>
+        </p:spPr>
+        <p:txBody>
+          <a:bodyPr/>
+          <a:lstStyle/>
+          <a:p>
+            <a:pPr eaLnBrk="1" hangingPunct="1"/>
+            <a:br>
+              <a:rPr lang="en-US" altLang="zh-CN" sz="8000" dirty="0">
+                <a:solidFill>
+                  <a:schemeClr val="bg1"/>
+                </a:solidFill>
+                <a:ea typeface="微软雅黑" panose="020B0503020204020204" pitchFamily="34" charset="-122"/>
+              </a:rPr>
+            </a:br>
+            <a:r>
+              <a:rPr lang="zh-CN" altLang="en-US" sz="6600" dirty="0">
+                <a:solidFill>
+                  <a:schemeClr val="bg1"/>
+                </a:solidFill>
+                <a:ea typeface="微软雅黑" panose="020B0503020204020204" pitchFamily="34" charset="-122"/>
+              </a:rPr>
+              <a:t>开发环境</a:t>
+            </a:r>
+            <a:br>
+              <a:rPr lang="zh-CN" altLang="en-US" sz="7200" dirty="0">
+                <a:solidFill>
+                  <a:schemeClr val="bg1"/>
+                </a:solidFill>
+                <a:ea typeface="微软雅黑" panose="020B0503020204020204" pitchFamily="34" charset="-122"/>
+              </a:rPr>
+            </a:br>
+            <a:endParaRPr lang="zh-CN" altLang="en-US" sz="7200" dirty="0">
+              <a:solidFill>
+                <a:schemeClr val="bg1"/>
+              </a:solidFill>
+              <a:ea typeface="微软雅黑" panose="020B0503020204020204" pitchFamily="34" charset="-122"/>
+            </a:endParaRPr>
+          </a:p>
+        </p:txBody>
+      </p:sp>
+    </p:spTree>
+    <p:extLst>
+      <p:ext uri="{BB962C8B-B14F-4D97-AF65-F5344CB8AC3E}">
+        <p14:creationId xmlns:p14="http://schemas.microsoft.com/office/powerpoint/2010/main" val="1278362483"/>
+      </p:ext>
+    </p:extLst>
+  </p:cSld>
+  <p:clrMapOvr>
+    <a:masterClrMapping/>
+  </p:clrMapOvr>
+</p:sld>
+</file>
+
+<file path=ppt/slides/slide11.xml><?xml version="1.0" encoding="utf-8"?>
+<p:sld xmlns:a="http://schemas.openxmlformats.org/drawingml/2006/main" xmlns:r="http://schemas.openxmlformats.org/officeDocument/2006/relationships" xmlns:p="http://schemas.openxmlformats.org/presentationml/2006/main">
+  <p:cSld>
+    <p:spTree>
+      <p:nvGrpSpPr>
+        <p:cNvPr id="1" name=""/>
+        <p:cNvGrpSpPr/>
+        <p:nvPr/>
+      </p:nvGrpSpPr>
+      <p:grpSpPr>
+        <a:xfrm>
+          <a:off x="0" y="0"/>
+          <a:ext cx="0" cy="0"/>
+          <a:chOff x="0" y="0"/>
+          <a:chExt cx="0" cy="0"/>
+        </a:xfrm>
+      </p:grpSpPr>
+      <p:sp>
+        <p:nvSpPr>
+          <p:cNvPr id="4098" name="TextBox 2">
+            <a:extLst>
+              <a:ext uri="{FF2B5EF4-FFF2-40B4-BE49-F238E27FC236}">
+                <a16:creationId xmlns:a16="http://schemas.microsoft.com/office/drawing/2014/main" id="{5552ED83-0001-4E47-A09B-F49C592A8E24}"/>
+              </a:ext>
+            </a:extLst>
+          </p:cNvPr>
+          <p:cNvSpPr txBox="1">
+            <a:spLocks noChangeArrowheads="1"/>
+          </p:cNvSpPr>
+          <p:nvPr/>
+        </p:nvSpPr>
+        <p:spPr bwMode="auto">
+          <a:xfrm>
+            <a:off x="179511" y="260648"/>
+            <a:ext cx="8569325" cy="830263"/>
+          </a:xfrm>
+          <a:prstGeom prst="rect">
+            <a:avLst/>
+          </a:prstGeom>
+          <a:noFill/>
+          <a:ln>
+            <a:noFill/>
+          </a:ln>
+          <a:extLst>
+            <a:ext uri="{909E8E84-426E-40DD-AFC4-6F175D3DCCD1}">
+              <a14:hiddenFill xmlns:a14="http://schemas.microsoft.com/office/drawing/2010/main">
+                <a:solidFill>
+                  <a:srgbClr val="FFFFFF"/>
+                </a:solidFill>
+              </a14:hiddenFill>
+            </a:ext>
+            <a:ext uri="{91240B29-F687-4F45-9708-019B960494DF}">
+              <a14:hiddenLine xmlns:a14="http://schemas.microsoft.com/office/drawing/2010/main" w="9525">
+                <a:solidFill>
+                  <a:srgbClr val="000000"/>
+                </a:solidFill>
+                <a:miter lim="800000"/>
+                <a:headEnd/>
+                <a:tailEnd/>
+              </a14:hiddenLine>
+            </a:ext>
+          </a:extLst>
+        </p:spPr>
+        <p:txBody>
+          <a:bodyPr wrap="square">
+            <a:spAutoFit/>
+          </a:bodyPr>
+          <a:lstStyle>
+            <a:lvl1pPr eaLnBrk="0" hangingPunct="0">
+              <a:defRPr>
+                <a:solidFill>
+                  <a:schemeClr val="tx1"/>
+                </a:solidFill>
+                <a:latin typeface="Arial" panose="020B0604020202020204" pitchFamily="34" charset="0"/>
+                <a:ea typeface="宋体" panose="02010600030101010101" pitchFamily="2" charset="-122"/>
+              </a:defRPr>
+            </a:lvl1pPr>
+            <a:lvl2pPr marL="742950" indent="-285750" eaLnBrk="0" hangingPunct="0">
+              <a:defRPr>
+                <a:solidFill>
+                  <a:schemeClr val="tx1"/>
+                </a:solidFill>
+                <a:latin typeface="Arial" panose="020B0604020202020204" pitchFamily="34" charset="0"/>
+                <a:ea typeface="宋体" panose="02010600030101010101" pitchFamily="2" charset="-122"/>
+              </a:defRPr>
+            </a:lvl2pPr>
+            <a:lvl3pPr marL="1143000" indent="-228600" eaLnBrk="0" hangingPunct="0">
+              <a:defRPr>
+                <a:solidFill>
+                  <a:schemeClr val="tx1"/>
+                </a:solidFill>
+                <a:latin typeface="Arial" panose="020B0604020202020204" pitchFamily="34" charset="0"/>
+                <a:ea typeface="宋体" panose="02010600030101010101" pitchFamily="2" charset="-122"/>
+              </a:defRPr>
+            </a:lvl3pPr>
+            <a:lvl4pPr marL="1600200" indent="-228600" eaLnBrk="0" hangingPunct="0">
+              <a:defRPr>
+                <a:solidFill>
+                  <a:schemeClr val="tx1"/>
+                </a:solidFill>
+                <a:latin typeface="Arial" panose="020B0604020202020204" pitchFamily="34" charset="0"/>
+                <a:ea typeface="宋体" panose="02010600030101010101" pitchFamily="2" charset="-122"/>
+              </a:defRPr>
+            </a:lvl4pPr>
+            <a:lvl5pPr marL="2057400" indent="-228600" eaLnBrk="0" hangingPunct="0">
+              <a:defRPr>
+                <a:solidFill>
+                  <a:schemeClr val="tx1"/>
+                </a:solidFill>
+                <a:latin typeface="Arial" panose="020B0604020202020204" pitchFamily="34" charset="0"/>
+                <a:ea typeface="宋体" panose="02010600030101010101" pitchFamily="2" charset="-122"/>
+              </a:defRPr>
+            </a:lvl5pPr>
+            <a:lvl6pPr marL="2514600" indent="-228600" eaLnBrk="0" fontAlgn="base" hangingPunct="0">
+              <a:spcBef>
+                <a:spcPct val="0"/>
+              </a:spcBef>
+              <a:spcAft>
+                <a:spcPct val="0"/>
+              </a:spcAft>
+              <a:defRPr>
+                <a:solidFill>
+                  <a:schemeClr val="tx1"/>
+                </a:solidFill>
+                <a:latin typeface="Arial" panose="020B0604020202020204" pitchFamily="34" charset="0"/>
+                <a:ea typeface="宋体" panose="02010600030101010101" pitchFamily="2" charset="-122"/>
+              </a:defRPr>
+            </a:lvl6pPr>
+            <a:lvl7pPr marL="2971800" indent="-228600" eaLnBrk="0" fontAlgn="base" hangingPunct="0">
+              <a:spcBef>
+                <a:spcPct val="0"/>
+              </a:spcBef>
+              <a:spcAft>
+                <a:spcPct val="0"/>
+              </a:spcAft>
+              <a:defRPr>
+                <a:solidFill>
+                  <a:schemeClr val="tx1"/>
+                </a:solidFill>
+                <a:latin typeface="Arial" panose="020B0604020202020204" pitchFamily="34" charset="0"/>
+                <a:ea typeface="宋体" panose="02010600030101010101" pitchFamily="2" charset="-122"/>
+              </a:defRPr>
+            </a:lvl7pPr>
+            <a:lvl8pPr marL="3429000" indent="-228600" eaLnBrk="0" fontAlgn="base" hangingPunct="0">
+              <a:spcBef>
+                <a:spcPct val="0"/>
+              </a:spcBef>
+              <a:spcAft>
+                <a:spcPct val="0"/>
+              </a:spcAft>
+              <a:defRPr>
+                <a:solidFill>
+                  <a:schemeClr val="tx1"/>
+                </a:solidFill>
+                <a:latin typeface="Arial" panose="020B0604020202020204" pitchFamily="34" charset="0"/>
+                <a:ea typeface="宋体" panose="02010600030101010101" pitchFamily="2" charset="-122"/>
+              </a:defRPr>
+            </a:lvl8pPr>
+            <a:lvl9pPr marL="3886200" indent="-228600" eaLnBrk="0" fontAlgn="base" hangingPunct="0">
+              <a:spcBef>
+                <a:spcPct val="0"/>
+              </a:spcBef>
+              <a:spcAft>
+                <a:spcPct val="0"/>
+              </a:spcAft>
+              <a:defRPr>
+                <a:solidFill>
+                  <a:schemeClr val="tx1"/>
+                </a:solidFill>
+                <a:latin typeface="Arial" panose="020B0604020202020204" pitchFamily="34" charset="0"/>
+                <a:ea typeface="宋体" panose="02010600030101010101" pitchFamily="2" charset="-122"/>
+              </a:defRPr>
+            </a:lvl9pPr>
+          </a:lstStyle>
+          <a:p>
+            <a:pPr eaLnBrk="1" hangingPunct="1"/>
+            <a:r>
+              <a:rPr lang="zh-CN" altLang="en-US" sz="4800" dirty="0">
+                <a:solidFill>
+                  <a:schemeClr val="bg1"/>
+                </a:solidFill>
+                <a:latin typeface="微软雅黑" panose="020B0503020204020204" pitchFamily="34" charset="-122"/>
+                <a:ea typeface="微软雅黑" panose="020B0503020204020204" pitchFamily="34" charset="-122"/>
+              </a:rPr>
+              <a:t>开发环境 </a:t>
+            </a:r>
+            <a:r>
+              <a:rPr lang="en-US" altLang="zh-CN" sz="4800" dirty="0">
+                <a:solidFill>
+                  <a:schemeClr val="bg1"/>
+                </a:solidFill>
+                <a:latin typeface="微软雅黑" panose="020B0503020204020204" pitchFamily="34" charset="-122"/>
+                <a:ea typeface="微软雅黑" panose="020B0503020204020204" pitchFamily="34" charset="-122"/>
+              </a:rPr>
+              <a:t>– Python</a:t>
+            </a:r>
+            <a:r>
+              <a:rPr lang="zh-CN" altLang="en-US" sz="4800" dirty="0">
+                <a:solidFill>
+                  <a:schemeClr val="bg1"/>
+                </a:solidFill>
+                <a:latin typeface="微软雅黑" panose="020B0503020204020204" pitchFamily="34" charset="-122"/>
+                <a:ea typeface="微软雅黑" panose="020B0503020204020204" pitchFamily="34" charset="-122"/>
+              </a:rPr>
+              <a:t>运行时</a:t>
+            </a:r>
+          </a:p>
+        </p:txBody>
+      </p:sp>
+      <p:sp>
+        <p:nvSpPr>
+          <p:cNvPr id="5" name="TextBox 4">
+            <a:extLst>
+              <a:ext uri="{FF2B5EF4-FFF2-40B4-BE49-F238E27FC236}">
+                <a16:creationId xmlns:a16="http://schemas.microsoft.com/office/drawing/2014/main" id="{E8A991AE-3688-4E36-95ED-0003B8B99099}"/>
+              </a:ext>
+            </a:extLst>
+          </p:cNvPr>
+          <p:cNvSpPr txBox="1"/>
+          <p:nvPr/>
+        </p:nvSpPr>
+        <p:spPr>
+          <a:xfrm>
+            <a:off x="179512" y="1196752"/>
+            <a:ext cx="8569325" cy="3447098"/>
+          </a:xfrm>
+          <a:prstGeom prst="rect">
+            <a:avLst/>
+          </a:prstGeom>
+          <a:noFill/>
+        </p:spPr>
+        <p:txBody>
+          <a:bodyPr>
+            <a:spAutoFit/>
+          </a:bodyPr>
+          <a:lstStyle/>
+          <a:p>
+            <a:pPr>
+              <a:defRPr/>
+            </a:pPr>
+            <a:r>
+              <a:rPr lang="en-US" altLang="zh-CN" sz="4000" dirty="0">
+                <a:solidFill>
+                  <a:schemeClr val="bg1"/>
+                </a:solidFill>
+                <a:latin typeface="微软雅黑" pitchFamily="34" charset="-122"/>
+                <a:ea typeface="微软雅黑" pitchFamily="34" charset="-122"/>
+              </a:rPr>
+              <a:t>Python 2 or 3 ?</a:t>
+            </a:r>
+          </a:p>
+          <a:p>
+            <a:pPr marL="571500" indent="-571500">
+              <a:buFont typeface="Arial" panose="020B0604020202020204" pitchFamily="34" charset="0"/>
+              <a:buChar char="•"/>
+              <a:defRPr/>
+            </a:pPr>
+            <a:r>
+              <a:rPr lang="en-US" altLang="zh-CN" sz="4000" dirty="0">
+                <a:solidFill>
+                  <a:schemeClr val="bg1"/>
+                </a:solidFill>
+                <a:latin typeface="微软雅黑" pitchFamily="34" charset="-122"/>
+                <a:ea typeface="微软雅黑" pitchFamily="34" charset="-122"/>
+              </a:rPr>
+              <a:t>Python3</a:t>
+            </a:r>
+            <a:r>
+              <a:rPr lang="zh-CN" altLang="en-US" sz="4000" dirty="0">
+                <a:solidFill>
+                  <a:schemeClr val="bg1"/>
+                </a:solidFill>
+                <a:latin typeface="微软雅黑" pitchFamily="34" charset="-122"/>
+                <a:ea typeface="微软雅黑" pitchFamily="34" charset="-122"/>
+              </a:rPr>
+              <a:t>是趋势</a:t>
+            </a:r>
+            <a:endParaRPr lang="en-US" altLang="zh-CN" sz="4000" dirty="0">
+              <a:solidFill>
+                <a:schemeClr val="bg1"/>
+              </a:solidFill>
+              <a:latin typeface="微软雅黑" pitchFamily="34" charset="-122"/>
+              <a:ea typeface="微软雅黑" pitchFamily="34" charset="-122"/>
+            </a:endParaRPr>
+          </a:p>
+          <a:p>
+            <a:pPr marL="571500" indent="-571500">
+              <a:buFont typeface="Arial" panose="020B0604020202020204" pitchFamily="34" charset="0"/>
+              <a:buChar char="•"/>
+              <a:defRPr/>
+            </a:pPr>
+            <a:r>
+              <a:rPr lang="zh-CN" altLang="en-US" sz="4000" dirty="0">
+                <a:solidFill>
+                  <a:schemeClr val="bg1"/>
+                </a:solidFill>
+                <a:latin typeface="微软雅黑" pitchFamily="34" charset="-122"/>
+                <a:ea typeface="微软雅黑" pitchFamily="34" charset="-122"/>
+              </a:rPr>
+              <a:t>推荐安装</a:t>
+            </a:r>
+            <a:r>
+              <a:rPr lang="en-US" altLang="zh-CN" sz="4000" b="1" dirty="0">
+                <a:solidFill>
+                  <a:srgbClr val="FFC000"/>
+                </a:solidFill>
+                <a:latin typeface="微软雅黑" pitchFamily="34" charset="-122"/>
+                <a:ea typeface="微软雅黑" pitchFamily="34" charset="-122"/>
+              </a:rPr>
+              <a:t>Anaconda</a:t>
+            </a:r>
+            <a:r>
+              <a:rPr lang="en-US" altLang="zh-CN" sz="4000" dirty="0">
+                <a:solidFill>
+                  <a:schemeClr val="bg1"/>
+                </a:solidFill>
+                <a:latin typeface="微软雅黑" pitchFamily="34" charset="-122"/>
+                <a:ea typeface="微软雅黑" pitchFamily="34" charset="-122"/>
+              </a:rPr>
+              <a:t>,</a:t>
+            </a:r>
+            <a:r>
+              <a:rPr lang="zh-CN" altLang="en-US" sz="4000" dirty="0">
+                <a:solidFill>
+                  <a:schemeClr val="bg1"/>
+                </a:solidFill>
+                <a:latin typeface="微软雅黑" pitchFamily="34" charset="-122"/>
+                <a:ea typeface="微软雅黑" pitchFamily="34" charset="-122"/>
+              </a:rPr>
+              <a:t> 而不是直接装</a:t>
+            </a:r>
+            <a:r>
+              <a:rPr lang="en-US" altLang="zh-CN" sz="4000" dirty="0">
+                <a:solidFill>
+                  <a:schemeClr val="bg1"/>
+                </a:solidFill>
+                <a:latin typeface="微软雅黑" pitchFamily="34" charset="-122"/>
+                <a:ea typeface="微软雅黑" pitchFamily="34" charset="-122"/>
+              </a:rPr>
+              <a:t>Python2/3</a:t>
+            </a:r>
+          </a:p>
+          <a:p>
+            <a:pPr marL="571500" indent="-571500">
+              <a:buFont typeface="Arial" panose="020B0604020202020204" pitchFamily="34" charset="0"/>
+              <a:buChar char="•"/>
+              <a:defRPr/>
+            </a:pPr>
+            <a:endParaRPr lang="en-US" altLang="zh-CN" sz="4000" dirty="0">
+              <a:solidFill>
+                <a:schemeClr val="bg1"/>
+              </a:solidFill>
+              <a:latin typeface="微软雅黑" pitchFamily="34" charset="-122"/>
+              <a:ea typeface="微软雅黑" pitchFamily="34" charset="-122"/>
+            </a:endParaRPr>
+          </a:p>
+          <a:p>
+            <a:pPr>
+              <a:defRPr/>
+            </a:pPr>
+            <a:endParaRPr lang="en-US" dirty="0">
+              <a:solidFill>
+                <a:schemeClr val="bg1"/>
+              </a:solidFill>
+              <a:latin typeface="Arial" charset="0"/>
+            </a:endParaRPr>
+          </a:p>
+        </p:txBody>
+      </p:sp>
+    </p:spTree>
+    <p:extLst>
+      <p:ext uri="{BB962C8B-B14F-4D97-AF65-F5344CB8AC3E}">
+        <p14:creationId xmlns:p14="http://schemas.microsoft.com/office/powerpoint/2010/main" val="1768504079"/>
+      </p:ext>
+    </p:extLst>
+  </p:cSld>
+  <p:clrMapOvr>
+    <a:masterClrMapping/>
+  </p:clrMapOvr>
+</p:sld>
+</file>
+
+<file path=ppt/slides/slide12.xml><?xml version="1.0" encoding="utf-8"?>
+<p:sld xmlns:a="http://schemas.openxmlformats.org/drawingml/2006/main" xmlns:r="http://schemas.openxmlformats.org/officeDocument/2006/relationships" xmlns:p="http://schemas.openxmlformats.org/presentationml/2006/main">
+  <p:cSld>
+    <p:spTree>
+      <p:nvGrpSpPr>
+        <p:cNvPr id="1" name=""/>
+        <p:cNvGrpSpPr/>
+        <p:nvPr/>
+      </p:nvGrpSpPr>
+      <p:grpSpPr>
+        <a:xfrm>
+          <a:off x="0" y="0"/>
+          <a:ext cx="0" cy="0"/>
+          <a:chOff x="0" y="0"/>
+          <a:chExt cx="0" cy="0"/>
+        </a:xfrm>
+      </p:grpSpPr>
+      <p:sp>
+        <p:nvSpPr>
+          <p:cNvPr id="4098" name="TextBox 2">
+            <a:extLst>
+              <a:ext uri="{FF2B5EF4-FFF2-40B4-BE49-F238E27FC236}">
+                <a16:creationId xmlns:a16="http://schemas.microsoft.com/office/drawing/2014/main" id="{5552ED83-0001-4E47-A09B-F49C592A8E24}"/>
+              </a:ext>
+            </a:extLst>
+          </p:cNvPr>
+          <p:cNvSpPr txBox="1">
+            <a:spLocks noChangeArrowheads="1"/>
+          </p:cNvSpPr>
+          <p:nvPr/>
+        </p:nvSpPr>
+        <p:spPr bwMode="auto">
+          <a:xfrm>
+            <a:off x="179512" y="260648"/>
+            <a:ext cx="7992888" cy="830997"/>
+          </a:xfrm>
+          <a:prstGeom prst="rect">
+            <a:avLst/>
+          </a:prstGeom>
+          <a:noFill/>
+          <a:ln>
+            <a:noFill/>
+          </a:ln>
+          <a:extLst>
+            <a:ext uri="{909E8E84-426E-40DD-AFC4-6F175D3DCCD1}">
+              <a14:hiddenFill xmlns:a14="http://schemas.microsoft.com/office/drawing/2010/main">
+                <a:solidFill>
+                  <a:srgbClr val="FFFFFF"/>
+                </a:solidFill>
+              </a14:hiddenFill>
+            </a:ext>
+            <a:ext uri="{91240B29-F687-4F45-9708-019B960494DF}">
+              <a14:hiddenLine xmlns:a14="http://schemas.microsoft.com/office/drawing/2010/main" w="9525">
+                <a:solidFill>
+                  <a:srgbClr val="000000"/>
+                </a:solidFill>
+                <a:miter lim="800000"/>
+                <a:headEnd/>
+                <a:tailEnd/>
+              </a14:hiddenLine>
+            </a:ext>
+          </a:extLst>
+        </p:spPr>
+        <p:txBody>
+          <a:bodyPr wrap="square">
+            <a:spAutoFit/>
+          </a:bodyPr>
+          <a:lstStyle>
+            <a:lvl1pPr eaLnBrk="0" hangingPunct="0">
+              <a:defRPr>
+                <a:solidFill>
+                  <a:schemeClr val="tx1"/>
+                </a:solidFill>
+                <a:latin typeface="Arial" panose="020B0604020202020204" pitchFamily="34" charset="0"/>
+                <a:ea typeface="宋体" panose="02010600030101010101" pitchFamily="2" charset="-122"/>
+              </a:defRPr>
+            </a:lvl1pPr>
+            <a:lvl2pPr marL="742950" indent="-285750" eaLnBrk="0" hangingPunct="0">
+              <a:defRPr>
+                <a:solidFill>
+                  <a:schemeClr val="tx1"/>
+                </a:solidFill>
+                <a:latin typeface="Arial" panose="020B0604020202020204" pitchFamily="34" charset="0"/>
+                <a:ea typeface="宋体" panose="02010600030101010101" pitchFamily="2" charset="-122"/>
+              </a:defRPr>
+            </a:lvl2pPr>
+            <a:lvl3pPr marL="1143000" indent="-228600" eaLnBrk="0" hangingPunct="0">
+              <a:defRPr>
+                <a:solidFill>
+                  <a:schemeClr val="tx1"/>
+                </a:solidFill>
+                <a:latin typeface="Arial" panose="020B0604020202020204" pitchFamily="34" charset="0"/>
+                <a:ea typeface="宋体" panose="02010600030101010101" pitchFamily="2" charset="-122"/>
+              </a:defRPr>
+            </a:lvl3pPr>
+            <a:lvl4pPr marL="1600200" indent="-228600" eaLnBrk="0" hangingPunct="0">
+              <a:defRPr>
+                <a:solidFill>
+                  <a:schemeClr val="tx1"/>
+                </a:solidFill>
+                <a:latin typeface="Arial" panose="020B0604020202020204" pitchFamily="34" charset="0"/>
+                <a:ea typeface="宋体" panose="02010600030101010101" pitchFamily="2" charset="-122"/>
+              </a:defRPr>
+            </a:lvl4pPr>
+            <a:lvl5pPr marL="2057400" indent="-228600" eaLnBrk="0" hangingPunct="0">
+              <a:defRPr>
+                <a:solidFill>
+                  <a:schemeClr val="tx1"/>
+                </a:solidFill>
+                <a:latin typeface="Arial" panose="020B0604020202020204" pitchFamily="34" charset="0"/>
+                <a:ea typeface="宋体" panose="02010600030101010101" pitchFamily="2" charset="-122"/>
+              </a:defRPr>
+            </a:lvl5pPr>
+            <a:lvl6pPr marL="2514600" indent="-228600" eaLnBrk="0" fontAlgn="base" hangingPunct="0">
+              <a:spcBef>
+                <a:spcPct val="0"/>
+              </a:spcBef>
+              <a:spcAft>
+                <a:spcPct val="0"/>
+              </a:spcAft>
+              <a:defRPr>
+                <a:solidFill>
+                  <a:schemeClr val="tx1"/>
+                </a:solidFill>
+                <a:latin typeface="Arial" panose="020B0604020202020204" pitchFamily="34" charset="0"/>
+                <a:ea typeface="宋体" panose="02010600030101010101" pitchFamily="2" charset="-122"/>
+              </a:defRPr>
+            </a:lvl6pPr>
+            <a:lvl7pPr marL="2971800" indent="-228600" eaLnBrk="0" fontAlgn="base" hangingPunct="0">
+              <a:spcBef>
+                <a:spcPct val="0"/>
+              </a:spcBef>
+              <a:spcAft>
+                <a:spcPct val="0"/>
+              </a:spcAft>
+              <a:defRPr>
+                <a:solidFill>
+                  <a:schemeClr val="tx1"/>
+                </a:solidFill>
+                <a:latin typeface="Arial" panose="020B0604020202020204" pitchFamily="34" charset="0"/>
+                <a:ea typeface="宋体" panose="02010600030101010101" pitchFamily="2" charset="-122"/>
+              </a:defRPr>
+            </a:lvl7pPr>
+            <a:lvl8pPr marL="3429000" indent="-228600" eaLnBrk="0" fontAlgn="base" hangingPunct="0">
+              <a:spcBef>
+                <a:spcPct val="0"/>
+              </a:spcBef>
+              <a:spcAft>
+                <a:spcPct val="0"/>
+              </a:spcAft>
+              <a:defRPr>
+                <a:solidFill>
+                  <a:schemeClr val="tx1"/>
+                </a:solidFill>
+                <a:latin typeface="Arial" panose="020B0604020202020204" pitchFamily="34" charset="0"/>
+                <a:ea typeface="宋体" panose="02010600030101010101" pitchFamily="2" charset="-122"/>
+              </a:defRPr>
+            </a:lvl8pPr>
+            <a:lvl9pPr marL="3886200" indent="-228600" eaLnBrk="0" fontAlgn="base" hangingPunct="0">
+              <a:spcBef>
+                <a:spcPct val="0"/>
+              </a:spcBef>
+              <a:spcAft>
+                <a:spcPct val="0"/>
+              </a:spcAft>
+              <a:defRPr>
+                <a:solidFill>
+                  <a:schemeClr val="tx1"/>
+                </a:solidFill>
+                <a:latin typeface="Arial" panose="020B0604020202020204" pitchFamily="34" charset="0"/>
+                <a:ea typeface="宋体" panose="02010600030101010101" pitchFamily="2" charset="-122"/>
+              </a:defRPr>
+            </a:lvl9pPr>
+          </a:lstStyle>
+          <a:p>
+            <a:pPr eaLnBrk="1" hangingPunct="1"/>
+            <a:r>
+              <a:rPr lang="zh-CN" altLang="en-US" sz="4800" dirty="0">
+                <a:solidFill>
+                  <a:schemeClr val="bg1"/>
+                </a:solidFill>
+                <a:latin typeface="微软雅黑" panose="020B0503020204020204" pitchFamily="34" charset="-122"/>
+                <a:ea typeface="微软雅黑" panose="020B0503020204020204" pitchFamily="34" charset="-122"/>
+              </a:rPr>
+              <a:t>开发环境 </a:t>
+            </a:r>
+            <a:r>
+              <a:rPr lang="en-US" altLang="zh-CN" sz="4800" dirty="0">
+                <a:solidFill>
+                  <a:schemeClr val="bg1"/>
+                </a:solidFill>
+                <a:latin typeface="微软雅黑" panose="020B0503020204020204" pitchFamily="34" charset="-122"/>
+                <a:ea typeface="微软雅黑" panose="020B0503020204020204" pitchFamily="34" charset="-122"/>
+              </a:rPr>
+              <a:t>– Python</a:t>
+            </a:r>
+            <a:r>
+              <a:rPr lang="zh-CN" altLang="en-US" sz="4800" dirty="0">
+                <a:solidFill>
+                  <a:schemeClr val="bg1"/>
+                </a:solidFill>
+                <a:latin typeface="微软雅黑" panose="020B0503020204020204" pitchFamily="34" charset="-122"/>
+                <a:ea typeface="微软雅黑" panose="020B0503020204020204" pitchFamily="34" charset="-122"/>
+              </a:rPr>
+              <a:t>运行时</a:t>
+            </a:r>
+          </a:p>
+        </p:txBody>
+      </p:sp>
+      <p:sp>
+        <p:nvSpPr>
+          <p:cNvPr id="5" name="TextBox 4">
+            <a:extLst>
+              <a:ext uri="{FF2B5EF4-FFF2-40B4-BE49-F238E27FC236}">
+                <a16:creationId xmlns:a16="http://schemas.microsoft.com/office/drawing/2014/main" id="{E8A991AE-3688-4E36-95ED-0003B8B99099}"/>
+              </a:ext>
+            </a:extLst>
+          </p:cNvPr>
+          <p:cNvSpPr txBox="1"/>
+          <p:nvPr/>
+        </p:nvSpPr>
+        <p:spPr>
+          <a:xfrm>
+            <a:off x="179512" y="1196752"/>
+            <a:ext cx="8569325" cy="4678204"/>
+          </a:xfrm>
+          <a:prstGeom prst="rect">
+            <a:avLst/>
+          </a:prstGeom>
+          <a:noFill/>
+        </p:spPr>
+        <p:txBody>
+          <a:bodyPr>
+            <a:spAutoFit/>
+          </a:bodyPr>
+          <a:lstStyle/>
+          <a:p>
+            <a:pPr>
+              <a:defRPr/>
+            </a:pPr>
+            <a:r>
+              <a:rPr lang="en-US" altLang="zh-CN" sz="4000" dirty="0">
+                <a:solidFill>
+                  <a:schemeClr val="bg1"/>
+                </a:solidFill>
+                <a:latin typeface="微软雅黑" pitchFamily="34" charset="-122"/>
+                <a:ea typeface="微软雅黑" pitchFamily="34" charset="-122"/>
+              </a:rPr>
+              <a:t>Anaconda</a:t>
+            </a:r>
+            <a:r>
+              <a:rPr lang="zh-CN" altLang="en-US" sz="4000" dirty="0">
+                <a:solidFill>
+                  <a:schemeClr val="bg1"/>
+                </a:solidFill>
+                <a:latin typeface="微软雅黑" pitchFamily="34" charset="-122"/>
+                <a:ea typeface="微软雅黑" pitchFamily="34" charset="-122"/>
+              </a:rPr>
+              <a:t>是什么</a:t>
+            </a:r>
+            <a:r>
+              <a:rPr lang="en-US" altLang="zh-CN" sz="4000" dirty="0">
+                <a:solidFill>
+                  <a:schemeClr val="bg1"/>
+                </a:solidFill>
+                <a:latin typeface="微软雅黑" pitchFamily="34" charset="-122"/>
+                <a:ea typeface="微软雅黑" pitchFamily="34" charset="-122"/>
+              </a:rPr>
+              <a:t> ?</a:t>
+            </a:r>
+          </a:p>
+          <a:p>
+            <a:pPr marL="571500" indent="-571500">
+              <a:buFont typeface="Arial" panose="020B0604020202020204" pitchFamily="34" charset="0"/>
+              <a:buChar char="•"/>
+              <a:defRPr/>
+            </a:pPr>
+            <a:r>
+              <a:rPr lang="zh-CN" altLang="en-US" sz="4000" dirty="0">
+                <a:solidFill>
+                  <a:schemeClr val="bg1"/>
+                </a:solidFill>
+                <a:latin typeface="微软雅黑" pitchFamily="34" charset="-122"/>
+                <a:ea typeface="微软雅黑" pitchFamily="34" charset="-122"/>
+              </a:rPr>
+              <a:t>一个</a:t>
+            </a:r>
+            <a:r>
+              <a:rPr lang="en-US" altLang="zh-CN" sz="4000" dirty="0">
+                <a:solidFill>
+                  <a:schemeClr val="bg1"/>
+                </a:solidFill>
+                <a:latin typeface="微软雅黑" pitchFamily="34" charset="-122"/>
+                <a:ea typeface="微软雅黑" pitchFamily="34" charset="-122"/>
+              </a:rPr>
+              <a:t>Python</a:t>
+            </a:r>
+            <a:r>
+              <a:rPr lang="zh-CN" altLang="en-US" sz="4000" dirty="0">
+                <a:solidFill>
+                  <a:schemeClr val="bg1"/>
+                </a:solidFill>
+                <a:latin typeface="微软雅黑" pitchFamily="34" charset="-122"/>
+                <a:ea typeface="微软雅黑" pitchFamily="34" charset="-122"/>
+              </a:rPr>
+              <a:t>运行时的发行版</a:t>
+            </a:r>
+            <a:endParaRPr lang="en-US" altLang="zh-CN" sz="4000" dirty="0">
+              <a:solidFill>
+                <a:schemeClr val="bg1"/>
+              </a:solidFill>
+              <a:latin typeface="微软雅黑" pitchFamily="34" charset="-122"/>
+              <a:ea typeface="微软雅黑" pitchFamily="34" charset="-122"/>
+            </a:endParaRPr>
+          </a:p>
+          <a:p>
+            <a:pPr marL="571500" indent="-571500">
+              <a:buFont typeface="Arial" panose="020B0604020202020204" pitchFamily="34" charset="0"/>
+              <a:buChar char="•"/>
+              <a:defRPr/>
+            </a:pPr>
+            <a:r>
+              <a:rPr lang="zh-CN" altLang="en-US" sz="4000" dirty="0">
+                <a:solidFill>
+                  <a:schemeClr val="bg1"/>
+                </a:solidFill>
+                <a:latin typeface="微软雅黑" pitchFamily="34" charset="-122"/>
+                <a:ea typeface="微软雅黑" pitchFamily="34" charset="-122"/>
+              </a:rPr>
+              <a:t>包含了</a:t>
+            </a:r>
+            <a:r>
+              <a:rPr lang="en-US" altLang="zh-CN" sz="4000" dirty="0">
+                <a:solidFill>
+                  <a:srgbClr val="FFC000"/>
+                </a:solidFill>
+                <a:latin typeface="微软雅黑" pitchFamily="34" charset="-122"/>
+                <a:ea typeface="微软雅黑" pitchFamily="34" charset="-122"/>
+              </a:rPr>
+              <a:t>Python</a:t>
+            </a:r>
+            <a:r>
+              <a:rPr lang="zh-CN" altLang="en-US" sz="4000" dirty="0">
+                <a:solidFill>
+                  <a:srgbClr val="FFC000"/>
+                </a:solidFill>
+                <a:latin typeface="微软雅黑" pitchFamily="34" charset="-122"/>
+                <a:ea typeface="微软雅黑" pitchFamily="34" charset="-122"/>
+              </a:rPr>
+              <a:t>运行时管理器</a:t>
+            </a:r>
+            <a:r>
+              <a:rPr lang="zh-CN" altLang="en-US" sz="4000" dirty="0">
+                <a:solidFill>
+                  <a:schemeClr val="bg1"/>
+                </a:solidFill>
+                <a:latin typeface="微软雅黑" pitchFamily="34" charset="-122"/>
+                <a:ea typeface="微软雅黑" pitchFamily="34" charset="-122"/>
+              </a:rPr>
+              <a:t>、</a:t>
+            </a:r>
+            <a:r>
+              <a:rPr lang="en-US" altLang="zh-CN" sz="4000" dirty="0">
+                <a:solidFill>
+                  <a:srgbClr val="FFC000"/>
+                </a:solidFill>
+                <a:latin typeface="微软雅黑" pitchFamily="34" charset="-122"/>
+                <a:ea typeface="微软雅黑" pitchFamily="34" charset="-122"/>
+              </a:rPr>
+              <a:t>Python</a:t>
+            </a:r>
+            <a:r>
+              <a:rPr lang="zh-CN" altLang="en-US" sz="4000" dirty="0">
+                <a:solidFill>
+                  <a:srgbClr val="FFC000"/>
+                </a:solidFill>
+                <a:latin typeface="微软雅黑" pitchFamily="34" charset="-122"/>
+                <a:ea typeface="微软雅黑" pitchFamily="34" charset="-122"/>
+              </a:rPr>
+              <a:t>包管理器</a:t>
+            </a:r>
+            <a:endParaRPr lang="en-US" altLang="zh-CN" sz="4000" dirty="0">
+              <a:solidFill>
+                <a:srgbClr val="FFC000"/>
+              </a:solidFill>
+              <a:latin typeface="微软雅黑" pitchFamily="34" charset="-122"/>
+              <a:ea typeface="微软雅黑" pitchFamily="34" charset="-122"/>
+            </a:endParaRPr>
+          </a:p>
+          <a:p>
+            <a:pPr marL="571500" indent="-571500">
+              <a:buFont typeface="Arial" panose="020B0604020202020204" pitchFamily="34" charset="0"/>
+              <a:buChar char="•"/>
+              <a:defRPr/>
+            </a:pPr>
+            <a:r>
+              <a:rPr lang="zh-CN" altLang="en-US" sz="4000" dirty="0">
+                <a:solidFill>
+                  <a:schemeClr val="bg1"/>
+                </a:solidFill>
+                <a:latin typeface="微软雅黑" pitchFamily="34" charset="-122"/>
+                <a:ea typeface="微软雅黑" pitchFamily="34" charset="-122"/>
+              </a:rPr>
+              <a:t>内置了大量常用的科学计算包，免去手工下载之苦</a:t>
+            </a:r>
+            <a:endParaRPr lang="en-US" altLang="zh-CN" sz="4000" dirty="0">
+              <a:solidFill>
+                <a:schemeClr val="bg1"/>
+              </a:solidFill>
+              <a:latin typeface="微软雅黑" pitchFamily="34" charset="-122"/>
+              <a:ea typeface="微软雅黑" pitchFamily="34" charset="-122"/>
+            </a:endParaRPr>
+          </a:p>
+          <a:p>
+            <a:pPr marL="571500" indent="-571500">
+              <a:buFont typeface="Arial" panose="020B0604020202020204" pitchFamily="34" charset="0"/>
+              <a:buChar char="•"/>
+              <a:defRPr/>
+            </a:pPr>
+            <a:endParaRPr lang="en-US" altLang="zh-CN" sz="4000" dirty="0">
+              <a:solidFill>
+                <a:schemeClr val="bg1"/>
+              </a:solidFill>
+              <a:latin typeface="微软雅黑" pitchFamily="34" charset="-122"/>
+              <a:ea typeface="微软雅黑" pitchFamily="34" charset="-122"/>
+            </a:endParaRPr>
+          </a:p>
+          <a:p>
+            <a:pPr>
+              <a:defRPr/>
+            </a:pPr>
+            <a:endParaRPr lang="en-US" dirty="0">
+              <a:solidFill>
+                <a:schemeClr val="bg1"/>
+              </a:solidFill>
+              <a:latin typeface="Arial" charset="0"/>
+            </a:endParaRPr>
+          </a:p>
+        </p:txBody>
+      </p:sp>
+    </p:spTree>
+    <p:extLst>
+      <p:ext uri="{BB962C8B-B14F-4D97-AF65-F5344CB8AC3E}">
+        <p14:creationId xmlns:p14="http://schemas.microsoft.com/office/powerpoint/2010/main" val="578532873"/>
+      </p:ext>
+    </p:extLst>
+  </p:cSld>
+  <p:clrMapOvr>
+    <a:masterClrMapping/>
+  </p:clrMapOvr>
+</p:sld>
+</file>
+
+<file path=ppt/slides/slide13.xml><?xml version="1.0" encoding="utf-8"?>
+<p:sld xmlns:a="http://schemas.openxmlformats.org/drawingml/2006/main" xmlns:r="http://schemas.openxmlformats.org/officeDocument/2006/relationships" xmlns:p="http://schemas.openxmlformats.org/presentationml/2006/main">
+  <p:cSld>
+    <p:spTree>
+      <p:nvGrpSpPr>
+        <p:cNvPr id="1" name=""/>
+        <p:cNvGrpSpPr/>
+        <p:nvPr/>
+      </p:nvGrpSpPr>
+      <p:grpSpPr>
+        <a:xfrm>
+          <a:off x="0" y="0"/>
+          <a:ext cx="0" cy="0"/>
+          <a:chOff x="0" y="0"/>
+          <a:chExt cx="0" cy="0"/>
+        </a:xfrm>
+      </p:grpSpPr>
+      <p:sp>
+        <p:nvSpPr>
+          <p:cNvPr id="4098" name="TextBox 2">
+            <a:extLst>
+              <a:ext uri="{FF2B5EF4-FFF2-40B4-BE49-F238E27FC236}">
+                <a16:creationId xmlns:a16="http://schemas.microsoft.com/office/drawing/2014/main" id="{5552ED83-0001-4E47-A09B-F49C592A8E24}"/>
+              </a:ext>
+            </a:extLst>
+          </p:cNvPr>
+          <p:cNvSpPr txBox="1">
+            <a:spLocks noChangeArrowheads="1"/>
+          </p:cNvSpPr>
+          <p:nvPr/>
+        </p:nvSpPr>
+        <p:spPr bwMode="auto">
+          <a:xfrm>
+            <a:off x="179512" y="260648"/>
+            <a:ext cx="7992888" cy="830997"/>
+          </a:xfrm>
+          <a:prstGeom prst="rect">
+            <a:avLst/>
+          </a:prstGeom>
+          <a:noFill/>
+          <a:ln>
+            <a:noFill/>
+          </a:ln>
+          <a:extLst>
+            <a:ext uri="{909E8E84-426E-40DD-AFC4-6F175D3DCCD1}">
+              <a14:hiddenFill xmlns:a14="http://schemas.microsoft.com/office/drawing/2010/main">
+                <a:solidFill>
+                  <a:srgbClr val="FFFFFF"/>
+                </a:solidFill>
+              </a14:hiddenFill>
+            </a:ext>
+            <a:ext uri="{91240B29-F687-4F45-9708-019B960494DF}">
+              <a14:hiddenLine xmlns:a14="http://schemas.microsoft.com/office/drawing/2010/main" w="9525">
+                <a:solidFill>
+                  <a:srgbClr val="000000"/>
+                </a:solidFill>
+                <a:miter lim="800000"/>
+                <a:headEnd/>
+                <a:tailEnd/>
+              </a14:hiddenLine>
+            </a:ext>
+          </a:extLst>
+        </p:spPr>
+        <p:txBody>
+          <a:bodyPr wrap="square">
+            <a:spAutoFit/>
+          </a:bodyPr>
+          <a:lstStyle>
+            <a:lvl1pPr eaLnBrk="0" hangingPunct="0">
+              <a:defRPr>
+                <a:solidFill>
+                  <a:schemeClr val="tx1"/>
+                </a:solidFill>
+                <a:latin typeface="Arial" panose="020B0604020202020204" pitchFamily="34" charset="0"/>
+                <a:ea typeface="宋体" panose="02010600030101010101" pitchFamily="2" charset="-122"/>
+              </a:defRPr>
+            </a:lvl1pPr>
+            <a:lvl2pPr marL="742950" indent="-285750" eaLnBrk="0" hangingPunct="0">
+              <a:defRPr>
+                <a:solidFill>
+                  <a:schemeClr val="tx1"/>
+                </a:solidFill>
+                <a:latin typeface="Arial" panose="020B0604020202020204" pitchFamily="34" charset="0"/>
+                <a:ea typeface="宋体" panose="02010600030101010101" pitchFamily="2" charset="-122"/>
+              </a:defRPr>
+            </a:lvl2pPr>
+            <a:lvl3pPr marL="1143000" indent="-228600" eaLnBrk="0" hangingPunct="0">
+              <a:defRPr>
+                <a:solidFill>
+                  <a:schemeClr val="tx1"/>
+                </a:solidFill>
+                <a:latin typeface="Arial" panose="020B0604020202020204" pitchFamily="34" charset="0"/>
+                <a:ea typeface="宋体" panose="02010600030101010101" pitchFamily="2" charset="-122"/>
+              </a:defRPr>
+            </a:lvl3pPr>
+            <a:lvl4pPr marL="1600200" indent="-228600" eaLnBrk="0" hangingPunct="0">
+              <a:defRPr>
+                <a:solidFill>
+                  <a:schemeClr val="tx1"/>
+                </a:solidFill>
+                <a:latin typeface="Arial" panose="020B0604020202020204" pitchFamily="34" charset="0"/>
+                <a:ea typeface="宋体" panose="02010600030101010101" pitchFamily="2" charset="-122"/>
+              </a:defRPr>
+            </a:lvl4pPr>
+            <a:lvl5pPr marL="2057400" indent="-228600" eaLnBrk="0" hangingPunct="0">
+              <a:defRPr>
+                <a:solidFill>
+                  <a:schemeClr val="tx1"/>
+                </a:solidFill>
+                <a:latin typeface="Arial" panose="020B0604020202020204" pitchFamily="34" charset="0"/>
+                <a:ea typeface="宋体" panose="02010600030101010101" pitchFamily="2" charset="-122"/>
+              </a:defRPr>
+            </a:lvl5pPr>
+            <a:lvl6pPr marL="2514600" indent="-228600" eaLnBrk="0" fontAlgn="base" hangingPunct="0">
+              <a:spcBef>
+                <a:spcPct val="0"/>
+              </a:spcBef>
+              <a:spcAft>
+                <a:spcPct val="0"/>
+              </a:spcAft>
+              <a:defRPr>
+                <a:solidFill>
+                  <a:schemeClr val="tx1"/>
+                </a:solidFill>
+                <a:latin typeface="Arial" panose="020B0604020202020204" pitchFamily="34" charset="0"/>
+                <a:ea typeface="宋体" panose="02010600030101010101" pitchFamily="2" charset="-122"/>
+              </a:defRPr>
+            </a:lvl6pPr>
+            <a:lvl7pPr marL="2971800" indent="-228600" eaLnBrk="0" fontAlgn="base" hangingPunct="0">
+              <a:spcBef>
+                <a:spcPct val="0"/>
+              </a:spcBef>
+              <a:spcAft>
+                <a:spcPct val="0"/>
+              </a:spcAft>
+              <a:defRPr>
+                <a:solidFill>
+                  <a:schemeClr val="tx1"/>
+                </a:solidFill>
+                <a:latin typeface="Arial" panose="020B0604020202020204" pitchFamily="34" charset="0"/>
+                <a:ea typeface="宋体" panose="02010600030101010101" pitchFamily="2" charset="-122"/>
+              </a:defRPr>
+            </a:lvl7pPr>
+            <a:lvl8pPr marL="3429000" indent="-228600" eaLnBrk="0" fontAlgn="base" hangingPunct="0">
+              <a:spcBef>
+                <a:spcPct val="0"/>
+              </a:spcBef>
+              <a:spcAft>
+                <a:spcPct val="0"/>
+              </a:spcAft>
+              <a:defRPr>
+                <a:solidFill>
+                  <a:schemeClr val="tx1"/>
+                </a:solidFill>
+                <a:latin typeface="Arial" panose="020B0604020202020204" pitchFamily="34" charset="0"/>
+                <a:ea typeface="宋体" panose="02010600030101010101" pitchFamily="2" charset="-122"/>
+              </a:defRPr>
+            </a:lvl8pPr>
+            <a:lvl9pPr marL="3886200" indent="-228600" eaLnBrk="0" fontAlgn="base" hangingPunct="0">
+              <a:spcBef>
+                <a:spcPct val="0"/>
+              </a:spcBef>
+              <a:spcAft>
+                <a:spcPct val="0"/>
+              </a:spcAft>
+              <a:defRPr>
+                <a:solidFill>
+                  <a:schemeClr val="tx1"/>
+                </a:solidFill>
+                <a:latin typeface="Arial" panose="020B0604020202020204" pitchFamily="34" charset="0"/>
+                <a:ea typeface="宋体" panose="02010600030101010101" pitchFamily="2" charset="-122"/>
+              </a:defRPr>
+            </a:lvl9pPr>
+          </a:lstStyle>
+          <a:p>
+            <a:pPr eaLnBrk="1" hangingPunct="1"/>
+            <a:r>
+              <a:rPr lang="zh-CN" altLang="en-US" sz="4800" dirty="0">
+                <a:solidFill>
+                  <a:schemeClr val="bg1"/>
+                </a:solidFill>
+                <a:latin typeface="微软雅黑" panose="020B0503020204020204" pitchFamily="34" charset="-122"/>
+                <a:ea typeface="微软雅黑" panose="020B0503020204020204" pitchFamily="34" charset="-122"/>
+              </a:rPr>
+              <a:t>开发环境 </a:t>
+            </a:r>
+            <a:r>
+              <a:rPr lang="en-US" altLang="zh-CN" sz="4800" dirty="0">
+                <a:solidFill>
+                  <a:schemeClr val="bg1"/>
+                </a:solidFill>
+                <a:latin typeface="微软雅黑" panose="020B0503020204020204" pitchFamily="34" charset="-122"/>
+                <a:ea typeface="微软雅黑" panose="020B0503020204020204" pitchFamily="34" charset="-122"/>
+              </a:rPr>
+              <a:t>– Python</a:t>
+            </a:r>
+            <a:r>
+              <a:rPr lang="zh-CN" altLang="en-US" sz="4800" dirty="0">
+                <a:solidFill>
+                  <a:schemeClr val="bg1"/>
+                </a:solidFill>
+                <a:latin typeface="微软雅黑" panose="020B0503020204020204" pitchFamily="34" charset="-122"/>
+                <a:ea typeface="微软雅黑" panose="020B0503020204020204" pitchFamily="34" charset="-122"/>
+              </a:rPr>
+              <a:t>运行时</a:t>
+            </a:r>
+          </a:p>
+        </p:txBody>
+      </p:sp>
+      <p:sp>
+        <p:nvSpPr>
+          <p:cNvPr id="5" name="TextBox 4">
+            <a:extLst>
+              <a:ext uri="{FF2B5EF4-FFF2-40B4-BE49-F238E27FC236}">
+                <a16:creationId xmlns:a16="http://schemas.microsoft.com/office/drawing/2014/main" id="{E8A991AE-3688-4E36-95ED-0003B8B99099}"/>
+              </a:ext>
+            </a:extLst>
+          </p:cNvPr>
+          <p:cNvSpPr txBox="1"/>
+          <p:nvPr/>
+        </p:nvSpPr>
+        <p:spPr>
+          <a:xfrm>
+            <a:off x="179512" y="1196752"/>
+            <a:ext cx="8569325" cy="1600438"/>
+          </a:xfrm>
+          <a:prstGeom prst="rect">
+            <a:avLst/>
+          </a:prstGeom>
+          <a:noFill/>
+        </p:spPr>
+        <p:txBody>
+          <a:bodyPr wrap="square">
+            <a:spAutoFit/>
+          </a:bodyPr>
+          <a:lstStyle/>
+          <a:p>
+            <a:pPr>
+              <a:defRPr/>
+            </a:pPr>
+            <a:r>
+              <a:rPr lang="en-US" altLang="zh-CN" sz="4000" dirty="0">
+                <a:solidFill>
+                  <a:schemeClr val="bg1"/>
+                </a:solidFill>
+                <a:latin typeface="微软雅黑" pitchFamily="34" charset="-122"/>
+                <a:ea typeface="微软雅黑" pitchFamily="34" charset="-122"/>
+              </a:rPr>
+              <a:t>Anaconda</a:t>
+            </a:r>
+            <a:r>
+              <a:rPr lang="zh-CN" altLang="en-US" sz="4000" dirty="0">
+                <a:solidFill>
+                  <a:schemeClr val="bg1"/>
+                </a:solidFill>
+                <a:latin typeface="微软雅黑" pitchFamily="34" charset="-122"/>
+                <a:ea typeface="微软雅黑" pitchFamily="34" charset="-122"/>
+              </a:rPr>
+              <a:t>是什么</a:t>
+            </a:r>
+            <a:r>
+              <a:rPr lang="en-US" altLang="zh-CN" sz="4000" dirty="0">
+                <a:solidFill>
+                  <a:schemeClr val="bg1"/>
+                </a:solidFill>
+                <a:latin typeface="微软雅黑" pitchFamily="34" charset="-122"/>
+                <a:ea typeface="微软雅黑" pitchFamily="34" charset="-122"/>
+              </a:rPr>
+              <a:t> ?</a:t>
+            </a:r>
+          </a:p>
+          <a:p>
+            <a:pPr marL="571500" indent="-571500">
+              <a:buFont typeface="Arial" panose="020B0604020202020204" pitchFamily="34" charset="0"/>
+              <a:buChar char="•"/>
+              <a:defRPr/>
+            </a:pPr>
+            <a:endParaRPr lang="en-US" altLang="zh-CN" sz="4000" dirty="0">
+              <a:solidFill>
+                <a:schemeClr val="bg1"/>
+              </a:solidFill>
+              <a:latin typeface="微软雅黑" pitchFamily="34" charset="-122"/>
+              <a:ea typeface="微软雅黑" pitchFamily="34" charset="-122"/>
+            </a:endParaRPr>
+          </a:p>
+          <a:p>
+            <a:pPr>
+              <a:defRPr/>
+            </a:pPr>
+            <a:endParaRPr lang="en-US" dirty="0">
+              <a:solidFill>
+                <a:schemeClr val="bg1"/>
+              </a:solidFill>
+              <a:latin typeface="Arial" charset="0"/>
+            </a:endParaRPr>
+          </a:p>
+        </p:txBody>
+      </p:sp>
+      <p:pic>
+        <p:nvPicPr>
+          <p:cNvPr id="3074" name="Picture 2" descr="https://upload-images.jianshu.io/upload_images/64542-4e9d1b7b08a5100e.jpg?imageMogr2/auto-orient/strip%7CimageView2/2/w/700">
+            <a:extLst>
+              <a:ext uri="{FF2B5EF4-FFF2-40B4-BE49-F238E27FC236}">
+                <a16:creationId xmlns:a16="http://schemas.microsoft.com/office/drawing/2014/main" id="{09B74F14-139A-4A10-8DAA-5EB73E53B91D}"/>
+              </a:ext>
+            </a:extLst>
+          </p:cNvPr>
+          <p:cNvPicPr>
+            <a:picLocks noChangeAspect="1" noChangeArrowheads="1"/>
+          </p:cNvPicPr>
+          <p:nvPr/>
+        </p:nvPicPr>
+        <p:blipFill>
+          <a:blip r:embed="rId2">
+            <a:extLst>
+              <a:ext uri="{28A0092B-C50C-407E-A947-70E740481C1C}">
+                <a14:useLocalDpi xmlns:a14="http://schemas.microsoft.com/office/drawing/2010/main" val="0"/>
+              </a:ext>
+            </a:extLst>
+          </a:blip>
+          <a:srcRect/>
+          <a:stretch>
+            <a:fillRect/>
+          </a:stretch>
+        </p:blipFill>
+        <p:spPr bwMode="auto">
+          <a:xfrm>
+            <a:off x="2339752" y="1916832"/>
+            <a:ext cx="4132436" cy="4870975"/>
+          </a:xfrm>
+          <a:prstGeom prst="rect">
+            <a:avLst/>
+          </a:prstGeom>
+          <a:noFill/>
+          <a:extLst>
+            <a:ext uri="{909E8E84-426E-40DD-AFC4-6F175D3DCCD1}">
+              <a14:hiddenFill xmlns:a14="http://schemas.microsoft.com/office/drawing/2010/main">
+                <a:solidFill>
+                  <a:srgbClr val="FFFFFF"/>
+                </a:solidFill>
+              </a14:hiddenFill>
+            </a:ext>
+          </a:extLst>
+        </p:spPr>
+      </p:pic>
+    </p:spTree>
+    <p:extLst>
+      <p:ext uri="{BB962C8B-B14F-4D97-AF65-F5344CB8AC3E}">
+        <p14:creationId xmlns:p14="http://schemas.microsoft.com/office/powerpoint/2010/main" val="2801388862"/>
+      </p:ext>
+    </p:extLst>
+  </p:cSld>
+  <p:clrMapOvr>
+    <a:masterClrMapping/>
+  </p:clrMapOvr>
+</p:sld>
+</file>
+
+<file path=ppt/slides/slide14.xml><?xml version="1.0" encoding="utf-8"?>
+<p:sld xmlns:a="http://schemas.openxmlformats.org/drawingml/2006/main" xmlns:r="http://schemas.openxmlformats.org/officeDocument/2006/relationships" xmlns:p="http://schemas.openxmlformats.org/presentationml/2006/main">
+  <p:cSld>
+    <p:spTree>
+      <p:nvGrpSpPr>
+        <p:cNvPr id="1" name=""/>
+        <p:cNvGrpSpPr/>
+        <p:nvPr/>
+      </p:nvGrpSpPr>
+      <p:grpSpPr>
+        <a:xfrm>
+          <a:off x="0" y="0"/>
+          <a:ext cx="0" cy="0"/>
+          <a:chOff x="0" y="0"/>
+          <a:chExt cx="0" cy="0"/>
+        </a:xfrm>
+      </p:grpSpPr>
+      <p:sp>
+        <p:nvSpPr>
+          <p:cNvPr id="4098" name="TextBox 2">
+            <a:extLst>
+              <a:ext uri="{FF2B5EF4-FFF2-40B4-BE49-F238E27FC236}">
+                <a16:creationId xmlns:a16="http://schemas.microsoft.com/office/drawing/2014/main" id="{5552ED83-0001-4E47-A09B-F49C592A8E24}"/>
+              </a:ext>
+            </a:extLst>
+          </p:cNvPr>
+          <p:cNvSpPr txBox="1">
+            <a:spLocks noChangeArrowheads="1"/>
+          </p:cNvSpPr>
+          <p:nvPr/>
+        </p:nvSpPr>
+        <p:spPr bwMode="auto">
+          <a:xfrm>
+            <a:off x="179512" y="260648"/>
+            <a:ext cx="7992888" cy="830997"/>
+          </a:xfrm>
+          <a:prstGeom prst="rect">
+            <a:avLst/>
+          </a:prstGeom>
+          <a:noFill/>
+          <a:ln>
+            <a:noFill/>
+          </a:ln>
+          <a:extLst>
+            <a:ext uri="{909E8E84-426E-40DD-AFC4-6F175D3DCCD1}">
+              <a14:hiddenFill xmlns:a14="http://schemas.microsoft.com/office/drawing/2010/main">
+                <a:solidFill>
+                  <a:srgbClr val="FFFFFF"/>
+                </a:solidFill>
+              </a14:hiddenFill>
+            </a:ext>
+            <a:ext uri="{91240B29-F687-4F45-9708-019B960494DF}">
+              <a14:hiddenLine xmlns:a14="http://schemas.microsoft.com/office/drawing/2010/main" w="9525">
+                <a:solidFill>
+                  <a:srgbClr val="000000"/>
+                </a:solidFill>
+                <a:miter lim="800000"/>
+                <a:headEnd/>
+                <a:tailEnd/>
+              </a14:hiddenLine>
+            </a:ext>
+          </a:extLst>
+        </p:spPr>
+        <p:txBody>
+          <a:bodyPr wrap="square">
+            <a:spAutoFit/>
+          </a:bodyPr>
+          <a:lstStyle>
+            <a:lvl1pPr eaLnBrk="0" hangingPunct="0">
+              <a:defRPr>
+                <a:solidFill>
+                  <a:schemeClr val="tx1"/>
+                </a:solidFill>
+                <a:latin typeface="Arial" panose="020B0604020202020204" pitchFamily="34" charset="0"/>
+                <a:ea typeface="宋体" panose="02010600030101010101" pitchFamily="2" charset="-122"/>
+              </a:defRPr>
+            </a:lvl1pPr>
+            <a:lvl2pPr marL="742950" indent="-285750" eaLnBrk="0" hangingPunct="0">
+              <a:defRPr>
+                <a:solidFill>
+                  <a:schemeClr val="tx1"/>
+                </a:solidFill>
+                <a:latin typeface="Arial" panose="020B0604020202020204" pitchFamily="34" charset="0"/>
+                <a:ea typeface="宋体" panose="02010600030101010101" pitchFamily="2" charset="-122"/>
+              </a:defRPr>
+            </a:lvl2pPr>
+            <a:lvl3pPr marL="1143000" indent="-228600" eaLnBrk="0" hangingPunct="0">
+              <a:defRPr>
+                <a:solidFill>
+                  <a:schemeClr val="tx1"/>
+                </a:solidFill>
+                <a:latin typeface="Arial" panose="020B0604020202020204" pitchFamily="34" charset="0"/>
+                <a:ea typeface="宋体" panose="02010600030101010101" pitchFamily="2" charset="-122"/>
+              </a:defRPr>
+            </a:lvl3pPr>
+            <a:lvl4pPr marL="1600200" indent="-228600" eaLnBrk="0" hangingPunct="0">
+              <a:defRPr>
+                <a:solidFill>
+                  <a:schemeClr val="tx1"/>
+                </a:solidFill>
+                <a:latin typeface="Arial" panose="020B0604020202020204" pitchFamily="34" charset="0"/>
+                <a:ea typeface="宋体" panose="02010600030101010101" pitchFamily="2" charset="-122"/>
+              </a:defRPr>
+            </a:lvl4pPr>
+            <a:lvl5pPr marL="2057400" indent="-228600" eaLnBrk="0" hangingPunct="0">
+              <a:defRPr>
+                <a:solidFill>
+                  <a:schemeClr val="tx1"/>
+                </a:solidFill>
+                <a:latin typeface="Arial" panose="020B0604020202020204" pitchFamily="34" charset="0"/>
+                <a:ea typeface="宋体" panose="02010600030101010101" pitchFamily="2" charset="-122"/>
+              </a:defRPr>
+            </a:lvl5pPr>
+            <a:lvl6pPr marL="2514600" indent="-228600" eaLnBrk="0" fontAlgn="base" hangingPunct="0">
+              <a:spcBef>
+                <a:spcPct val="0"/>
+              </a:spcBef>
+              <a:spcAft>
+                <a:spcPct val="0"/>
+              </a:spcAft>
+              <a:defRPr>
+                <a:solidFill>
+                  <a:schemeClr val="tx1"/>
+                </a:solidFill>
+                <a:latin typeface="Arial" panose="020B0604020202020204" pitchFamily="34" charset="0"/>
+                <a:ea typeface="宋体" panose="02010600030101010101" pitchFamily="2" charset="-122"/>
+              </a:defRPr>
+            </a:lvl6pPr>
+            <a:lvl7pPr marL="2971800" indent="-228600" eaLnBrk="0" fontAlgn="base" hangingPunct="0">
+              <a:spcBef>
+                <a:spcPct val="0"/>
+              </a:spcBef>
+              <a:spcAft>
+                <a:spcPct val="0"/>
+              </a:spcAft>
+              <a:defRPr>
+                <a:solidFill>
+                  <a:schemeClr val="tx1"/>
+                </a:solidFill>
+                <a:latin typeface="Arial" panose="020B0604020202020204" pitchFamily="34" charset="0"/>
+                <a:ea typeface="宋体" panose="02010600030101010101" pitchFamily="2" charset="-122"/>
+              </a:defRPr>
+            </a:lvl7pPr>
+            <a:lvl8pPr marL="3429000" indent="-228600" eaLnBrk="0" fontAlgn="base" hangingPunct="0">
+              <a:spcBef>
+                <a:spcPct val="0"/>
+              </a:spcBef>
+              <a:spcAft>
+                <a:spcPct val="0"/>
+              </a:spcAft>
+              <a:defRPr>
+                <a:solidFill>
+                  <a:schemeClr val="tx1"/>
+                </a:solidFill>
+                <a:latin typeface="Arial" panose="020B0604020202020204" pitchFamily="34" charset="0"/>
+                <a:ea typeface="宋体" panose="02010600030101010101" pitchFamily="2" charset="-122"/>
+              </a:defRPr>
+            </a:lvl8pPr>
+            <a:lvl9pPr marL="3886200" indent="-228600" eaLnBrk="0" fontAlgn="base" hangingPunct="0">
+              <a:spcBef>
+                <a:spcPct val="0"/>
+              </a:spcBef>
+              <a:spcAft>
+                <a:spcPct val="0"/>
+              </a:spcAft>
+              <a:defRPr>
+                <a:solidFill>
+                  <a:schemeClr val="tx1"/>
+                </a:solidFill>
+                <a:latin typeface="Arial" panose="020B0604020202020204" pitchFamily="34" charset="0"/>
+                <a:ea typeface="宋体" panose="02010600030101010101" pitchFamily="2" charset="-122"/>
+              </a:defRPr>
+            </a:lvl9pPr>
+          </a:lstStyle>
+          <a:p>
+            <a:pPr eaLnBrk="1" hangingPunct="1"/>
+            <a:r>
+              <a:rPr lang="zh-CN" altLang="en-US" sz="4800" dirty="0">
+                <a:solidFill>
+                  <a:schemeClr val="bg1"/>
+                </a:solidFill>
+                <a:latin typeface="微软雅黑" panose="020B0503020204020204" pitchFamily="34" charset="-122"/>
+                <a:ea typeface="微软雅黑" panose="020B0503020204020204" pitchFamily="34" charset="-122"/>
+              </a:rPr>
+              <a:t>开发环境 </a:t>
+            </a:r>
+            <a:r>
+              <a:rPr lang="en-US" altLang="zh-CN" sz="4800" dirty="0">
+                <a:solidFill>
+                  <a:schemeClr val="bg1"/>
+                </a:solidFill>
+                <a:latin typeface="微软雅黑" panose="020B0503020204020204" pitchFamily="34" charset="-122"/>
+                <a:ea typeface="微软雅黑" panose="020B0503020204020204" pitchFamily="34" charset="-122"/>
+              </a:rPr>
+              <a:t>– Python</a:t>
+            </a:r>
+            <a:r>
+              <a:rPr lang="zh-CN" altLang="en-US" sz="4800" dirty="0">
+                <a:solidFill>
+                  <a:schemeClr val="bg1"/>
+                </a:solidFill>
+                <a:latin typeface="微软雅黑" panose="020B0503020204020204" pitchFamily="34" charset="-122"/>
+                <a:ea typeface="微软雅黑" panose="020B0503020204020204" pitchFamily="34" charset="-122"/>
+              </a:rPr>
+              <a:t>运行时</a:t>
+            </a:r>
+          </a:p>
+        </p:txBody>
+      </p:sp>
+      <p:sp>
+        <p:nvSpPr>
+          <p:cNvPr id="5" name="TextBox 4">
+            <a:extLst>
+              <a:ext uri="{FF2B5EF4-FFF2-40B4-BE49-F238E27FC236}">
+                <a16:creationId xmlns:a16="http://schemas.microsoft.com/office/drawing/2014/main" id="{E8A991AE-3688-4E36-95ED-0003B8B99099}"/>
+              </a:ext>
+            </a:extLst>
+          </p:cNvPr>
+          <p:cNvSpPr txBox="1"/>
+          <p:nvPr/>
+        </p:nvSpPr>
+        <p:spPr>
+          <a:xfrm>
+            <a:off x="179512" y="1196752"/>
+            <a:ext cx="8569325" cy="4062651"/>
+          </a:xfrm>
+          <a:prstGeom prst="rect">
+            <a:avLst/>
+          </a:prstGeom>
+          <a:noFill/>
+        </p:spPr>
+        <p:txBody>
+          <a:bodyPr wrap="square">
+            <a:spAutoFit/>
+          </a:bodyPr>
+          <a:lstStyle/>
+          <a:p>
+            <a:pPr>
+              <a:defRPr/>
+            </a:pPr>
+            <a:r>
+              <a:rPr lang="en-US" altLang="zh-CN" sz="4000" dirty="0">
+                <a:solidFill>
+                  <a:schemeClr val="bg1"/>
+                </a:solidFill>
+                <a:latin typeface="微软雅黑" pitchFamily="34" charset="-122"/>
+                <a:ea typeface="微软雅黑" pitchFamily="34" charset="-122"/>
+              </a:rPr>
+              <a:t>Anaconda</a:t>
+            </a:r>
+            <a:r>
+              <a:rPr lang="zh-CN" altLang="en-US" sz="4000" dirty="0">
+                <a:solidFill>
+                  <a:schemeClr val="bg1"/>
+                </a:solidFill>
+                <a:latin typeface="微软雅黑" pitchFamily="34" charset="-122"/>
+                <a:ea typeface="微软雅黑" pitchFamily="34" charset="-122"/>
+              </a:rPr>
+              <a:t>的安装方法：</a:t>
+            </a:r>
+            <a:endParaRPr lang="en-US" altLang="zh-CN" sz="4000" dirty="0">
+              <a:solidFill>
+                <a:schemeClr val="bg1"/>
+              </a:solidFill>
+              <a:latin typeface="微软雅黑" pitchFamily="34" charset="-122"/>
+              <a:ea typeface="微软雅黑" pitchFamily="34" charset="-122"/>
+            </a:endParaRPr>
+          </a:p>
+          <a:p>
+            <a:pPr marL="571500" indent="-571500">
+              <a:buFont typeface="Arial" panose="020B0604020202020204" pitchFamily="34" charset="0"/>
+              <a:buChar char="•"/>
+              <a:defRPr/>
+            </a:pPr>
+            <a:r>
+              <a:rPr lang="en-US" altLang="zh-CN" sz="4000" dirty="0">
+                <a:solidFill>
+                  <a:schemeClr val="bg1"/>
+                </a:solidFill>
+                <a:latin typeface="微软雅黑" pitchFamily="34" charset="-122"/>
+                <a:ea typeface="微软雅黑" pitchFamily="34" charset="-122"/>
+                <a:hlinkClick r:id="rId2"/>
+              </a:rPr>
+              <a:t>https://foofish.net/compatible-py2-and-py3.html</a:t>
+            </a:r>
+            <a:endParaRPr lang="en-US" altLang="zh-CN" sz="4000" dirty="0">
+              <a:solidFill>
+                <a:schemeClr val="bg1"/>
+              </a:solidFill>
+              <a:latin typeface="微软雅黑" pitchFamily="34" charset="-122"/>
+              <a:ea typeface="微软雅黑" pitchFamily="34" charset="-122"/>
+            </a:endParaRPr>
+          </a:p>
+          <a:p>
+            <a:pPr marL="571500" indent="-571500">
+              <a:buFont typeface="Arial" panose="020B0604020202020204" pitchFamily="34" charset="0"/>
+              <a:buChar char="•"/>
+              <a:defRPr/>
+            </a:pPr>
+            <a:r>
+              <a:rPr lang="en-US" altLang="zh-CN" sz="4000" dirty="0">
+                <a:solidFill>
+                  <a:schemeClr val="bg1"/>
+                </a:solidFill>
+                <a:latin typeface="微软雅黑" pitchFamily="34" charset="-122"/>
+                <a:ea typeface="微软雅黑" pitchFamily="34" charset="-122"/>
+                <a:hlinkClick r:id="rId3"/>
+              </a:rPr>
+              <a:t>https://www.jianshu.com/p/eecd77803508</a:t>
+            </a:r>
+            <a:endParaRPr lang="en-US" altLang="zh-CN" sz="4000" dirty="0">
+              <a:solidFill>
+                <a:schemeClr val="bg1"/>
+              </a:solidFill>
+              <a:latin typeface="微软雅黑" pitchFamily="34" charset="-122"/>
+              <a:ea typeface="微软雅黑" pitchFamily="34" charset="-122"/>
+            </a:endParaRPr>
+          </a:p>
+          <a:p>
+            <a:pPr marL="571500" indent="-571500">
+              <a:buFont typeface="Arial" panose="020B0604020202020204" pitchFamily="34" charset="0"/>
+              <a:buChar char="•"/>
+              <a:defRPr/>
+            </a:pPr>
+            <a:endParaRPr lang="en-US" altLang="zh-CN" sz="4000" dirty="0">
+              <a:solidFill>
+                <a:schemeClr val="bg1"/>
+              </a:solidFill>
+              <a:latin typeface="微软雅黑" pitchFamily="34" charset="-122"/>
+              <a:ea typeface="微软雅黑" pitchFamily="34" charset="-122"/>
+            </a:endParaRPr>
+          </a:p>
+          <a:p>
+            <a:pPr>
+              <a:defRPr/>
+            </a:pPr>
+            <a:endParaRPr lang="en-US" dirty="0">
+              <a:solidFill>
+                <a:schemeClr val="bg1"/>
+              </a:solidFill>
+              <a:latin typeface="Arial" charset="0"/>
+            </a:endParaRPr>
+          </a:p>
+        </p:txBody>
+      </p:sp>
+    </p:spTree>
+    <p:extLst>
+      <p:ext uri="{BB962C8B-B14F-4D97-AF65-F5344CB8AC3E}">
+        <p14:creationId xmlns:p14="http://schemas.microsoft.com/office/powerpoint/2010/main" val="704276598"/>
+      </p:ext>
+    </p:extLst>
+  </p:cSld>
+  <p:clrMapOvr>
+    <a:masterClrMapping/>
+  </p:clrMapOvr>
+</p:sld>
+</file>
+
+<file path=ppt/slides/slide15.xml><?xml version="1.0" encoding="utf-8"?>
+<p:sld xmlns:a="http://schemas.openxmlformats.org/drawingml/2006/main" xmlns:r="http://schemas.openxmlformats.org/officeDocument/2006/relationships" xmlns:p="http://schemas.openxmlformats.org/presentationml/2006/main">
+  <p:cSld>
+    <p:spTree>
+      <p:nvGrpSpPr>
+        <p:cNvPr id="1" name=""/>
+        <p:cNvGrpSpPr/>
+        <p:nvPr/>
+      </p:nvGrpSpPr>
+      <p:grpSpPr>
+        <a:xfrm>
+          <a:off x="0" y="0"/>
+          <a:ext cx="0" cy="0"/>
+          <a:chOff x="0" y="0"/>
+          <a:chExt cx="0" cy="0"/>
+        </a:xfrm>
+      </p:grpSpPr>
+      <p:sp>
+        <p:nvSpPr>
+          <p:cNvPr id="5122" name="Rectangle 2">
+            <a:extLst>
+              <a:ext uri="{FF2B5EF4-FFF2-40B4-BE49-F238E27FC236}">
+                <a16:creationId xmlns:a16="http://schemas.microsoft.com/office/drawing/2014/main" id="{DA0A6638-A01B-4ADE-AF93-1C7B857D9914}"/>
+              </a:ext>
+            </a:extLst>
+          </p:cNvPr>
+          <p:cNvSpPr>
+            <a:spLocks noGrp="1" noChangeArrowheads="1"/>
+          </p:cNvSpPr>
+          <p:nvPr>
+            <p:ph type="ctrTitle"/>
+          </p:nvPr>
+        </p:nvSpPr>
+        <p:spPr>
+          <a:xfrm>
+            <a:off x="684213" y="2133600"/>
+            <a:ext cx="7847012" cy="2159000"/>
+          </a:xfrm>
+        </p:spPr>
+        <p:txBody>
+          <a:bodyPr/>
+          <a:lstStyle/>
+          <a:p>
+            <a:pPr eaLnBrk="1" hangingPunct="1"/>
+            <a:br>
+              <a:rPr lang="en-US" altLang="zh-CN" sz="8000" dirty="0">
+                <a:solidFill>
+                  <a:schemeClr val="bg1"/>
+                </a:solidFill>
+                <a:ea typeface="微软雅黑" panose="020B0503020204020204" pitchFamily="34" charset="-122"/>
+              </a:rPr>
+            </a:br>
+            <a:r>
+              <a:rPr lang="en-US" altLang="zh-CN" sz="6600" dirty="0">
+                <a:solidFill>
+                  <a:schemeClr val="bg1"/>
+                </a:solidFill>
+                <a:ea typeface="微软雅黑" panose="020B0503020204020204" pitchFamily="34" charset="-122"/>
+              </a:rPr>
+              <a:t>Q &amp; A</a:t>
+            </a:r>
+            <a:br>
+              <a:rPr lang="zh-CN" altLang="en-US" sz="7200" dirty="0">
+                <a:solidFill>
+                  <a:schemeClr val="bg1"/>
+                </a:solidFill>
+                <a:ea typeface="微软雅黑" panose="020B0503020204020204" pitchFamily="34" charset="-122"/>
+              </a:rPr>
+            </a:br>
+            <a:endParaRPr lang="zh-CN" altLang="en-US" sz="7200" dirty="0">
+              <a:solidFill>
+                <a:schemeClr val="bg1"/>
+              </a:solidFill>
+              <a:ea typeface="微软雅黑" panose="020B0503020204020204" pitchFamily="34" charset="-122"/>
+            </a:endParaRPr>
+          </a:p>
+        </p:txBody>
+      </p:sp>
+    </p:spTree>
+    <p:extLst>
+      <p:ext uri="{BB962C8B-B14F-4D97-AF65-F5344CB8AC3E}">
+        <p14:creationId xmlns:p14="http://schemas.microsoft.com/office/powerpoint/2010/main" val="1068010669"/>
+      </p:ext>
+    </p:extLst>
+  </p:cSld>
+  <p:clrMapOvr>
+    <a:masterClrMapping/>
+  </p:clrMapOvr>
+</p:sld>
+</file>
+
 <file path=ppt/slides/slide2.xml><?xml version="1.0" encoding="utf-8"?>
 <p:sld xmlns:a="http://schemas.openxmlformats.org/drawingml/2006/main" xmlns:r="http://schemas.openxmlformats.org/officeDocument/2006/relationships" xmlns:p="http://schemas.openxmlformats.org/presentationml/2006/main">
   <p:cSld>
@@ -8049,13 +9792,13 @@
               </a:rPr>
             </a:br>
             <a:r>
-              <a:rPr lang="en-US" altLang="zh-CN" sz="6600" dirty="0">
+              <a:rPr lang="zh-CN" altLang="en-US" sz="6600" dirty="0">
                 <a:solidFill>
                   <a:schemeClr val="bg1"/>
                 </a:solidFill>
                 <a:ea typeface="微软雅黑" panose="020B0503020204020204" pitchFamily="34" charset="-122"/>
               </a:rPr>
-              <a:t>Chapter N Title</a:t>
+              <a:t>背景</a:t>
             </a:r>
             <a:br>
               <a:rPr lang="zh-CN" altLang="en-US" sz="7200" dirty="0">
@@ -8115,7 +9858,7 @@
         </p:nvSpPr>
         <p:spPr bwMode="auto">
           <a:xfrm>
-            <a:off x="179388" y="530225"/>
+            <a:off x="179512" y="260648"/>
             <a:ext cx="6913562" cy="830263"/>
           </a:xfrm>
           <a:prstGeom prst="rect">
@@ -8259,22 +10002,15 @@
           <a:p>
             <a:pPr eaLnBrk="1" hangingPunct="1"/>
             <a:r>
-              <a:rPr lang="en-US" altLang="zh-CN" sz="4800" dirty="0">
+              <a:rPr lang="zh-CN" altLang="en-US" sz="4800" dirty="0">
                 <a:solidFill>
                   <a:schemeClr val="bg1"/>
                 </a:solidFill>
                 <a:latin typeface="微软雅黑" panose="020B0503020204020204" pitchFamily="34" charset="-122"/>
                 <a:ea typeface="微软雅黑" panose="020B0503020204020204" pitchFamily="34" charset="-122"/>
               </a:rPr>
-              <a:t>Chapter N Title</a:t>
-            </a:r>
-            <a:endParaRPr lang="zh-CN" altLang="en-US" sz="4800" dirty="0">
-              <a:solidFill>
-                <a:schemeClr val="bg1"/>
-              </a:solidFill>
-              <a:latin typeface="微软雅黑" panose="020B0503020204020204" pitchFamily="34" charset="-122"/>
-              <a:ea typeface="微软雅黑" panose="020B0503020204020204" pitchFamily="34" charset="-122"/>
-            </a:endParaRPr>
+              <a:t>背景</a:t>
+            </a:r>
           </a:p>
         </p:txBody>
       </p:sp>
@@ -8292,8 +10028,8 @@
         </p:nvSpPr>
         <p:spPr>
           <a:xfrm>
-            <a:off x="323850" y="1628775"/>
-            <a:ext cx="8569325" cy="707886"/>
+            <a:off x="179512" y="1196752"/>
+            <a:ext cx="8569325" cy="984885"/>
           </a:xfrm>
           <a:prstGeom prst="rect">
             <a:avLst/>
@@ -8310,15 +10046,37 @@
               <a:defRPr/>
             </a:pPr>
             <a:r>
-              <a:rPr lang="en-US" sz="4000" dirty="0">
+              <a:rPr lang="en-US" altLang="zh-CN" sz="4000" dirty="0">
                 <a:solidFill>
                   <a:schemeClr val="bg1"/>
                 </a:solidFill>
                 <a:latin typeface="微软雅黑" pitchFamily="34" charset="-122"/>
                 <a:ea typeface="微软雅黑" pitchFamily="34" charset="-122"/>
               </a:rPr>
-              <a:t>Text</a:t>
-            </a:r>
+              <a:t>Python</a:t>
+            </a:r>
+            <a:r>
+              <a:rPr lang="zh-CN" altLang="en-US" sz="4000" dirty="0">
+                <a:solidFill>
+                  <a:schemeClr val="bg1"/>
+                </a:solidFill>
+                <a:latin typeface="微软雅黑" pitchFamily="34" charset="-122"/>
+                <a:ea typeface="微软雅黑" pitchFamily="34" charset="-122"/>
+              </a:rPr>
+              <a:t>是什么？</a:t>
+            </a:r>
+            <a:endParaRPr lang="en-US" altLang="zh-CN" sz="4000" dirty="0">
+              <a:solidFill>
+                <a:schemeClr val="bg1"/>
+              </a:solidFill>
+              <a:latin typeface="微软雅黑" pitchFamily="34" charset="-122"/>
+              <a:ea typeface="微软雅黑" pitchFamily="34" charset="-122"/>
+            </a:endParaRPr>
+          </a:p>
+          <a:p>
+            <a:pPr>
+              <a:defRPr/>
+            </a:pPr>
             <a:endParaRPr lang="en-US" dirty="0">
               <a:solidFill>
                 <a:schemeClr val="bg1"/>
@@ -8328,6 +10086,36 @@
           </a:p>
         </p:txBody>
       </p:sp>
+      <p:pic>
+        <p:nvPicPr>
+          <p:cNvPr id="2" name="Picture 1">
+            <a:extLst>
+              <a:ext uri="{FF2B5EF4-FFF2-40B4-BE49-F238E27FC236}">
+                <a16:creationId xmlns:a16="http://schemas.microsoft.com/office/drawing/2014/main" id="{38827F9A-B19C-4635-8274-6439442E4788}"/>
+              </a:ext>
+            </a:extLst>
+          </p:cNvPr>
+          <p:cNvPicPr>
+            <a:picLocks noChangeAspect="1"/>
+          </p:cNvPicPr>
+          <p:nvPr/>
+        </p:nvPicPr>
+        <p:blipFill>
+          <a:blip r:embed="rId2"/>
+          <a:stretch>
+            <a:fillRect/>
+          </a:stretch>
+        </p:blipFill>
+        <p:spPr>
+          <a:xfrm>
+            <a:off x="1738312" y="2310342"/>
+            <a:ext cx="5667375" cy="3924300"/>
+          </a:xfrm>
+          <a:prstGeom prst="rect">
+            <a:avLst/>
+          </a:prstGeom>
+        </p:spPr>
+      </p:pic>
     </p:spTree>
   </p:cSld>
   <p:clrMapOvr>
@@ -8355,61 +10143,394 @@
       </p:grpSpPr>
       <p:sp>
         <p:nvSpPr>
-          <p:cNvPr id="5122" name="Rectangle 2">
+          <p:cNvPr id="4098" name="TextBox 2">
             <a:extLst>
               <a:ext uri="{FF2B5EF4-FFF2-40B4-BE49-F238E27FC236}">
-                <a16:creationId xmlns:a16="http://schemas.microsoft.com/office/drawing/2014/main" id="{DA0A6638-A01B-4ADE-AF93-1C7B857D9914}"/>
+                <a16:creationId xmlns:a16="http://schemas.microsoft.com/office/drawing/2014/main" id="{5552ED83-0001-4E47-A09B-F49C592A8E24}"/>
               </a:ext>
             </a:extLst>
           </p:cNvPr>
-          <p:cNvSpPr>
-            <a:spLocks noGrp="1" noChangeArrowheads="1"/>
-          </p:cNvSpPr>
-          <p:nvPr>
-            <p:ph type="ctrTitle"/>
-          </p:nvPr>
+          <p:cNvSpPr txBox="1">
+            <a:spLocks noChangeArrowheads="1"/>
+          </p:cNvSpPr>
+          <p:nvPr/>
+        </p:nvSpPr>
+        <p:spPr bwMode="auto">
+          <a:xfrm>
+            <a:off x="179512" y="260648"/>
+            <a:ext cx="6913562" cy="830263"/>
+          </a:xfrm>
+          <a:prstGeom prst="rect">
+            <a:avLst/>
+          </a:prstGeom>
+          <a:noFill/>
+          <a:ln>
+            <a:noFill/>
+          </a:ln>
+          <a:extLst>
+            <a:ext uri="{909E8E84-426E-40DD-AFC4-6F175D3DCCD1}">
+              <a14:hiddenFill xmlns:a14="http://schemas.microsoft.com/office/drawing/2010/main">
+                <a:solidFill>
+                  <a:srgbClr val="FFFFFF"/>
+                </a:solidFill>
+              </a14:hiddenFill>
+            </a:ext>
+            <a:ext uri="{91240B29-F687-4F45-9708-019B960494DF}">
+              <a14:hiddenLine xmlns:a14="http://schemas.microsoft.com/office/drawing/2010/main" w="9525">
+                <a:solidFill>
+                  <a:srgbClr val="000000"/>
+                </a:solidFill>
+                <a:miter lim="800000"/>
+                <a:headEnd/>
+                <a:tailEnd/>
+              </a14:hiddenLine>
+            </a:ext>
+          </a:extLst>
+        </p:spPr>
+        <p:txBody>
+          <a:bodyPr>
+            <a:spAutoFit/>
+          </a:bodyPr>
+          <a:lstStyle>
+            <a:lvl1pPr eaLnBrk="0" hangingPunct="0">
+              <a:defRPr>
+                <a:solidFill>
+                  <a:schemeClr val="tx1"/>
+                </a:solidFill>
+                <a:latin typeface="Arial" panose="020B0604020202020204" pitchFamily="34" charset="0"/>
+                <a:ea typeface="宋体" panose="02010600030101010101" pitchFamily="2" charset="-122"/>
+              </a:defRPr>
+            </a:lvl1pPr>
+            <a:lvl2pPr marL="742950" indent="-285750" eaLnBrk="0" hangingPunct="0">
+              <a:defRPr>
+                <a:solidFill>
+                  <a:schemeClr val="tx1"/>
+                </a:solidFill>
+                <a:latin typeface="Arial" panose="020B0604020202020204" pitchFamily="34" charset="0"/>
+                <a:ea typeface="宋体" panose="02010600030101010101" pitchFamily="2" charset="-122"/>
+              </a:defRPr>
+            </a:lvl2pPr>
+            <a:lvl3pPr marL="1143000" indent="-228600" eaLnBrk="0" hangingPunct="0">
+              <a:defRPr>
+                <a:solidFill>
+                  <a:schemeClr val="tx1"/>
+                </a:solidFill>
+                <a:latin typeface="Arial" panose="020B0604020202020204" pitchFamily="34" charset="0"/>
+                <a:ea typeface="宋体" panose="02010600030101010101" pitchFamily="2" charset="-122"/>
+              </a:defRPr>
+            </a:lvl3pPr>
+            <a:lvl4pPr marL="1600200" indent="-228600" eaLnBrk="0" hangingPunct="0">
+              <a:defRPr>
+                <a:solidFill>
+                  <a:schemeClr val="tx1"/>
+                </a:solidFill>
+                <a:latin typeface="Arial" panose="020B0604020202020204" pitchFamily="34" charset="0"/>
+                <a:ea typeface="宋体" panose="02010600030101010101" pitchFamily="2" charset="-122"/>
+              </a:defRPr>
+            </a:lvl4pPr>
+            <a:lvl5pPr marL="2057400" indent="-228600" eaLnBrk="0" hangingPunct="0">
+              <a:defRPr>
+                <a:solidFill>
+                  <a:schemeClr val="tx1"/>
+                </a:solidFill>
+                <a:latin typeface="Arial" panose="020B0604020202020204" pitchFamily="34" charset="0"/>
+                <a:ea typeface="宋体" panose="02010600030101010101" pitchFamily="2" charset="-122"/>
+              </a:defRPr>
+            </a:lvl5pPr>
+            <a:lvl6pPr marL="2514600" indent="-228600" eaLnBrk="0" fontAlgn="base" hangingPunct="0">
+              <a:spcBef>
+                <a:spcPct val="0"/>
+              </a:spcBef>
+              <a:spcAft>
+                <a:spcPct val="0"/>
+              </a:spcAft>
+              <a:defRPr>
+                <a:solidFill>
+                  <a:schemeClr val="tx1"/>
+                </a:solidFill>
+                <a:latin typeface="Arial" panose="020B0604020202020204" pitchFamily="34" charset="0"/>
+                <a:ea typeface="宋体" panose="02010600030101010101" pitchFamily="2" charset="-122"/>
+              </a:defRPr>
+            </a:lvl6pPr>
+            <a:lvl7pPr marL="2971800" indent="-228600" eaLnBrk="0" fontAlgn="base" hangingPunct="0">
+              <a:spcBef>
+                <a:spcPct val="0"/>
+              </a:spcBef>
+              <a:spcAft>
+                <a:spcPct val="0"/>
+              </a:spcAft>
+              <a:defRPr>
+                <a:solidFill>
+                  <a:schemeClr val="tx1"/>
+                </a:solidFill>
+                <a:latin typeface="Arial" panose="020B0604020202020204" pitchFamily="34" charset="0"/>
+                <a:ea typeface="宋体" panose="02010600030101010101" pitchFamily="2" charset="-122"/>
+              </a:defRPr>
+            </a:lvl7pPr>
+            <a:lvl8pPr marL="3429000" indent="-228600" eaLnBrk="0" fontAlgn="base" hangingPunct="0">
+              <a:spcBef>
+                <a:spcPct val="0"/>
+              </a:spcBef>
+              <a:spcAft>
+                <a:spcPct val="0"/>
+              </a:spcAft>
+              <a:defRPr>
+                <a:solidFill>
+                  <a:schemeClr val="tx1"/>
+                </a:solidFill>
+                <a:latin typeface="Arial" panose="020B0604020202020204" pitchFamily="34" charset="0"/>
+                <a:ea typeface="宋体" panose="02010600030101010101" pitchFamily="2" charset="-122"/>
+              </a:defRPr>
+            </a:lvl8pPr>
+            <a:lvl9pPr marL="3886200" indent="-228600" eaLnBrk="0" fontAlgn="base" hangingPunct="0">
+              <a:spcBef>
+                <a:spcPct val="0"/>
+              </a:spcBef>
+              <a:spcAft>
+                <a:spcPct val="0"/>
+              </a:spcAft>
+              <a:defRPr>
+                <a:solidFill>
+                  <a:schemeClr val="tx1"/>
+                </a:solidFill>
+                <a:latin typeface="Arial" panose="020B0604020202020204" pitchFamily="34" charset="0"/>
+                <a:ea typeface="宋体" panose="02010600030101010101" pitchFamily="2" charset="-122"/>
+              </a:defRPr>
+            </a:lvl9pPr>
+          </a:lstStyle>
+          <a:p>
+            <a:pPr eaLnBrk="1" hangingPunct="1"/>
+            <a:r>
+              <a:rPr lang="zh-CN" altLang="en-US" sz="4800" dirty="0">
+                <a:solidFill>
+                  <a:schemeClr val="bg1"/>
+                </a:solidFill>
+                <a:latin typeface="微软雅黑" panose="020B0503020204020204" pitchFamily="34" charset="-122"/>
+                <a:ea typeface="微软雅黑" panose="020B0503020204020204" pitchFamily="34" charset="-122"/>
+              </a:rPr>
+              <a:t>背景</a:t>
+            </a:r>
+          </a:p>
+        </p:txBody>
+      </p:sp>
+      <p:sp>
+        <p:nvSpPr>
+          <p:cNvPr id="5" name="TextBox 4">
+            <a:extLst>
+              <a:ext uri="{FF2B5EF4-FFF2-40B4-BE49-F238E27FC236}">
+                <a16:creationId xmlns:a16="http://schemas.microsoft.com/office/drawing/2014/main" id="{E8A991AE-3688-4E36-95ED-0003B8B99099}"/>
+              </a:ext>
+            </a:extLst>
+          </p:cNvPr>
+          <p:cNvSpPr txBox="1"/>
+          <p:nvPr/>
         </p:nvSpPr>
         <p:spPr>
           <a:xfrm>
-            <a:off x="684213" y="2133600"/>
-            <a:ext cx="7847012" cy="2159000"/>
+            <a:off x="179512" y="1196752"/>
+            <a:ext cx="8569325" cy="4062651"/>
           </a:xfrm>
-        </p:spPr>
-        <p:txBody>
-          <a:bodyPr/>
+          <a:prstGeom prst="rect">
+            <a:avLst/>
+          </a:prstGeom>
+          <a:noFill/>
+        </p:spPr>
+        <p:txBody>
+          <a:bodyPr>
+            <a:spAutoFit/>
+          </a:bodyPr>
           <a:lstStyle/>
           <a:p>
-            <a:pPr eaLnBrk="1" hangingPunct="1"/>
-            <a:br>
-              <a:rPr lang="en-US" altLang="zh-CN" sz="8000" dirty="0">
+            <a:pPr>
+              <a:defRPr/>
+            </a:pPr>
+            <a:r>
+              <a:rPr lang="en-US" altLang="zh-CN" sz="4000" dirty="0">
                 <a:solidFill>
                   <a:schemeClr val="bg1"/>
                 </a:solidFill>
-                <a:ea typeface="微软雅黑" panose="020B0503020204020204" pitchFamily="34" charset="-122"/>
+                <a:latin typeface="微软雅黑" pitchFamily="34" charset="-122"/>
+                <a:ea typeface="微软雅黑" pitchFamily="34" charset="-122"/>
               </a:rPr>
-            </a:br>
-            <a:r>
-              <a:rPr lang="en-US" altLang="zh-CN" sz="6600" dirty="0">
+              <a:t>Python</a:t>
+            </a:r>
+            <a:r>
+              <a:rPr lang="zh-CN" altLang="en-US" sz="4000" dirty="0">
                 <a:solidFill>
                   <a:schemeClr val="bg1"/>
                 </a:solidFill>
-                <a:ea typeface="微软雅黑" panose="020B0503020204020204" pitchFamily="34" charset="-122"/>
+                <a:latin typeface="微软雅黑" pitchFamily="34" charset="-122"/>
+                <a:ea typeface="微软雅黑" pitchFamily="34" charset="-122"/>
               </a:rPr>
-              <a:t>Q &amp; A</a:t>
-            </a:r>
-            <a:br>
-              <a:rPr lang="zh-CN" altLang="en-US" sz="7200" dirty="0">
-                <a:solidFill>
-                  <a:schemeClr val="bg1"/>
-                </a:solidFill>
-                <a:ea typeface="微软雅黑" panose="020B0503020204020204" pitchFamily="34" charset="-122"/>
-              </a:rPr>
-            </a:br>
-            <a:endParaRPr lang="zh-CN" altLang="en-US" sz="7200" dirty="0">
+              <a:t>是什么？</a:t>
+            </a:r>
+            <a:endParaRPr lang="en-US" altLang="zh-CN" sz="4000" dirty="0">
               <a:solidFill>
                 <a:schemeClr val="bg1"/>
               </a:solidFill>
-              <a:ea typeface="微软雅黑" panose="020B0503020204020204" pitchFamily="34" charset="-122"/>
+              <a:latin typeface="微软雅黑" pitchFamily="34" charset="-122"/>
+              <a:ea typeface="微软雅黑" pitchFamily="34" charset="-122"/>
+            </a:endParaRPr>
+          </a:p>
+          <a:p>
+            <a:pPr marL="571500" indent="-571500">
+              <a:buFont typeface="Arial" panose="020B0604020202020204" pitchFamily="34" charset="0"/>
+              <a:buChar char="•"/>
+              <a:defRPr/>
+            </a:pPr>
+            <a:r>
+              <a:rPr lang="en-US" altLang="zh-CN" sz="4000" dirty="0">
+                <a:solidFill>
+                  <a:schemeClr val="bg1"/>
+                </a:solidFill>
+                <a:latin typeface="微软雅黑" pitchFamily="34" charset="-122"/>
+                <a:ea typeface="微软雅黑" pitchFamily="34" charset="-122"/>
+              </a:rPr>
+              <a:t>Python </a:t>
+            </a:r>
+            <a:r>
+              <a:rPr lang="zh-CN" altLang="en-US" sz="4000" dirty="0">
+                <a:solidFill>
+                  <a:schemeClr val="bg1"/>
+                </a:solidFill>
+                <a:latin typeface="微软雅黑" pitchFamily="34" charset="-122"/>
+                <a:ea typeface="微软雅黑" pitchFamily="34" charset="-122"/>
+              </a:rPr>
+              <a:t>是一种解释型语言</a:t>
+            </a:r>
+            <a:endParaRPr lang="en-US" altLang="zh-CN" sz="4000" dirty="0">
+              <a:solidFill>
+                <a:schemeClr val="bg1"/>
+              </a:solidFill>
+              <a:latin typeface="微软雅黑" pitchFamily="34" charset="-122"/>
+              <a:ea typeface="微软雅黑" pitchFamily="34" charset="-122"/>
+            </a:endParaRPr>
+          </a:p>
+          <a:p>
+            <a:pPr marL="571500" indent="-571500">
+              <a:buFont typeface="Arial" panose="020B0604020202020204" pitchFamily="34" charset="0"/>
+              <a:buChar char="•"/>
+              <a:defRPr/>
+            </a:pPr>
+            <a:r>
+              <a:rPr lang="en-US" altLang="zh-CN" sz="4000" dirty="0">
+                <a:solidFill>
+                  <a:schemeClr val="bg1"/>
+                </a:solidFill>
+                <a:latin typeface="微软雅黑" pitchFamily="34" charset="-122"/>
+                <a:ea typeface="微软雅黑" pitchFamily="34" charset="-122"/>
+              </a:rPr>
+              <a:t>Python </a:t>
+            </a:r>
+            <a:r>
+              <a:rPr lang="zh-CN" altLang="en-US" sz="4000" dirty="0">
+                <a:solidFill>
+                  <a:schemeClr val="bg1"/>
+                </a:solidFill>
+                <a:latin typeface="微软雅黑" pitchFamily="34" charset="-122"/>
+                <a:ea typeface="微软雅黑" pitchFamily="34" charset="-122"/>
+              </a:rPr>
+              <a:t>是一种动态语言</a:t>
+            </a:r>
+            <a:endParaRPr lang="en-US" altLang="zh-CN" sz="4000" dirty="0">
+              <a:solidFill>
+                <a:schemeClr val="bg1"/>
+              </a:solidFill>
+              <a:latin typeface="微软雅黑" pitchFamily="34" charset="-122"/>
+              <a:ea typeface="微软雅黑" pitchFamily="34" charset="-122"/>
+            </a:endParaRPr>
+          </a:p>
+          <a:p>
+            <a:pPr marL="571500" indent="-571500">
+              <a:buFont typeface="Arial" panose="020B0604020202020204" pitchFamily="34" charset="0"/>
+              <a:buChar char="•"/>
+              <a:defRPr/>
+            </a:pPr>
+            <a:r>
+              <a:rPr lang="en-US" altLang="zh-CN" sz="4000" dirty="0">
+                <a:solidFill>
+                  <a:schemeClr val="bg1"/>
+                </a:solidFill>
+                <a:latin typeface="微软雅黑" pitchFamily="34" charset="-122"/>
+                <a:ea typeface="微软雅黑" pitchFamily="34" charset="-122"/>
+              </a:rPr>
+              <a:t>Python </a:t>
+            </a:r>
+            <a:r>
+              <a:rPr lang="zh-CN" altLang="en-US" sz="4000" dirty="0">
+                <a:solidFill>
+                  <a:schemeClr val="bg1"/>
+                </a:solidFill>
+                <a:latin typeface="微软雅黑" pitchFamily="34" charset="-122"/>
+                <a:ea typeface="微软雅黑" pitchFamily="34" charset="-122"/>
+              </a:rPr>
+              <a:t>是一种</a:t>
+            </a:r>
+            <a:r>
+              <a:rPr lang="en-US" altLang="zh-CN" sz="4000" dirty="0">
+                <a:solidFill>
+                  <a:schemeClr val="bg1"/>
+                </a:solidFill>
+                <a:latin typeface="微软雅黑" pitchFamily="34" charset="-122"/>
+                <a:ea typeface="微软雅黑" pitchFamily="34" charset="-122"/>
+              </a:rPr>
+              <a:t>OOP</a:t>
+            </a:r>
+            <a:r>
+              <a:rPr lang="zh-CN" altLang="en-US" sz="4000" dirty="0">
+                <a:solidFill>
+                  <a:schemeClr val="bg1"/>
+                </a:solidFill>
+                <a:latin typeface="微软雅黑" pitchFamily="34" charset="-122"/>
+                <a:ea typeface="微软雅黑" pitchFamily="34" charset="-122"/>
+              </a:rPr>
+              <a:t>语言</a:t>
+            </a:r>
+            <a:endParaRPr lang="en-US" altLang="zh-CN" sz="4000" dirty="0">
+              <a:solidFill>
+                <a:schemeClr val="bg1"/>
+              </a:solidFill>
+              <a:latin typeface="微软雅黑" pitchFamily="34" charset="-122"/>
+              <a:ea typeface="微软雅黑" pitchFamily="34" charset="-122"/>
+            </a:endParaRPr>
+          </a:p>
+          <a:p>
+            <a:pPr marL="571500" indent="-571500">
+              <a:buFont typeface="Arial" panose="020B0604020202020204" pitchFamily="34" charset="0"/>
+              <a:buChar char="•"/>
+              <a:defRPr/>
+            </a:pPr>
+            <a:endParaRPr lang="en-US" altLang="zh-CN" sz="4000" b="1" dirty="0">
+              <a:solidFill>
+                <a:schemeClr val="bg1"/>
+              </a:solidFill>
+              <a:latin typeface="微软雅黑" pitchFamily="34" charset="-122"/>
+              <a:ea typeface="微软雅黑" pitchFamily="34" charset="-122"/>
+            </a:endParaRPr>
+          </a:p>
+          <a:p>
+            <a:pPr marL="571500" indent="-571500">
+              <a:buFont typeface="Arial" panose="020B0604020202020204" pitchFamily="34" charset="0"/>
+              <a:buChar char="•"/>
+              <a:defRPr/>
+            </a:pPr>
+            <a:endParaRPr lang="en-US" altLang="zh-CN" sz="4000" dirty="0">
+              <a:solidFill>
+                <a:schemeClr val="bg1"/>
+              </a:solidFill>
+              <a:latin typeface="微软雅黑" pitchFamily="34" charset="-122"/>
+              <a:ea typeface="微软雅黑" pitchFamily="34" charset="-122"/>
+            </a:endParaRPr>
+          </a:p>
+          <a:p>
+            <a:pPr>
+              <a:defRPr/>
+            </a:pPr>
+            <a:endParaRPr lang="en-US" dirty="0">
+              <a:solidFill>
+                <a:schemeClr val="bg1"/>
+              </a:solidFill>
+              <a:latin typeface="Arial" charset="0"/>
             </a:endParaRPr>
           </a:p>
         </p:txBody>
@@ -8417,7 +10538,1510 @@
     </p:spTree>
     <p:extLst>
       <p:ext uri="{BB962C8B-B14F-4D97-AF65-F5344CB8AC3E}">
-        <p14:creationId xmlns:p14="http://schemas.microsoft.com/office/powerpoint/2010/main" val="1068010669"/>
+        <p14:creationId xmlns:p14="http://schemas.microsoft.com/office/powerpoint/2010/main" val="2249524029"/>
+      </p:ext>
+    </p:extLst>
+  </p:cSld>
+  <p:clrMapOvr>
+    <a:masterClrMapping/>
+  </p:clrMapOvr>
+</p:sld>
+</file>
+
+<file path=ppt/slides/slide6.xml><?xml version="1.0" encoding="utf-8"?>
+<p:sld xmlns:a="http://schemas.openxmlformats.org/drawingml/2006/main" xmlns:r="http://schemas.openxmlformats.org/officeDocument/2006/relationships" xmlns:p="http://schemas.openxmlformats.org/presentationml/2006/main">
+  <p:cSld>
+    <p:spTree>
+      <p:nvGrpSpPr>
+        <p:cNvPr id="1" name=""/>
+        <p:cNvGrpSpPr/>
+        <p:nvPr/>
+      </p:nvGrpSpPr>
+      <p:grpSpPr>
+        <a:xfrm>
+          <a:off x="0" y="0"/>
+          <a:ext cx="0" cy="0"/>
+          <a:chOff x="0" y="0"/>
+          <a:chExt cx="0" cy="0"/>
+        </a:xfrm>
+      </p:grpSpPr>
+      <p:sp>
+        <p:nvSpPr>
+          <p:cNvPr id="4098" name="TextBox 2">
+            <a:extLst>
+              <a:ext uri="{FF2B5EF4-FFF2-40B4-BE49-F238E27FC236}">
+                <a16:creationId xmlns:a16="http://schemas.microsoft.com/office/drawing/2014/main" id="{5552ED83-0001-4E47-A09B-F49C592A8E24}"/>
+              </a:ext>
+            </a:extLst>
+          </p:cNvPr>
+          <p:cNvSpPr txBox="1">
+            <a:spLocks noChangeArrowheads="1"/>
+          </p:cNvSpPr>
+          <p:nvPr/>
+        </p:nvSpPr>
+        <p:spPr bwMode="auto">
+          <a:xfrm>
+            <a:off x="179512" y="116632"/>
+            <a:ext cx="6913562" cy="830263"/>
+          </a:xfrm>
+          <a:prstGeom prst="rect">
+            <a:avLst/>
+          </a:prstGeom>
+          <a:noFill/>
+          <a:ln>
+            <a:noFill/>
+          </a:ln>
+          <a:extLst>
+            <a:ext uri="{909E8E84-426E-40DD-AFC4-6F175D3DCCD1}">
+              <a14:hiddenFill xmlns:a14="http://schemas.microsoft.com/office/drawing/2010/main">
+                <a:solidFill>
+                  <a:srgbClr val="FFFFFF"/>
+                </a:solidFill>
+              </a14:hiddenFill>
+            </a:ext>
+            <a:ext uri="{91240B29-F687-4F45-9708-019B960494DF}">
+              <a14:hiddenLine xmlns:a14="http://schemas.microsoft.com/office/drawing/2010/main" w="9525">
+                <a:solidFill>
+                  <a:srgbClr val="000000"/>
+                </a:solidFill>
+                <a:miter lim="800000"/>
+                <a:headEnd/>
+                <a:tailEnd/>
+              </a14:hiddenLine>
+            </a:ext>
+          </a:extLst>
+        </p:spPr>
+        <p:txBody>
+          <a:bodyPr>
+            <a:spAutoFit/>
+          </a:bodyPr>
+          <a:lstStyle>
+            <a:lvl1pPr eaLnBrk="0" hangingPunct="0">
+              <a:defRPr>
+                <a:solidFill>
+                  <a:schemeClr val="tx1"/>
+                </a:solidFill>
+                <a:latin typeface="Arial" panose="020B0604020202020204" pitchFamily="34" charset="0"/>
+                <a:ea typeface="宋体" panose="02010600030101010101" pitchFamily="2" charset="-122"/>
+              </a:defRPr>
+            </a:lvl1pPr>
+            <a:lvl2pPr marL="742950" indent="-285750" eaLnBrk="0" hangingPunct="0">
+              <a:defRPr>
+                <a:solidFill>
+                  <a:schemeClr val="tx1"/>
+                </a:solidFill>
+                <a:latin typeface="Arial" panose="020B0604020202020204" pitchFamily="34" charset="0"/>
+                <a:ea typeface="宋体" panose="02010600030101010101" pitchFamily="2" charset="-122"/>
+              </a:defRPr>
+            </a:lvl2pPr>
+            <a:lvl3pPr marL="1143000" indent="-228600" eaLnBrk="0" hangingPunct="0">
+              <a:defRPr>
+                <a:solidFill>
+                  <a:schemeClr val="tx1"/>
+                </a:solidFill>
+                <a:latin typeface="Arial" panose="020B0604020202020204" pitchFamily="34" charset="0"/>
+                <a:ea typeface="宋体" panose="02010600030101010101" pitchFamily="2" charset="-122"/>
+              </a:defRPr>
+            </a:lvl3pPr>
+            <a:lvl4pPr marL="1600200" indent="-228600" eaLnBrk="0" hangingPunct="0">
+              <a:defRPr>
+                <a:solidFill>
+                  <a:schemeClr val="tx1"/>
+                </a:solidFill>
+                <a:latin typeface="Arial" panose="020B0604020202020204" pitchFamily="34" charset="0"/>
+                <a:ea typeface="宋体" panose="02010600030101010101" pitchFamily="2" charset="-122"/>
+              </a:defRPr>
+            </a:lvl4pPr>
+            <a:lvl5pPr marL="2057400" indent="-228600" eaLnBrk="0" hangingPunct="0">
+              <a:defRPr>
+                <a:solidFill>
+                  <a:schemeClr val="tx1"/>
+                </a:solidFill>
+                <a:latin typeface="Arial" panose="020B0604020202020204" pitchFamily="34" charset="0"/>
+                <a:ea typeface="宋体" panose="02010600030101010101" pitchFamily="2" charset="-122"/>
+              </a:defRPr>
+            </a:lvl5pPr>
+            <a:lvl6pPr marL="2514600" indent="-228600" eaLnBrk="0" fontAlgn="base" hangingPunct="0">
+              <a:spcBef>
+                <a:spcPct val="0"/>
+              </a:spcBef>
+              <a:spcAft>
+                <a:spcPct val="0"/>
+              </a:spcAft>
+              <a:defRPr>
+                <a:solidFill>
+                  <a:schemeClr val="tx1"/>
+                </a:solidFill>
+                <a:latin typeface="Arial" panose="020B0604020202020204" pitchFamily="34" charset="0"/>
+                <a:ea typeface="宋体" panose="02010600030101010101" pitchFamily="2" charset="-122"/>
+              </a:defRPr>
+            </a:lvl6pPr>
+            <a:lvl7pPr marL="2971800" indent="-228600" eaLnBrk="0" fontAlgn="base" hangingPunct="0">
+              <a:spcBef>
+                <a:spcPct val="0"/>
+              </a:spcBef>
+              <a:spcAft>
+                <a:spcPct val="0"/>
+              </a:spcAft>
+              <a:defRPr>
+                <a:solidFill>
+                  <a:schemeClr val="tx1"/>
+                </a:solidFill>
+                <a:latin typeface="Arial" panose="020B0604020202020204" pitchFamily="34" charset="0"/>
+                <a:ea typeface="宋体" panose="02010600030101010101" pitchFamily="2" charset="-122"/>
+              </a:defRPr>
+            </a:lvl7pPr>
+            <a:lvl8pPr marL="3429000" indent="-228600" eaLnBrk="0" fontAlgn="base" hangingPunct="0">
+              <a:spcBef>
+                <a:spcPct val="0"/>
+              </a:spcBef>
+              <a:spcAft>
+                <a:spcPct val="0"/>
+              </a:spcAft>
+              <a:defRPr>
+                <a:solidFill>
+                  <a:schemeClr val="tx1"/>
+                </a:solidFill>
+                <a:latin typeface="Arial" panose="020B0604020202020204" pitchFamily="34" charset="0"/>
+                <a:ea typeface="宋体" panose="02010600030101010101" pitchFamily="2" charset="-122"/>
+              </a:defRPr>
+            </a:lvl8pPr>
+            <a:lvl9pPr marL="3886200" indent="-228600" eaLnBrk="0" fontAlgn="base" hangingPunct="0">
+              <a:spcBef>
+                <a:spcPct val="0"/>
+              </a:spcBef>
+              <a:spcAft>
+                <a:spcPct val="0"/>
+              </a:spcAft>
+              <a:defRPr>
+                <a:solidFill>
+                  <a:schemeClr val="tx1"/>
+                </a:solidFill>
+                <a:latin typeface="Arial" panose="020B0604020202020204" pitchFamily="34" charset="0"/>
+                <a:ea typeface="宋体" panose="02010600030101010101" pitchFamily="2" charset="-122"/>
+              </a:defRPr>
+            </a:lvl9pPr>
+          </a:lstStyle>
+          <a:p>
+            <a:pPr eaLnBrk="1" hangingPunct="1"/>
+            <a:r>
+              <a:rPr lang="zh-CN" altLang="en-US" sz="4800" dirty="0">
+                <a:solidFill>
+                  <a:schemeClr val="bg1"/>
+                </a:solidFill>
+                <a:latin typeface="微软雅黑" panose="020B0503020204020204" pitchFamily="34" charset="-122"/>
+                <a:ea typeface="微软雅黑" panose="020B0503020204020204" pitchFamily="34" charset="-122"/>
+              </a:rPr>
+              <a:t>背景</a:t>
+            </a:r>
+          </a:p>
+        </p:txBody>
+      </p:sp>
+      <p:sp>
+        <p:nvSpPr>
+          <p:cNvPr id="5" name="TextBox 4">
+            <a:extLst>
+              <a:ext uri="{FF2B5EF4-FFF2-40B4-BE49-F238E27FC236}">
+                <a16:creationId xmlns:a16="http://schemas.microsoft.com/office/drawing/2014/main" id="{E8A991AE-3688-4E36-95ED-0003B8B99099}"/>
+              </a:ext>
+            </a:extLst>
+          </p:cNvPr>
+          <p:cNvSpPr txBox="1"/>
+          <p:nvPr/>
+        </p:nvSpPr>
+        <p:spPr>
+          <a:xfrm>
+            <a:off x="179512" y="980728"/>
+            <a:ext cx="8569325" cy="2215991"/>
+          </a:xfrm>
+          <a:prstGeom prst="rect">
+            <a:avLst/>
+          </a:prstGeom>
+          <a:noFill/>
+        </p:spPr>
+        <p:txBody>
+          <a:bodyPr>
+            <a:spAutoFit/>
+          </a:bodyPr>
+          <a:lstStyle/>
+          <a:p>
+            <a:pPr>
+              <a:defRPr/>
+            </a:pPr>
+            <a:r>
+              <a:rPr lang="en-US" altLang="zh-CN" sz="4000" dirty="0">
+                <a:solidFill>
+                  <a:schemeClr val="bg1"/>
+                </a:solidFill>
+                <a:latin typeface="微软雅黑" pitchFamily="34" charset="-122"/>
+                <a:ea typeface="微软雅黑" pitchFamily="34" charset="-122"/>
+              </a:rPr>
+              <a:t>Python</a:t>
+            </a:r>
+            <a:r>
+              <a:rPr lang="zh-CN" altLang="en-US" sz="4000" dirty="0">
+                <a:solidFill>
+                  <a:schemeClr val="bg1"/>
+                </a:solidFill>
+                <a:latin typeface="微软雅黑" pitchFamily="34" charset="-122"/>
+                <a:ea typeface="微软雅黑" pitchFamily="34" charset="-122"/>
+              </a:rPr>
+              <a:t>是什么？</a:t>
+            </a:r>
+            <a:endParaRPr lang="en-US" altLang="zh-CN" sz="4000" dirty="0">
+              <a:solidFill>
+                <a:schemeClr val="bg1"/>
+              </a:solidFill>
+              <a:latin typeface="微软雅黑" pitchFamily="34" charset="-122"/>
+              <a:ea typeface="微软雅黑" pitchFamily="34" charset="-122"/>
+            </a:endParaRPr>
+          </a:p>
+          <a:p>
+            <a:pPr>
+              <a:defRPr/>
+            </a:pPr>
+            <a:endParaRPr lang="en-US" altLang="zh-CN" sz="4000" b="1" dirty="0">
+              <a:solidFill>
+                <a:schemeClr val="bg1"/>
+              </a:solidFill>
+              <a:latin typeface="微软雅黑" pitchFamily="34" charset="-122"/>
+              <a:ea typeface="微软雅黑" pitchFamily="34" charset="-122"/>
+            </a:endParaRPr>
+          </a:p>
+          <a:p>
+            <a:pPr marL="571500" indent="-571500">
+              <a:buFont typeface="Arial" panose="020B0604020202020204" pitchFamily="34" charset="0"/>
+              <a:buChar char="•"/>
+              <a:defRPr/>
+            </a:pPr>
+            <a:endParaRPr lang="en-US" altLang="zh-CN" sz="4000" dirty="0">
+              <a:solidFill>
+                <a:schemeClr val="bg1"/>
+              </a:solidFill>
+              <a:latin typeface="微软雅黑" pitchFamily="34" charset="-122"/>
+              <a:ea typeface="微软雅黑" pitchFamily="34" charset="-122"/>
+            </a:endParaRPr>
+          </a:p>
+          <a:p>
+            <a:pPr>
+              <a:defRPr/>
+            </a:pPr>
+            <a:endParaRPr lang="en-US" dirty="0">
+              <a:solidFill>
+                <a:schemeClr val="bg1"/>
+              </a:solidFill>
+              <a:latin typeface="Arial" charset="0"/>
+            </a:endParaRPr>
+          </a:p>
+        </p:txBody>
+      </p:sp>
+      <p:pic>
+        <p:nvPicPr>
+          <p:cNvPr id="3" name="Picture 2">
+            <a:extLst>
+              <a:ext uri="{FF2B5EF4-FFF2-40B4-BE49-F238E27FC236}">
+                <a16:creationId xmlns:a16="http://schemas.microsoft.com/office/drawing/2014/main" id="{E79BCCA0-F07A-4750-9531-7E2622444879}"/>
+              </a:ext>
+            </a:extLst>
+          </p:cNvPr>
+          <p:cNvPicPr>
+            <a:picLocks noChangeAspect="1"/>
+          </p:cNvPicPr>
+          <p:nvPr/>
+        </p:nvPicPr>
+        <p:blipFill>
+          <a:blip r:embed="rId2"/>
+          <a:stretch>
+            <a:fillRect/>
+          </a:stretch>
+        </p:blipFill>
+        <p:spPr>
+          <a:xfrm>
+            <a:off x="2123728" y="1628800"/>
+            <a:ext cx="4756972" cy="4897711"/>
+          </a:xfrm>
+          <a:prstGeom prst="rect">
+            <a:avLst/>
+          </a:prstGeom>
+        </p:spPr>
+      </p:pic>
+    </p:spTree>
+    <p:extLst>
+      <p:ext uri="{BB962C8B-B14F-4D97-AF65-F5344CB8AC3E}">
+        <p14:creationId xmlns:p14="http://schemas.microsoft.com/office/powerpoint/2010/main" val="2124254600"/>
+      </p:ext>
+    </p:extLst>
+  </p:cSld>
+  <p:clrMapOvr>
+    <a:masterClrMapping/>
+  </p:clrMapOvr>
+</p:sld>
+</file>
+
+<file path=ppt/slides/slide7.xml><?xml version="1.0" encoding="utf-8"?>
+<p:sld xmlns:a="http://schemas.openxmlformats.org/drawingml/2006/main" xmlns:r="http://schemas.openxmlformats.org/officeDocument/2006/relationships" xmlns:p="http://schemas.openxmlformats.org/presentationml/2006/main">
+  <p:cSld>
+    <p:spTree>
+      <p:nvGrpSpPr>
+        <p:cNvPr id="1" name=""/>
+        <p:cNvGrpSpPr/>
+        <p:nvPr/>
+      </p:nvGrpSpPr>
+      <p:grpSpPr>
+        <a:xfrm>
+          <a:off x="0" y="0"/>
+          <a:ext cx="0" cy="0"/>
+          <a:chOff x="0" y="0"/>
+          <a:chExt cx="0" cy="0"/>
+        </a:xfrm>
+      </p:grpSpPr>
+      <p:sp>
+        <p:nvSpPr>
+          <p:cNvPr id="4098" name="TextBox 2">
+            <a:extLst>
+              <a:ext uri="{FF2B5EF4-FFF2-40B4-BE49-F238E27FC236}">
+                <a16:creationId xmlns:a16="http://schemas.microsoft.com/office/drawing/2014/main" id="{5552ED83-0001-4E47-A09B-F49C592A8E24}"/>
+              </a:ext>
+            </a:extLst>
+          </p:cNvPr>
+          <p:cNvSpPr txBox="1">
+            <a:spLocks noChangeArrowheads="1"/>
+          </p:cNvSpPr>
+          <p:nvPr/>
+        </p:nvSpPr>
+        <p:spPr bwMode="auto">
+          <a:xfrm>
+            <a:off x="179512" y="260648"/>
+            <a:ext cx="6913562" cy="830997"/>
+          </a:xfrm>
+          <a:prstGeom prst="rect">
+            <a:avLst/>
+          </a:prstGeom>
+          <a:noFill/>
+          <a:ln>
+            <a:noFill/>
+          </a:ln>
+          <a:extLst>
+            <a:ext uri="{909E8E84-426E-40DD-AFC4-6F175D3DCCD1}">
+              <a14:hiddenFill xmlns:a14="http://schemas.microsoft.com/office/drawing/2010/main">
+                <a:solidFill>
+                  <a:srgbClr val="FFFFFF"/>
+                </a:solidFill>
+              </a14:hiddenFill>
+            </a:ext>
+            <a:ext uri="{91240B29-F687-4F45-9708-019B960494DF}">
+              <a14:hiddenLine xmlns:a14="http://schemas.microsoft.com/office/drawing/2010/main" w="9525">
+                <a:solidFill>
+                  <a:srgbClr val="000000"/>
+                </a:solidFill>
+                <a:miter lim="800000"/>
+                <a:headEnd/>
+                <a:tailEnd/>
+              </a14:hiddenLine>
+            </a:ext>
+          </a:extLst>
+        </p:spPr>
+        <p:txBody>
+          <a:bodyPr>
+            <a:spAutoFit/>
+          </a:bodyPr>
+          <a:lstStyle>
+            <a:lvl1pPr eaLnBrk="0" hangingPunct="0">
+              <a:defRPr>
+                <a:solidFill>
+                  <a:schemeClr val="tx1"/>
+                </a:solidFill>
+                <a:latin typeface="Arial" panose="020B0604020202020204" pitchFamily="34" charset="0"/>
+                <a:ea typeface="宋体" panose="02010600030101010101" pitchFamily="2" charset="-122"/>
+              </a:defRPr>
+            </a:lvl1pPr>
+            <a:lvl2pPr marL="742950" indent="-285750" eaLnBrk="0" hangingPunct="0">
+              <a:defRPr>
+                <a:solidFill>
+                  <a:schemeClr val="tx1"/>
+                </a:solidFill>
+                <a:latin typeface="Arial" panose="020B0604020202020204" pitchFamily="34" charset="0"/>
+                <a:ea typeface="宋体" panose="02010600030101010101" pitchFamily="2" charset="-122"/>
+              </a:defRPr>
+            </a:lvl2pPr>
+            <a:lvl3pPr marL="1143000" indent="-228600" eaLnBrk="0" hangingPunct="0">
+              <a:defRPr>
+                <a:solidFill>
+                  <a:schemeClr val="tx1"/>
+                </a:solidFill>
+                <a:latin typeface="Arial" panose="020B0604020202020204" pitchFamily="34" charset="0"/>
+                <a:ea typeface="宋体" panose="02010600030101010101" pitchFamily="2" charset="-122"/>
+              </a:defRPr>
+            </a:lvl3pPr>
+            <a:lvl4pPr marL="1600200" indent="-228600" eaLnBrk="0" hangingPunct="0">
+              <a:defRPr>
+                <a:solidFill>
+                  <a:schemeClr val="tx1"/>
+                </a:solidFill>
+                <a:latin typeface="Arial" panose="020B0604020202020204" pitchFamily="34" charset="0"/>
+                <a:ea typeface="宋体" panose="02010600030101010101" pitchFamily="2" charset="-122"/>
+              </a:defRPr>
+            </a:lvl4pPr>
+            <a:lvl5pPr marL="2057400" indent="-228600" eaLnBrk="0" hangingPunct="0">
+              <a:defRPr>
+                <a:solidFill>
+                  <a:schemeClr val="tx1"/>
+                </a:solidFill>
+                <a:latin typeface="Arial" panose="020B0604020202020204" pitchFamily="34" charset="0"/>
+                <a:ea typeface="宋体" panose="02010600030101010101" pitchFamily="2" charset="-122"/>
+              </a:defRPr>
+            </a:lvl5pPr>
+            <a:lvl6pPr marL="2514600" indent="-228600" eaLnBrk="0" fontAlgn="base" hangingPunct="0">
+              <a:spcBef>
+                <a:spcPct val="0"/>
+              </a:spcBef>
+              <a:spcAft>
+                <a:spcPct val="0"/>
+              </a:spcAft>
+              <a:defRPr>
+                <a:solidFill>
+                  <a:schemeClr val="tx1"/>
+                </a:solidFill>
+                <a:latin typeface="Arial" panose="020B0604020202020204" pitchFamily="34" charset="0"/>
+                <a:ea typeface="宋体" panose="02010600030101010101" pitchFamily="2" charset="-122"/>
+              </a:defRPr>
+            </a:lvl6pPr>
+            <a:lvl7pPr marL="2971800" indent="-228600" eaLnBrk="0" fontAlgn="base" hangingPunct="0">
+              <a:spcBef>
+                <a:spcPct val="0"/>
+              </a:spcBef>
+              <a:spcAft>
+                <a:spcPct val="0"/>
+              </a:spcAft>
+              <a:defRPr>
+                <a:solidFill>
+                  <a:schemeClr val="tx1"/>
+                </a:solidFill>
+                <a:latin typeface="Arial" panose="020B0604020202020204" pitchFamily="34" charset="0"/>
+                <a:ea typeface="宋体" panose="02010600030101010101" pitchFamily="2" charset="-122"/>
+              </a:defRPr>
+            </a:lvl7pPr>
+            <a:lvl8pPr marL="3429000" indent="-228600" eaLnBrk="0" fontAlgn="base" hangingPunct="0">
+              <a:spcBef>
+                <a:spcPct val="0"/>
+              </a:spcBef>
+              <a:spcAft>
+                <a:spcPct val="0"/>
+              </a:spcAft>
+              <a:defRPr>
+                <a:solidFill>
+                  <a:schemeClr val="tx1"/>
+                </a:solidFill>
+                <a:latin typeface="Arial" panose="020B0604020202020204" pitchFamily="34" charset="0"/>
+                <a:ea typeface="宋体" panose="02010600030101010101" pitchFamily="2" charset="-122"/>
+              </a:defRPr>
+            </a:lvl8pPr>
+            <a:lvl9pPr marL="3886200" indent="-228600" eaLnBrk="0" fontAlgn="base" hangingPunct="0">
+              <a:spcBef>
+                <a:spcPct val="0"/>
+              </a:spcBef>
+              <a:spcAft>
+                <a:spcPct val="0"/>
+              </a:spcAft>
+              <a:defRPr>
+                <a:solidFill>
+                  <a:schemeClr val="tx1"/>
+                </a:solidFill>
+                <a:latin typeface="Arial" panose="020B0604020202020204" pitchFamily="34" charset="0"/>
+                <a:ea typeface="宋体" panose="02010600030101010101" pitchFamily="2" charset="-122"/>
+              </a:defRPr>
+            </a:lvl9pPr>
+          </a:lstStyle>
+          <a:p>
+            <a:pPr eaLnBrk="1" hangingPunct="1"/>
+            <a:r>
+              <a:rPr lang="zh-CN" altLang="en-US" sz="4800" dirty="0">
+                <a:solidFill>
+                  <a:schemeClr val="bg1"/>
+                </a:solidFill>
+                <a:latin typeface="微软雅黑" panose="020B0503020204020204" pitchFamily="34" charset="-122"/>
+                <a:ea typeface="微软雅黑" panose="020B0503020204020204" pitchFamily="34" charset="-122"/>
+              </a:rPr>
+              <a:t>背景 </a:t>
+            </a:r>
+            <a:r>
+              <a:rPr lang="en-US" altLang="zh-CN" sz="4800" dirty="0">
+                <a:solidFill>
+                  <a:schemeClr val="bg1"/>
+                </a:solidFill>
+                <a:latin typeface="微软雅黑" panose="020B0503020204020204" pitchFamily="34" charset="-122"/>
+                <a:ea typeface="微软雅黑" panose="020B0503020204020204" pitchFamily="34" charset="-122"/>
+              </a:rPr>
+              <a:t>-</a:t>
+            </a:r>
+            <a:r>
+              <a:rPr lang="zh-CN" altLang="en-US" sz="4800" dirty="0">
+                <a:solidFill>
+                  <a:schemeClr val="bg1"/>
+                </a:solidFill>
+                <a:latin typeface="微软雅黑" pitchFamily="34" charset="-122"/>
+                <a:ea typeface="微软雅黑" pitchFamily="34" charset="-122"/>
+              </a:rPr>
+              <a:t>为什么</a:t>
+            </a:r>
+            <a:r>
+              <a:rPr lang="en-US" altLang="zh-CN" sz="4800" dirty="0">
+                <a:solidFill>
+                  <a:schemeClr val="bg1"/>
+                </a:solidFill>
+                <a:latin typeface="微软雅黑" pitchFamily="34" charset="-122"/>
+                <a:ea typeface="微软雅黑" pitchFamily="34" charset="-122"/>
+              </a:rPr>
+              <a:t>Python</a:t>
+            </a:r>
+            <a:r>
+              <a:rPr lang="zh-CN" altLang="en-US" sz="4800" dirty="0">
+                <a:solidFill>
+                  <a:schemeClr val="bg1"/>
+                </a:solidFill>
+                <a:latin typeface="微软雅黑" pitchFamily="34" charset="-122"/>
+                <a:ea typeface="微软雅黑" pitchFamily="34" charset="-122"/>
+              </a:rPr>
+              <a:t>？</a:t>
+            </a:r>
+            <a:endParaRPr lang="en-US" altLang="zh-CN" sz="4800" dirty="0">
+              <a:solidFill>
+                <a:schemeClr val="bg1"/>
+              </a:solidFill>
+              <a:latin typeface="微软雅黑" pitchFamily="34" charset="-122"/>
+              <a:ea typeface="微软雅黑" pitchFamily="34" charset="-122"/>
+            </a:endParaRPr>
+          </a:p>
+        </p:txBody>
+      </p:sp>
+      <p:sp>
+        <p:nvSpPr>
+          <p:cNvPr id="5" name="TextBox 4">
+            <a:extLst>
+              <a:ext uri="{FF2B5EF4-FFF2-40B4-BE49-F238E27FC236}">
+                <a16:creationId xmlns:a16="http://schemas.microsoft.com/office/drawing/2014/main" id="{E8A991AE-3688-4E36-95ED-0003B8B99099}"/>
+              </a:ext>
+            </a:extLst>
+          </p:cNvPr>
+          <p:cNvSpPr txBox="1"/>
+          <p:nvPr/>
+        </p:nvSpPr>
+        <p:spPr>
+          <a:xfrm>
+            <a:off x="179512" y="1196752"/>
+            <a:ext cx="8569325" cy="2215991"/>
+          </a:xfrm>
+          <a:prstGeom prst="rect">
+            <a:avLst/>
+          </a:prstGeom>
+          <a:noFill/>
+        </p:spPr>
+        <p:txBody>
+          <a:bodyPr>
+            <a:spAutoFit/>
+          </a:bodyPr>
+          <a:lstStyle/>
+          <a:p>
+            <a:pPr>
+              <a:defRPr/>
+            </a:pPr>
+            <a:r>
+              <a:rPr lang="en-US" altLang="zh-CN" sz="4000" dirty="0">
+                <a:solidFill>
+                  <a:schemeClr val="bg1"/>
+                </a:solidFill>
+                <a:latin typeface="微软雅黑" pitchFamily="34" charset="-122"/>
+                <a:ea typeface="微软雅黑" pitchFamily="34" charset="-122"/>
+              </a:rPr>
+              <a:t>1. </a:t>
+            </a:r>
+            <a:r>
+              <a:rPr lang="zh-CN" altLang="en-US" sz="4000" dirty="0">
+                <a:solidFill>
+                  <a:schemeClr val="bg1"/>
+                </a:solidFill>
+                <a:latin typeface="微软雅黑" pitchFamily="34" charset="-122"/>
+                <a:ea typeface="微软雅黑" pitchFamily="34" charset="-122"/>
+              </a:rPr>
+              <a:t>简单、易学、表达能力强</a:t>
+            </a:r>
+            <a:endParaRPr lang="en-US" altLang="zh-CN" sz="4000" dirty="0">
+              <a:solidFill>
+                <a:schemeClr val="bg1"/>
+              </a:solidFill>
+              <a:latin typeface="微软雅黑" pitchFamily="34" charset="-122"/>
+              <a:ea typeface="微软雅黑" pitchFamily="34" charset="-122"/>
+            </a:endParaRPr>
+          </a:p>
+          <a:p>
+            <a:pPr>
+              <a:defRPr/>
+            </a:pPr>
+            <a:endParaRPr lang="en-US" altLang="zh-CN" sz="4000" dirty="0">
+              <a:solidFill>
+                <a:schemeClr val="bg1"/>
+              </a:solidFill>
+              <a:latin typeface="微软雅黑" pitchFamily="34" charset="-122"/>
+              <a:ea typeface="微软雅黑" pitchFamily="34" charset="-122"/>
+            </a:endParaRPr>
+          </a:p>
+          <a:p>
+            <a:pPr>
+              <a:defRPr/>
+            </a:pPr>
+            <a:r>
+              <a:rPr lang="en-US" altLang="zh-CN" sz="4000" dirty="0">
+                <a:solidFill>
+                  <a:schemeClr val="bg1"/>
+                </a:solidFill>
+                <a:latin typeface="微软雅黑" pitchFamily="34" charset="-122"/>
+                <a:ea typeface="微软雅黑" pitchFamily="34" charset="-122"/>
+              </a:rPr>
+              <a:t>[A,B,C] x [X,Y,Z] = [AX,AY,AZ,BX,…]</a:t>
+            </a:r>
+          </a:p>
+          <a:p>
+            <a:pPr>
+              <a:defRPr/>
+            </a:pPr>
+            <a:endParaRPr lang="en-US" dirty="0">
+              <a:solidFill>
+                <a:schemeClr val="bg1"/>
+              </a:solidFill>
+              <a:latin typeface="Arial" charset="0"/>
+            </a:endParaRPr>
+          </a:p>
+        </p:txBody>
+      </p:sp>
+      <p:pic>
+        <p:nvPicPr>
+          <p:cNvPr id="2" name="Picture 1">
+            <a:extLst>
+              <a:ext uri="{FF2B5EF4-FFF2-40B4-BE49-F238E27FC236}">
+                <a16:creationId xmlns:a16="http://schemas.microsoft.com/office/drawing/2014/main" id="{6C5BD105-50C8-4DB1-A5FA-35DE9A9B47C9}"/>
+              </a:ext>
+            </a:extLst>
+          </p:cNvPr>
+          <p:cNvPicPr>
+            <a:picLocks noChangeAspect="1"/>
+          </p:cNvPicPr>
+          <p:nvPr/>
+        </p:nvPicPr>
+        <p:blipFill>
+          <a:blip r:embed="rId2"/>
+          <a:stretch>
+            <a:fillRect/>
+          </a:stretch>
+        </p:blipFill>
+        <p:spPr>
+          <a:xfrm>
+            <a:off x="-66388" y="3645024"/>
+            <a:ext cx="9235492" cy="1145375"/>
+          </a:xfrm>
+          <a:prstGeom prst="rect">
+            <a:avLst/>
+          </a:prstGeom>
+        </p:spPr>
+      </p:pic>
+    </p:spTree>
+    <p:extLst>
+      <p:ext uri="{BB962C8B-B14F-4D97-AF65-F5344CB8AC3E}">
+        <p14:creationId xmlns:p14="http://schemas.microsoft.com/office/powerpoint/2010/main" val="1236588781"/>
+      </p:ext>
+    </p:extLst>
+  </p:cSld>
+  <p:clrMapOvr>
+    <a:masterClrMapping/>
+  </p:clrMapOvr>
+  <p:timing>
+    <p:tnLst>
+      <p:par>
+        <p:cTn id="1" dur="indefinite" restart="never" nodeType="tmRoot">
+          <p:childTnLst>
+            <p:seq concurrent="1" nextAc="seek">
+              <p:cTn id="2" dur="indefinite" nodeType="mainSeq">
+                <p:childTnLst>
+                  <p:par>
+                    <p:cTn id="3" fill="hold">
+                      <p:stCondLst>
+                        <p:cond delay="indefinite"/>
+                      </p:stCondLst>
+                      <p:childTnLst>
+                        <p:par>
+                          <p:cTn id="4" fill="hold">
+                            <p:stCondLst>
+                              <p:cond delay="0"/>
+                            </p:stCondLst>
+                            <p:childTnLst>
+                              <p:par>
+                                <p:cTn id="5" presetID="1" presetClass="entr" presetSubtype="0" fill="hold" nodeType="clickEffect">
+                                  <p:stCondLst>
+                                    <p:cond delay="0"/>
+                                  </p:stCondLst>
+                                  <p:childTnLst>
+                                    <p:set>
+                                      <p:cBhvr>
+                                        <p:cTn id="6" dur="1" fill="hold">
+                                          <p:stCondLst>
+                                            <p:cond delay="0"/>
+                                          </p:stCondLst>
+                                        </p:cTn>
+                                        <p:tgtEl>
+                                          <p:spTgt spid="2"/>
+                                        </p:tgtEl>
+                                        <p:attrNameLst>
+                                          <p:attrName>style.visibility</p:attrName>
+                                        </p:attrNameLst>
+                                      </p:cBhvr>
+                                      <p:to>
+                                        <p:strVal val="visible"/>
+                                      </p:to>
+                                    </p:set>
+                                  </p:childTnLst>
+                                </p:cTn>
+                              </p:par>
+                            </p:childTnLst>
+                          </p:cTn>
+                        </p:par>
+                      </p:childTnLst>
+                    </p:cTn>
+                  </p:par>
+                </p:childTnLst>
+              </p:cTn>
+              <p:prevCondLst>
+                <p:cond evt="onPrev" delay="0">
+                  <p:tgtEl>
+                    <p:sldTgt/>
+                  </p:tgtEl>
+                </p:cond>
+              </p:prevCondLst>
+              <p:nextCondLst>
+                <p:cond evt="onNext" delay="0">
+                  <p:tgtEl>
+                    <p:sldTgt/>
+                  </p:tgtEl>
+                </p:cond>
+              </p:nextCondLst>
+            </p:seq>
+          </p:childTnLst>
+        </p:cTn>
+      </p:par>
+    </p:tnLst>
+  </p:timing>
+</p:sld>
+</file>
+
+<file path=ppt/slides/slide8.xml><?xml version="1.0" encoding="utf-8"?>
+<p:sld xmlns:a="http://schemas.openxmlformats.org/drawingml/2006/main" xmlns:r="http://schemas.openxmlformats.org/officeDocument/2006/relationships" xmlns:p="http://schemas.openxmlformats.org/presentationml/2006/main">
+  <p:cSld>
+    <p:spTree>
+      <p:nvGrpSpPr>
+        <p:cNvPr id="1" name=""/>
+        <p:cNvGrpSpPr/>
+        <p:nvPr/>
+      </p:nvGrpSpPr>
+      <p:grpSpPr>
+        <a:xfrm>
+          <a:off x="0" y="0"/>
+          <a:ext cx="0" cy="0"/>
+          <a:chOff x="0" y="0"/>
+          <a:chExt cx="0" cy="0"/>
+        </a:xfrm>
+      </p:grpSpPr>
+      <p:sp>
+        <p:nvSpPr>
+          <p:cNvPr id="4098" name="TextBox 2">
+            <a:extLst>
+              <a:ext uri="{FF2B5EF4-FFF2-40B4-BE49-F238E27FC236}">
+                <a16:creationId xmlns:a16="http://schemas.microsoft.com/office/drawing/2014/main" id="{5552ED83-0001-4E47-A09B-F49C592A8E24}"/>
+              </a:ext>
+            </a:extLst>
+          </p:cNvPr>
+          <p:cNvSpPr txBox="1">
+            <a:spLocks noChangeArrowheads="1"/>
+          </p:cNvSpPr>
+          <p:nvPr/>
+        </p:nvSpPr>
+        <p:spPr bwMode="auto">
+          <a:xfrm>
+            <a:off x="179512" y="260648"/>
+            <a:ext cx="6913562" cy="830997"/>
+          </a:xfrm>
+          <a:prstGeom prst="rect">
+            <a:avLst/>
+          </a:prstGeom>
+          <a:noFill/>
+          <a:ln>
+            <a:noFill/>
+          </a:ln>
+          <a:extLst>
+            <a:ext uri="{909E8E84-426E-40DD-AFC4-6F175D3DCCD1}">
+              <a14:hiddenFill xmlns:a14="http://schemas.microsoft.com/office/drawing/2010/main">
+                <a:solidFill>
+                  <a:srgbClr val="FFFFFF"/>
+                </a:solidFill>
+              </a14:hiddenFill>
+            </a:ext>
+            <a:ext uri="{91240B29-F687-4F45-9708-019B960494DF}">
+              <a14:hiddenLine xmlns:a14="http://schemas.microsoft.com/office/drawing/2010/main" w="9525">
+                <a:solidFill>
+                  <a:srgbClr val="000000"/>
+                </a:solidFill>
+                <a:miter lim="800000"/>
+                <a:headEnd/>
+                <a:tailEnd/>
+              </a14:hiddenLine>
+            </a:ext>
+          </a:extLst>
+        </p:spPr>
+        <p:txBody>
+          <a:bodyPr>
+            <a:spAutoFit/>
+          </a:bodyPr>
+          <a:lstStyle>
+            <a:lvl1pPr eaLnBrk="0" hangingPunct="0">
+              <a:defRPr>
+                <a:solidFill>
+                  <a:schemeClr val="tx1"/>
+                </a:solidFill>
+                <a:latin typeface="Arial" panose="020B0604020202020204" pitchFamily="34" charset="0"/>
+                <a:ea typeface="宋体" panose="02010600030101010101" pitchFamily="2" charset="-122"/>
+              </a:defRPr>
+            </a:lvl1pPr>
+            <a:lvl2pPr marL="742950" indent="-285750" eaLnBrk="0" hangingPunct="0">
+              <a:defRPr>
+                <a:solidFill>
+                  <a:schemeClr val="tx1"/>
+                </a:solidFill>
+                <a:latin typeface="Arial" panose="020B0604020202020204" pitchFamily="34" charset="0"/>
+                <a:ea typeface="宋体" panose="02010600030101010101" pitchFamily="2" charset="-122"/>
+              </a:defRPr>
+            </a:lvl2pPr>
+            <a:lvl3pPr marL="1143000" indent="-228600" eaLnBrk="0" hangingPunct="0">
+              <a:defRPr>
+                <a:solidFill>
+                  <a:schemeClr val="tx1"/>
+                </a:solidFill>
+                <a:latin typeface="Arial" panose="020B0604020202020204" pitchFamily="34" charset="0"/>
+                <a:ea typeface="宋体" panose="02010600030101010101" pitchFamily="2" charset="-122"/>
+              </a:defRPr>
+            </a:lvl3pPr>
+            <a:lvl4pPr marL="1600200" indent="-228600" eaLnBrk="0" hangingPunct="0">
+              <a:defRPr>
+                <a:solidFill>
+                  <a:schemeClr val="tx1"/>
+                </a:solidFill>
+                <a:latin typeface="Arial" panose="020B0604020202020204" pitchFamily="34" charset="0"/>
+                <a:ea typeface="宋体" panose="02010600030101010101" pitchFamily="2" charset="-122"/>
+              </a:defRPr>
+            </a:lvl4pPr>
+            <a:lvl5pPr marL="2057400" indent="-228600" eaLnBrk="0" hangingPunct="0">
+              <a:defRPr>
+                <a:solidFill>
+                  <a:schemeClr val="tx1"/>
+                </a:solidFill>
+                <a:latin typeface="Arial" panose="020B0604020202020204" pitchFamily="34" charset="0"/>
+                <a:ea typeface="宋体" panose="02010600030101010101" pitchFamily="2" charset="-122"/>
+              </a:defRPr>
+            </a:lvl5pPr>
+            <a:lvl6pPr marL="2514600" indent="-228600" eaLnBrk="0" fontAlgn="base" hangingPunct="0">
+              <a:spcBef>
+                <a:spcPct val="0"/>
+              </a:spcBef>
+              <a:spcAft>
+                <a:spcPct val="0"/>
+              </a:spcAft>
+              <a:defRPr>
+                <a:solidFill>
+                  <a:schemeClr val="tx1"/>
+                </a:solidFill>
+                <a:latin typeface="Arial" panose="020B0604020202020204" pitchFamily="34" charset="0"/>
+                <a:ea typeface="宋体" panose="02010600030101010101" pitchFamily="2" charset="-122"/>
+              </a:defRPr>
+            </a:lvl6pPr>
+            <a:lvl7pPr marL="2971800" indent="-228600" eaLnBrk="0" fontAlgn="base" hangingPunct="0">
+              <a:spcBef>
+                <a:spcPct val="0"/>
+              </a:spcBef>
+              <a:spcAft>
+                <a:spcPct val="0"/>
+              </a:spcAft>
+              <a:defRPr>
+                <a:solidFill>
+                  <a:schemeClr val="tx1"/>
+                </a:solidFill>
+                <a:latin typeface="Arial" panose="020B0604020202020204" pitchFamily="34" charset="0"/>
+                <a:ea typeface="宋体" panose="02010600030101010101" pitchFamily="2" charset="-122"/>
+              </a:defRPr>
+            </a:lvl7pPr>
+            <a:lvl8pPr marL="3429000" indent="-228600" eaLnBrk="0" fontAlgn="base" hangingPunct="0">
+              <a:spcBef>
+                <a:spcPct val="0"/>
+              </a:spcBef>
+              <a:spcAft>
+                <a:spcPct val="0"/>
+              </a:spcAft>
+              <a:defRPr>
+                <a:solidFill>
+                  <a:schemeClr val="tx1"/>
+                </a:solidFill>
+                <a:latin typeface="Arial" panose="020B0604020202020204" pitchFamily="34" charset="0"/>
+                <a:ea typeface="宋体" panose="02010600030101010101" pitchFamily="2" charset="-122"/>
+              </a:defRPr>
+            </a:lvl8pPr>
+            <a:lvl9pPr marL="3886200" indent="-228600" eaLnBrk="0" fontAlgn="base" hangingPunct="0">
+              <a:spcBef>
+                <a:spcPct val="0"/>
+              </a:spcBef>
+              <a:spcAft>
+                <a:spcPct val="0"/>
+              </a:spcAft>
+              <a:defRPr>
+                <a:solidFill>
+                  <a:schemeClr val="tx1"/>
+                </a:solidFill>
+                <a:latin typeface="Arial" panose="020B0604020202020204" pitchFamily="34" charset="0"/>
+                <a:ea typeface="宋体" panose="02010600030101010101" pitchFamily="2" charset="-122"/>
+              </a:defRPr>
+            </a:lvl9pPr>
+          </a:lstStyle>
+          <a:p>
+            <a:pPr eaLnBrk="1" hangingPunct="1"/>
+            <a:r>
+              <a:rPr lang="zh-CN" altLang="en-US" sz="4800" dirty="0">
+                <a:solidFill>
+                  <a:schemeClr val="bg1"/>
+                </a:solidFill>
+                <a:latin typeface="微软雅黑" panose="020B0503020204020204" pitchFamily="34" charset="-122"/>
+                <a:ea typeface="微软雅黑" panose="020B0503020204020204" pitchFamily="34" charset="-122"/>
+              </a:rPr>
+              <a:t>背景 </a:t>
+            </a:r>
+            <a:r>
+              <a:rPr lang="en-US" altLang="zh-CN" sz="4800" dirty="0">
+                <a:solidFill>
+                  <a:schemeClr val="bg1"/>
+                </a:solidFill>
+                <a:latin typeface="微软雅黑" panose="020B0503020204020204" pitchFamily="34" charset="-122"/>
+                <a:ea typeface="微软雅黑" panose="020B0503020204020204" pitchFamily="34" charset="-122"/>
+              </a:rPr>
+              <a:t>-</a:t>
+            </a:r>
+            <a:r>
+              <a:rPr lang="zh-CN" altLang="en-US" sz="4800" dirty="0">
+                <a:solidFill>
+                  <a:schemeClr val="bg1"/>
+                </a:solidFill>
+                <a:latin typeface="微软雅黑" pitchFamily="34" charset="-122"/>
+                <a:ea typeface="微软雅黑" pitchFamily="34" charset="-122"/>
+              </a:rPr>
+              <a:t>为什么</a:t>
+            </a:r>
+            <a:r>
+              <a:rPr lang="en-US" altLang="zh-CN" sz="4800" dirty="0">
+                <a:solidFill>
+                  <a:schemeClr val="bg1"/>
+                </a:solidFill>
+                <a:latin typeface="微软雅黑" pitchFamily="34" charset="-122"/>
+                <a:ea typeface="微软雅黑" pitchFamily="34" charset="-122"/>
+              </a:rPr>
+              <a:t>Python</a:t>
+            </a:r>
+            <a:r>
+              <a:rPr lang="zh-CN" altLang="en-US" sz="4800" dirty="0">
+                <a:solidFill>
+                  <a:schemeClr val="bg1"/>
+                </a:solidFill>
+                <a:latin typeface="微软雅黑" pitchFamily="34" charset="-122"/>
+                <a:ea typeface="微软雅黑" pitchFamily="34" charset="-122"/>
+              </a:rPr>
+              <a:t>？</a:t>
+            </a:r>
+            <a:endParaRPr lang="en-US" altLang="zh-CN" sz="4800" dirty="0">
+              <a:solidFill>
+                <a:schemeClr val="bg1"/>
+              </a:solidFill>
+              <a:latin typeface="微软雅黑" pitchFamily="34" charset="-122"/>
+              <a:ea typeface="微软雅黑" pitchFamily="34" charset="-122"/>
+            </a:endParaRPr>
+          </a:p>
+        </p:txBody>
+      </p:sp>
+      <p:sp>
+        <p:nvSpPr>
+          <p:cNvPr id="5" name="TextBox 4">
+            <a:extLst>
+              <a:ext uri="{FF2B5EF4-FFF2-40B4-BE49-F238E27FC236}">
+                <a16:creationId xmlns:a16="http://schemas.microsoft.com/office/drawing/2014/main" id="{E8A991AE-3688-4E36-95ED-0003B8B99099}"/>
+              </a:ext>
+            </a:extLst>
+          </p:cNvPr>
+          <p:cNvSpPr txBox="1"/>
+          <p:nvPr/>
+        </p:nvSpPr>
+        <p:spPr>
+          <a:xfrm>
+            <a:off x="179512" y="1196752"/>
+            <a:ext cx="8569325" cy="984885"/>
+          </a:xfrm>
+          <a:prstGeom prst="rect">
+            <a:avLst/>
+          </a:prstGeom>
+          <a:noFill/>
+        </p:spPr>
+        <p:txBody>
+          <a:bodyPr>
+            <a:spAutoFit/>
+          </a:bodyPr>
+          <a:lstStyle/>
+          <a:p>
+            <a:pPr>
+              <a:defRPr/>
+            </a:pPr>
+            <a:r>
+              <a:rPr lang="en-US" altLang="zh-CN" sz="4000" dirty="0">
+                <a:solidFill>
+                  <a:schemeClr val="bg1"/>
+                </a:solidFill>
+                <a:latin typeface="微软雅黑" pitchFamily="34" charset="-122"/>
+                <a:ea typeface="微软雅黑" pitchFamily="34" charset="-122"/>
+              </a:rPr>
+              <a:t>2. </a:t>
+            </a:r>
+            <a:r>
+              <a:rPr lang="zh-CN" altLang="en-US" sz="4000" dirty="0">
+                <a:solidFill>
+                  <a:schemeClr val="bg1"/>
+                </a:solidFill>
+                <a:latin typeface="微软雅黑" pitchFamily="34" charset="-122"/>
+                <a:ea typeface="微软雅黑" pitchFamily="34" charset="-122"/>
+              </a:rPr>
+              <a:t>丰富的生态</a:t>
+            </a:r>
+            <a:endParaRPr lang="en-US" altLang="zh-CN" sz="4000" dirty="0">
+              <a:solidFill>
+                <a:schemeClr val="bg1"/>
+              </a:solidFill>
+              <a:latin typeface="微软雅黑" pitchFamily="34" charset="-122"/>
+              <a:ea typeface="微软雅黑" pitchFamily="34" charset="-122"/>
+            </a:endParaRPr>
+          </a:p>
+          <a:p>
+            <a:pPr>
+              <a:defRPr/>
+            </a:pPr>
+            <a:endParaRPr lang="en-US" dirty="0">
+              <a:solidFill>
+                <a:schemeClr val="bg1"/>
+              </a:solidFill>
+              <a:latin typeface="Arial" charset="0"/>
+            </a:endParaRPr>
+          </a:p>
+        </p:txBody>
+      </p:sp>
+      <p:pic>
+        <p:nvPicPr>
+          <p:cNvPr id="1026" name="Picture 2" descr="ä¸ç¯æç« å+¥é¨Pythonçæç³»ç»">
+            <a:extLst>
+              <a:ext uri="{FF2B5EF4-FFF2-40B4-BE49-F238E27FC236}">
+                <a16:creationId xmlns:a16="http://schemas.microsoft.com/office/drawing/2014/main" id="{DDA15401-4015-4E77-8296-AD0A850C867C}"/>
+              </a:ext>
+            </a:extLst>
+          </p:cNvPr>
+          <p:cNvPicPr>
+            <a:picLocks noChangeAspect="1" noChangeArrowheads="1"/>
+          </p:cNvPicPr>
+          <p:nvPr/>
+        </p:nvPicPr>
+        <p:blipFill>
+          <a:blip r:embed="rId2">
+            <a:extLst>
+              <a:ext uri="{28A0092B-C50C-407E-A947-70E740481C1C}">
+                <a14:useLocalDpi xmlns:a14="http://schemas.microsoft.com/office/drawing/2010/main" val="0"/>
+              </a:ext>
+            </a:extLst>
+          </a:blip>
+          <a:srcRect/>
+          <a:stretch>
+            <a:fillRect/>
+          </a:stretch>
+        </p:blipFill>
+        <p:spPr bwMode="auto">
+          <a:xfrm>
+            <a:off x="1187624" y="1916832"/>
+            <a:ext cx="6912768" cy="4850458"/>
+          </a:xfrm>
+          <a:prstGeom prst="rect">
+            <a:avLst/>
+          </a:prstGeom>
+          <a:noFill/>
+          <a:extLst>
+            <a:ext uri="{909E8E84-426E-40DD-AFC4-6F175D3DCCD1}">
+              <a14:hiddenFill xmlns:a14="http://schemas.microsoft.com/office/drawing/2010/main">
+                <a:solidFill>
+                  <a:srgbClr val="FFFFFF"/>
+                </a:solidFill>
+              </a14:hiddenFill>
+            </a:ext>
+          </a:extLst>
+        </p:spPr>
+      </p:pic>
+    </p:spTree>
+    <p:extLst>
+      <p:ext uri="{BB962C8B-B14F-4D97-AF65-F5344CB8AC3E}">
+        <p14:creationId xmlns:p14="http://schemas.microsoft.com/office/powerpoint/2010/main" val="343813481"/>
+      </p:ext>
+    </p:extLst>
+  </p:cSld>
+  <p:clrMapOvr>
+    <a:masterClrMapping/>
+  </p:clrMapOvr>
+</p:sld>
+</file>
+
+<file path=ppt/slides/slide9.xml><?xml version="1.0" encoding="utf-8"?>
+<p:sld xmlns:a="http://schemas.openxmlformats.org/drawingml/2006/main" xmlns:r="http://schemas.openxmlformats.org/officeDocument/2006/relationships" xmlns:p="http://schemas.openxmlformats.org/presentationml/2006/main">
+  <p:cSld>
+    <p:spTree>
+      <p:nvGrpSpPr>
+        <p:cNvPr id="1" name=""/>
+        <p:cNvGrpSpPr/>
+        <p:nvPr/>
+      </p:nvGrpSpPr>
+      <p:grpSpPr>
+        <a:xfrm>
+          <a:off x="0" y="0"/>
+          <a:ext cx="0" cy="0"/>
+          <a:chOff x="0" y="0"/>
+          <a:chExt cx="0" cy="0"/>
+        </a:xfrm>
+      </p:grpSpPr>
+      <p:sp>
+        <p:nvSpPr>
+          <p:cNvPr id="4098" name="TextBox 2">
+            <a:extLst>
+              <a:ext uri="{FF2B5EF4-FFF2-40B4-BE49-F238E27FC236}">
+                <a16:creationId xmlns:a16="http://schemas.microsoft.com/office/drawing/2014/main" id="{5552ED83-0001-4E47-A09B-F49C592A8E24}"/>
+              </a:ext>
+            </a:extLst>
+          </p:cNvPr>
+          <p:cNvSpPr txBox="1">
+            <a:spLocks noChangeArrowheads="1"/>
+          </p:cNvSpPr>
+          <p:nvPr/>
+        </p:nvSpPr>
+        <p:spPr bwMode="auto">
+          <a:xfrm>
+            <a:off x="179512" y="260648"/>
+            <a:ext cx="6913562" cy="830997"/>
+          </a:xfrm>
+          <a:prstGeom prst="rect">
+            <a:avLst/>
+          </a:prstGeom>
+          <a:noFill/>
+          <a:ln>
+            <a:noFill/>
+          </a:ln>
+          <a:extLst>
+            <a:ext uri="{909E8E84-426E-40DD-AFC4-6F175D3DCCD1}">
+              <a14:hiddenFill xmlns:a14="http://schemas.microsoft.com/office/drawing/2010/main">
+                <a:solidFill>
+                  <a:srgbClr val="FFFFFF"/>
+                </a:solidFill>
+              </a14:hiddenFill>
+            </a:ext>
+            <a:ext uri="{91240B29-F687-4F45-9708-019B960494DF}">
+              <a14:hiddenLine xmlns:a14="http://schemas.microsoft.com/office/drawing/2010/main" w="9525">
+                <a:solidFill>
+                  <a:srgbClr val="000000"/>
+                </a:solidFill>
+                <a:miter lim="800000"/>
+                <a:headEnd/>
+                <a:tailEnd/>
+              </a14:hiddenLine>
+            </a:ext>
+          </a:extLst>
+        </p:spPr>
+        <p:txBody>
+          <a:bodyPr>
+            <a:spAutoFit/>
+          </a:bodyPr>
+          <a:lstStyle>
+            <a:lvl1pPr eaLnBrk="0" hangingPunct="0">
+              <a:defRPr>
+                <a:solidFill>
+                  <a:schemeClr val="tx1"/>
+                </a:solidFill>
+                <a:latin typeface="Arial" panose="020B0604020202020204" pitchFamily="34" charset="0"/>
+                <a:ea typeface="宋体" panose="02010600030101010101" pitchFamily="2" charset="-122"/>
+              </a:defRPr>
+            </a:lvl1pPr>
+            <a:lvl2pPr marL="742950" indent="-285750" eaLnBrk="0" hangingPunct="0">
+              <a:defRPr>
+                <a:solidFill>
+                  <a:schemeClr val="tx1"/>
+                </a:solidFill>
+                <a:latin typeface="Arial" panose="020B0604020202020204" pitchFamily="34" charset="0"/>
+                <a:ea typeface="宋体" panose="02010600030101010101" pitchFamily="2" charset="-122"/>
+              </a:defRPr>
+            </a:lvl2pPr>
+            <a:lvl3pPr marL="1143000" indent="-228600" eaLnBrk="0" hangingPunct="0">
+              <a:defRPr>
+                <a:solidFill>
+                  <a:schemeClr val="tx1"/>
+                </a:solidFill>
+                <a:latin typeface="Arial" panose="020B0604020202020204" pitchFamily="34" charset="0"/>
+                <a:ea typeface="宋体" panose="02010600030101010101" pitchFamily="2" charset="-122"/>
+              </a:defRPr>
+            </a:lvl3pPr>
+            <a:lvl4pPr marL="1600200" indent="-228600" eaLnBrk="0" hangingPunct="0">
+              <a:defRPr>
+                <a:solidFill>
+                  <a:schemeClr val="tx1"/>
+                </a:solidFill>
+                <a:latin typeface="Arial" panose="020B0604020202020204" pitchFamily="34" charset="0"/>
+                <a:ea typeface="宋体" panose="02010600030101010101" pitchFamily="2" charset="-122"/>
+              </a:defRPr>
+            </a:lvl4pPr>
+            <a:lvl5pPr marL="2057400" indent="-228600" eaLnBrk="0" hangingPunct="0">
+              <a:defRPr>
+                <a:solidFill>
+                  <a:schemeClr val="tx1"/>
+                </a:solidFill>
+                <a:latin typeface="Arial" panose="020B0604020202020204" pitchFamily="34" charset="0"/>
+                <a:ea typeface="宋体" panose="02010600030101010101" pitchFamily="2" charset="-122"/>
+              </a:defRPr>
+            </a:lvl5pPr>
+            <a:lvl6pPr marL="2514600" indent="-228600" eaLnBrk="0" fontAlgn="base" hangingPunct="0">
+              <a:spcBef>
+                <a:spcPct val="0"/>
+              </a:spcBef>
+              <a:spcAft>
+                <a:spcPct val="0"/>
+              </a:spcAft>
+              <a:defRPr>
+                <a:solidFill>
+                  <a:schemeClr val="tx1"/>
+                </a:solidFill>
+                <a:latin typeface="Arial" panose="020B0604020202020204" pitchFamily="34" charset="0"/>
+                <a:ea typeface="宋体" panose="02010600030101010101" pitchFamily="2" charset="-122"/>
+              </a:defRPr>
+            </a:lvl6pPr>
+            <a:lvl7pPr marL="2971800" indent="-228600" eaLnBrk="0" fontAlgn="base" hangingPunct="0">
+              <a:spcBef>
+                <a:spcPct val="0"/>
+              </a:spcBef>
+              <a:spcAft>
+                <a:spcPct val="0"/>
+              </a:spcAft>
+              <a:defRPr>
+                <a:solidFill>
+                  <a:schemeClr val="tx1"/>
+                </a:solidFill>
+                <a:latin typeface="Arial" panose="020B0604020202020204" pitchFamily="34" charset="0"/>
+                <a:ea typeface="宋体" panose="02010600030101010101" pitchFamily="2" charset="-122"/>
+              </a:defRPr>
+            </a:lvl7pPr>
+            <a:lvl8pPr marL="3429000" indent="-228600" eaLnBrk="0" fontAlgn="base" hangingPunct="0">
+              <a:spcBef>
+                <a:spcPct val="0"/>
+              </a:spcBef>
+              <a:spcAft>
+                <a:spcPct val="0"/>
+              </a:spcAft>
+              <a:defRPr>
+                <a:solidFill>
+                  <a:schemeClr val="tx1"/>
+                </a:solidFill>
+                <a:latin typeface="Arial" panose="020B0604020202020204" pitchFamily="34" charset="0"/>
+                <a:ea typeface="宋体" panose="02010600030101010101" pitchFamily="2" charset="-122"/>
+              </a:defRPr>
+            </a:lvl8pPr>
+            <a:lvl9pPr marL="3886200" indent="-228600" eaLnBrk="0" fontAlgn="base" hangingPunct="0">
+              <a:spcBef>
+                <a:spcPct val="0"/>
+              </a:spcBef>
+              <a:spcAft>
+                <a:spcPct val="0"/>
+              </a:spcAft>
+              <a:defRPr>
+                <a:solidFill>
+                  <a:schemeClr val="tx1"/>
+                </a:solidFill>
+                <a:latin typeface="Arial" panose="020B0604020202020204" pitchFamily="34" charset="0"/>
+                <a:ea typeface="宋体" panose="02010600030101010101" pitchFamily="2" charset="-122"/>
+              </a:defRPr>
+            </a:lvl9pPr>
+          </a:lstStyle>
+          <a:p>
+            <a:pPr eaLnBrk="1" hangingPunct="1"/>
+            <a:r>
+              <a:rPr lang="zh-CN" altLang="en-US" sz="4800" dirty="0">
+                <a:solidFill>
+                  <a:schemeClr val="bg1"/>
+                </a:solidFill>
+                <a:latin typeface="微软雅黑" panose="020B0503020204020204" pitchFamily="34" charset="-122"/>
+                <a:ea typeface="微软雅黑" panose="020B0503020204020204" pitchFamily="34" charset="-122"/>
+              </a:rPr>
+              <a:t>背景 </a:t>
+            </a:r>
+            <a:r>
+              <a:rPr lang="en-US" altLang="zh-CN" sz="4800" dirty="0">
+                <a:solidFill>
+                  <a:schemeClr val="bg1"/>
+                </a:solidFill>
+                <a:latin typeface="微软雅黑" panose="020B0503020204020204" pitchFamily="34" charset="-122"/>
+                <a:ea typeface="微软雅黑" panose="020B0503020204020204" pitchFamily="34" charset="-122"/>
+              </a:rPr>
+              <a:t>-</a:t>
+            </a:r>
+            <a:r>
+              <a:rPr lang="zh-CN" altLang="en-US" sz="4800" dirty="0">
+                <a:solidFill>
+                  <a:schemeClr val="bg1"/>
+                </a:solidFill>
+                <a:latin typeface="微软雅黑" pitchFamily="34" charset="-122"/>
+                <a:ea typeface="微软雅黑" pitchFamily="34" charset="-122"/>
+              </a:rPr>
+              <a:t>为什么</a:t>
+            </a:r>
+            <a:r>
+              <a:rPr lang="en-US" altLang="zh-CN" sz="4800" dirty="0">
+                <a:solidFill>
+                  <a:schemeClr val="bg1"/>
+                </a:solidFill>
+                <a:latin typeface="微软雅黑" pitchFamily="34" charset="-122"/>
+                <a:ea typeface="微软雅黑" pitchFamily="34" charset="-122"/>
+              </a:rPr>
+              <a:t>Python</a:t>
+            </a:r>
+            <a:r>
+              <a:rPr lang="zh-CN" altLang="en-US" sz="4800" dirty="0">
+                <a:solidFill>
+                  <a:schemeClr val="bg1"/>
+                </a:solidFill>
+                <a:latin typeface="微软雅黑" pitchFamily="34" charset="-122"/>
+                <a:ea typeface="微软雅黑" pitchFamily="34" charset="-122"/>
+              </a:rPr>
+              <a:t>？</a:t>
+            </a:r>
+            <a:endParaRPr lang="en-US" altLang="zh-CN" sz="4800" dirty="0">
+              <a:solidFill>
+                <a:schemeClr val="bg1"/>
+              </a:solidFill>
+              <a:latin typeface="微软雅黑" pitchFamily="34" charset="-122"/>
+              <a:ea typeface="微软雅黑" pitchFamily="34" charset="-122"/>
+            </a:endParaRPr>
+          </a:p>
+        </p:txBody>
+      </p:sp>
+      <p:sp>
+        <p:nvSpPr>
+          <p:cNvPr id="5" name="TextBox 4">
+            <a:extLst>
+              <a:ext uri="{FF2B5EF4-FFF2-40B4-BE49-F238E27FC236}">
+                <a16:creationId xmlns:a16="http://schemas.microsoft.com/office/drawing/2014/main" id="{E8A991AE-3688-4E36-95ED-0003B8B99099}"/>
+              </a:ext>
+            </a:extLst>
+          </p:cNvPr>
+          <p:cNvSpPr txBox="1"/>
+          <p:nvPr/>
+        </p:nvSpPr>
+        <p:spPr>
+          <a:xfrm>
+            <a:off x="179512" y="1196752"/>
+            <a:ext cx="8569325" cy="984885"/>
+          </a:xfrm>
+          <a:prstGeom prst="rect">
+            <a:avLst/>
+          </a:prstGeom>
+          <a:noFill/>
+        </p:spPr>
+        <p:txBody>
+          <a:bodyPr>
+            <a:spAutoFit/>
+          </a:bodyPr>
+          <a:lstStyle/>
+          <a:p>
+            <a:pPr>
+              <a:defRPr/>
+            </a:pPr>
+            <a:r>
+              <a:rPr lang="en-US" altLang="zh-CN" sz="4000" dirty="0">
+                <a:solidFill>
+                  <a:schemeClr val="bg1"/>
+                </a:solidFill>
+                <a:latin typeface="微软雅黑" pitchFamily="34" charset="-122"/>
+                <a:ea typeface="微软雅黑" pitchFamily="34" charset="-122"/>
+              </a:rPr>
+              <a:t>3. Trend</a:t>
+            </a:r>
+          </a:p>
+          <a:p>
+            <a:pPr>
+              <a:defRPr/>
+            </a:pPr>
+            <a:endParaRPr lang="en-US" dirty="0">
+              <a:solidFill>
+                <a:schemeClr val="bg1"/>
+              </a:solidFill>
+              <a:latin typeface="Arial" charset="0"/>
+            </a:endParaRPr>
+          </a:p>
+        </p:txBody>
+      </p:sp>
+      <p:pic>
+        <p:nvPicPr>
+          <p:cNvPr id="2050" name="Picture 2" descr="https://zgab33vy595fw5zq-zippykid.netdna-ssl.com/wp-content/uploads/2017/09/growth_major_languages-1-1024x878.png">
+            <a:extLst>
+              <a:ext uri="{FF2B5EF4-FFF2-40B4-BE49-F238E27FC236}">
+                <a16:creationId xmlns:a16="http://schemas.microsoft.com/office/drawing/2014/main" id="{BDA76681-25C8-461E-87BB-40412F6B4805}"/>
+              </a:ext>
+            </a:extLst>
+          </p:cNvPr>
+          <p:cNvPicPr>
+            <a:picLocks noChangeAspect="1" noChangeArrowheads="1"/>
+          </p:cNvPicPr>
+          <p:nvPr/>
+        </p:nvPicPr>
+        <p:blipFill>
+          <a:blip r:embed="rId2">
+            <a:extLst>
+              <a:ext uri="{28A0092B-C50C-407E-A947-70E740481C1C}">
+                <a14:useLocalDpi xmlns:a14="http://schemas.microsoft.com/office/drawing/2010/main" val="0"/>
+              </a:ext>
+            </a:extLst>
+          </a:blip>
+          <a:srcRect/>
+          <a:stretch>
+            <a:fillRect/>
+          </a:stretch>
+        </p:blipFill>
+        <p:spPr bwMode="auto">
+          <a:xfrm>
+            <a:off x="2517303" y="1275885"/>
+            <a:ext cx="6447185" cy="5528352"/>
+          </a:xfrm>
+          <a:prstGeom prst="rect">
+            <a:avLst/>
+          </a:prstGeom>
+          <a:noFill/>
+          <a:extLst>
+            <a:ext uri="{909E8E84-426E-40DD-AFC4-6F175D3DCCD1}">
+              <a14:hiddenFill xmlns:a14="http://schemas.microsoft.com/office/drawing/2010/main">
+                <a:solidFill>
+                  <a:srgbClr val="FFFFFF"/>
+                </a:solidFill>
+              </a14:hiddenFill>
+            </a:ext>
+          </a:extLst>
+        </p:spPr>
+      </p:pic>
+    </p:spTree>
+    <p:extLst>
+      <p:ext uri="{BB962C8B-B14F-4D97-AF65-F5344CB8AC3E}">
+        <p14:creationId xmlns:p14="http://schemas.microsoft.com/office/powerpoint/2010/main" val="1942493987"/>
       </p:ext>
     </p:extLst>
   </p:cSld>

</xml_diff>

<commit_message>
Update Ch1 ppt, add python basic
</commit_message>
<xml_diff>
--- a/chapter.1/ppt/ML_CH1_Python_Basic.pptx
+++ b/chapter.1/ppt/ML_CH1_Python_Basic.pptx
@@ -20,7 +20,17 @@
     <p:sldId id="303" r:id="rId14"/>
     <p:sldId id="304" r:id="rId15"/>
     <p:sldId id="305" r:id="rId16"/>
-    <p:sldId id="294" r:id="rId17"/>
+    <p:sldId id="306" r:id="rId17"/>
+    <p:sldId id="307" r:id="rId18"/>
+    <p:sldId id="308" r:id="rId19"/>
+    <p:sldId id="309" r:id="rId20"/>
+    <p:sldId id="310" r:id="rId21"/>
+    <p:sldId id="311" r:id="rId22"/>
+    <p:sldId id="312" r:id="rId23"/>
+    <p:sldId id="313" r:id="rId24"/>
+    <p:sldId id="314" r:id="rId25"/>
+    <p:sldId id="315" r:id="rId26"/>
+    <p:sldId id="294" r:id="rId27"/>
   </p:sldIdLst>
   <p:sldSz cx="9144000" cy="6858000" type="screen4x3"/>
   <p:notesSz cx="6858000" cy="9144000"/>
@@ -9339,6 +9349,1605 @@
       </p:grpSpPr>
       <p:sp>
         <p:nvSpPr>
+          <p:cNvPr id="4098" name="TextBox 2">
+            <a:extLst>
+              <a:ext uri="{FF2B5EF4-FFF2-40B4-BE49-F238E27FC236}">
+                <a16:creationId xmlns:a16="http://schemas.microsoft.com/office/drawing/2014/main" id="{5552ED83-0001-4E47-A09B-F49C592A8E24}"/>
+              </a:ext>
+            </a:extLst>
+          </p:cNvPr>
+          <p:cNvSpPr txBox="1">
+            <a:spLocks noChangeArrowheads="1"/>
+          </p:cNvSpPr>
+          <p:nvPr/>
+        </p:nvSpPr>
+        <p:spPr bwMode="auto">
+          <a:xfrm>
+            <a:off x="179512" y="260648"/>
+            <a:ext cx="8496944" cy="830997"/>
+          </a:xfrm>
+          <a:prstGeom prst="rect">
+            <a:avLst/>
+          </a:prstGeom>
+          <a:noFill/>
+          <a:ln>
+            <a:noFill/>
+          </a:ln>
+          <a:extLst>
+            <a:ext uri="{909E8E84-426E-40DD-AFC4-6F175D3DCCD1}">
+              <a14:hiddenFill xmlns:a14="http://schemas.microsoft.com/office/drawing/2010/main">
+                <a:solidFill>
+                  <a:srgbClr val="FFFFFF"/>
+                </a:solidFill>
+              </a14:hiddenFill>
+            </a:ext>
+            <a:ext uri="{91240B29-F687-4F45-9708-019B960494DF}">
+              <a14:hiddenLine xmlns:a14="http://schemas.microsoft.com/office/drawing/2010/main" w="9525">
+                <a:solidFill>
+                  <a:srgbClr val="000000"/>
+                </a:solidFill>
+                <a:miter lim="800000"/>
+                <a:headEnd/>
+                <a:tailEnd/>
+              </a14:hiddenLine>
+            </a:ext>
+          </a:extLst>
+        </p:spPr>
+        <p:txBody>
+          <a:bodyPr wrap="square">
+            <a:spAutoFit/>
+          </a:bodyPr>
+          <a:lstStyle>
+            <a:lvl1pPr eaLnBrk="0" hangingPunct="0">
+              <a:defRPr>
+                <a:solidFill>
+                  <a:schemeClr val="tx1"/>
+                </a:solidFill>
+                <a:latin typeface="Arial" panose="020B0604020202020204" pitchFamily="34" charset="0"/>
+                <a:ea typeface="宋体" panose="02010600030101010101" pitchFamily="2" charset="-122"/>
+              </a:defRPr>
+            </a:lvl1pPr>
+            <a:lvl2pPr marL="742950" indent="-285750" eaLnBrk="0" hangingPunct="0">
+              <a:defRPr>
+                <a:solidFill>
+                  <a:schemeClr val="tx1"/>
+                </a:solidFill>
+                <a:latin typeface="Arial" panose="020B0604020202020204" pitchFamily="34" charset="0"/>
+                <a:ea typeface="宋体" panose="02010600030101010101" pitchFamily="2" charset="-122"/>
+              </a:defRPr>
+            </a:lvl2pPr>
+            <a:lvl3pPr marL="1143000" indent="-228600" eaLnBrk="0" hangingPunct="0">
+              <a:defRPr>
+                <a:solidFill>
+                  <a:schemeClr val="tx1"/>
+                </a:solidFill>
+                <a:latin typeface="Arial" panose="020B0604020202020204" pitchFamily="34" charset="0"/>
+                <a:ea typeface="宋体" panose="02010600030101010101" pitchFamily="2" charset="-122"/>
+              </a:defRPr>
+            </a:lvl3pPr>
+            <a:lvl4pPr marL="1600200" indent="-228600" eaLnBrk="0" hangingPunct="0">
+              <a:defRPr>
+                <a:solidFill>
+                  <a:schemeClr val="tx1"/>
+                </a:solidFill>
+                <a:latin typeface="Arial" panose="020B0604020202020204" pitchFamily="34" charset="0"/>
+                <a:ea typeface="宋体" panose="02010600030101010101" pitchFamily="2" charset="-122"/>
+              </a:defRPr>
+            </a:lvl4pPr>
+            <a:lvl5pPr marL="2057400" indent="-228600" eaLnBrk="0" hangingPunct="0">
+              <a:defRPr>
+                <a:solidFill>
+                  <a:schemeClr val="tx1"/>
+                </a:solidFill>
+                <a:latin typeface="Arial" panose="020B0604020202020204" pitchFamily="34" charset="0"/>
+                <a:ea typeface="宋体" panose="02010600030101010101" pitchFamily="2" charset="-122"/>
+              </a:defRPr>
+            </a:lvl5pPr>
+            <a:lvl6pPr marL="2514600" indent="-228600" eaLnBrk="0" fontAlgn="base" hangingPunct="0">
+              <a:spcBef>
+                <a:spcPct val="0"/>
+              </a:spcBef>
+              <a:spcAft>
+                <a:spcPct val="0"/>
+              </a:spcAft>
+              <a:defRPr>
+                <a:solidFill>
+                  <a:schemeClr val="tx1"/>
+                </a:solidFill>
+                <a:latin typeface="Arial" panose="020B0604020202020204" pitchFamily="34" charset="0"/>
+                <a:ea typeface="宋体" panose="02010600030101010101" pitchFamily="2" charset="-122"/>
+              </a:defRPr>
+            </a:lvl6pPr>
+            <a:lvl7pPr marL="2971800" indent="-228600" eaLnBrk="0" fontAlgn="base" hangingPunct="0">
+              <a:spcBef>
+                <a:spcPct val="0"/>
+              </a:spcBef>
+              <a:spcAft>
+                <a:spcPct val="0"/>
+              </a:spcAft>
+              <a:defRPr>
+                <a:solidFill>
+                  <a:schemeClr val="tx1"/>
+                </a:solidFill>
+                <a:latin typeface="Arial" panose="020B0604020202020204" pitchFamily="34" charset="0"/>
+                <a:ea typeface="宋体" panose="02010600030101010101" pitchFamily="2" charset="-122"/>
+              </a:defRPr>
+            </a:lvl7pPr>
+            <a:lvl8pPr marL="3429000" indent="-228600" eaLnBrk="0" fontAlgn="base" hangingPunct="0">
+              <a:spcBef>
+                <a:spcPct val="0"/>
+              </a:spcBef>
+              <a:spcAft>
+                <a:spcPct val="0"/>
+              </a:spcAft>
+              <a:defRPr>
+                <a:solidFill>
+                  <a:schemeClr val="tx1"/>
+                </a:solidFill>
+                <a:latin typeface="Arial" panose="020B0604020202020204" pitchFamily="34" charset="0"/>
+                <a:ea typeface="宋体" panose="02010600030101010101" pitchFamily="2" charset="-122"/>
+              </a:defRPr>
+            </a:lvl8pPr>
+            <a:lvl9pPr marL="3886200" indent="-228600" eaLnBrk="0" fontAlgn="base" hangingPunct="0">
+              <a:spcBef>
+                <a:spcPct val="0"/>
+              </a:spcBef>
+              <a:spcAft>
+                <a:spcPct val="0"/>
+              </a:spcAft>
+              <a:defRPr>
+                <a:solidFill>
+                  <a:schemeClr val="tx1"/>
+                </a:solidFill>
+                <a:latin typeface="Arial" panose="020B0604020202020204" pitchFamily="34" charset="0"/>
+                <a:ea typeface="宋体" panose="02010600030101010101" pitchFamily="2" charset="-122"/>
+              </a:defRPr>
+            </a:lvl9pPr>
+          </a:lstStyle>
+          <a:p>
+            <a:pPr eaLnBrk="1" hangingPunct="1"/>
+            <a:r>
+              <a:rPr lang="zh-CN" altLang="en-US" sz="4800" dirty="0">
+                <a:solidFill>
+                  <a:schemeClr val="bg1"/>
+                </a:solidFill>
+                <a:latin typeface="微软雅黑" panose="020B0503020204020204" pitchFamily="34" charset="-122"/>
+                <a:ea typeface="微软雅黑" panose="020B0503020204020204" pitchFamily="34" charset="-122"/>
+              </a:rPr>
+              <a:t>开发环境 </a:t>
+            </a:r>
+            <a:r>
+              <a:rPr lang="en-US" altLang="zh-CN" sz="4800" dirty="0">
+                <a:solidFill>
+                  <a:schemeClr val="bg1"/>
+                </a:solidFill>
+                <a:latin typeface="微软雅黑" panose="020B0503020204020204" pitchFamily="34" charset="-122"/>
+                <a:ea typeface="微软雅黑" panose="020B0503020204020204" pitchFamily="34" charset="-122"/>
+              </a:rPr>
+              <a:t>– </a:t>
+            </a:r>
+            <a:r>
+              <a:rPr lang="en-US" altLang="zh-CN" sz="4000" dirty="0" err="1">
+                <a:solidFill>
+                  <a:schemeClr val="bg1"/>
+                </a:solidFill>
+                <a:latin typeface="微软雅黑" panose="020B0503020204020204" pitchFamily="34" charset="-122"/>
+                <a:ea typeface="微软雅黑" panose="020B0503020204020204" pitchFamily="34" charset="-122"/>
+              </a:rPr>
+              <a:t>Jupyter</a:t>
+            </a:r>
+            <a:r>
+              <a:rPr lang="en-US" altLang="zh-CN" sz="4000" dirty="0">
+                <a:solidFill>
+                  <a:schemeClr val="bg1"/>
+                </a:solidFill>
+                <a:latin typeface="微软雅黑" panose="020B0503020204020204" pitchFamily="34" charset="-122"/>
+                <a:ea typeface="微软雅黑" panose="020B0503020204020204" pitchFamily="34" charset="-122"/>
+              </a:rPr>
+              <a:t> Notebook</a:t>
+            </a:r>
+            <a:endParaRPr lang="zh-CN" altLang="en-US" sz="4800" dirty="0">
+              <a:solidFill>
+                <a:schemeClr val="bg1"/>
+              </a:solidFill>
+              <a:latin typeface="微软雅黑" panose="020B0503020204020204" pitchFamily="34" charset="-122"/>
+              <a:ea typeface="微软雅黑" panose="020B0503020204020204" pitchFamily="34" charset="-122"/>
+            </a:endParaRPr>
+          </a:p>
+        </p:txBody>
+      </p:sp>
+      <p:sp>
+        <p:nvSpPr>
+          <p:cNvPr id="5" name="TextBox 4">
+            <a:extLst>
+              <a:ext uri="{FF2B5EF4-FFF2-40B4-BE49-F238E27FC236}">
+                <a16:creationId xmlns:a16="http://schemas.microsoft.com/office/drawing/2014/main" id="{E8A991AE-3688-4E36-95ED-0003B8B99099}"/>
+              </a:ext>
+            </a:extLst>
+          </p:cNvPr>
+          <p:cNvSpPr txBox="1"/>
+          <p:nvPr/>
+        </p:nvSpPr>
+        <p:spPr>
+          <a:xfrm>
+            <a:off x="179512" y="1196752"/>
+            <a:ext cx="8569325" cy="4062651"/>
+          </a:xfrm>
+          <a:prstGeom prst="rect">
+            <a:avLst/>
+          </a:prstGeom>
+          <a:noFill/>
+        </p:spPr>
+        <p:txBody>
+          <a:bodyPr>
+            <a:spAutoFit/>
+          </a:bodyPr>
+          <a:lstStyle/>
+          <a:p>
+            <a:pPr>
+              <a:defRPr/>
+            </a:pPr>
+            <a:r>
+              <a:rPr lang="en-US" altLang="zh-CN" sz="4000" dirty="0" err="1">
+                <a:solidFill>
+                  <a:schemeClr val="bg1"/>
+                </a:solidFill>
+                <a:latin typeface="微软雅黑" pitchFamily="34" charset="-122"/>
+                <a:ea typeface="微软雅黑" pitchFamily="34" charset="-122"/>
+              </a:rPr>
+              <a:t>Jupyter</a:t>
+            </a:r>
+            <a:r>
+              <a:rPr lang="en-US" altLang="zh-CN" sz="4000" dirty="0">
+                <a:solidFill>
+                  <a:schemeClr val="bg1"/>
+                </a:solidFill>
+                <a:latin typeface="微软雅黑" pitchFamily="34" charset="-122"/>
+                <a:ea typeface="微软雅黑" pitchFamily="34" charset="-122"/>
+              </a:rPr>
+              <a:t> Notebook</a:t>
+            </a:r>
+            <a:r>
+              <a:rPr lang="zh-CN" altLang="en-US" sz="4000" dirty="0">
+                <a:solidFill>
+                  <a:schemeClr val="bg1"/>
+                </a:solidFill>
+                <a:latin typeface="微软雅黑" pitchFamily="34" charset="-122"/>
+                <a:ea typeface="微软雅黑" pitchFamily="34" charset="-122"/>
+              </a:rPr>
+              <a:t>是什么</a:t>
+            </a:r>
+            <a:r>
+              <a:rPr lang="en-US" altLang="zh-CN" sz="4000" dirty="0">
+                <a:solidFill>
+                  <a:schemeClr val="bg1"/>
+                </a:solidFill>
+                <a:latin typeface="微软雅黑" pitchFamily="34" charset="-122"/>
+                <a:ea typeface="微软雅黑" pitchFamily="34" charset="-122"/>
+              </a:rPr>
+              <a:t> ?</a:t>
+            </a:r>
+          </a:p>
+          <a:p>
+            <a:pPr marL="571500" indent="-571500">
+              <a:buFont typeface="Arial" panose="020B0604020202020204" pitchFamily="34" charset="0"/>
+              <a:buChar char="•"/>
+              <a:defRPr/>
+            </a:pPr>
+            <a:r>
+              <a:rPr lang="zh-CN" altLang="en-US" sz="4000" dirty="0">
+                <a:solidFill>
+                  <a:schemeClr val="bg1"/>
+                </a:solidFill>
+                <a:latin typeface="微软雅黑" pitchFamily="34" charset="-122"/>
+                <a:ea typeface="微软雅黑" pitchFamily="34" charset="-122"/>
+              </a:rPr>
+              <a:t>一个开源的</a:t>
+            </a:r>
+            <a:r>
+              <a:rPr lang="en-US" altLang="zh-CN" sz="4000" dirty="0">
+                <a:solidFill>
+                  <a:schemeClr val="bg1"/>
+                </a:solidFill>
+                <a:latin typeface="微软雅黑" pitchFamily="34" charset="-122"/>
+                <a:ea typeface="微软雅黑" pitchFamily="34" charset="-122"/>
+              </a:rPr>
+              <a:t>Web</a:t>
+            </a:r>
+            <a:r>
+              <a:rPr lang="zh-CN" altLang="en-US" sz="4000" dirty="0">
+                <a:solidFill>
+                  <a:schemeClr val="bg1"/>
+                </a:solidFill>
+                <a:latin typeface="微软雅黑" pitchFamily="34" charset="-122"/>
+                <a:ea typeface="微软雅黑" pitchFamily="34" charset="-122"/>
+              </a:rPr>
+              <a:t>应用程序</a:t>
+            </a:r>
+            <a:endParaRPr lang="en-US" altLang="zh-CN" sz="4000" dirty="0">
+              <a:solidFill>
+                <a:schemeClr val="bg1"/>
+              </a:solidFill>
+              <a:latin typeface="微软雅黑" pitchFamily="34" charset="-122"/>
+              <a:ea typeface="微软雅黑" pitchFamily="34" charset="-122"/>
+            </a:endParaRPr>
+          </a:p>
+          <a:p>
+            <a:pPr marL="571500" indent="-571500">
+              <a:buFont typeface="Arial" panose="020B0604020202020204" pitchFamily="34" charset="0"/>
+              <a:buChar char="•"/>
+              <a:defRPr/>
+            </a:pPr>
+            <a:r>
+              <a:rPr lang="zh-CN" altLang="en-US" sz="4000" dirty="0">
+                <a:solidFill>
+                  <a:schemeClr val="bg1"/>
+                </a:solidFill>
+                <a:latin typeface="微软雅黑" pitchFamily="34" charset="-122"/>
+                <a:ea typeface="微软雅黑" pitchFamily="34" charset="-122"/>
+              </a:rPr>
+              <a:t>可视化的交互环境器</a:t>
+            </a:r>
+            <a:endParaRPr lang="en-US" altLang="zh-CN" sz="4000" dirty="0">
+              <a:solidFill>
+                <a:schemeClr val="bg1"/>
+              </a:solidFill>
+              <a:latin typeface="微软雅黑" pitchFamily="34" charset="-122"/>
+              <a:ea typeface="微软雅黑" pitchFamily="34" charset="-122"/>
+            </a:endParaRPr>
+          </a:p>
+          <a:p>
+            <a:pPr marL="571500" indent="-571500">
+              <a:buFont typeface="Arial" panose="020B0604020202020204" pitchFamily="34" charset="0"/>
+              <a:buChar char="•"/>
+              <a:defRPr/>
+            </a:pPr>
+            <a:r>
+              <a:rPr lang="zh-CN" altLang="en-US" sz="4000" dirty="0">
+                <a:solidFill>
+                  <a:schemeClr val="bg1"/>
+                </a:solidFill>
+                <a:latin typeface="微软雅黑" pitchFamily="34" charset="-122"/>
+                <a:ea typeface="微软雅黑" pitchFamily="34" charset="-122"/>
+              </a:rPr>
+              <a:t>可以与别人分享你的</a:t>
+            </a:r>
+            <a:r>
+              <a:rPr lang="en-US" altLang="zh-CN" sz="4000" dirty="0">
+                <a:solidFill>
+                  <a:schemeClr val="bg1"/>
+                </a:solidFill>
+                <a:latin typeface="微软雅黑" pitchFamily="34" charset="-122"/>
+                <a:ea typeface="微软雅黑" pitchFamily="34" charset="-122"/>
+              </a:rPr>
+              <a:t>Notebook</a:t>
+            </a:r>
+            <a:r>
+              <a:rPr lang="zh-CN" altLang="en-US" sz="4000" dirty="0">
+                <a:solidFill>
+                  <a:schemeClr val="bg1"/>
+                </a:solidFill>
+                <a:latin typeface="微软雅黑" pitchFamily="34" charset="-122"/>
+                <a:ea typeface="微软雅黑" pitchFamily="34" charset="-122"/>
+              </a:rPr>
+              <a:t>，也可以导入别人的</a:t>
+            </a:r>
+            <a:r>
+              <a:rPr lang="en-US" altLang="zh-CN" sz="4000" dirty="0">
+                <a:solidFill>
+                  <a:schemeClr val="bg1"/>
+                </a:solidFill>
+                <a:latin typeface="微软雅黑" pitchFamily="34" charset="-122"/>
+                <a:ea typeface="微软雅黑" pitchFamily="34" charset="-122"/>
+              </a:rPr>
+              <a:t>Notebook</a:t>
+            </a:r>
+          </a:p>
+          <a:p>
+            <a:pPr marL="571500" indent="-571500">
+              <a:buFont typeface="Arial" panose="020B0604020202020204" pitchFamily="34" charset="0"/>
+              <a:buChar char="•"/>
+              <a:defRPr/>
+            </a:pPr>
+            <a:endParaRPr lang="en-US" altLang="zh-CN" sz="4000" dirty="0">
+              <a:solidFill>
+                <a:schemeClr val="bg1"/>
+              </a:solidFill>
+              <a:latin typeface="微软雅黑" pitchFamily="34" charset="-122"/>
+              <a:ea typeface="微软雅黑" pitchFamily="34" charset="-122"/>
+            </a:endParaRPr>
+          </a:p>
+          <a:p>
+            <a:pPr>
+              <a:defRPr/>
+            </a:pPr>
+            <a:endParaRPr lang="en-US" dirty="0">
+              <a:solidFill>
+                <a:schemeClr val="bg1"/>
+              </a:solidFill>
+              <a:latin typeface="Arial" charset="0"/>
+            </a:endParaRPr>
+          </a:p>
+        </p:txBody>
+      </p:sp>
+    </p:spTree>
+    <p:extLst>
+      <p:ext uri="{BB962C8B-B14F-4D97-AF65-F5344CB8AC3E}">
+        <p14:creationId xmlns:p14="http://schemas.microsoft.com/office/powerpoint/2010/main" val="422799599"/>
+      </p:ext>
+    </p:extLst>
+  </p:cSld>
+  <p:clrMapOvr>
+    <a:masterClrMapping/>
+  </p:clrMapOvr>
+</p:sld>
+</file>
+
+<file path=ppt/slides/slide16.xml><?xml version="1.0" encoding="utf-8"?>
+<p:sld xmlns:a="http://schemas.openxmlformats.org/drawingml/2006/main" xmlns:r="http://schemas.openxmlformats.org/officeDocument/2006/relationships" xmlns:p="http://schemas.openxmlformats.org/presentationml/2006/main">
+  <p:cSld>
+    <p:spTree>
+      <p:nvGrpSpPr>
+        <p:cNvPr id="1" name=""/>
+        <p:cNvGrpSpPr/>
+        <p:nvPr/>
+      </p:nvGrpSpPr>
+      <p:grpSpPr>
+        <a:xfrm>
+          <a:off x="0" y="0"/>
+          <a:ext cx="0" cy="0"/>
+          <a:chOff x="0" y="0"/>
+          <a:chExt cx="0" cy="0"/>
+        </a:xfrm>
+      </p:grpSpPr>
+      <p:sp>
+        <p:nvSpPr>
+          <p:cNvPr id="4098" name="TextBox 2">
+            <a:extLst>
+              <a:ext uri="{FF2B5EF4-FFF2-40B4-BE49-F238E27FC236}">
+                <a16:creationId xmlns:a16="http://schemas.microsoft.com/office/drawing/2014/main" id="{5552ED83-0001-4E47-A09B-F49C592A8E24}"/>
+              </a:ext>
+            </a:extLst>
+          </p:cNvPr>
+          <p:cNvSpPr txBox="1">
+            <a:spLocks noChangeArrowheads="1"/>
+          </p:cNvSpPr>
+          <p:nvPr/>
+        </p:nvSpPr>
+        <p:spPr bwMode="auto">
+          <a:xfrm>
+            <a:off x="179512" y="260648"/>
+            <a:ext cx="8496944" cy="830997"/>
+          </a:xfrm>
+          <a:prstGeom prst="rect">
+            <a:avLst/>
+          </a:prstGeom>
+          <a:noFill/>
+          <a:ln>
+            <a:noFill/>
+          </a:ln>
+          <a:extLst>
+            <a:ext uri="{909E8E84-426E-40DD-AFC4-6F175D3DCCD1}">
+              <a14:hiddenFill xmlns:a14="http://schemas.microsoft.com/office/drawing/2010/main">
+                <a:solidFill>
+                  <a:srgbClr val="FFFFFF"/>
+                </a:solidFill>
+              </a14:hiddenFill>
+            </a:ext>
+            <a:ext uri="{91240B29-F687-4F45-9708-019B960494DF}">
+              <a14:hiddenLine xmlns:a14="http://schemas.microsoft.com/office/drawing/2010/main" w="9525">
+                <a:solidFill>
+                  <a:srgbClr val="000000"/>
+                </a:solidFill>
+                <a:miter lim="800000"/>
+                <a:headEnd/>
+                <a:tailEnd/>
+              </a14:hiddenLine>
+            </a:ext>
+          </a:extLst>
+        </p:spPr>
+        <p:txBody>
+          <a:bodyPr wrap="square">
+            <a:spAutoFit/>
+          </a:bodyPr>
+          <a:lstStyle>
+            <a:lvl1pPr eaLnBrk="0" hangingPunct="0">
+              <a:defRPr>
+                <a:solidFill>
+                  <a:schemeClr val="tx1"/>
+                </a:solidFill>
+                <a:latin typeface="Arial" panose="020B0604020202020204" pitchFamily="34" charset="0"/>
+                <a:ea typeface="宋体" panose="02010600030101010101" pitchFamily="2" charset="-122"/>
+              </a:defRPr>
+            </a:lvl1pPr>
+            <a:lvl2pPr marL="742950" indent="-285750" eaLnBrk="0" hangingPunct="0">
+              <a:defRPr>
+                <a:solidFill>
+                  <a:schemeClr val="tx1"/>
+                </a:solidFill>
+                <a:latin typeface="Arial" panose="020B0604020202020204" pitchFamily="34" charset="0"/>
+                <a:ea typeface="宋体" panose="02010600030101010101" pitchFamily="2" charset="-122"/>
+              </a:defRPr>
+            </a:lvl2pPr>
+            <a:lvl3pPr marL="1143000" indent="-228600" eaLnBrk="0" hangingPunct="0">
+              <a:defRPr>
+                <a:solidFill>
+                  <a:schemeClr val="tx1"/>
+                </a:solidFill>
+                <a:latin typeface="Arial" panose="020B0604020202020204" pitchFamily="34" charset="0"/>
+                <a:ea typeface="宋体" panose="02010600030101010101" pitchFamily="2" charset="-122"/>
+              </a:defRPr>
+            </a:lvl3pPr>
+            <a:lvl4pPr marL="1600200" indent="-228600" eaLnBrk="0" hangingPunct="0">
+              <a:defRPr>
+                <a:solidFill>
+                  <a:schemeClr val="tx1"/>
+                </a:solidFill>
+                <a:latin typeface="Arial" panose="020B0604020202020204" pitchFamily="34" charset="0"/>
+                <a:ea typeface="宋体" panose="02010600030101010101" pitchFamily="2" charset="-122"/>
+              </a:defRPr>
+            </a:lvl4pPr>
+            <a:lvl5pPr marL="2057400" indent="-228600" eaLnBrk="0" hangingPunct="0">
+              <a:defRPr>
+                <a:solidFill>
+                  <a:schemeClr val="tx1"/>
+                </a:solidFill>
+                <a:latin typeface="Arial" panose="020B0604020202020204" pitchFamily="34" charset="0"/>
+                <a:ea typeface="宋体" panose="02010600030101010101" pitchFamily="2" charset="-122"/>
+              </a:defRPr>
+            </a:lvl5pPr>
+            <a:lvl6pPr marL="2514600" indent="-228600" eaLnBrk="0" fontAlgn="base" hangingPunct="0">
+              <a:spcBef>
+                <a:spcPct val="0"/>
+              </a:spcBef>
+              <a:spcAft>
+                <a:spcPct val="0"/>
+              </a:spcAft>
+              <a:defRPr>
+                <a:solidFill>
+                  <a:schemeClr val="tx1"/>
+                </a:solidFill>
+                <a:latin typeface="Arial" panose="020B0604020202020204" pitchFamily="34" charset="0"/>
+                <a:ea typeface="宋体" panose="02010600030101010101" pitchFamily="2" charset="-122"/>
+              </a:defRPr>
+            </a:lvl6pPr>
+            <a:lvl7pPr marL="2971800" indent="-228600" eaLnBrk="0" fontAlgn="base" hangingPunct="0">
+              <a:spcBef>
+                <a:spcPct val="0"/>
+              </a:spcBef>
+              <a:spcAft>
+                <a:spcPct val="0"/>
+              </a:spcAft>
+              <a:defRPr>
+                <a:solidFill>
+                  <a:schemeClr val="tx1"/>
+                </a:solidFill>
+                <a:latin typeface="Arial" panose="020B0604020202020204" pitchFamily="34" charset="0"/>
+                <a:ea typeface="宋体" panose="02010600030101010101" pitchFamily="2" charset="-122"/>
+              </a:defRPr>
+            </a:lvl7pPr>
+            <a:lvl8pPr marL="3429000" indent="-228600" eaLnBrk="0" fontAlgn="base" hangingPunct="0">
+              <a:spcBef>
+                <a:spcPct val="0"/>
+              </a:spcBef>
+              <a:spcAft>
+                <a:spcPct val="0"/>
+              </a:spcAft>
+              <a:defRPr>
+                <a:solidFill>
+                  <a:schemeClr val="tx1"/>
+                </a:solidFill>
+                <a:latin typeface="Arial" panose="020B0604020202020204" pitchFamily="34" charset="0"/>
+                <a:ea typeface="宋体" panose="02010600030101010101" pitchFamily="2" charset="-122"/>
+              </a:defRPr>
+            </a:lvl8pPr>
+            <a:lvl9pPr marL="3886200" indent="-228600" eaLnBrk="0" fontAlgn="base" hangingPunct="0">
+              <a:spcBef>
+                <a:spcPct val="0"/>
+              </a:spcBef>
+              <a:spcAft>
+                <a:spcPct val="0"/>
+              </a:spcAft>
+              <a:defRPr>
+                <a:solidFill>
+                  <a:schemeClr val="tx1"/>
+                </a:solidFill>
+                <a:latin typeface="Arial" panose="020B0604020202020204" pitchFamily="34" charset="0"/>
+                <a:ea typeface="宋体" panose="02010600030101010101" pitchFamily="2" charset="-122"/>
+              </a:defRPr>
+            </a:lvl9pPr>
+          </a:lstStyle>
+          <a:p>
+            <a:pPr eaLnBrk="1" hangingPunct="1"/>
+            <a:r>
+              <a:rPr lang="zh-CN" altLang="en-US" sz="4800" dirty="0">
+                <a:solidFill>
+                  <a:schemeClr val="bg1"/>
+                </a:solidFill>
+                <a:latin typeface="微软雅黑" panose="020B0503020204020204" pitchFamily="34" charset="-122"/>
+                <a:ea typeface="微软雅黑" panose="020B0503020204020204" pitchFamily="34" charset="-122"/>
+              </a:rPr>
+              <a:t>开发环境 </a:t>
+            </a:r>
+            <a:r>
+              <a:rPr lang="en-US" altLang="zh-CN" sz="4800" dirty="0">
+                <a:solidFill>
+                  <a:schemeClr val="bg1"/>
+                </a:solidFill>
+                <a:latin typeface="微软雅黑" panose="020B0503020204020204" pitchFamily="34" charset="-122"/>
+                <a:ea typeface="微软雅黑" panose="020B0503020204020204" pitchFamily="34" charset="-122"/>
+              </a:rPr>
+              <a:t>– </a:t>
+            </a:r>
+            <a:r>
+              <a:rPr lang="en-US" altLang="zh-CN" sz="4000" dirty="0" err="1">
+                <a:solidFill>
+                  <a:schemeClr val="bg1"/>
+                </a:solidFill>
+                <a:latin typeface="微软雅黑" panose="020B0503020204020204" pitchFamily="34" charset="-122"/>
+                <a:ea typeface="微软雅黑" panose="020B0503020204020204" pitchFamily="34" charset="-122"/>
+              </a:rPr>
+              <a:t>Jupyter</a:t>
+            </a:r>
+            <a:r>
+              <a:rPr lang="en-US" altLang="zh-CN" sz="4000" dirty="0">
+                <a:solidFill>
+                  <a:schemeClr val="bg1"/>
+                </a:solidFill>
+                <a:latin typeface="微软雅黑" panose="020B0503020204020204" pitchFamily="34" charset="-122"/>
+                <a:ea typeface="微软雅黑" panose="020B0503020204020204" pitchFamily="34" charset="-122"/>
+              </a:rPr>
+              <a:t> Notebook</a:t>
+            </a:r>
+            <a:endParaRPr lang="zh-CN" altLang="en-US" sz="4800" dirty="0">
+              <a:solidFill>
+                <a:schemeClr val="bg1"/>
+              </a:solidFill>
+              <a:latin typeface="微软雅黑" panose="020B0503020204020204" pitchFamily="34" charset="-122"/>
+              <a:ea typeface="微软雅黑" panose="020B0503020204020204" pitchFamily="34" charset="-122"/>
+            </a:endParaRPr>
+          </a:p>
+        </p:txBody>
+      </p:sp>
+      <p:sp>
+        <p:nvSpPr>
+          <p:cNvPr id="5" name="TextBox 4">
+            <a:extLst>
+              <a:ext uri="{FF2B5EF4-FFF2-40B4-BE49-F238E27FC236}">
+                <a16:creationId xmlns:a16="http://schemas.microsoft.com/office/drawing/2014/main" id="{E8A991AE-3688-4E36-95ED-0003B8B99099}"/>
+              </a:ext>
+            </a:extLst>
+          </p:cNvPr>
+          <p:cNvSpPr txBox="1"/>
+          <p:nvPr/>
+        </p:nvSpPr>
+        <p:spPr>
+          <a:xfrm>
+            <a:off x="179512" y="1196752"/>
+            <a:ext cx="8569325" cy="1600438"/>
+          </a:xfrm>
+          <a:prstGeom prst="rect">
+            <a:avLst/>
+          </a:prstGeom>
+          <a:noFill/>
+        </p:spPr>
+        <p:txBody>
+          <a:bodyPr>
+            <a:spAutoFit/>
+          </a:bodyPr>
+          <a:lstStyle/>
+          <a:p>
+            <a:pPr>
+              <a:defRPr/>
+            </a:pPr>
+            <a:r>
+              <a:rPr lang="en-US" altLang="zh-CN" sz="4000" dirty="0" err="1">
+                <a:solidFill>
+                  <a:schemeClr val="bg1"/>
+                </a:solidFill>
+                <a:latin typeface="微软雅黑" pitchFamily="34" charset="-122"/>
+                <a:ea typeface="微软雅黑" pitchFamily="34" charset="-122"/>
+              </a:rPr>
+              <a:t>Jupyter</a:t>
+            </a:r>
+            <a:r>
+              <a:rPr lang="en-US" altLang="zh-CN" sz="4000" dirty="0">
+                <a:solidFill>
+                  <a:schemeClr val="bg1"/>
+                </a:solidFill>
+                <a:latin typeface="微软雅黑" pitchFamily="34" charset="-122"/>
+                <a:ea typeface="微软雅黑" pitchFamily="34" charset="-122"/>
+              </a:rPr>
+              <a:t> Notebook</a:t>
+            </a:r>
+            <a:r>
+              <a:rPr lang="zh-CN" altLang="en-US" sz="4000" dirty="0">
+                <a:solidFill>
+                  <a:schemeClr val="bg1"/>
+                </a:solidFill>
+                <a:latin typeface="微软雅黑" pitchFamily="34" charset="-122"/>
+                <a:ea typeface="微软雅黑" pitchFamily="34" charset="-122"/>
+              </a:rPr>
+              <a:t>随</a:t>
+            </a:r>
+            <a:r>
+              <a:rPr lang="en-US" altLang="zh-CN" sz="4000" dirty="0">
+                <a:solidFill>
+                  <a:schemeClr val="bg1"/>
+                </a:solidFill>
+                <a:latin typeface="微软雅黑" pitchFamily="34" charset="-122"/>
+                <a:ea typeface="微软雅黑" pitchFamily="34" charset="-122"/>
+              </a:rPr>
+              <a:t>Anaconda</a:t>
+            </a:r>
+            <a:r>
+              <a:rPr lang="zh-CN" altLang="en-US" sz="4000" dirty="0">
+                <a:solidFill>
+                  <a:schemeClr val="bg1"/>
+                </a:solidFill>
+                <a:latin typeface="微软雅黑" pitchFamily="34" charset="-122"/>
+                <a:ea typeface="微软雅黑" pitchFamily="34" charset="-122"/>
+              </a:rPr>
+              <a:t>一起被安装：</a:t>
+            </a:r>
+            <a:endParaRPr lang="en-US" altLang="zh-CN" sz="4000" dirty="0">
+              <a:solidFill>
+                <a:schemeClr val="bg1"/>
+              </a:solidFill>
+              <a:latin typeface="微软雅黑" pitchFamily="34" charset="-122"/>
+              <a:ea typeface="微软雅黑" pitchFamily="34" charset="-122"/>
+            </a:endParaRPr>
+          </a:p>
+          <a:p>
+            <a:pPr>
+              <a:defRPr/>
+            </a:pPr>
+            <a:endParaRPr lang="en-US" dirty="0">
+              <a:solidFill>
+                <a:schemeClr val="bg1"/>
+              </a:solidFill>
+              <a:latin typeface="Arial" charset="0"/>
+            </a:endParaRPr>
+          </a:p>
+        </p:txBody>
+      </p:sp>
+      <p:pic>
+        <p:nvPicPr>
+          <p:cNvPr id="2" name="Picture 1">
+            <a:extLst>
+              <a:ext uri="{FF2B5EF4-FFF2-40B4-BE49-F238E27FC236}">
+                <a16:creationId xmlns:a16="http://schemas.microsoft.com/office/drawing/2014/main" id="{59700CC7-B6DB-4E0F-B243-142906E08C76}"/>
+              </a:ext>
+            </a:extLst>
+          </p:cNvPr>
+          <p:cNvPicPr>
+            <a:picLocks noChangeAspect="1"/>
+          </p:cNvPicPr>
+          <p:nvPr/>
+        </p:nvPicPr>
+        <p:blipFill>
+          <a:blip r:embed="rId2"/>
+          <a:stretch>
+            <a:fillRect/>
+          </a:stretch>
+        </p:blipFill>
+        <p:spPr>
+          <a:xfrm>
+            <a:off x="2555776" y="2287844"/>
+            <a:ext cx="3528392" cy="4342636"/>
+          </a:xfrm>
+          <a:prstGeom prst="rect">
+            <a:avLst/>
+          </a:prstGeom>
+        </p:spPr>
+      </p:pic>
+      <p:sp>
+        <p:nvSpPr>
+          <p:cNvPr id="3" name="Rectangle 2">
+            <a:extLst>
+              <a:ext uri="{FF2B5EF4-FFF2-40B4-BE49-F238E27FC236}">
+                <a16:creationId xmlns:a16="http://schemas.microsoft.com/office/drawing/2014/main" id="{A0A990FA-0B45-4CED-A30F-FC194BFE8DE0}"/>
+              </a:ext>
+            </a:extLst>
+          </p:cNvPr>
+          <p:cNvSpPr/>
+          <p:nvPr/>
+        </p:nvSpPr>
+        <p:spPr>
+          <a:xfrm>
+            <a:off x="1907704" y="5301208"/>
+            <a:ext cx="4536504" cy="504056"/>
+          </a:xfrm>
+          <a:prstGeom prst="rect">
+            <a:avLst/>
+          </a:prstGeom>
+          <a:noFill/>
+          <a:ln>
+            <a:solidFill>
+              <a:srgbClr val="FF0000"/>
+            </a:solidFill>
+          </a:ln>
+        </p:spPr>
+        <p:style>
+          <a:lnRef idx="2">
+            <a:schemeClr val="accent1">
+              <a:shade val="50000"/>
+            </a:schemeClr>
+          </a:lnRef>
+          <a:fillRef idx="1">
+            <a:schemeClr val="accent1"/>
+          </a:fillRef>
+          <a:effectRef idx="0">
+            <a:schemeClr val="accent1"/>
+          </a:effectRef>
+          <a:fontRef idx="minor">
+            <a:schemeClr val="lt1"/>
+          </a:fontRef>
+        </p:style>
+        <p:txBody>
+          <a:bodyPr rtlCol="0" anchor="ctr"/>
+          <a:lstStyle/>
+          <a:p>
+            <a:pPr algn="ctr"/>
+            <a:endParaRPr lang="en-US"/>
+          </a:p>
+        </p:txBody>
+      </p:sp>
+    </p:spTree>
+    <p:extLst>
+      <p:ext uri="{BB962C8B-B14F-4D97-AF65-F5344CB8AC3E}">
+        <p14:creationId xmlns:p14="http://schemas.microsoft.com/office/powerpoint/2010/main" val="1548811297"/>
+      </p:ext>
+    </p:extLst>
+  </p:cSld>
+  <p:clrMapOvr>
+    <a:masterClrMapping/>
+  </p:clrMapOvr>
+</p:sld>
+</file>
+
+<file path=ppt/slides/slide17.xml><?xml version="1.0" encoding="utf-8"?>
+<p:sld xmlns:a="http://schemas.openxmlformats.org/drawingml/2006/main" xmlns:r="http://schemas.openxmlformats.org/officeDocument/2006/relationships" xmlns:p="http://schemas.openxmlformats.org/presentationml/2006/main">
+  <p:cSld>
+    <p:spTree>
+      <p:nvGrpSpPr>
+        <p:cNvPr id="1" name=""/>
+        <p:cNvGrpSpPr/>
+        <p:nvPr/>
+      </p:nvGrpSpPr>
+      <p:grpSpPr>
+        <a:xfrm>
+          <a:off x="0" y="0"/>
+          <a:ext cx="0" cy="0"/>
+          <a:chOff x="0" y="0"/>
+          <a:chExt cx="0" cy="0"/>
+        </a:xfrm>
+      </p:grpSpPr>
+      <p:sp>
+        <p:nvSpPr>
+          <p:cNvPr id="4098" name="TextBox 2">
+            <a:extLst>
+              <a:ext uri="{FF2B5EF4-FFF2-40B4-BE49-F238E27FC236}">
+                <a16:creationId xmlns:a16="http://schemas.microsoft.com/office/drawing/2014/main" id="{5552ED83-0001-4E47-A09B-F49C592A8E24}"/>
+              </a:ext>
+            </a:extLst>
+          </p:cNvPr>
+          <p:cNvSpPr txBox="1">
+            <a:spLocks noChangeArrowheads="1"/>
+          </p:cNvSpPr>
+          <p:nvPr/>
+        </p:nvSpPr>
+        <p:spPr bwMode="auto">
+          <a:xfrm>
+            <a:off x="179512" y="260648"/>
+            <a:ext cx="8496944" cy="830997"/>
+          </a:xfrm>
+          <a:prstGeom prst="rect">
+            <a:avLst/>
+          </a:prstGeom>
+          <a:noFill/>
+          <a:ln>
+            <a:noFill/>
+          </a:ln>
+          <a:extLst>
+            <a:ext uri="{909E8E84-426E-40DD-AFC4-6F175D3DCCD1}">
+              <a14:hiddenFill xmlns:a14="http://schemas.microsoft.com/office/drawing/2010/main">
+                <a:solidFill>
+                  <a:srgbClr val="FFFFFF"/>
+                </a:solidFill>
+              </a14:hiddenFill>
+            </a:ext>
+            <a:ext uri="{91240B29-F687-4F45-9708-019B960494DF}">
+              <a14:hiddenLine xmlns:a14="http://schemas.microsoft.com/office/drawing/2010/main" w="9525">
+                <a:solidFill>
+                  <a:srgbClr val="000000"/>
+                </a:solidFill>
+                <a:miter lim="800000"/>
+                <a:headEnd/>
+                <a:tailEnd/>
+              </a14:hiddenLine>
+            </a:ext>
+          </a:extLst>
+        </p:spPr>
+        <p:txBody>
+          <a:bodyPr wrap="square">
+            <a:spAutoFit/>
+          </a:bodyPr>
+          <a:lstStyle>
+            <a:lvl1pPr eaLnBrk="0" hangingPunct="0">
+              <a:defRPr>
+                <a:solidFill>
+                  <a:schemeClr val="tx1"/>
+                </a:solidFill>
+                <a:latin typeface="Arial" panose="020B0604020202020204" pitchFamily="34" charset="0"/>
+                <a:ea typeface="宋体" panose="02010600030101010101" pitchFamily="2" charset="-122"/>
+              </a:defRPr>
+            </a:lvl1pPr>
+            <a:lvl2pPr marL="742950" indent="-285750" eaLnBrk="0" hangingPunct="0">
+              <a:defRPr>
+                <a:solidFill>
+                  <a:schemeClr val="tx1"/>
+                </a:solidFill>
+                <a:latin typeface="Arial" panose="020B0604020202020204" pitchFamily="34" charset="0"/>
+                <a:ea typeface="宋体" panose="02010600030101010101" pitchFamily="2" charset="-122"/>
+              </a:defRPr>
+            </a:lvl2pPr>
+            <a:lvl3pPr marL="1143000" indent="-228600" eaLnBrk="0" hangingPunct="0">
+              <a:defRPr>
+                <a:solidFill>
+                  <a:schemeClr val="tx1"/>
+                </a:solidFill>
+                <a:latin typeface="Arial" panose="020B0604020202020204" pitchFamily="34" charset="0"/>
+                <a:ea typeface="宋体" panose="02010600030101010101" pitchFamily="2" charset="-122"/>
+              </a:defRPr>
+            </a:lvl3pPr>
+            <a:lvl4pPr marL="1600200" indent="-228600" eaLnBrk="0" hangingPunct="0">
+              <a:defRPr>
+                <a:solidFill>
+                  <a:schemeClr val="tx1"/>
+                </a:solidFill>
+                <a:latin typeface="Arial" panose="020B0604020202020204" pitchFamily="34" charset="0"/>
+                <a:ea typeface="宋体" panose="02010600030101010101" pitchFamily="2" charset="-122"/>
+              </a:defRPr>
+            </a:lvl4pPr>
+            <a:lvl5pPr marL="2057400" indent="-228600" eaLnBrk="0" hangingPunct="0">
+              <a:defRPr>
+                <a:solidFill>
+                  <a:schemeClr val="tx1"/>
+                </a:solidFill>
+                <a:latin typeface="Arial" panose="020B0604020202020204" pitchFamily="34" charset="0"/>
+                <a:ea typeface="宋体" panose="02010600030101010101" pitchFamily="2" charset="-122"/>
+              </a:defRPr>
+            </a:lvl5pPr>
+            <a:lvl6pPr marL="2514600" indent="-228600" eaLnBrk="0" fontAlgn="base" hangingPunct="0">
+              <a:spcBef>
+                <a:spcPct val="0"/>
+              </a:spcBef>
+              <a:spcAft>
+                <a:spcPct val="0"/>
+              </a:spcAft>
+              <a:defRPr>
+                <a:solidFill>
+                  <a:schemeClr val="tx1"/>
+                </a:solidFill>
+                <a:latin typeface="Arial" panose="020B0604020202020204" pitchFamily="34" charset="0"/>
+                <a:ea typeface="宋体" panose="02010600030101010101" pitchFamily="2" charset="-122"/>
+              </a:defRPr>
+            </a:lvl6pPr>
+            <a:lvl7pPr marL="2971800" indent="-228600" eaLnBrk="0" fontAlgn="base" hangingPunct="0">
+              <a:spcBef>
+                <a:spcPct val="0"/>
+              </a:spcBef>
+              <a:spcAft>
+                <a:spcPct val="0"/>
+              </a:spcAft>
+              <a:defRPr>
+                <a:solidFill>
+                  <a:schemeClr val="tx1"/>
+                </a:solidFill>
+                <a:latin typeface="Arial" panose="020B0604020202020204" pitchFamily="34" charset="0"/>
+                <a:ea typeface="宋体" panose="02010600030101010101" pitchFamily="2" charset="-122"/>
+              </a:defRPr>
+            </a:lvl7pPr>
+            <a:lvl8pPr marL="3429000" indent="-228600" eaLnBrk="0" fontAlgn="base" hangingPunct="0">
+              <a:spcBef>
+                <a:spcPct val="0"/>
+              </a:spcBef>
+              <a:spcAft>
+                <a:spcPct val="0"/>
+              </a:spcAft>
+              <a:defRPr>
+                <a:solidFill>
+                  <a:schemeClr val="tx1"/>
+                </a:solidFill>
+                <a:latin typeface="Arial" panose="020B0604020202020204" pitchFamily="34" charset="0"/>
+                <a:ea typeface="宋体" panose="02010600030101010101" pitchFamily="2" charset="-122"/>
+              </a:defRPr>
+            </a:lvl8pPr>
+            <a:lvl9pPr marL="3886200" indent="-228600" eaLnBrk="0" fontAlgn="base" hangingPunct="0">
+              <a:spcBef>
+                <a:spcPct val="0"/>
+              </a:spcBef>
+              <a:spcAft>
+                <a:spcPct val="0"/>
+              </a:spcAft>
+              <a:defRPr>
+                <a:solidFill>
+                  <a:schemeClr val="tx1"/>
+                </a:solidFill>
+                <a:latin typeface="Arial" panose="020B0604020202020204" pitchFamily="34" charset="0"/>
+                <a:ea typeface="宋体" panose="02010600030101010101" pitchFamily="2" charset="-122"/>
+              </a:defRPr>
+            </a:lvl9pPr>
+          </a:lstStyle>
+          <a:p>
+            <a:pPr eaLnBrk="1" hangingPunct="1"/>
+            <a:r>
+              <a:rPr lang="zh-CN" altLang="en-US" sz="4800" dirty="0">
+                <a:solidFill>
+                  <a:schemeClr val="bg1"/>
+                </a:solidFill>
+                <a:latin typeface="微软雅黑" panose="020B0503020204020204" pitchFamily="34" charset="-122"/>
+                <a:ea typeface="微软雅黑" panose="020B0503020204020204" pitchFamily="34" charset="-122"/>
+              </a:rPr>
+              <a:t>开发环境 </a:t>
+            </a:r>
+            <a:r>
+              <a:rPr lang="en-US" altLang="zh-CN" sz="4800" dirty="0">
+                <a:solidFill>
+                  <a:schemeClr val="bg1"/>
+                </a:solidFill>
+                <a:latin typeface="微软雅黑" panose="020B0503020204020204" pitchFamily="34" charset="-122"/>
+                <a:ea typeface="微软雅黑" panose="020B0503020204020204" pitchFamily="34" charset="-122"/>
+              </a:rPr>
+              <a:t>– </a:t>
+            </a:r>
+            <a:r>
+              <a:rPr lang="en-US" altLang="zh-CN" sz="4000" dirty="0" err="1">
+                <a:solidFill>
+                  <a:schemeClr val="bg1"/>
+                </a:solidFill>
+                <a:latin typeface="微软雅黑" panose="020B0503020204020204" pitchFamily="34" charset="-122"/>
+                <a:ea typeface="微软雅黑" panose="020B0503020204020204" pitchFamily="34" charset="-122"/>
+              </a:rPr>
+              <a:t>Jupyter</a:t>
+            </a:r>
+            <a:r>
+              <a:rPr lang="en-US" altLang="zh-CN" sz="4000" dirty="0">
+                <a:solidFill>
+                  <a:schemeClr val="bg1"/>
+                </a:solidFill>
+                <a:latin typeface="微软雅黑" panose="020B0503020204020204" pitchFamily="34" charset="-122"/>
+                <a:ea typeface="微软雅黑" panose="020B0503020204020204" pitchFamily="34" charset="-122"/>
+              </a:rPr>
+              <a:t> Notebook</a:t>
+            </a:r>
+            <a:endParaRPr lang="zh-CN" altLang="en-US" sz="4800" dirty="0">
+              <a:solidFill>
+                <a:schemeClr val="bg1"/>
+              </a:solidFill>
+              <a:latin typeface="微软雅黑" panose="020B0503020204020204" pitchFamily="34" charset="-122"/>
+              <a:ea typeface="微软雅黑" panose="020B0503020204020204" pitchFamily="34" charset="-122"/>
+            </a:endParaRPr>
+          </a:p>
+        </p:txBody>
+      </p:sp>
+      <p:sp>
+        <p:nvSpPr>
+          <p:cNvPr id="5" name="TextBox 4">
+            <a:extLst>
+              <a:ext uri="{FF2B5EF4-FFF2-40B4-BE49-F238E27FC236}">
+                <a16:creationId xmlns:a16="http://schemas.microsoft.com/office/drawing/2014/main" id="{E8A991AE-3688-4E36-95ED-0003B8B99099}"/>
+              </a:ext>
+            </a:extLst>
+          </p:cNvPr>
+          <p:cNvSpPr txBox="1"/>
+          <p:nvPr/>
+        </p:nvSpPr>
+        <p:spPr>
+          <a:xfrm>
+            <a:off x="179512" y="1196752"/>
+            <a:ext cx="8569325" cy="984885"/>
+          </a:xfrm>
+          <a:prstGeom prst="rect">
+            <a:avLst/>
+          </a:prstGeom>
+          <a:noFill/>
+        </p:spPr>
+        <p:txBody>
+          <a:bodyPr>
+            <a:spAutoFit/>
+          </a:bodyPr>
+          <a:lstStyle/>
+          <a:p>
+            <a:pPr>
+              <a:defRPr/>
+            </a:pPr>
+            <a:r>
+              <a:rPr lang="en-US" altLang="zh-CN" sz="4000" dirty="0" err="1">
+                <a:solidFill>
+                  <a:schemeClr val="bg1"/>
+                </a:solidFill>
+                <a:latin typeface="微软雅黑" pitchFamily="34" charset="-122"/>
+                <a:ea typeface="微软雅黑" pitchFamily="34" charset="-122"/>
+              </a:rPr>
+              <a:t>Jupyter</a:t>
+            </a:r>
+            <a:r>
+              <a:rPr lang="en-US" altLang="zh-CN" sz="4000" dirty="0">
+                <a:solidFill>
+                  <a:schemeClr val="bg1"/>
+                </a:solidFill>
+                <a:latin typeface="微软雅黑" pitchFamily="34" charset="-122"/>
+                <a:ea typeface="微软雅黑" pitchFamily="34" charset="-122"/>
+              </a:rPr>
+              <a:t> Notebook</a:t>
+            </a:r>
+            <a:r>
+              <a:rPr lang="zh-CN" altLang="en-US" sz="4000" dirty="0">
+                <a:solidFill>
+                  <a:schemeClr val="bg1"/>
+                </a:solidFill>
+                <a:latin typeface="微软雅黑" pitchFamily="34" charset="-122"/>
+                <a:ea typeface="微软雅黑" pitchFamily="34" charset="-122"/>
+              </a:rPr>
+              <a:t>界面：</a:t>
+            </a:r>
+            <a:endParaRPr lang="en-US" altLang="zh-CN" sz="4000" dirty="0">
+              <a:solidFill>
+                <a:schemeClr val="bg1"/>
+              </a:solidFill>
+              <a:latin typeface="微软雅黑" pitchFamily="34" charset="-122"/>
+              <a:ea typeface="微软雅黑" pitchFamily="34" charset="-122"/>
+            </a:endParaRPr>
+          </a:p>
+          <a:p>
+            <a:pPr>
+              <a:defRPr/>
+            </a:pPr>
+            <a:endParaRPr lang="en-US" dirty="0">
+              <a:solidFill>
+                <a:schemeClr val="bg1"/>
+              </a:solidFill>
+              <a:latin typeface="Arial" charset="0"/>
+            </a:endParaRPr>
+          </a:p>
+        </p:txBody>
+      </p:sp>
+      <p:pic>
+        <p:nvPicPr>
+          <p:cNvPr id="4" name="Picture 3">
+            <a:extLst>
+              <a:ext uri="{FF2B5EF4-FFF2-40B4-BE49-F238E27FC236}">
+                <a16:creationId xmlns:a16="http://schemas.microsoft.com/office/drawing/2014/main" id="{1507DB0A-8FDC-4427-98A8-58A19E12CB92}"/>
+              </a:ext>
+            </a:extLst>
+          </p:cNvPr>
+          <p:cNvPicPr>
+            <a:picLocks noChangeAspect="1"/>
+          </p:cNvPicPr>
+          <p:nvPr/>
+        </p:nvPicPr>
+        <p:blipFill>
+          <a:blip r:embed="rId2"/>
+          <a:stretch>
+            <a:fillRect/>
+          </a:stretch>
+        </p:blipFill>
+        <p:spPr>
+          <a:xfrm>
+            <a:off x="1691680" y="1844824"/>
+            <a:ext cx="5904656" cy="4904414"/>
+          </a:xfrm>
+          <a:prstGeom prst="rect">
+            <a:avLst/>
+          </a:prstGeom>
+        </p:spPr>
+      </p:pic>
+    </p:spTree>
+    <p:extLst>
+      <p:ext uri="{BB962C8B-B14F-4D97-AF65-F5344CB8AC3E}">
+        <p14:creationId xmlns:p14="http://schemas.microsoft.com/office/powerpoint/2010/main" val="3530155083"/>
+      </p:ext>
+    </p:extLst>
+  </p:cSld>
+  <p:clrMapOvr>
+    <a:masterClrMapping/>
+  </p:clrMapOvr>
+</p:sld>
+</file>
+
+<file path=ppt/slides/slide18.xml><?xml version="1.0" encoding="utf-8"?>
+<p:sld xmlns:a="http://schemas.openxmlformats.org/drawingml/2006/main" xmlns:r="http://schemas.openxmlformats.org/officeDocument/2006/relationships" xmlns:p="http://schemas.openxmlformats.org/presentationml/2006/main">
+  <p:cSld>
+    <p:spTree>
+      <p:nvGrpSpPr>
+        <p:cNvPr id="1" name=""/>
+        <p:cNvGrpSpPr/>
+        <p:nvPr/>
+      </p:nvGrpSpPr>
+      <p:grpSpPr>
+        <a:xfrm>
+          <a:off x="0" y="0"/>
+          <a:ext cx="0" cy="0"/>
+          <a:chOff x="0" y="0"/>
+          <a:chExt cx="0" cy="0"/>
+        </a:xfrm>
+      </p:grpSpPr>
+      <p:sp>
+        <p:nvSpPr>
+          <p:cNvPr id="4098" name="TextBox 2">
+            <a:extLst>
+              <a:ext uri="{FF2B5EF4-FFF2-40B4-BE49-F238E27FC236}">
+                <a16:creationId xmlns:a16="http://schemas.microsoft.com/office/drawing/2014/main" id="{5552ED83-0001-4E47-A09B-F49C592A8E24}"/>
+              </a:ext>
+            </a:extLst>
+          </p:cNvPr>
+          <p:cNvSpPr txBox="1">
+            <a:spLocks noChangeArrowheads="1"/>
+          </p:cNvSpPr>
+          <p:nvPr/>
+        </p:nvSpPr>
+        <p:spPr bwMode="auto">
+          <a:xfrm>
+            <a:off x="179512" y="260648"/>
+            <a:ext cx="8496944" cy="830997"/>
+          </a:xfrm>
+          <a:prstGeom prst="rect">
+            <a:avLst/>
+          </a:prstGeom>
+          <a:noFill/>
+          <a:ln>
+            <a:noFill/>
+          </a:ln>
+          <a:extLst>
+            <a:ext uri="{909E8E84-426E-40DD-AFC4-6F175D3DCCD1}">
+              <a14:hiddenFill xmlns:a14="http://schemas.microsoft.com/office/drawing/2010/main">
+                <a:solidFill>
+                  <a:srgbClr val="FFFFFF"/>
+                </a:solidFill>
+              </a14:hiddenFill>
+            </a:ext>
+            <a:ext uri="{91240B29-F687-4F45-9708-019B960494DF}">
+              <a14:hiddenLine xmlns:a14="http://schemas.microsoft.com/office/drawing/2010/main" w="9525">
+                <a:solidFill>
+                  <a:srgbClr val="000000"/>
+                </a:solidFill>
+                <a:miter lim="800000"/>
+                <a:headEnd/>
+                <a:tailEnd/>
+              </a14:hiddenLine>
+            </a:ext>
+          </a:extLst>
+        </p:spPr>
+        <p:txBody>
+          <a:bodyPr wrap="square">
+            <a:spAutoFit/>
+          </a:bodyPr>
+          <a:lstStyle>
+            <a:lvl1pPr eaLnBrk="0" hangingPunct="0">
+              <a:defRPr>
+                <a:solidFill>
+                  <a:schemeClr val="tx1"/>
+                </a:solidFill>
+                <a:latin typeface="Arial" panose="020B0604020202020204" pitchFamily="34" charset="0"/>
+                <a:ea typeface="宋体" panose="02010600030101010101" pitchFamily="2" charset="-122"/>
+              </a:defRPr>
+            </a:lvl1pPr>
+            <a:lvl2pPr marL="742950" indent="-285750" eaLnBrk="0" hangingPunct="0">
+              <a:defRPr>
+                <a:solidFill>
+                  <a:schemeClr val="tx1"/>
+                </a:solidFill>
+                <a:latin typeface="Arial" panose="020B0604020202020204" pitchFamily="34" charset="0"/>
+                <a:ea typeface="宋体" panose="02010600030101010101" pitchFamily="2" charset="-122"/>
+              </a:defRPr>
+            </a:lvl2pPr>
+            <a:lvl3pPr marL="1143000" indent="-228600" eaLnBrk="0" hangingPunct="0">
+              <a:defRPr>
+                <a:solidFill>
+                  <a:schemeClr val="tx1"/>
+                </a:solidFill>
+                <a:latin typeface="Arial" panose="020B0604020202020204" pitchFamily="34" charset="0"/>
+                <a:ea typeface="宋体" panose="02010600030101010101" pitchFamily="2" charset="-122"/>
+              </a:defRPr>
+            </a:lvl3pPr>
+            <a:lvl4pPr marL="1600200" indent="-228600" eaLnBrk="0" hangingPunct="0">
+              <a:defRPr>
+                <a:solidFill>
+                  <a:schemeClr val="tx1"/>
+                </a:solidFill>
+                <a:latin typeface="Arial" panose="020B0604020202020204" pitchFamily="34" charset="0"/>
+                <a:ea typeface="宋体" panose="02010600030101010101" pitchFamily="2" charset="-122"/>
+              </a:defRPr>
+            </a:lvl4pPr>
+            <a:lvl5pPr marL="2057400" indent="-228600" eaLnBrk="0" hangingPunct="0">
+              <a:defRPr>
+                <a:solidFill>
+                  <a:schemeClr val="tx1"/>
+                </a:solidFill>
+                <a:latin typeface="Arial" panose="020B0604020202020204" pitchFamily="34" charset="0"/>
+                <a:ea typeface="宋体" panose="02010600030101010101" pitchFamily="2" charset="-122"/>
+              </a:defRPr>
+            </a:lvl5pPr>
+            <a:lvl6pPr marL="2514600" indent="-228600" eaLnBrk="0" fontAlgn="base" hangingPunct="0">
+              <a:spcBef>
+                <a:spcPct val="0"/>
+              </a:spcBef>
+              <a:spcAft>
+                <a:spcPct val="0"/>
+              </a:spcAft>
+              <a:defRPr>
+                <a:solidFill>
+                  <a:schemeClr val="tx1"/>
+                </a:solidFill>
+                <a:latin typeface="Arial" panose="020B0604020202020204" pitchFamily="34" charset="0"/>
+                <a:ea typeface="宋体" panose="02010600030101010101" pitchFamily="2" charset="-122"/>
+              </a:defRPr>
+            </a:lvl6pPr>
+            <a:lvl7pPr marL="2971800" indent="-228600" eaLnBrk="0" fontAlgn="base" hangingPunct="0">
+              <a:spcBef>
+                <a:spcPct val="0"/>
+              </a:spcBef>
+              <a:spcAft>
+                <a:spcPct val="0"/>
+              </a:spcAft>
+              <a:defRPr>
+                <a:solidFill>
+                  <a:schemeClr val="tx1"/>
+                </a:solidFill>
+                <a:latin typeface="Arial" panose="020B0604020202020204" pitchFamily="34" charset="0"/>
+                <a:ea typeface="宋体" panose="02010600030101010101" pitchFamily="2" charset="-122"/>
+              </a:defRPr>
+            </a:lvl7pPr>
+            <a:lvl8pPr marL="3429000" indent="-228600" eaLnBrk="0" fontAlgn="base" hangingPunct="0">
+              <a:spcBef>
+                <a:spcPct val="0"/>
+              </a:spcBef>
+              <a:spcAft>
+                <a:spcPct val="0"/>
+              </a:spcAft>
+              <a:defRPr>
+                <a:solidFill>
+                  <a:schemeClr val="tx1"/>
+                </a:solidFill>
+                <a:latin typeface="Arial" panose="020B0604020202020204" pitchFamily="34" charset="0"/>
+                <a:ea typeface="宋体" panose="02010600030101010101" pitchFamily="2" charset="-122"/>
+              </a:defRPr>
+            </a:lvl8pPr>
+            <a:lvl9pPr marL="3886200" indent="-228600" eaLnBrk="0" fontAlgn="base" hangingPunct="0">
+              <a:spcBef>
+                <a:spcPct val="0"/>
+              </a:spcBef>
+              <a:spcAft>
+                <a:spcPct val="0"/>
+              </a:spcAft>
+              <a:defRPr>
+                <a:solidFill>
+                  <a:schemeClr val="tx1"/>
+                </a:solidFill>
+                <a:latin typeface="Arial" panose="020B0604020202020204" pitchFamily="34" charset="0"/>
+                <a:ea typeface="宋体" panose="02010600030101010101" pitchFamily="2" charset="-122"/>
+              </a:defRPr>
+            </a:lvl9pPr>
+          </a:lstStyle>
+          <a:p>
+            <a:pPr eaLnBrk="1" hangingPunct="1"/>
+            <a:r>
+              <a:rPr lang="zh-CN" altLang="en-US" sz="4800" dirty="0">
+                <a:solidFill>
+                  <a:schemeClr val="bg1"/>
+                </a:solidFill>
+                <a:latin typeface="微软雅黑" panose="020B0503020204020204" pitchFamily="34" charset="-122"/>
+                <a:ea typeface="微软雅黑" panose="020B0503020204020204" pitchFamily="34" charset="-122"/>
+              </a:rPr>
+              <a:t>开发环境 </a:t>
+            </a:r>
+            <a:r>
+              <a:rPr lang="en-US" altLang="zh-CN" sz="4800" dirty="0">
+                <a:solidFill>
+                  <a:schemeClr val="bg1"/>
+                </a:solidFill>
+                <a:latin typeface="微软雅黑" panose="020B0503020204020204" pitchFamily="34" charset="-122"/>
+                <a:ea typeface="微软雅黑" panose="020B0503020204020204" pitchFamily="34" charset="-122"/>
+              </a:rPr>
+              <a:t>– </a:t>
+            </a:r>
+            <a:r>
+              <a:rPr lang="en-US" altLang="zh-CN" sz="4000" dirty="0">
+                <a:solidFill>
+                  <a:schemeClr val="bg1"/>
+                </a:solidFill>
+                <a:latin typeface="微软雅黑" panose="020B0503020204020204" pitchFamily="34" charset="-122"/>
+                <a:ea typeface="微软雅黑" panose="020B0503020204020204" pitchFamily="34" charset="-122"/>
+              </a:rPr>
+              <a:t>IDE</a:t>
+            </a:r>
+            <a:endParaRPr lang="zh-CN" altLang="en-US" sz="4800" dirty="0">
+              <a:solidFill>
+                <a:schemeClr val="bg1"/>
+              </a:solidFill>
+              <a:latin typeface="微软雅黑" panose="020B0503020204020204" pitchFamily="34" charset="-122"/>
+              <a:ea typeface="微软雅黑" panose="020B0503020204020204" pitchFamily="34" charset="-122"/>
+            </a:endParaRPr>
+          </a:p>
+        </p:txBody>
+      </p:sp>
+      <p:sp>
+        <p:nvSpPr>
+          <p:cNvPr id="5" name="TextBox 4">
+            <a:extLst>
+              <a:ext uri="{FF2B5EF4-FFF2-40B4-BE49-F238E27FC236}">
+                <a16:creationId xmlns:a16="http://schemas.microsoft.com/office/drawing/2014/main" id="{E8A991AE-3688-4E36-95ED-0003B8B99099}"/>
+              </a:ext>
+            </a:extLst>
+          </p:cNvPr>
+          <p:cNvSpPr txBox="1"/>
+          <p:nvPr/>
+        </p:nvSpPr>
+        <p:spPr>
+          <a:xfrm>
+            <a:off x="179512" y="1196752"/>
+            <a:ext cx="8569325" cy="2831544"/>
+          </a:xfrm>
+          <a:prstGeom prst="rect">
+            <a:avLst/>
+          </a:prstGeom>
+          <a:noFill/>
+        </p:spPr>
+        <p:txBody>
+          <a:bodyPr>
+            <a:spAutoFit/>
+          </a:bodyPr>
+          <a:lstStyle/>
+          <a:p>
+            <a:pPr marL="571500" indent="-571500">
+              <a:buFont typeface="Arial" panose="020B0604020202020204" pitchFamily="34" charset="0"/>
+              <a:buChar char="•"/>
+              <a:defRPr/>
+            </a:pPr>
+            <a:r>
+              <a:rPr lang="zh-CN" altLang="en-US" sz="4000" dirty="0">
+                <a:solidFill>
+                  <a:schemeClr val="bg1"/>
+                </a:solidFill>
+                <a:latin typeface="微软雅黑" pitchFamily="34" charset="-122"/>
+                <a:ea typeface="微软雅黑" pitchFamily="34" charset="-122"/>
+              </a:rPr>
+              <a:t>推荐使用</a:t>
+            </a:r>
+            <a:r>
+              <a:rPr lang="en-US" altLang="zh-CN" sz="4000" dirty="0" err="1">
+                <a:solidFill>
+                  <a:schemeClr val="bg1"/>
+                </a:solidFill>
+                <a:latin typeface="微软雅黑" pitchFamily="34" charset="-122"/>
+                <a:ea typeface="微软雅黑" pitchFamily="34" charset="-122"/>
+              </a:rPr>
+              <a:t>PyCharm</a:t>
+            </a:r>
+            <a:endParaRPr lang="en-US" altLang="zh-CN" sz="4000" dirty="0">
+              <a:solidFill>
+                <a:schemeClr val="bg1"/>
+              </a:solidFill>
+              <a:latin typeface="微软雅黑" pitchFamily="34" charset="-122"/>
+              <a:ea typeface="微软雅黑" pitchFamily="34" charset="-122"/>
+            </a:endParaRPr>
+          </a:p>
+          <a:p>
+            <a:pPr marL="571500" indent="-571500">
+              <a:buFont typeface="Arial" panose="020B0604020202020204" pitchFamily="34" charset="0"/>
+              <a:buChar char="•"/>
+              <a:defRPr/>
+            </a:pPr>
+            <a:r>
+              <a:rPr lang="en-US" altLang="zh-CN" sz="4000" dirty="0">
+                <a:solidFill>
+                  <a:schemeClr val="bg1"/>
+                </a:solidFill>
+                <a:latin typeface="微软雅黑" pitchFamily="34" charset="-122"/>
+                <a:ea typeface="微软雅黑" pitchFamily="34" charset="-122"/>
+                <a:hlinkClick r:id="rId2"/>
+              </a:rPr>
+              <a:t>https://www.jetbrains.com/pycharm/</a:t>
+            </a:r>
+            <a:endParaRPr lang="en-US" altLang="zh-CN" sz="4000" dirty="0">
+              <a:solidFill>
+                <a:schemeClr val="bg1"/>
+              </a:solidFill>
+              <a:latin typeface="微软雅黑" pitchFamily="34" charset="-122"/>
+              <a:ea typeface="微软雅黑" pitchFamily="34" charset="-122"/>
+            </a:endParaRPr>
+          </a:p>
+          <a:p>
+            <a:pPr marL="571500" indent="-571500">
+              <a:buFont typeface="Arial" panose="020B0604020202020204" pitchFamily="34" charset="0"/>
+              <a:buChar char="•"/>
+              <a:defRPr/>
+            </a:pPr>
+            <a:endParaRPr lang="en-US" altLang="zh-CN" sz="4000" dirty="0">
+              <a:solidFill>
+                <a:schemeClr val="bg1"/>
+              </a:solidFill>
+              <a:latin typeface="微软雅黑" pitchFamily="34" charset="-122"/>
+              <a:ea typeface="微软雅黑" pitchFamily="34" charset="-122"/>
+            </a:endParaRPr>
+          </a:p>
+          <a:p>
+            <a:pPr>
+              <a:defRPr/>
+            </a:pPr>
+            <a:endParaRPr lang="en-US" dirty="0">
+              <a:solidFill>
+                <a:schemeClr val="bg1"/>
+              </a:solidFill>
+              <a:latin typeface="Arial" charset="0"/>
+            </a:endParaRPr>
+          </a:p>
+        </p:txBody>
+      </p:sp>
+      <p:pic>
+        <p:nvPicPr>
+          <p:cNvPr id="2" name="Picture 1">
+            <a:extLst>
+              <a:ext uri="{FF2B5EF4-FFF2-40B4-BE49-F238E27FC236}">
+                <a16:creationId xmlns:a16="http://schemas.microsoft.com/office/drawing/2014/main" id="{633F8DE4-3DBB-4D01-A905-C0C57FF4F79D}"/>
+              </a:ext>
+            </a:extLst>
+          </p:cNvPr>
+          <p:cNvPicPr>
+            <a:picLocks noChangeAspect="1"/>
+          </p:cNvPicPr>
+          <p:nvPr/>
+        </p:nvPicPr>
+        <p:blipFill>
+          <a:blip r:embed="rId3"/>
+          <a:stretch>
+            <a:fillRect/>
+          </a:stretch>
+        </p:blipFill>
+        <p:spPr>
+          <a:xfrm>
+            <a:off x="1595561" y="3140968"/>
+            <a:ext cx="5952877" cy="3591042"/>
+          </a:xfrm>
+          <a:prstGeom prst="rect">
+            <a:avLst/>
+          </a:prstGeom>
+        </p:spPr>
+      </p:pic>
+    </p:spTree>
+    <p:extLst>
+      <p:ext uri="{BB962C8B-B14F-4D97-AF65-F5344CB8AC3E}">
+        <p14:creationId xmlns:p14="http://schemas.microsoft.com/office/powerpoint/2010/main" val="3434601521"/>
+      </p:ext>
+    </p:extLst>
+  </p:cSld>
+  <p:clrMapOvr>
+    <a:masterClrMapping/>
+  </p:clrMapOvr>
+</p:sld>
+</file>
+
+<file path=ppt/slides/slide19.xml><?xml version="1.0" encoding="utf-8"?>
+<p:sld xmlns:a="http://schemas.openxmlformats.org/drawingml/2006/main" xmlns:r="http://schemas.openxmlformats.org/officeDocument/2006/relationships" xmlns:p="http://schemas.openxmlformats.org/presentationml/2006/main">
+  <p:cSld>
+    <p:spTree>
+      <p:nvGrpSpPr>
+        <p:cNvPr id="1" name=""/>
+        <p:cNvGrpSpPr/>
+        <p:nvPr/>
+      </p:nvGrpSpPr>
+      <p:grpSpPr>
+        <a:xfrm>
+          <a:off x="0" y="0"/>
+          <a:ext cx="0" cy="0"/>
+          <a:chOff x="0" y="0"/>
+          <a:chExt cx="0" cy="0"/>
+        </a:xfrm>
+      </p:grpSpPr>
+      <p:sp>
+        <p:nvSpPr>
           <p:cNvPr id="5122" name="Rectangle 2">
             <a:extLst>
               <a:ext uri="{FF2B5EF4-FFF2-40B4-BE49-F238E27FC236}">
@@ -9355,8 +10964,8 @@
         </p:nvSpPr>
         <p:spPr>
           <a:xfrm>
-            <a:off x="684213" y="2133600"/>
-            <a:ext cx="7847012" cy="2159000"/>
+            <a:off x="-22856" y="2636912"/>
+            <a:ext cx="9036495" cy="2159000"/>
           </a:xfrm>
         </p:spPr>
         <p:txBody>
@@ -9373,14 +10982,31 @@
               </a:rPr>
             </a:br>
             <a:r>
-              <a:rPr lang="en-US" altLang="zh-CN" sz="6600" dirty="0">
+              <a:rPr lang="en-US" altLang="zh-CN" sz="8000" dirty="0">
                 <a:solidFill>
                   <a:schemeClr val="bg1"/>
                 </a:solidFill>
                 <a:ea typeface="微软雅黑" panose="020B0503020204020204" pitchFamily="34" charset="-122"/>
               </a:rPr>
-              <a:t>Q &amp; A</a:t>
-            </a:r>
+              <a:t>Python</a:t>
+            </a:r>
+            <a:r>
+              <a:rPr lang="zh-CN" altLang="en-US" sz="8000" dirty="0">
+                <a:solidFill>
+                  <a:schemeClr val="bg1"/>
+                </a:solidFill>
+                <a:ea typeface="微软雅黑" panose="020B0503020204020204" pitchFamily="34" charset="-122"/>
+              </a:rPr>
+              <a:t>语言关键点</a:t>
+            </a:r>
+            <a:br>
+              <a:rPr lang="zh-CN" altLang="en-US" sz="8000" dirty="0">
+                <a:solidFill>
+                  <a:schemeClr val="bg1"/>
+                </a:solidFill>
+                <a:ea typeface="微软雅黑" panose="020B0503020204020204" pitchFamily="34" charset="-122"/>
+              </a:rPr>
+            </a:br>
             <a:br>
               <a:rPr lang="zh-CN" altLang="en-US" sz="7200" dirty="0">
                 <a:solidFill>
@@ -9401,7 +11027,7 @@
     </p:spTree>
     <p:extLst>
       <p:ext uri="{BB962C8B-B14F-4D97-AF65-F5344CB8AC3E}">
-        <p14:creationId xmlns:p14="http://schemas.microsoft.com/office/powerpoint/2010/main" val="1068010669"/>
+        <p14:creationId xmlns:p14="http://schemas.microsoft.com/office/powerpoint/2010/main" val="4160731250"/>
       </p:ext>
     </p:extLst>
   </p:cSld>
@@ -9622,7 +11248,7 @@
         <p:spPr>
           <a:xfrm>
             <a:off x="287337" y="1484784"/>
-            <a:ext cx="8569325" cy="2752548"/>
+            <a:ext cx="8569325" cy="2862322"/>
           </a:xfrm>
           <a:prstGeom prst="rect">
             <a:avLst/>
@@ -9715,7 +11341,7 @@
                 <a:latin typeface="微软雅黑" pitchFamily="34" charset="-122"/>
                 <a:ea typeface="微软雅黑" pitchFamily="34" charset="-122"/>
               </a:rPr>
-              <a:t>语言特点</a:t>
+              <a:t>语言关键点</a:t>
             </a:r>
             <a:endParaRPr lang="en-US" dirty="0">
               <a:solidFill>
@@ -9730,6 +11356,2395 @@
     <p:extLst>
       <p:ext uri="{BB962C8B-B14F-4D97-AF65-F5344CB8AC3E}">
         <p14:creationId xmlns:p14="http://schemas.microsoft.com/office/powerpoint/2010/main" val="4087806439"/>
+      </p:ext>
+    </p:extLst>
+  </p:cSld>
+  <p:clrMapOvr>
+    <a:masterClrMapping/>
+  </p:clrMapOvr>
+</p:sld>
+</file>
+
+<file path=ppt/slides/slide20.xml><?xml version="1.0" encoding="utf-8"?>
+<p:sld xmlns:a="http://schemas.openxmlformats.org/drawingml/2006/main" xmlns:r="http://schemas.openxmlformats.org/officeDocument/2006/relationships" xmlns:p="http://schemas.openxmlformats.org/presentationml/2006/main">
+  <p:cSld>
+    <p:spTree>
+      <p:nvGrpSpPr>
+        <p:cNvPr id="1" name=""/>
+        <p:cNvGrpSpPr/>
+        <p:nvPr/>
+      </p:nvGrpSpPr>
+      <p:grpSpPr>
+        <a:xfrm>
+          <a:off x="0" y="0"/>
+          <a:ext cx="0" cy="0"/>
+          <a:chOff x="0" y="0"/>
+          <a:chExt cx="0" cy="0"/>
+        </a:xfrm>
+      </p:grpSpPr>
+      <p:sp>
+        <p:nvSpPr>
+          <p:cNvPr id="4098" name="TextBox 2">
+            <a:extLst>
+              <a:ext uri="{FF2B5EF4-FFF2-40B4-BE49-F238E27FC236}">
+                <a16:creationId xmlns:a16="http://schemas.microsoft.com/office/drawing/2014/main" id="{5552ED83-0001-4E47-A09B-F49C592A8E24}"/>
+              </a:ext>
+            </a:extLst>
+          </p:cNvPr>
+          <p:cNvSpPr txBox="1">
+            <a:spLocks noChangeArrowheads="1"/>
+          </p:cNvSpPr>
+          <p:nvPr/>
+        </p:nvSpPr>
+        <p:spPr bwMode="auto">
+          <a:xfrm>
+            <a:off x="179512" y="260648"/>
+            <a:ext cx="8496944" cy="830997"/>
+          </a:xfrm>
+          <a:prstGeom prst="rect">
+            <a:avLst/>
+          </a:prstGeom>
+          <a:noFill/>
+          <a:ln>
+            <a:noFill/>
+          </a:ln>
+          <a:extLst>
+            <a:ext uri="{909E8E84-426E-40DD-AFC4-6F175D3DCCD1}">
+              <a14:hiddenFill xmlns:a14="http://schemas.microsoft.com/office/drawing/2010/main">
+                <a:solidFill>
+                  <a:srgbClr val="FFFFFF"/>
+                </a:solidFill>
+              </a14:hiddenFill>
+            </a:ext>
+            <a:ext uri="{91240B29-F687-4F45-9708-019B960494DF}">
+              <a14:hiddenLine xmlns:a14="http://schemas.microsoft.com/office/drawing/2010/main" w="9525">
+                <a:solidFill>
+                  <a:srgbClr val="000000"/>
+                </a:solidFill>
+                <a:miter lim="800000"/>
+                <a:headEnd/>
+                <a:tailEnd/>
+              </a14:hiddenLine>
+            </a:ext>
+          </a:extLst>
+        </p:spPr>
+        <p:txBody>
+          <a:bodyPr wrap="square">
+            <a:spAutoFit/>
+          </a:bodyPr>
+          <a:lstStyle>
+            <a:lvl1pPr eaLnBrk="0" hangingPunct="0">
+              <a:defRPr>
+                <a:solidFill>
+                  <a:schemeClr val="tx1"/>
+                </a:solidFill>
+                <a:latin typeface="Arial" panose="020B0604020202020204" pitchFamily="34" charset="0"/>
+                <a:ea typeface="宋体" panose="02010600030101010101" pitchFamily="2" charset="-122"/>
+              </a:defRPr>
+            </a:lvl1pPr>
+            <a:lvl2pPr marL="742950" indent="-285750" eaLnBrk="0" hangingPunct="0">
+              <a:defRPr>
+                <a:solidFill>
+                  <a:schemeClr val="tx1"/>
+                </a:solidFill>
+                <a:latin typeface="Arial" panose="020B0604020202020204" pitchFamily="34" charset="0"/>
+                <a:ea typeface="宋体" panose="02010600030101010101" pitchFamily="2" charset="-122"/>
+              </a:defRPr>
+            </a:lvl2pPr>
+            <a:lvl3pPr marL="1143000" indent="-228600" eaLnBrk="0" hangingPunct="0">
+              <a:defRPr>
+                <a:solidFill>
+                  <a:schemeClr val="tx1"/>
+                </a:solidFill>
+                <a:latin typeface="Arial" panose="020B0604020202020204" pitchFamily="34" charset="0"/>
+                <a:ea typeface="宋体" panose="02010600030101010101" pitchFamily="2" charset="-122"/>
+              </a:defRPr>
+            </a:lvl3pPr>
+            <a:lvl4pPr marL="1600200" indent="-228600" eaLnBrk="0" hangingPunct="0">
+              <a:defRPr>
+                <a:solidFill>
+                  <a:schemeClr val="tx1"/>
+                </a:solidFill>
+                <a:latin typeface="Arial" panose="020B0604020202020204" pitchFamily="34" charset="0"/>
+                <a:ea typeface="宋体" panose="02010600030101010101" pitchFamily="2" charset="-122"/>
+              </a:defRPr>
+            </a:lvl4pPr>
+            <a:lvl5pPr marL="2057400" indent="-228600" eaLnBrk="0" hangingPunct="0">
+              <a:defRPr>
+                <a:solidFill>
+                  <a:schemeClr val="tx1"/>
+                </a:solidFill>
+                <a:latin typeface="Arial" panose="020B0604020202020204" pitchFamily="34" charset="0"/>
+                <a:ea typeface="宋体" panose="02010600030101010101" pitchFamily="2" charset="-122"/>
+              </a:defRPr>
+            </a:lvl5pPr>
+            <a:lvl6pPr marL="2514600" indent="-228600" eaLnBrk="0" fontAlgn="base" hangingPunct="0">
+              <a:spcBef>
+                <a:spcPct val="0"/>
+              </a:spcBef>
+              <a:spcAft>
+                <a:spcPct val="0"/>
+              </a:spcAft>
+              <a:defRPr>
+                <a:solidFill>
+                  <a:schemeClr val="tx1"/>
+                </a:solidFill>
+                <a:latin typeface="Arial" panose="020B0604020202020204" pitchFamily="34" charset="0"/>
+                <a:ea typeface="宋体" panose="02010600030101010101" pitchFamily="2" charset="-122"/>
+              </a:defRPr>
+            </a:lvl6pPr>
+            <a:lvl7pPr marL="2971800" indent="-228600" eaLnBrk="0" fontAlgn="base" hangingPunct="0">
+              <a:spcBef>
+                <a:spcPct val="0"/>
+              </a:spcBef>
+              <a:spcAft>
+                <a:spcPct val="0"/>
+              </a:spcAft>
+              <a:defRPr>
+                <a:solidFill>
+                  <a:schemeClr val="tx1"/>
+                </a:solidFill>
+                <a:latin typeface="Arial" panose="020B0604020202020204" pitchFamily="34" charset="0"/>
+                <a:ea typeface="宋体" panose="02010600030101010101" pitchFamily="2" charset="-122"/>
+              </a:defRPr>
+            </a:lvl7pPr>
+            <a:lvl8pPr marL="3429000" indent="-228600" eaLnBrk="0" fontAlgn="base" hangingPunct="0">
+              <a:spcBef>
+                <a:spcPct val="0"/>
+              </a:spcBef>
+              <a:spcAft>
+                <a:spcPct val="0"/>
+              </a:spcAft>
+              <a:defRPr>
+                <a:solidFill>
+                  <a:schemeClr val="tx1"/>
+                </a:solidFill>
+                <a:latin typeface="Arial" panose="020B0604020202020204" pitchFamily="34" charset="0"/>
+                <a:ea typeface="宋体" panose="02010600030101010101" pitchFamily="2" charset="-122"/>
+              </a:defRPr>
+            </a:lvl8pPr>
+            <a:lvl9pPr marL="3886200" indent="-228600" eaLnBrk="0" fontAlgn="base" hangingPunct="0">
+              <a:spcBef>
+                <a:spcPct val="0"/>
+              </a:spcBef>
+              <a:spcAft>
+                <a:spcPct val="0"/>
+              </a:spcAft>
+              <a:defRPr>
+                <a:solidFill>
+                  <a:schemeClr val="tx1"/>
+                </a:solidFill>
+                <a:latin typeface="Arial" panose="020B0604020202020204" pitchFamily="34" charset="0"/>
+                <a:ea typeface="宋体" panose="02010600030101010101" pitchFamily="2" charset="-122"/>
+              </a:defRPr>
+            </a:lvl9pPr>
+          </a:lstStyle>
+          <a:p>
+            <a:pPr eaLnBrk="1" hangingPunct="1"/>
+            <a:r>
+              <a:rPr lang="en-US" altLang="zh-CN" sz="4800" dirty="0">
+                <a:solidFill>
+                  <a:schemeClr val="bg1"/>
+                </a:solidFill>
+                <a:latin typeface="微软雅黑" panose="020B0503020204020204" pitchFamily="34" charset="-122"/>
+                <a:ea typeface="微软雅黑" panose="020B0503020204020204" pitchFamily="34" charset="-122"/>
+              </a:rPr>
+              <a:t>Python</a:t>
+            </a:r>
+            <a:r>
+              <a:rPr lang="zh-CN" altLang="en-US" sz="4800" dirty="0">
+                <a:solidFill>
+                  <a:schemeClr val="bg1"/>
+                </a:solidFill>
+                <a:latin typeface="微软雅黑" panose="020B0503020204020204" pitchFamily="34" charset="-122"/>
+                <a:ea typeface="微软雅黑" panose="020B0503020204020204" pitchFamily="34" charset="-122"/>
+              </a:rPr>
+              <a:t> </a:t>
+            </a:r>
+            <a:r>
+              <a:rPr lang="en-US" altLang="zh-CN" sz="4800" dirty="0">
+                <a:solidFill>
+                  <a:schemeClr val="bg1"/>
+                </a:solidFill>
+                <a:latin typeface="微软雅黑" panose="020B0503020204020204" pitchFamily="34" charset="-122"/>
+                <a:ea typeface="微软雅黑" panose="020B0503020204020204" pitchFamily="34" charset="-122"/>
+              </a:rPr>
+              <a:t>– </a:t>
+            </a:r>
+            <a:r>
+              <a:rPr lang="zh-CN" altLang="en-US" sz="4000" dirty="0">
+                <a:solidFill>
+                  <a:schemeClr val="bg1"/>
+                </a:solidFill>
+                <a:latin typeface="微软雅黑" panose="020B0503020204020204" pitchFamily="34" charset="-122"/>
+                <a:ea typeface="微软雅黑" panose="020B0503020204020204" pitchFamily="34" charset="-122"/>
+              </a:rPr>
+              <a:t>原生数据类型</a:t>
+            </a:r>
+            <a:endParaRPr lang="zh-CN" altLang="en-US" sz="4800" dirty="0">
+              <a:solidFill>
+                <a:schemeClr val="bg1"/>
+              </a:solidFill>
+              <a:latin typeface="微软雅黑" panose="020B0503020204020204" pitchFamily="34" charset="-122"/>
+              <a:ea typeface="微软雅黑" panose="020B0503020204020204" pitchFamily="34" charset="-122"/>
+            </a:endParaRPr>
+          </a:p>
+        </p:txBody>
+      </p:sp>
+      <p:sp>
+        <p:nvSpPr>
+          <p:cNvPr id="5" name="TextBox 4">
+            <a:extLst>
+              <a:ext uri="{FF2B5EF4-FFF2-40B4-BE49-F238E27FC236}">
+                <a16:creationId xmlns:a16="http://schemas.microsoft.com/office/drawing/2014/main" id="{E8A991AE-3688-4E36-95ED-0003B8B99099}"/>
+              </a:ext>
+            </a:extLst>
+          </p:cNvPr>
+          <p:cNvSpPr txBox="1"/>
+          <p:nvPr/>
+        </p:nvSpPr>
+        <p:spPr>
+          <a:xfrm>
+            <a:off x="179512" y="1196752"/>
+            <a:ext cx="8569325" cy="5601533"/>
+          </a:xfrm>
+          <a:prstGeom prst="rect">
+            <a:avLst/>
+          </a:prstGeom>
+          <a:noFill/>
+        </p:spPr>
+        <p:txBody>
+          <a:bodyPr>
+            <a:spAutoFit/>
+          </a:bodyPr>
+          <a:lstStyle/>
+          <a:p>
+            <a:pPr marL="571500" indent="-571500">
+              <a:spcBef>
+                <a:spcPts val="600"/>
+              </a:spcBef>
+              <a:buFont typeface="Arial" panose="020B0604020202020204" pitchFamily="34" charset="0"/>
+              <a:buChar char="•"/>
+              <a:defRPr/>
+            </a:pPr>
+            <a:r>
+              <a:rPr lang="en-US" altLang="zh-CN" sz="4000" dirty="0" err="1">
+                <a:solidFill>
+                  <a:srgbClr val="FFC000"/>
+                </a:solidFill>
+                <a:latin typeface="微软雅黑" pitchFamily="34" charset="-122"/>
+                <a:ea typeface="微软雅黑" pitchFamily="34" charset="-122"/>
+              </a:rPr>
+              <a:t>int</a:t>
+            </a:r>
+            <a:r>
+              <a:rPr lang="en-US" altLang="zh-CN" sz="4000" dirty="0">
+                <a:solidFill>
+                  <a:schemeClr val="bg1"/>
+                </a:solidFill>
+                <a:latin typeface="微软雅黑" pitchFamily="34" charset="-122"/>
+                <a:ea typeface="微软雅黑" pitchFamily="34" charset="-122"/>
+              </a:rPr>
+              <a:t>:</a:t>
+            </a:r>
+            <a:r>
+              <a:rPr lang="zh-CN" altLang="en-US" sz="4000" dirty="0">
+                <a:solidFill>
+                  <a:schemeClr val="bg1"/>
+                </a:solidFill>
+                <a:latin typeface="微软雅黑" pitchFamily="34" charset="-122"/>
+                <a:ea typeface="微软雅黑" pitchFamily="34" charset="-122"/>
+              </a:rPr>
+              <a:t> 原生</a:t>
+            </a:r>
+            <a:r>
+              <a:rPr lang="en-US" altLang="zh-CN" sz="4000" dirty="0">
+                <a:solidFill>
+                  <a:schemeClr val="bg1"/>
+                </a:solidFill>
+                <a:latin typeface="微软雅黑" pitchFamily="34" charset="-122"/>
+                <a:ea typeface="微软雅黑" pitchFamily="34" charset="-122"/>
+              </a:rPr>
+              <a:t>type 64bit, </a:t>
+            </a:r>
+            <a:r>
+              <a:rPr lang="zh-CN" altLang="en-US" sz="4000" dirty="0">
+                <a:solidFill>
+                  <a:schemeClr val="bg1"/>
+                </a:solidFill>
+                <a:latin typeface="微软雅黑" pitchFamily="34" charset="-122"/>
+                <a:ea typeface="微软雅黑" pitchFamily="34" charset="-122"/>
+              </a:rPr>
+              <a:t>超过之后自动转换成</a:t>
+            </a:r>
+            <a:r>
+              <a:rPr lang="en-US" altLang="zh-CN" sz="4000" dirty="0">
+                <a:solidFill>
+                  <a:srgbClr val="FFC000"/>
+                </a:solidFill>
+                <a:latin typeface="微软雅黑" pitchFamily="34" charset="-122"/>
+                <a:ea typeface="微软雅黑" pitchFamily="34" charset="-122"/>
+              </a:rPr>
+              <a:t>long</a:t>
+            </a:r>
+            <a:r>
+              <a:rPr lang="zh-CN" altLang="en-US" sz="4000" dirty="0">
+                <a:solidFill>
+                  <a:schemeClr val="bg1"/>
+                </a:solidFill>
+                <a:latin typeface="微软雅黑" pitchFamily="34" charset="-122"/>
+                <a:ea typeface="微软雅黑" pitchFamily="34" charset="-122"/>
+              </a:rPr>
+              <a:t>（无上限）</a:t>
+            </a:r>
+            <a:endParaRPr lang="en-US" altLang="zh-CN" sz="4000" dirty="0">
+              <a:solidFill>
+                <a:schemeClr val="bg1"/>
+              </a:solidFill>
+              <a:latin typeface="微软雅黑" pitchFamily="34" charset="-122"/>
+              <a:ea typeface="微软雅黑" pitchFamily="34" charset="-122"/>
+            </a:endParaRPr>
+          </a:p>
+          <a:p>
+            <a:pPr marL="571500" indent="-571500">
+              <a:lnSpc>
+                <a:spcPct val="150000"/>
+              </a:lnSpc>
+              <a:spcBef>
+                <a:spcPts val="600"/>
+              </a:spcBef>
+              <a:buFont typeface="Arial" panose="020B0604020202020204" pitchFamily="34" charset="0"/>
+              <a:buChar char="•"/>
+              <a:defRPr/>
+            </a:pPr>
+            <a:r>
+              <a:rPr lang="en-US" altLang="zh-CN" sz="4000" dirty="0">
+                <a:solidFill>
+                  <a:srgbClr val="FFC000"/>
+                </a:solidFill>
+                <a:latin typeface="微软雅黑" pitchFamily="34" charset="-122"/>
+                <a:ea typeface="微软雅黑" pitchFamily="34" charset="-122"/>
+              </a:rPr>
+              <a:t>float</a:t>
+            </a:r>
+            <a:r>
+              <a:rPr lang="en-US" altLang="zh-CN" sz="4000" dirty="0">
+                <a:solidFill>
+                  <a:schemeClr val="bg1"/>
+                </a:solidFill>
+                <a:latin typeface="微软雅黑" pitchFamily="34" charset="-122"/>
+                <a:ea typeface="微软雅黑" pitchFamily="34" charset="-122"/>
+              </a:rPr>
+              <a:t>: 64bit</a:t>
+            </a:r>
+            <a:r>
+              <a:rPr lang="zh-CN" altLang="en-US" sz="4000" dirty="0">
+                <a:solidFill>
+                  <a:schemeClr val="bg1"/>
+                </a:solidFill>
+                <a:latin typeface="微软雅黑" pitchFamily="34" charset="-122"/>
+                <a:ea typeface="微软雅黑" pitchFamily="34" charset="-122"/>
+              </a:rPr>
+              <a:t>浮点数</a:t>
+            </a:r>
+            <a:endParaRPr lang="en-US" altLang="zh-CN" sz="4000" dirty="0">
+              <a:solidFill>
+                <a:schemeClr val="bg1"/>
+              </a:solidFill>
+              <a:latin typeface="微软雅黑" pitchFamily="34" charset="-122"/>
+              <a:ea typeface="微软雅黑" pitchFamily="34" charset="-122"/>
+            </a:endParaRPr>
+          </a:p>
+          <a:p>
+            <a:pPr marL="571500" indent="-571500">
+              <a:lnSpc>
+                <a:spcPct val="150000"/>
+              </a:lnSpc>
+              <a:spcBef>
+                <a:spcPts val="600"/>
+              </a:spcBef>
+              <a:buFont typeface="Arial" panose="020B0604020202020204" pitchFamily="34" charset="0"/>
+              <a:buChar char="•"/>
+              <a:defRPr/>
+            </a:pPr>
+            <a:r>
+              <a:rPr lang="en-US" altLang="zh-CN" sz="4000" dirty="0">
+                <a:solidFill>
+                  <a:srgbClr val="FFC000"/>
+                </a:solidFill>
+                <a:latin typeface="微软雅黑" pitchFamily="34" charset="-122"/>
+                <a:ea typeface="微软雅黑" pitchFamily="34" charset="-122"/>
+              </a:rPr>
+              <a:t>string</a:t>
+            </a:r>
+            <a:r>
+              <a:rPr lang="en-US" altLang="zh-CN" sz="4000" dirty="0">
+                <a:solidFill>
+                  <a:schemeClr val="bg1"/>
+                </a:solidFill>
+                <a:latin typeface="微软雅黑" pitchFamily="34" charset="-122"/>
+                <a:ea typeface="微软雅黑" pitchFamily="34" charset="-122"/>
+              </a:rPr>
+              <a:t>: </a:t>
+            </a:r>
+            <a:r>
+              <a:rPr lang="zh-CN" altLang="en-US" sz="4000" dirty="0">
+                <a:solidFill>
+                  <a:schemeClr val="bg1"/>
+                </a:solidFill>
+                <a:latin typeface="微软雅黑" pitchFamily="34" charset="-122"/>
+                <a:ea typeface="微软雅黑" pitchFamily="34" charset="-122"/>
+              </a:rPr>
+              <a:t>用单引号或双引号包围</a:t>
+            </a:r>
+            <a:endParaRPr lang="en-US" altLang="zh-CN" sz="4000" dirty="0">
+              <a:solidFill>
+                <a:schemeClr val="bg1"/>
+              </a:solidFill>
+              <a:latin typeface="微软雅黑" pitchFamily="34" charset="-122"/>
+              <a:ea typeface="微软雅黑" pitchFamily="34" charset="-122"/>
+            </a:endParaRPr>
+          </a:p>
+          <a:p>
+            <a:pPr marL="571500" indent="-571500">
+              <a:lnSpc>
+                <a:spcPct val="150000"/>
+              </a:lnSpc>
+              <a:spcBef>
+                <a:spcPts val="600"/>
+              </a:spcBef>
+              <a:buFont typeface="Arial" panose="020B0604020202020204" pitchFamily="34" charset="0"/>
+              <a:buChar char="•"/>
+              <a:defRPr/>
+            </a:pPr>
+            <a:r>
+              <a:rPr lang="en-US" altLang="zh-CN" sz="4000" dirty="0">
+                <a:solidFill>
+                  <a:srgbClr val="FFC000"/>
+                </a:solidFill>
+                <a:latin typeface="微软雅黑" pitchFamily="34" charset="-122"/>
+                <a:ea typeface="微软雅黑" pitchFamily="34" charset="-122"/>
+              </a:rPr>
+              <a:t>bool</a:t>
+            </a:r>
+            <a:r>
+              <a:rPr lang="en-US" altLang="zh-CN" sz="4000" dirty="0">
+                <a:solidFill>
+                  <a:schemeClr val="bg1"/>
+                </a:solidFill>
+                <a:latin typeface="微软雅黑" pitchFamily="34" charset="-122"/>
+                <a:ea typeface="微软雅黑" pitchFamily="34" charset="-122"/>
+              </a:rPr>
+              <a:t>: True/False</a:t>
+            </a:r>
+          </a:p>
+          <a:p>
+            <a:pPr marL="571500" indent="-571500">
+              <a:lnSpc>
+                <a:spcPct val="150000"/>
+              </a:lnSpc>
+              <a:spcBef>
+                <a:spcPts val="600"/>
+              </a:spcBef>
+              <a:buFont typeface="Arial" panose="020B0604020202020204" pitchFamily="34" charset="0"/>
+              <a:buChar char="•"/>
+              <a:defRPr/>
+            </a:pPr>
+            <a:r>
+              <a:rPr lang="zh-CN" altLang="en-US" sz="4000" dirty="0">
+                <a:solidFill>
+                  <a:srgbClr val="FFC000"/>
+                </a:solidFill>
+                <a:latin typeface="微软雅黑" pitchFamily="34" charset="-122"/>
+                <a:ea typeface="微软雅黑" pitchFamily="34" charset="-122"/>
+              </a:rPr>
+              <a:t>空值</a:t>
+            </a:r>
+            <a:r>
+              <a:rPr lang="zh-CN" altLang="en-US" sz="4000" dirty="0">
+                <a:solidFill>
+                  <a:schemeClr val="bg1"/>
+                </a:solidFill>
+                <a:latin typeface="微软雅黑" pitchFamily="34" charset="-122"/>
+                <a:ea typeface="微软雅黑" pitchFamily="34" charset="-122"/>
+              </a:rPr>
+              <a:t>：</a:t>
+            </a:r>
+            <a:r>
+              <a:rPr lang="en-US" altLang="zh-CN" sz="4000" dirty="0">
+                <a:solidFill>
+                  <a:schemeClr val="bg1"/>
+                </a:solidFill>
+                <a:latin typeface="微软雅黑" pitchFamily="34" charset="-122"/>
+                <a:ea typeface="微软雅黑" pitchFamily="34" charset="-122"/>
+              </a:rPr>
+              <a:t>None</a:t>
+            </a:r>
+          </a:p>
+          <a:p>
+            <a:pPr>
+              <a:defRPr/>
+            </a:pPr>
+            <a:endParaRPr lang="en-US" dirty="0">
+              <a:solidFill>
+                <a:schemeClr val="bg1"/>
+              </a:solidFill>
+              <a:latin typeface="Arial" charset="0"/>
+            </a:endParaRPr>
+          </a:p>
+        </p:txBody>
+      </p:sp>
+    </p:spTree>
+    <p:extLst>
+      <p:ext uri="{BB962C8B-B14F-4D97-AF65-F5344CB8AC3E}">
+        <p14:creationId xmlns:p14="http://schemas.microsoft.com/office/powerpoint/2010/main" val="2840977258"/>
+      </p:ext>
+    </p:extLst>
+  </p:cSld>
+  <p:clrMapOvr>
+    <a:masterClrMapping/>
+  </p:clrMapOvr>
+</p:sld>
+</file>
+
+<file path=ppt/slides/slide21.xml><?xml version="1.0" encoding="utf-8"?>
+<p:sld xmlns:a="http://schemas.openxmlformats.org/drawingml/2006/main" xmlns:r="http://schemas.openxmlformats.org/officeDocument/2006/relationships" xmlns:p="http://schemas.openxmlformats.org/presentationml/2006/main">
+  <p:cSld>
+    <p:spTree>
+      <p:nvGrpSpPr>
+        <p:cNvPr id="1" name=""/>
+        <p:cNvGrpSpPr/>
+        <p:nvPr/>
+      </p:nvGrpSpPr>
+      <p:grpSpPr>
+        <a:xfrm>
+          <a:off x="0" y="0"/>
+          <a:ext cx="0" cy="0"/>
+          <a:chOff x="0" y="0"/>
+          <a:chExt cx="0" cy="0"/>
+        </a:xfrm>
+      </p:grpSpPr>
+      <p:sp>
+        <p:nvSpPr>
+          <p:cNvPr id="4098" name="TextBox 2">
+            <a:extLst>
+              <a:ext uri="{FF2B5EF4-FFF2-40B4-BE49-F238E27FC236}">
+                <a16:creationId xmlns:a16="http://schemas.microsoft.com/office/drawing/2014/main" id="{5552ED83-0001-4E47-A09B-F49C592A8E24}"/>
+              </a:ext>
+            </a:extLst>
+          </p:cNvPr>
+          <p:cNvSpPr txBox="1">
+            <a:spLocks noChangeArrowheads="1"/>
+          </p:cNvSpPr>
+          <p:nvPr/>
+        </p:nvSpPr>
+        <p:spPr bwMode="auto">
+          <a:xfrm>
+            <a:off x="179512" y="260648"/>
+            <a:ext cx="8496944" cy="830997"/>
+          </a:xfrm>
+          <a:prstGeom prst="rect">
+            <a:avLst/>
+          </a:prstGeom>
+          <a:noFill/>
+          <a:ln>
+            <a:noFill/>
+          </a:ln>
+          <a:extLst>
+            <a:ext uri="{909E8E84-426E-40DD-AFC4-6F175D3DCCD1}">
+              <a14:hiddenFill xmlns:a14="http://schemas.microsoft.com/office/drawing/2010/main">
+                <a:solidFill>
+                  <a:srgbClr val="FFFFFF"/>
+                </a:solidFill>
+              </a14:hiddenFill>
+            </a:ext>
+            <a:ext uri="{91240B29-F687-4F45-9708-019B960494DF}">
+              <a14:hiddenLine xmlns:a14="http://schemas.microsoft.com/office/drawing/2010/main" w="9525">
+                <a:solidFill>
+                  <a:srgbClr val="000000"/>
+                </a:solidFill>
+                <a:miter lim="800000"/>
+                <a:headEnd/>
+                <a:tailEnd/>
+              </a14:hiddenLine>
+            </a:ext>
+          </a:extLst>
+        </p:spPr>
+        <p:txBody>
+          <a:bodyPr wrap="square">
+            <a:spAutoFit/>
+          </a:bodyPr>
+          <a:lstStyle>
+            <a:lvl1pPr eaLnBrk="0" hangingPunct="0">
+              <a:defRPr>
+                <a:solidFill>
+                  <a:schemeClr val="tx1"/>
+                </a:solidFill>
+                <a:latin typeface="Arial" panose="020B0604020202020204" pitchFamily="34" charset="0"/>
+                <a:ea typeface="宋体" panose="02010600030101010101" pitchFamily="2" charset="-122"/>
+              </a:defRPr>
+            </a:lvl1pPr>
+            <a:lvl2pPr marL="742950" indent="-285750" eaLnBrk="0" hangingPunct="0">
+              <a:defRPr>
+                <a:solidFill>
+                  <a:schemeClr val="tx1"/>
+                </a:solidFill>
+                <a:latin typeface="Arial" panose="020B0604020202020204" pitchFamily="34" charset="0"/>
+                <a:ea typeface="宋体" panose="02010600030101010101" pitchFamily="2" charset="-122"/>
+              </a:defRPr>
+            </a:lvl2pPr>
+            <a:lvl3pPr marL="1143000" indent="-228600" eaLnBrk="0" hangingPunct="0">
+              <a:defRPr>
+                <a:solidFill>
+                  <a:schemeClr val="tx1"/>
+                </a:solidFill>
+                <a:latin typeface="Arial" panose="020B0604020202020204" pitchFamily="34" charset="0"/>
+                <a:ea typeface="宋体" panose="02010600030101010101" pitchFamily="2" charset="-122"/>
+              </a:defRPr>
+            </a:lvl3pPr>
+            <a:lvl4pPr marL="1600200" indent="-228600" eaLnBrk="0" hangingPunct="0">
+              <a:defRPr>
+                <a:solidFill>
+                  <a:schemeClr val="tx1"/>
+                </a:solidFill>
+                <a:latin typeface="Arial" panose="020B0604020202020204" pitchFamily="34" charset="0"/>
+                <a:ea typeface="宋体" panose="02010600030101010101" pitchFamily="2" charset="-122"/>
+              </a:defRPr>
+            </a:lvl4pPr>
+            <a:lvl5pPr marL="2057400" indent="-228600" eaLnBrk="0" hangingPunct="0">
+              <a:defRPr>
+                <a:solidFill>
+                  <a:schemeClr val="tx1"/>
+                </a:solidFill>
+                <a:latin typeface="Arial" panose="020B0604020202020204" pitchFamily="34" charset="0"/>
+                <a:ea typeface="宋体" panose="02010600030101010101" pitchFamily="2" charset="-122"/>
+              </a:defRPr>
+            </a:lvl5pPr>
+            <a:lvl6pPr marL="2514600" indent="-228600" eaLnBrk="0" fontAlgn="base" hangingPunct="0">
+              <a:spcBef>
+                <a:spcPct val="0"/>
+              </a:spcBef>
+              <a:spcAft>
+                <a:spcPct val="0"/>
+              </a:spcAft>
+              <a:defRPr>
+                <a:solidFill>
+                  <a:schemeClr val="tx1"/>
+                </a:solidFill>
+                <a:latin typeface="Arial" panose="020B0604020202020204" pitchFamily="34" charset="0"/>
+                <a:ea typeface="宋体" panose="02010600030101010101" pitchFamily="2" charset="-122"/>
+              </a:defRPr>
+            </a:lvl6pPr>
+            <a:lvl7pPr marL="2971800" indent="-228600" eaLnBrk="0" fontAlgn="base" hangingPunct="0">
+              <a:spcBef>
+                <a:spcPct val="0"/>
+              </a:spcBef>
+              <a:spcAft>
+                <a:spcPct val="0"/>
+              </a:spcAft>
+              <a:defRPr>
+                <a:solidFill>
+                  <a:schemeClr val="tx1"/>
+                </a:solidFill>
+                <a:latin typeface="Arial" panose="020B0604020202020204" pitchFamily="34" charset="0"/>
+                <a:ea typeface="宋体" panose="02010600030101010101" pitchFamily="2" charset="-122"/>
+              </a:defRPr>
+            </a:lvl7pPr>
+            <a:lvl8pPr marL="3429000" indent="-228600" eaLnBrk="0" fontAlgn="base" hangingPunct="0">
+              <a:spcBef>
+                <a:spcPct val="0"/>
+              </a:spcBef>
+              <a:spcAft>
+                <a:spcPct val="0"/>
+              </a:spcAft>
+              <a:defRPr>
+                <a:solidFill>
+                  <a:schemeClr val="tx1"/>
+                </a:solidFill>
+                <a:latin typeface="Arial" panose="020B0604020202020204" pitchFamily="34" charset="0"/>
+                <a:ea typeface="宋体" panose="02010600030101010101" pitchFamily="2" charset="-122"/>
+              </a:defRPr>
+            </a:lvl8pPr>
+            <a:lvl9pPr marL="3886200" indent="-228600" eaLnBrk="0" fontAlgn="base" hangingPunct="0">
+              <a:spcBef>
+                <a:spcPct val="0"/>
+              </a:spcBef>
+              <a:spcAft>
+                <a:spcPct val="0"/>
+              </a:spcAft>
+              <a:defRPr>
+                <a:solidFill>
+                  <a:schemeClr val="tx1"/>
+                </a:solidFill>
+                <a:latin typeface="Arial" panose="020B0604020202020204" pitchFamily="34" charset="0"/>
+                <a:ea typeface="宋体" panose="02010600030101010101" pitchFamily="2" charset="-122"/>
+              </a:defRPr>
+            </a:lvl9pPr>
+          </a:lstStyle>
+          <a:p>
+            <a:pPr eaLnBrk="1" hangingPunct="1"/>
+            <a:r>
+              <a:rPr lang="en-US" altLang="zh-CN" sz="4800" dirty="0">
+                <a:solidFill>
+                  <a:schemeClr val="bg1"/>
+                </a:solidFill>
+                <a:latin typeface="微软雅黑" panose="020B0503020204020204" pitchFamily="34" charset="-122"/>
+                <a:ea typeface="微软雅黑" panose="020B0503020204020204" pitchFamily="34" charset="-122"/>
+              </a:rPr>
+              <a:t>Python</a:t>
+            </a:r>
+            <a:r>
+              <a:rPr lang="zh-CN" altLang="en-US" sz="4800" dirty="0">
+                <a:solidFill>
+                  <a:schemeClr val="bg1"/>
+                </a:solidFill>
+                <a:latin typeface="微软雅黑" panose="020B0503020204020204" pitchFamily="34" charset="-122"/>
+                <a:ea typeface="微软雅黑" panose="020B0503020204020204" pitchFamily="34" charset="-122"/>
+              </a:rPr>
+              <a:t> </a:t>
+            </a:r>
+            <a:r>
+              <a:rPr lang="en-US" altLang="zh-CN" sz="4800" dirty="0">
+                <a:solidFill>
+                  <a:schemeClr val="bg1"/>
+                </a:solidFill>
+                <a:latin typeface="微软雅黑" panose="020B0503020204020204" pitchFamily="34" charset="-122"/>
+                <a:ea typeface="微软雅黑" panose="020B0503020204020204" pitchFamily="34" charset="-122"/>
+              </a:rPr>
+              <a:t>– </a:t>
+            </a:r>
+            <a:r>
+              <a:rPr lang="zh-CN" altLang="en-US" sz="4000" dirty="0">
+                <a:solidFill>
+                  <a:schemeClr val="bg1"/>
+                </a:solidFill>
+                <a:latin typeface="微软雅黑" panose="020B0503020204020204" pitchFamily="34" charset="-122"/>
+                <a:ea typeface="微软雅黑" panose="020B0503020204020204" pitchFamily="34" charset="-122"/>
+              </a:rPr>
+              <a:t>内置数据类型</a:t>
+            </a:r>
+            <a:endParaRPr lang="zh-CN" altLang="en-US" sz="4800" dirty="0">
+              <a:solidFill>
+                <a:schemeClr val="bg1"/>
+              </a:solidFill>
+              <a:latin typeface="微软雅黑" panose="020B0503020204020204" pitchFamily="34" charset="-122"/>
+              <a:ea typeface="微软雅黑" panose="020B0503020204020204" pitchFamily="34" charset="-122"/>
+            </a:endParaRPr>
+          </a:p>
+        </p:txBody>
+      </p:sp>
+      <p:sp>
+        <p:nvSpPr>
+          <p:cNvPr id="5" name="TextBox 4">
+            <a:extLst>
+              <a:ext uri="{FF2B5EF4-FFF2-40B4-BE49-F238E27FC236}">
+                <a16:creationId xmlns:a16="http://schemas.microsoft.com/office/drawing/2014/main" id="{E8A991AE-3688-4E36-95ED-0003B8B99099}"/>
+              </a:ext>
+            </a:extLst>
+          </p:cNvPr>
+          <p:cNvSpPr txBox="1"/>
+          <p:nvPr/>
+        </p:nvSpPr>
+        <p:spPr>
+          <a:xfrm>
+            <a:off x="179512" y="1196752"/>
+            <a:ext cx="8569325" cy="707886"/>
+          </a:xfrm>
+          <a:prstGeom prst="rect">
+            <a:avLst/>
+          </a:prstGeom>
+          <a:noFill/>
+        </p:spPr>
+        <p:txBody>
+          <a:bodyPr>
+            <a:spAutoFit/>
+          </a:bodyPr>
+          <a:lstStyle/>
+          <a:p>
+            <a:pPr marL="571500" indent="-571500">
+              <a:spcBef>
+                <a:spcPts val="600"/>
+              </a:spcBef>
+              <a:buFont typeface="Arial" panose="020B0604020202020204" pitchFamily="34" charset="0"/>
+              <a:buChar char="•"/>
+              <a:defRPr/>
+            </a:pPr>
+            <a:r>
+              <a:rPr lang="en-US" altLang="zh-CN" sz="4000" dirty="0">
+                <a:solidFill>
+                  <a:srgbClr val="FFC000"/>
+                </a:solidFill>
+                <a:latin typeface="微软雅黑" pitchFamily="34" charset="-122"/>
+                <a:ea typeface="微软雅黑" pitchFamily="34" charset="-122"/>
+              </a:rPr>
+              <a:t>list</a:t>
+            </a:r>
+            <a:r>
+              <a:rPr lang="en-US" altLang="zh-CN" sz="4000" dirty="0">
+                <a:solidFill>
+                  <a:schemeClr val="bg1"/>
+                </a:solidFill>
+                <a:latin typeface="微软雅黑" pitchFamily="34" charset="-122"/>
+                <a:ea typeface="微软雅黑" pitchFamily="34" charset="-122"/>
+              </a:rPr>
+              <a:t>: </a:t>
+            </a:r>
+            <a:r>
+              <a:rPr lang="zh-CN" altLang="en-US" sz="4000" dirty="0">
+                <a:solidFill>
+                  <a:schemeClr val="bg1"/>
+                </a:solidFill>
+                <a:latin typeface="微软雅黑" pitchFamily="34" charset="-122"/>
+                <a:ea typeface="微软雅黑" pitchFamily="34" charset="-122"/>
+              </a:rPr>
+              <a:t>等同于其它语言中的数组</a:t>
+            </a:r>
+            <a:endParaRPr lang="en-US" dirty="0">
+              <a:solidFill>
+                <a:schemeClr val="bg1"/>
+              </a:solidFill>
+              <a:latin typeface="Arial" charset="0"/>
+            </a:endParaRPr>
+          </a:p>
+        </p:txBody>
+      </p:sp>
+      <p:pic>
+        <p:nvPicPr>
+          <p:cNvPr id="3" name="Picture 2">
+            <a:extLst>
+              <a:ext uri="{FF2B5EF4-FFF2-40B4-BE49-F238E27FC236}">
+                <a16:creationId xmlns:a16="http://schemas.microsoft.com/office/drawing/2014/main" id="{E4A4C2A9-0712-43D0-9E5D-0313D0DD0C1B}"/>
+              </a:ext>
+            </a:extLst>
+          </p:cNvPr>
+          <p:cNvPicPr>
+            <a:picLocks noChangeAspect="1"/>
+          </p:cNvPicPr>
+          <p:nvPr/>
+        </p:nvPicPr>
+        <p:blipFill>
+          <a:blip r:embed="rId2"/>
+          <a:stretch>
+            <a:fillRect/>
+          </a:stretch>
+        </p:blipFill>
+        <p:spPr>
+          <a:xfrm>
+            <a:off x="755575" y="1904638"/>
+            <a:ext cx="7455095" cy="2028418"/>
+          </a:xfrm>
+          <a:prstGeom prst="rect">
+            <a:avLst/>
+          </a:prstGeom>
+        </p:spPr>
+      </p:pic>
+      <p:sp>
+        <p:nvSpPr>
+          <p:cNvPr id="6" name="TextBox 5">
+            <a:extLst>
+              <a:ext uri="{FF2B5EF4-FFF2-40B4-BE49-F238E27FC236}">
+                <a16:creationId xmlns:a16="http://schemas.microsoft.com/office/drawing/2014/main" id="{7C719624-08C8-409E-AD93-517EEA1C4534}"/>
+              </a:ext>
+            </a:extLst>
+          </p:cNvPr>
+          <p:cNvSpPr txBox="1"/>
+          <p:nvPr/>
+        </p:nvSpPr>
+        <p:spPr>
+          <a:xfrm>
+            <a:off x="198459" y="4077072"/>
+            <a:ext cx="8569325" cy="707886"/>
+          </a:xfrm>
+          <a:prstGeom prst="rect">
+            <a:avLst/>
+          </a:prstGeom>
+          <a:noFill/>
+        </p:spPr>
+        <p:txBody>
+          <a:bodyPr>
+            <a:spAutoFit/>
+          </a:bodyPr>
+          <a:lstStyle/>
+          <a:p>
+            <a:pPr marL="571500" indent="-571500">
+              <a:spcBef>
+                <a:spcPts val="600"/>
+              </a:spcBef>
+              <a:buFont typeface="Arial" panose="020B0604020202020204" pitchFamily="34" charset="0"/>
+              <a:buChar char="•"/>
+              <a:defRPr/>
+            </a:pPr>
+            <a:r>
+              <a:rPr lang="zh-CN" altLang="en-US" sz="4000" dirty="0">
+                <a:solidFill>
+                  <a:schemeClr val="bg1"/>
+                </a:solidFill>
+                <a:latin typeface="微软雅黑" pitchFamily="34" charset="-122"/>
+                <a:ea typeface="微软雅黑" pitchFamily="34" charset="-122"/>
+              </a:rPr>
+              <a:t>增删元素</a:t>
+            </a:r>
+            <a:endParaRPr lang="en-US" dirty="0">
+              <a:solidFill>
+                <a:schemeClr val="bg1"/>
+              </a:solidFill>
+              <a:latin typeface="Arial" charset="0"/>
+            </a:endParaRPr>
+          </a:p>
+        </p:txBody>
+      </p:sp>
+      <p:pic>
+        <p:nvPicPr>
+          <p:cNvPr id="4" name="Picture 3">
+            <a:extLst>
+              <a:ext uri="{FF2B5EF4-FFF2-40B4-BE49-F238E27FC236}">
+                <a16:creationId xmlns:a16="http://schemas.microsoft.com/office/drawing/2014/main" id="{DCE41AB8-146D-481C-B756-7C3EA5A2FE42}"/>
+              </a:ext>
+            </a:extLst>
+          </p:cNvPr>
+          <p:cNvPicPr>
+            <a:picLocks noChangeAspect="1"/>
+          </p:cNvPicPr>
+          <p:nvPr/>
+        </p:nvPicPr>
+        <p:blipFill>
+          <a:blip r:embed="rId3"/>
+          <a:stretch>
+            <a:fillRect/>
+          </a:stretch>
+        </p:blipFill>
+        <p:spPr>
+          <a:xfrm>
+            <a:off x="755575" y="4819246"/>
+            <a:ext cx="7455095" cy="1835350"/>
+          </a:xfrm>
+          <a:prstGeom prst="rect">
+            <a:avLst/>
+          </a:prstGeom>
+        </p:spPr>
+      </p:pic>
+    </p:spTree>
+    <p:extLst>
+      <p:ext uri="{BB962C8B-B14F-4D97-AF65-F5344CB8AC3E}">
+        <p14:creationId xmlns:p14="http://schemas.microsoft.com/office/powerpoint/2010/main" val="779061356"/>
+      </p:ext>
+    </p:extLst>
+  </p:cSld>
+  <p:clrMapOvr>
+    <a:masterClrMapping/>
+  </p:clrMapOvr>
+</p:sld>
+</file>
+
+<file path=ppt/slides/slide22.xml><?xml version="1.0" encoding="utf-8"?>
+<p:sld xmlns:a="http://schemas.openxmlformats.org/drawingml/2006/main" xmlns:r="http://schemas.openxmlformats.org/officeDocument/2006/relationships" xmlns:p="http://schemas.openxmlformats.org/presentationml/2006/main">
+  <p:cSld>
+    <p:spTree>
+      <p:nvGrpSpPr>
+        <p:cNvPr id="1" name=""/>
+        <p:cNvGrpSpPr/>
+        <p:nvPr/>
+      </p:nvGrpSpPr>
+      <p:grpSpPr>
+        <a:xfrm>
+          <a:off x="0" y="0"/>
+          <a:ext cx="0" cy="0"/>
+          <a:chOff x="0" y="0"/>
+          <a:chExt cx="0" cy="0"/>
+        </a:xfrm>
+      </p:grpSpPr>
+      <p:sp>
+        <p:nvSpPr>
+          <p:cNvPr id="4098" name="TextBox 2">
+            <a:extLst>
+              <a:ext uri="{FF2B5EF4-FFF2-40B4-BE49-F238E27FC236}">
+                <a16:creationId xmlns:a16="http://schemas.microsoft.com/office/drawing/2014/main" id="{5552ED83-0001-4E47-A09B-F49C592A8E24}"/>
+              </a:ext>
+            </a:extLst>
+          </p:cNvPr>
+          <p:cNvSpPr txBox="1">
+            <a:spLocks noChangeArrowheads="1"/>
+          </p:cNvSpPr>
+          <p:nvPr/>
+        </p:nvSpPr>
+        <p:spPr bwMode="auto">
+          <a:xfrm>
+            <a:off x="179512" y="260648"/>
+            <a:ext cx="8496944" cy="830997"/>
+          </a:xfrm>
+          <a:prstGeom prst="rect">
+            <a:avLst/>
+          </a:prstGeom>
+          <a:noFill/>
+          <a:ln>
+            <a:noFill/>
+          </a:ln>
+          <a:extLst>
+            <a:ext uri="{909E8E84-426E-40DD-AFC4-6F175D3DCCD1}">
+              <a14:hiddenFill xmlns:a14="http://schemas.microsoft.com/office/drawing/2010/main">
+                <a:solidFill>
+                  <a:srgbClr val="FFFFFF"/>
+                </a:solidFill>
+              </a14:hiddenFill>
+            </a:ext>
+            <a:ext uri="{91240B29-F687-4F45-9708-019B960494DF}">
+              <a14:hiddenLine xmlns:a14="http://schemas.microsoft.com/office/drawing/2010/main" w="9525">
+                <a:solidFill>
+                  <a:srgbClr val="000000"/>
+                </a:solidFill>
+                <a:miter lim="800000"/>
+                <a:headEnd/>
+                <a:tailEnd/>
+              </a14:hiddenLine>
+            </a:ext>
+          </a:extLst>
+        </p:spPr>
+        <p:txBody>
+          <a:bodyPr wrap="square">
+            <a:spAutoFit/>
+          </a:bodyPr>
+          <a:lstStyle>
+            <a:lvl1pPr eaLnBrk="0" hangingPunct="0">
+              <a:defRPr>
+                <a:solidFill>
+                  <a:schemeClr val="tx1"/>
+                </a:solidFill>
+                <a:latin typeface="Arial" panose="020B0604020202020204" pitchFamily="34" charset="0"/>
+                <a:ea typeface="宋体" panose="02010600030101010101" pitchFamily="2" charset="-122"/>
+              </a:defRPr>
+            </a:lvl1pPr>
+            <a:lvl2pPr marL="742950" indent="-285750" eaLnBrk="0" hangingPunct="0">
+              <a:defRPr>
+                <a:solidFill>
+                  <a:schemeClr val="tx1"/>
+                </a:solidFill>
+                <a:latin typeface="Arial" panose="020B0604020202020204" pitchFamily="34" charset="0"/>
+                <a:ea typeface="宋体" panose="02010600030101010101" pitchFamily="2" charset="-122"/>
+              </a:defRPr>
+            </a:lvl2pPr>
+            <a:lvl3pPr marL="1143000" indent="-228600" eaLnBrk="0" hangingPunct="0">
+              <a:defRPr>
+                <a:solidFill>
+                  <a:schemeClr val="tx1"/>
+                </a:solidFill>
+                <a:latin typeface="Arial" panose="020B0604020202020204" pitchFamily="34" charset="0"/>
+                <a:ea typeface="宋体" panose="02010600030101010101" pitchFamily="2" charset="-122"/>
+              </a:defRPr>
+            </a:lvl3pPr>
+            <a:lvl4pPr marL="1600200" indent="-228600" eaLnBrk="0" hangingPunct="0">
+              <a:defRPr>
+                <a:solidFill>
+                  <a:schemeClr val="tx1"/>
+                </a:solidFill>
+                <a:latin typeface="Arial" panose="020B0604020202020204" pitchFamily="34" charset="0"/>
+                <a:ea typeface="宋体" panose="02010600030101010101" pitchFamily="2" charset="-122"/>
+              </a:defRPr>
+            </a:lvl4pPr>
+            <a:lvl5pPr marL="2057400" indent="-228600" eaLnBrk="0" hangingPunct="0">
+              <a:defRPr>
+                <a:solidFill>
+                  <a:schemeClr val="tx1"/>
+                </a:solidFill>
+                <a:latin typeface="Arial" panose="020B0604020202020204" pitchFamily="34" charset="0"/>
+                <a:ea typeface="宋体" panose="02010600030101010101" pitchFamily="2" charset="-122"/>
+              </a:defRPr>
+            </a:lvl5pPr>
+            <a:lvl6pPr marL="2514600" indent="-228600" eaLnBrk="0" fontAlgn="base" hangingPunct="0">
+              <a:spcBef>
+                <a:spcPct val="0"/>
+              </a:spcBef>
+              <a:spcAft>
+                <a:spcPct val="0"/>
+              </a:spcAft>
+              <a:defRPr>
+                <a:solidFill>
+                  <a:schemeClr val="tx1"/>
+                </a:solidFill>
+                <a:latin typeface="Arial" panose="020B0604020202020204" pitchFamily="34" charset="0"/>
+                <a:ea typeface="宋体" panose="02010600030101010101" pitchFamily="2" charset="-122"/>
+              </a:defRPr>
+            </a:lvl6pPr>
+            <a:lvl7pPr marL="2971800" indent="-228600" eaLnBrk="0" fontAlgn="base" hangingPunct="0">
+              <a:spcBef>
+                <a:spcPct val="0"/>
+              </a:spcBef>
+              <a:spcAft>
+                <a:spcPct val="0"/>
+              </a:spcAft>
+              <a:defRPr>
+                <a:solidFill>
+                  <a:schemeClr val="tx1"/>
+                </a:solidFill>
+                <a:latin typeface="Arial" panose="020B0604020202020204" pitchFamily="34" charset="0"/>
+                <a:ea typeface="宋体" panose="02010600030101010101" pitchFamily="2" charset="-122"/>
+              </a:defRPr>
+            </a:lvl7pPr>
+            <a:lvl8pPr marL="3429000" indent="-228600" eaLnBrk="0" fontAlgn="base" hangingPunct="0">
+              <a:spcBef>
+                <a:spcPct val="0"/>
+              </a:spcBef>
+              <a:spcAft>
+                <a:spcPct val="0"/>
+              </a:spcAft>
+              <a:defRPr>
+                <a:solidFill>
+                  <a:schemeClr val="tx1"/>
+                </a:solidFill>
+                <a:latin typeface="Arial" panose="020B0604020202020204" pitchFamily="34" charset="0"/>
+                <a:ea typeface="宋体" panose="02010600030101010101" pitchFamily="2" charset="-122"/>
+              </a:defRPr>
+            </a:lvl8pPr>
+            <a:lvl9pPr marL="3886200" indent="-228600" eaLnBrk="0" fontAlgn="base" hangingPunct="0">
+              <a:spcBef>
+                <a:spcPct val="0"/>
+              </a:spcBef>
+              <a:spcAft>
+                <a:spcPct val="0"/>
+              </a:spcAft>
+              <a:defRPr>
+                <a:solidFill>
+                  <a:schemeClr val="tx1"/>
+                </a:solidFill>
+                <a:latin typeface="Arial" panose="020B0604020202020204" pitchFamily="34" charset="0"/>
+                <a:ea typeface="宋体" panose="02010600030101010101" pitchFamily="2" charset="-122"/>
+              </a:defRPr>
+            </a:lvl9pPr>
+          </a:lstStyle>
+          <a:p>
+            <a:pPr eaLnBrk="1" hangingPunct="1"/>
+            <a:r>
+              <a:rPr lang="en-US" altLang="zh-CN" sz="4800" dirty="0">
+                <a:solidFill>
+                  <a:schemeClr val="bg1"/>
+                </a:solidFill>
+                <a:latin typeface="微软雅黑" panose="020B0503020204020204" pitchFamily="34" charset="-122"/>
+                <a:ea typeface="微软雅黑" panose="020B0503020204020204" pitchFamily="34" charset="-122"/>
+              </a:rPr>
+              <a:t>Python</a:t>
+            </a:r>
+            <a:r>
+              <a:rPr lang="zh-CN" altLang="en-US" sz="4800" dirty="0">
+                <a:solidFill>
+                  <a:schemeClr val="bg1"/>
+                </a:solidFill>
+                <a:latin typeface="微软雅黑" panose="020B0503020204020204" pitchFamily="34" charset="-122"/>
+                <a:ea typeface="微软雅黑" panose="020B0503020204020204" pitchFamily="34" charset="-122"/>
+              </a:rPr>
+              <a:t> </a:t>
+            </a:r>
+            <a:r>
+              <a:rPr lang="en-US" altLang="zh-CN" sz="4800" dirty="0">
+                <a:solidFill>
+                  <a:schemeClr val="bg1"/>
+                </a:solidFill>
+                <a:latin typeface="微软雅黑" panose="020B0503020204020204" pitchFamily="34" charset="-122"/>
+                <a:ea typeface="微软雅黑" panose="020B0503020204020204" pitchFamily="34" charset="-122"/>
+              </a:rPr>
+              <a:t>– </a:t>
+            </a:r>
+            <a:r>
+              <a:rPr lang="zh-CN" altLang="en-US" sz="4000" dirty="0">
+                <a:solidFill>
+                  <a:schemeClr val="bg1"/>
+                </a:solidFill>
+                <a:latin typeface="微软雅黑" panose="020B0503020204020204" pitchFamily="34" charset="-122"/>
+                <a:ea typeface="微软雅黑" panose="020B0503020204020204" pitchFamily="34" charset="-122"/>
+              </a:rPr>
+              <a:t>内置数据类型</a:t>
+            </a:r>
+            <a:endParaRPr lang="zh-CN" altLang="en-US" sz="4800" dirty="0">
+              <a:solidFill>
+                <a:schemeClr val="bg1"/>
+              </a:solidFill>
+              <a:latin typeface="微软雅黑" panose="020B0503020204020204" pitchFamily="34" charset="-122"/>
+              <a:ea typeface="微软雅黑" panose="020B0503020204020204" pitchFamily="34" charset="-122"/>
+            </a:endParaRPr>
+          </a:p>
+        </p:txBody>
+      </p:sp>
+      <p:sp>
+        <p:nvSpPr>
+          <p:cNvPr id="5" name="TextBox 4">
+            <a:extLst>
+              <a:ext uri="{FF2B5EF4-FFF2-40B4-BE49-F238E27FC236}">
+                <a16:creationId xmlns:a16="http://schemas.microsoft.com/office/drawing/2014/main" id="{E8A991AE-3688-4E36-95ED-0003B8B99099}"/>
+              </a:ext>
+            </a:extLst>
+          </p:cNvPr>
+          <p:cNvSpPr txBox="1"/>
+          <p:nvPr/>
+        </p:nvSpPr>
+        <p:spPr>
+          <a:xfrm>
+            <a:off x="179512" y="1196752"/>
+            <a:ext cx="8569325" cy="707886"/>
+          </a:xfrm>
+          <a:prstGeom prst="rect">
+            <a:avLst/>
+          </a:prstGeom>
+          <a:noFill/>
+        </p:spPr>
+        <p:txBody>
+          <a:bodyPr>
+            <a:spAutoFit/>
+          </a:bodyPr>
+          <a:lstStyle/>
+          <a:p>
+            <a:pPr marL="571500" indent="-571500">
+              <a:spcBef>
+                <a:spcPts val="600"/>
+              </a:spcBef>
+              <a:buFont typeface="Arial" panose="020B0604020202020204" pitchFamily="34" charset="0"/>
+              <a:buChar char="•"/>
+              <a:defRPr/>
+            </a:pPr>
+            <a:r>
+              <a:rPr lang="en-US" altLang="zh-CN" sz="4000" dirty="0">
+                <a:solidFill>
+                  <a:srgbClr val="FFC000"/>
+                </a:solidFill>
+                <a:latin typeface="微软雅黑" pitchFamily="34" charset="-122"/>
+                <a:ea typeface="微软雅黑" pitchFamily="34" charset="-122"/>
+              </a:rPr>
+              <a:t>tuple</a:t>
+            </a:r>
+            <a:r>
+              <a:rPr lang="en-US" altLang="zh-CN" sz="4000" dirty="0">
+                <a:solidFill>
+                  <a:schemeClr val="bg1"/>
+                </a:solidFill>
+                <a:latin typeface="微软雅黑" pitchFamily="34" charset="-122"/>
+                <a:ea typeface="微软雅黑" pitchFamily="34" charset="-122"/>
+              </a:rPr>
+              <a:t>: </a:t>
+            </a:r>
+            <a:r>
+              <a:rPr lang="zh-CN" altLang="en-US" sz="4000" dirty="0">
+                <a:solidFill>
+                  <a:schemeClr val="bg1"/>
+                </a:solidFill>
+                <a:latin typeface="微软雅黑" pitchFamily="34" charset="-122"/>
+                <a:ea typeface="微软雅黑" pitchFamily="34" charset="-122"/>
+              </a:rPr>
+              <a:t>不可变数组</a:t>
+            </a:r>
+            <a:endParaRPr lang="en-US" dirty="0">
+              <a:solidFill>
+                <a:schemeClr val="bg1"/>
+              </a:solidFill>
+              <a:latin typeface="Arial" charset="0"/>
+            </a:endParaRPr>
+          </a:p>
+        </p:txBody>
+      </p:sp>
+      <p:sp>
+        <p:nvSpPr>
+          <p:cNvPr id="6" name="TextBox 5">
+            <a:extLst>
+              <a:ext uri="{FF2B5EF4-FFF2-40B4-BE49-F238E27FC236}">
+                <a16:creationId xmlns:a16="http://schemas.microsoft.com/office/drawing/2014/main" id="{7C719624-08C8-409E-AD93-517EEA1C4534}"/>
+              </a:ext>
+            </a:extLst>
+          </p:cNvPr>
+          <p:cNvSpPr txBox="1"/>
+          <p:nvPr/>
+        </p:nvSpPr>
+        <p:spPr>
+          <a:xfrm>
+            <a:off x="179512" y="3728764"/>
+            <a:ext cx="8569325" cy="707886"/>
+          </a:xfrm>
+          <a:prstGeom prst="rect">
+            <a:avLst/>
+          </a:prstGeom>
+          <a:noFill/>
+        </p:spPr>
+        <p:txBody>
+          <a:bodyPr>
+            <a:spAutoFit/>
+          </a:bodyPr>
+          <a:lstStyle/>
+          <a:p>
+            <a:pPr marL="571500" indent="-571500">
+              <a:spcBef>
+                <a:spcPts val="600"/>
+              </a:spcBef>
+              <a:buFont typeface="Arial" panose="020B0604020202020204" pitchFamily="34" charset="0"/>
+              <a:buChar char="•"/>
+              <a:defRPr/>
+            </a:pPr>
+            <a:r>
+              <a:rPr lang="zh-CN" altLang="en-US" sz="4000" dirty="0">
+                <a:solidFill>
+                  <a:schemeClr val="bg1"/>
+                </a:solidFill>
+                <a:latin typeface="微软雅黑" pitchFamily="34" charset="-122"/>
+                <a:ea typeface="微软雅黑" pitchFamily="34" charset="-122"/>
+              </a:rPr>
+              <a:t>如果</a:t>
+            </a:r>
+            <a:r>
+              <a:rPr lang="en-US" altLang="zh-CN" sz="4000" dirty="0">
+                <a:solidFill>
+                  <a:schemeClr val="bg1"/>
+                </a:solidFill>
+                <a:latin typeface="微软雅黑" pitchFamily="34" charset="-122"/>
+                <a:ea typeface="微软雅黑" pitchFamily="34" charset="-122"/>
+              </a:rPr>
+              <a:t>tuple</a:t>
+            </a:r>
+            <a:r>
+              <a:rPr lang="zh-CN" altLang="en-US" sz="4000" dirty="0">
+                <a:solidFill>
+                  <a:schemeClr val="bg1"/>
+                </a:solidFill>
+                <a:latin typeface="微软雅黑" pitchFamily="34" charset="-122"/>
+                <a:ea typeface="微软雅黑" pitchFamily="34" charset="-122"/>
+              </a:rPr>
+              <a:t>只有一个元素</a:t>
+            </a:r>
+            <a:endParaRPr lang="en-US" dirty="0">
+              <a:solidFill>
+                <a:schemeClr val="bg1"/>
+              </a:solidFill>
+              <a:latin typeface="Arial" charset="0"/>
+            </a:endParaRPr>
+          </a:p>
+        </p:txBody>
+      </p:sp>
+      <p:pic>
+        <p:nvPicPr>
+          <p:cNvPr id="2" name="Picture 1">
+            <a:extLst>
+              <a:ext uri="{FF2B5EF4-FFF2-40B4-BE49-F238E27FC236}">
+                <a16:creationId xmlns:a16="http://schemas.microsoft.com/office/drawing/2014/main" id="{DE20F7C3-DD3E-4755-912C-F49FBAE70984}"/>
+              </a:ext>
+            </a:extLst>
+          </p:cNvPr>
+          <p:cNvPicPr>
+            <a:picLocks noChangeAspect="1"/>
+          </p:cNvPicPr>
+          <p:nvPr/>
+        </p:nvPicPr>
+        <p:blipFill>
+          <a:blip r:embed="rId2"/>
+          <a:stretch>
+            <a:fillRect/>
+          </a:stretch>
+        </p:blipFill>
+        <p:spPr>
+          <a:xfrm>
+            <a:off x="475278" y="1923696"/>
+            <a:ext cx="8256399" cy="1677537"/>
+          </a:xfrm>
+          <a:prstGeom prst="rect">
+            <a:avLst/>
+          </a:prstGeom>
+        </p:spPr>
+      </p:pic>
+      <p:pic>
+        <p:nvPicPr>
+          <p:cNvPr id="7" name="Picture 6">
+            <a:extLst>
+              <a:ext uri="{FF2B5EF4-FFF2-40B4-BE49-F238E27FC236}">
+                <a16:creationId xmlns:a16="http://schemas.microsoft.com/office/drawing/2014/main" id="{D40E1C39-B92D-4AB1-AA82-68BFC2826600}"/>
+              </a:ext>
+            </a:extLst>
+          </p:cNvPr>
+          <p:cNvPicPr>
+            <a:picLocks noChangeAspect="1"/>
+          </p:cNvPicPr>
+          <p:nvPr/>
+        </p:nvPicPr>
+        <p:blipFill>
+          <a:blip r:embed="rId3"/>
+          <a:stretch>
+            <a:fillRect/>
+          </a:stretch>
+        </p:blipFill>
+        <p:spPr>
+          <a:xfrm>
+            <a:off x="2314471" y="4426338"/>
+            <a:ext cx="4227026" cy="2148447"/>
+          </a:xfrm>
+          <a:prstGeom prst="rect">
+            <a:avLst/>
+          </a:prstGeom>
+        </p:spPr>
+      </p:pic>
+    </p:spTree>
+    <p:extLst>
+      <p:ext uri="{BB962C8B-B14F-4D97-AF65-F5344CB8AC3E}">
+        <p14:creationId xmlns:p14="http://schemas.microsoft.com/office/powerpoint/2010/main" val="830791142"/>
+      </p:ext>
+    </p:extLst>
+  </p:cSld>
+  <p:clrMapOvr>
+    <a:masterClrMapping/>
+  </p:clrMapOvr>
+</p:sld>
+</file>
+
+<file path=ppt/slides/slide23.xml><?xml version="1.0" encoding="utf-8"?>
+<p:sld xmlns:a="http://schemas.openxmlformats.org/drawingml/2006/main" xmlns:r="http://schemas.openxmlformats.org/officeDocument/2006/relationships" xmlns:p="http://schemas.openxmlformats.org/presentationml/2006/main">
+  <p:cSld>
+    <p:spTree>
+      <p:nvGrpSpPr>
+        <p:cNvPr id="1" name=""/>
+        <p:cNvGrpSpPr/>
+        <p:nvPr/>
+      </p:nvGrpSpPr>
+      <p:grpSpPr>
+        <a:xfrm>
+          <a:off x="0" y="0"/>
+          <a:ext cx="0" cy="0"/>
+          <a:chOff x="0" y="0"/>
+          <a:chExt cx="0" cy="0"/>
+        </a:xfrm>
+      </p:grpSpPr>
+      <p:sp>
+        <p:nvSpPr>
+          <p:cNvPr id="4098" name="TextBox 2">
+            <a:extLst>
+              <a:ext uri="{FF2B5EF4-FFF2-40B4-BE49-F238E27FC236}">
+                <a16:creationId xmlns:a16="http://schemas.microsoft.com/office/drawing/2014/main" id="{5552ED83-0001-4E47-A09B-F49C592A8E24}"/>
+              </a:ext>
+            </a:extLst>
+          </p:cNvPr>
+          <p:cNvSpPr txBox="1">
+            <a:spLocks noChangeArrowheads="1"/>
+          </p:cNvSpPr>
+          <p:nvPr/>
+        </p:nvSpPr>
+        <p:spPr bwMode="auto">
+          <a:xfrm>
+            <a:off x="179512" y="260648"/>
+            <a:ext cx="8496944" cy="830997"/>
+          </a:xfrm>
+          <a:prstGeom prst="rect">
+            <a:avLst/>
+          </a:prstGeom>
+          <a:noFill/>
+          <a:ln>
+            <a:noFill/>
+          </a:ln>
+          <a:extLst>
+            <a:ext uri="{909E8E84-426E-40DD-AFC4-6F175D3DCCD1}">
+              <a14:hiddenFill xmlns:a14="http://schemas.microsoft.com/office/drawing/2010/main">
+                <a:solidFill>
+                  <a:srgbClr val="FFFFFF"/>
+                </a:solidFill>
+              </a14:hiddenFill>
+            </a:ext>
+            <a:ext uri="{91240B29-F687-4F45-9708-019B960494DF}">
+              <a14:hiddenLine xmlns:a14="http://schemas.microsoft.com/office/drawing/2010/main" w="9525">
+                <a:solidFill>
+                  <a:srgbClr val="000000"/>
+                </a:solidFill>
+                <a:miter lim="800000"/>
+                <a:headEnd/>
+                <a:tailEnd/>
+              </a14:hiddenLine>
+            </a:ext>
+          </a:extLst>
+        </p:spPr>
+        <p:txBody>
+          <a:bodyPr wrap="square">
+            <a:spAutoFit/>
+          </a:bodyPr>
+          <a:lstStyle>
+            <a:lvl1pPr eaLnBrk="0" hangingPunct="0">
+              <a:defRPr>
+                <a:solidFill>
+                  <a:schemeClr val="tx1"/>
+                </a:solidFill>
+                <a:latin typeface="Arial" panose="020B0604020202020204" pitchFamily="34" charset="0"/>
+                <a:ea typeface="宋体" panose="02010600030101010101" pitchFamily="2" charset="-122"/>
+              </a:defRPr>
+            </a:lvl1pPr>
+            <a:lvl2pPr marL="742950" indent="-285750" eaLnBrk="0" hangingPunct="0">
+              <a:defRPr>
+                <a:solidFill>
+                  <a:schemeClr val="tx1"/>
+                </a:solidFill>
+                <a:latin typeface="Arial" panose="020B0604020202020204" pitchFamily="34" charset="0"/>
+                <a:ea typeface="宋体" panose="02010600030101010101" pitchFamily="2" charset="-122"/>
+              </a:defRPr>
+            </a:lvl2pPr>
+            <a:lvl3pPr marL="1143000" indent="-228600" eaLnBrk="0" hangingPunct="0">
+              <a:defRPr>
+                <a:solidFill>
+                  <a:schemeClr val="tx1"/>
+                </a:solidFill>
+                <a:latin typeface="Arial" panose="020B0604020202020204" pitchFamily="34" charset="0"/>
+                <a:ea typeface="宋体" panose="02010600030101010101" pitchFamily="2" charset="-122"/>
+              </a:defRPr>
+            </a:lvl3pPr>
+            <a:lvl4pPr marL="1600200" indent="-228600" eaLnBrk="0" hangingPunct="0">
+              <a:defRPr>
+                <a:solidFill>
+                  <a:schemeClr val="tx1"/>
+                </a:solidFill>
+                <a:latin typeface="Arial" panose="020B0604020202020204" pitchFamily="34" charset="0"/>
+                <a:ea typeface="宋体" panose="02010600030101010101" pitchFamily="2" charset="-122"/>
+              </a:defRPr>
+            </a:lvl4pPr>
+            <a:lvl5pPr marL="2057400" indent="-228600" eaLnBrk="0" hangingPunct="0">
+              <a:defRPr>
+                <a:solidFill>
+                  <a:schemeClr val="tx1"/>
+                </a:solidFill>
+                <a:latin typeface="Arial" panose="020B0604020202020204" pitchFamily="34" charset="0"/>
+                <a:ea typeface="宋体" panose="02010600030101010101" pitchFamily="2" charset="-122"/>
+              </a:defRPr>
+            </a:lvl5pPr>
+            <a:lvl6pPr marL="2514600" indent="-228600" eaLnBrk="0" fontAlgn="base" hangingPunct="0">
+              <a:spcBef>
+                <a:spcPct val="0"/>
+              </a:spcBef>
+              <a:spcAft>
+                <a:spcPct val="0"/>
+              </a:spcAft>
+              <a:defRPr>
+                <a:solidFill>
+                  <a:schemeClr val="tx1"/>
+                </a:solidFill>
+                <a:latin typeface="Arial" panose="020B0604020202020204" pitchFamily="34" charset="0"/>
+                <a:ea typeface="宋体" panose="02010600030101010101" pitchFamily="2" charset="-122"/>
+              </a:defRPr>
+            </a:lvl6pPr>
+            <a:lvl7pPr marL="2971800" indent="-228600" eaLnBrk="0" fontAlgn="base" hangingPunct="0">
+              <a:spcBef>
+                <a:spcPct val="0"/>
+              </a:spcBef>
+              <a:spcAft>
+                <a:spcPct val="0"/>
+              </a:spcAft>
+              <a:defRPr>
+                <a:solidFill>
+                  <a:schemeClr val="tx1"/>
+                </a:solidFill>
+                <a:latin typeface="Arial" panose="020B0604020202020204" pitchFamily="34" charset="0"/>
+                <a:ea typeface="宋体" panose="02010600030101010101" pitchFamily="2" charset="-122"/>
+              </a:defRPr>
+            </a:lvl7pPr>
+            <a:lvl8pPr marL="3429000" indent="-228600" eaLnBrk="0" fontAlgn="base" hangingPunct="0">
+              <a:spcBef>
+                <a:spcPct val="0"/>
+              </a:spcBef>
+              <a:spcAft>
+                <a:spcPct val="0"/>
+              </a:spcAft>
+              <a:defRPr>
+                <a:solidFill>
+                  <a:schemeClr val="tx1"/>
+                </a:solidFill>
+                <a:latin typeface="Arial" panose="020B0604020202020204" pitchFamily="34" charset="0"/>
+                <a:ea typeface="宋体" panose="02010600030101010101" pitchFamily="2" charset="-122"/>
+              </a:defRPr>
+            </a:lvl8pPr>
+            <a:lvl9pPr marL="3886200" indent="-228600" eaLnBrk="0" fontAlgn="base" hangingPunct="0">
+              <a:spcBef>
+                <a:spcPct val="0"/>
+              </a:spcBef>
+              <a:spcAft>
+                <a:spcPct val="0"/>
+              </a:spcAft>
+              <a:defRPr>
+                <a:solidFill>
+                  <a:schemeClr val="tx1"/>
+                </a:solidFill>
+                <a:latin typeface="Arial" panose="020B0604020202020204" pitchFamily="34" charset="0"/>
+                <a:ea typeface="宋体" panose="02010600030101010101" pitchFamily="2" charset="-122"/>
+              </a:defRPr>
+            </a:lvl9pPr>
+          </a:lstStyle>
+          <a:p>
+            <a:pPr eaLnBrk="1" hangingPunct="1"/>
+            <a:r>
+              <a:rPr lang="en-US" altLang="zh-CN" sz="4800" dirty="0">
+                <a:solidFill>
+                  <a:schemeClr val="bg1"/>
+                </a:solidFill>
+                <a:latin typeface="微软雅黑" panose="020B0503020204020204" pitchFamily="34" charset="-122"/>
+                <a:ea typeface="微软雅黑" panose="020B0503020204020204" pitchFamily="34" charset="-122"/>
+              </a:rPr>
+              <a:t>Python</a:t>
+            </a:r>
+            <a:r>
+              <a:rPr lang="zh-CN" altLang="en-US" sz="4800" dirty="0">
+                <a:solidFill>
+                  <a:schemeClr val="bg1"/>
+                </a:solidFill>
+                <a:latin typeface="微软雅黑" panose="020B0503020204020204" pitchFamily="34" charset="-122"/>
+                <a:ea typeface="微软雅黑" panose="020B0503020204020204" pitchFamily="34" charset="-122"/>
+              </a:rPr>
+              <a:t> </a:t>
+            </a:r>
+            <a:r>
+              <a:rPr lang="en-US" altLang="zh-CN" sz="4800" dirty="0">
+                <a:solidFill>
+                  <a:schemeClr val="bg1"/>
+                </a:solidFill>
+                <a:latin typeface="微软雅黑" panose="020B0503020204020204" pitchFamily="34" charset="-122"/>
+                <a:ea typeface="微软雅黑" panose="020B0503020204020204" pitchFamily="34" charset="-122"/>
+              </a:rPr>
+              <a:t>– </a:t>
+            </a:r>
+            <a:r>
+              <a:rPr lang="zh-CN" altLang="en-US" sz="4000" dirty="0">
+                <a:solidFill>
+                  <a:schemeClr val="bg1"/>
+                </a:solidFill>
+                <a:latin typeface="微软雅黑" panose="020B0503020204020204" pitchFamily="34" charset="-122"/>
+                <a:ea typeface="微软雅黑" panose="020B0503020204020204" pitchFamily="34" charset="-122"/>
+              </a:rPr>
+              <a:t>内置数据类型</a:t>
+            </a:r>
+            <a:endParaRPr lang="zh-CN" altLang="en-US" sz="4800" dirty="0">
+              <a:solidFill>
+                <a:schemeClr val="bg1"/>
+              </a:solidFill>
+              <a:latin typeface="微软雅黑" panose="020B0503020204020204" pitchFamily="34" charset="-122"/>
+              <a:ea typeface="微软雅黑" panose="020B0503020204020204" pitchFamily="34" charset="-122"/>
+            </a:endParaRPr>
+          </a:p>
+        </p:txBody>
+      </p:sp>
+      <p:sp>
+        <p:nvSpPr>
+          <p:cNvPr id="5" name="TextBox 4">
+            <a:extLst>
+              <a:ext uri="{FF2B5EF4-FFF2-40B4-BE49-F238E27FC236}">
+                <a16:creationId xmlns:a16="http://schemas.microsoft.com/office/drawing/2014/main" id="{E8A991AE-3688-4E36-95ED-0003B8B99099}"/>
+              </a:ext>
+            </a:extLst>
+          </p:cNvPr>
+          <p:cNvSpPr txBox="1"/>
+          <p:nvPr/>
+        </p:nvSpPr>
+        <p:spPr>
+          <a:xfrm>
+            <a:off x="179512" y="1196752"/>
+            <a:ext cx="8569325" cy="707886"/>
+          </a:xfrm>
+          <a:prstGeom prst="rect">
+            <a:avLst/>
+          </a:prstGeom>
+          <a:noFill/>
+        </p:spPr>
+        <p:txBody>
+          <a:bodyPr>
+            <a:spAutoFit/>
+          </a:bodyPr>
+          <a:lstStyle/>
+          <a:p>
+            <a:pPr marL="571500" indent="-571500">
+              <a:spcBef>
+                <a:spcPts val="600"/>
+              </a:spcBef>
+              <a:buFont typeface="Arial" panose="020B0604020202020204" pitchFamily="34" charset="0"/>
+              <a:buChar char="•"/>
+              <a:defRPr/>
+            </a:pPr>
+            <a:r>
+              <a:rPr lang="en-US" altLang="zh-CN" sz="4000" dirty="0">
+                <a:solidFill>
+                  <a:srgbClr val="FFC000"/>
+                </a:solidFill>
+                <a:latin typeface="微软雅黑" pitchFamily="34" charset="-122"/>
+                <a:ea typeface="微软雅黑" pitchFamily="34" charset="-122"/>
+              </a:rPr>
+              <a:t>set</a:t>
+            </a:r>
+            <a:r>
+              <a:rPr lang="en-US" altLang="zh-CN" sz="4000" dirty="0">
+                <a:solidFill>
+                  <a:schemeClr val="bg1"/>
+                </a:solidFill>
+                <a:latin typeface="微软雅黑" pitchFamily="34" charset="-122"/>
+                <a:ea typeface="微软雅黑" pitchFamily="34" charset="-122"/>
+              </a:rPr>
+              <a:t>: </a:t>
+            </a:r>
+            <a:r>
+              <a:rPr lang="zh-CN" altLang="en-US" sz="4000" dirty="0">
+                <a:solidFill>
+                  <a:schemeClr val="bg1"/>
+                </a:solidFill>
+                <a:latin typeface="微软雅黑" pitchFamily="34" charset="-122"/>
+                <a:ea typeface="微软雅黑" pitchFamily="34" charset="-122"/>
+              </a:rPr>
+              <a:t>集合（无序、去重）</a:t>
+            </a:r>
+            <a:endParaRPr lang="en-US" dirty="0">
+              <a:solidFill>
+                <a:schemeClr val="bg1"/>
+              </a:solidFill>
+              <a:latin typeface="Arial" charset="0"/>
+            </a:endParaRPr>
+          </a:p>
+        </p:txBody>
+      </p:sp>
+      <p:sp>
+        <p:nvSpPr>
+          <p:cNvPr id="6" name="TextBox 5">
+            <a:extLst>
+              <a:ext uri="{FF2B5EF4-FFF2-40B4-BE49-F238E27FC236}">
+                <a16:creationId xmlns:a16="http://schemas.microsoft.com/office/drawing/2014/main" id="{7C719624-08C8-409E-AD93-517EEA1C4534}"/>
+              </a:ext>
+            </a:extLst>
+          </p:cNvPr>
+          <p:cNvSpPr txBox="1"/>
+          <p:nvPr/>
+        </p:nvSpPr>
+        <p:spPr>
+          <a:xfrm>
+            <a:off x="146384" y="3539626"/>
+            <a:ext cx="8569325" cy="707886"/>
+          </a:xfrm>
+          <a:prstGeom prst="rect">
+            <a:avLst/>
+          </a:prstGeom>
+          <a:noFill/>
+        </p:spPr>
+        <p:txBody>
+          <a:bodyPr>
+            <a:spAutoFit/>
+          </a:bodyPr>
+          <a:lstStyle/>
+          <a:p>
+            <a:pPr marL="571500" indent="-571500">
+              <a:spcBef>
+                <a:spcPts val="600"/>
+              </a:spcBef>
+              <a:buFont typeface="Arial" panose="020B0604020202020204" pitchFamily="34" charset="0"/>
+              <a:buChar char="•"/>
+              <a:defRPr/>
+            </a:pPr>
+            <a:r>
+              <a:rPr lang="zh-CN" altLang="en-US" sz="4000" dirty="0">
+                <a:solidFill>
+                  <a:schemeClr val="bg1"/>
+                </a:solidFill>
+                <a:latin typeface="微软雅黑" pitchFamily="34" charset="-122"/>
+                <a:ea typeface="微软雅黑" pitchFamily="34" charset="-122"/>
+              </a:rPr>
+              <a:t>增删元素</a:t>
+            </a:r>
+            <a:endParaRPr lang="en-US" dirty="0">
+              <a:solidFill>
+                <a:schemeClr val="bg1"/>
+              </a:solidFill>
+              <a:latin typeface="Arial" charset="0"/>
+            </a:endParaRPr>
+          </a:p>
+        </p:txBody>
+      </p:sp>
+      <p:pic>
+        <p:nvPicPr>
+          <p:cNvPr id="3" name="Picture 2">
+            <a:extLst>
+              <a:ext uri="{FF2B5EF4-FFF2-40B4-BE49-F238E27FC236}">
+                <a16:creationId xmlns:a16="http://schemas.microsoft.com/office/drawing/2014/main" id="{1A362BA6-8A17-4851-86BB-640E8FD0832E}"/>
+              </a:ext>
+            </a:extLst>
+          </p:cNvPr>
+          <p:cNvPicPr>
+            <a:picLocks noChangeAspect="1"/>
+          </p:cNvPicPr>
+          <p:nvPr/>
+        </p:nvPicPr>
+        <p:blipFill>
+          <a:blip r:embed="rId2"/>
+          <a:stretch>
+            <a:fillRect/>
+          </a:stretch>
+        </p:blipFill>
+        <p:spPr>
+          <a:xfrm>
+            <a:off x="1655676" y="1904638"/>
+            <a:ext cx="5544616" cy="1456162"/>
+          </a:xfrm>
+          <a:prstGeom prst="rect">
+            <a:avLst/>
+          </a:prstGeom>
+        </p:spPr>
+      </p:pic>
+      <p:pic>
+        <p:nvPicPr>
+          <p:cNvPr id="4" name="Picture 3">
+            <a:extLst>
+              <a:ext uri="{FF2B5EF4-FFF2-40B4-BE49-F238E27FC236}">
+                <a16:creationId xmlns:a16="http://schemas.microsoft.com/office/drawing/2014/main" id="{73884681-C792-4D4C-AF65-F789ACD7F707}"/>
+              </a:ext>
+            </a:extLst>
+          </p:cNvPr>
+          <p:cNvPicPr>
+            <a:picLocks noChangeAspect="1"/>
+          </p:cNvPicPr>
+          <p:nvPr/>
+        </p:nvPicPr>
+        <p:blipFill>
+          <a:blip r:embed="rId3"/>
+          <a:stretch>
+            <a:fillRect/>
+          </a:stretch>
+        </p:blipFill>
+        <p:spPr>
+          <a:xfrm>
+            <a:off x="2123728" y="4247512"/>
+            <a:ext cx="4608512" cy="2478162"/>
+          </a:xfrm>
+          <a:prstGeom prst="rect">
+            <a:avLst/>
+          </a:prstGeom>
+        </p:spPr>
+      </p:pic>
+    </p:spTree>
+    <p:extLst>
+      <p:ext uri="{BB962C8B-B14F-4D97-AF65-F5344CB8AC3E}">
+        <p14:creationId xmlns:p14="http://schemas.microsoft.com/office/powerpoint/2010/main" val="348575814"/>
+      </p:ext>
+    </p:extLst>
+  </p:cSld>
+  <p:clrMapOvr>
+    <a:masterClrMapping/>
+  </p:clrMapOvr>
+</p:sld>
+</file>
+
+<file path=ppt/slides/slide24.xml><?xml version="1.0" encoding="utf-8"?>
+<p:sld xmlns:a="http://schemas.openxmlformats.org/drawingml/2006/main" xmlns:r="http://schemas.openxmlformats.org/officeDocument/2006/relationships" xmlns:p="http://schemas.openxmlformats.org/presentationml/2006/main">
+  <p:cSld>
+    <p:spTree>
+      <p:nvGrpSpPr>
+        <p:cNvPr id="1" name=""/>
+        <p:cNvGrpSpPr/>
+        <p:nvPr/>
+      </p:nvGrpSpPr>
+      <p:grpSpPr>
+        <a:xfrm>
+          <a:off x="0" y="0"/>
+          <a:ext cx="0" cy="0"/>
+          <a:chOff x="0" y="0"/>
+          <a:chExt cx="0" cy="0"/>
+        </a:xfrm>
+      </p:grpSpPr>
+      <p:sp>
+        <p:nvSpPr>
+          <p:cNvPr id="4098" name="TextBox 2">
+            <a:extLst>
+              <a:ext uri="{FF2B5EF4-FFF2-40B4-BE49-F238E27FC236}">
+                <a16:creationId xmlns:a16="http://schemas.microsoft.com/office/drawing/2014/main" id="{5552ED83-0001-4E47-A09B-F49C592A8E24}"/>
+              </a:ext>
+            </a:extLst>
+          </p:cNvPr>
+          <p:cNvSpPr txBox="1">
+            <a:spLocks noChangeArrowheads="1"/>
+          </p:cNvSpPr>
+          <p:nvPr/>
+        </p:nvSpPr>
+        <p:spPr bwMode="auto">
+          <a:xfrm>
+            <a:off x="179512" y="260648"/>
+            <a:ext cx="8496944" cy="830997"/>
+          </a:xfrm>
+          <a:prstGeom prst="rect">
+            <a:avLst/>
+          </a:prstGeom>
+          <a:noFill/>
+          <a:ln>
+            <a:noFill/>
+          </a:ln>
+          <a:extLst>
+            <a:ext uri="{909E8E84-426E-40DD-AFC4-6F175D3DCCD1}">
+              <a14:hiddenFill xmlns:a14="http://schemas.microsoft.com/office/drawing/2010/main">
+                <a:solidFill>
+                  <a:srgbClr val="FFFFFF"/>
+                </a:solidFill>
+              </a14:hiddenFill>
+            </a:ext>
+            <a:ext uri="{91240B29-F687-4F45-9708-019B960494DF}">
+              <a14:hiddenLine xmlns:a14="http://schemas.microsoft.com/office/drawing/2010/main" w="9525">
+                <a:solidFill>
+                  <a:srgbClr val="000000"/>
+                </a:solidFill>
+                <a:miter lim="800000"/>
+                <a:headEnd/>
+                <a:tailEnd/>
+              </a14:hiddenLine>
+            </a:ext>
+          </a:extLst>
+        </p:spPr>
+        <p:txBody>
+          <a:bodyPr wrap="square">
+            <a:spAutoFit/>
+          </a:bodyPr>
+          <a:lstStyle>
+            <a:lvl1pPr eaLnBrk="0" hangingPunct="0">
+              <a:defRPr>
+                <a:solidFill>
+                  <a:schemeClr val="tx1"/>
+                </a:solidFill>
+                <a:latin typeface="Arial" panose="020B0604020202020204" pitchFamily="34" charset="0"/>
+                <a:ea typeface="宋体" panose="02010600030101010101" pitchFamily="2" charset="-122"/>
+              </a:defRPr>
+            </a:lvl1pPr>
+            <a:lvl2pPr marL="742950" indent="-285750" eaLnBrk="0" hangingPunct="0">
+              <a:defRPr>
+                <a:solidFill>
+                  <a:schemeClr val="tx1"/>
+                </a:solidFill>
+                <a:latin typeface="Arial" panose="020B0604020202020204" pitchFamily="34" charset="0"/>
+                <a:ea typeface="宋体" panose="02010600030101010101" pitchFamily="2" charset="-122"/>
+              </a:defRPr>
+            </a:lvl2pPr>
+            <a:lvl3pPr marL="1143000" indent="-228600" eaLnBrk="0" hangingPunct="0">
+              <a:defRPr>
+                <a:solidFill>
+                  <a:schemeClr val="tx1"/>
+                </a:solidFill>
+                <a:latin typeface="Arial" panose="020B0604020202020204" pitchFamily="34" charset="0"/>
+                <a:ea typeface="宋体" panose="02010600030101010101" pitchFamily="2" charset="-122"/>
+              </a:defRPr>
+            </a:lvl3pPr>
+            <a:lvl4pPr marL="1600200" indent="-228600" eaLnBrk="0" hangingPunct="0">
+              <a:defRPr>
+                <a:solidFill>
+                  <a:schemeClr val="tx1"/>
+                </a:solidFill>
+                <a:latin typeface="Arial" panose="020B0604020202020204" pitchFamily="34" charset="0"/>
+                <a:ea typeface="宋体" panose="02010600030101010101" pitchFamily="2" charset="-122"/>
+              </a:defRPr>
+            </a:lvl4pPr>
+            <a:lvl5pPr marL="2057400" indent="-228600" eaLnBrk="0" hangingPunct="0">
+              <a:defRPr>
+                <a:solidFill>
+                  <a:schemeClr val="tx1"/>
+                </a:solidFill>
+                <a:latin typeface="Arial" panose="020B0604020202020204" pitchFamily="34" charset="0"/>
+                <a:ea typeface="宋体" panose="02010600030101010101" pitchFamily="2" charset="-122"/>
+              </a:defRPr>
+            </a:lvl5pPr>
+            <a:lvl6pPr marL="2514600" indent="-228600" eaLnBrk="0" fontAlgn="base" hangingPunct="0">
+              <a:spcBef>
+                <a:spcPct val="0"/>
+              </a:spcBef>
+              <a:spcAft>
+                <a:spcPct val="0"/>
+              </a:spcAft>
+              <a:defRPr>
+                <a:solidFill>
+                  <a:schemeClr val="tx1"/>
+                </a:solidFill>
+                <a:latin typeface="Arial" panose="020B0604020202020204" pitchFamily="34" charset="0"/>
+                <a:ea typeface="宋体" panose="02010600030101010101" pitchFamily="2" charset="-122"/>
+              </a:defRPr>
+            </a:lvl6pPr>
+            <a:lvl7pPr marL="2971800" indent="-228600" eaLnBrk="0" fontAlgn="base" hangingPunct="0">
+              <a:spcBef>
+                <a:spcPct val="0"/>
+              </a:spcBef>
+              <a:spcAft>
+                <a:spcPct val="0"/>
+              </a:spcAft>
+              <a:defRPr>
+                <a:solidFill>
+                  <a:schemeClr val="tx1"/>
+                </a:solidFill>
+                <a:latin typeface="Arial" panose="020B0604020202020204" pitchFamily="34" charset="0"/>
+                <a:ea typeface="宋体" panose="02010600030101010101" pitchFamily="2" charset="-122"/>
+              </a:defRPr>
+            </a:lvl7pPr>
+            <a:lvl8pPr marL="3429000" indent="-228600" eaLnBrk="0" fontAlgn="base" hangingPunct="0">
+              <a:spcBef>
+                <a:spcPct val="0"/>
+              </a:spcBef>
+              <a:spcAft>
+                <a:spcPct val="0"/>
+              </a:spcAft>
+              <a:defRPr>
+                <a:solidFill>
+                  <a:schemeClr val="tx1"/>
+                </a:solidFill>
+                <a:latin typeface="Arial" panose="020B0604020202020204" pitchFamily="34" charset="0"/>
+                <a:ea typeface="宋体" panose="02010600030101010101" pitchFamily="2" charset="-122"/>
+              </a:defRPr>
+            </a:lvl8pPr>
+            <a:lvl9pPr marL="3886200" indent="-228600" eaLnBrk="0" fontAlgn="base" hangingPunct="0">
+              <a:spcBef>
+                <a:spcPct val="0"/>
+              </a:spcBef>
+              <a:spcAft>
+                <a:spcPct val="0"/>
+              </a:spcAft>
+              <a:defRPr>
+                <a:solidFill>
+                  <a:schemeClr val="tx1"/>
+                </a:solidFill>
+                <a:latin typeface="Arial" panose="020B0604020202020204" pitchFamily="34" charset="0"/>
+                <a:ea typeface="宋体" panose="02010600030101010101" pitchFamily="2" charset="-122"/>
+              </a:defRPr>
+            </a:lvl9pPr>
+          </a:lstStyle>
+          <a:p>
+            <a:pPr eaLnBrk="1" hangingPunct="1"/>
+            <a:r>
+              <a:rPr lang="en-US" altLang="zh-CN" sz="4800" dirty="0">
+                <a:solidFill>
+                  <a:schemeClr val="bg1"/>
+                </a:solidFill>
+                <a:latin typeface="微软雅黑" panose="020B0503020204020204" pitchFamily="34" charset="-122"/>
+                <a:ea typeface="微软雅黑" panose="020B0503020204020204" pitchFamily="34" charset="-122"/>
+              </a:rPr>
+              <a:t>Python</a:t>
+            </a:r>
+            <a:r>
+              <a:rPr lang="zh-CN" altLang="en-US" sz="4800" dirty="0">
+                <a:solidFill>
+                  <a:schemeClr val="bg1"/>
+                </a:solidFill>
+                <a:latin typeface="微软雅黑" panose="020B0503020204020204" pitchFamily="34" charset="-122"/>
+                <a:ea typeface="微软雅黑" panose="020B0503020204020204" pitchFamily="34" charset="-122"/>
+              </a:rPr>
+              <a:t> </a:t>
+            </a:r>
+            <a:r>
+              <a:rPr lang="en-US" altLang="zh-CN" sz="4800" dirty="0">
+                <a:solidFill>
+                  <a:schemeClr val="bg1"/>
+                </a:solidFill>
+                <a:latin typeface="微软雅黑" panose="020B0503020204020204" pitchFamily="34" charset="-122"/>
+                <a:ea typeface="微软雅黑" panose="020B0503020204020204" pitchFamily="34" charset="-122"/>
+              </a:rPr>
+              <a:t>– </a:t>
+            </a:r>
+            <a:r>
+              <a:rPr lang="zh-CN" altLang="en-US" sz="4000" dirty="0">
+                <a:solidFill>
+                  <a:schemeClr val="bg1"/>
+                </a:solidFill>
+                <a:latin typeface="微软雅黑" panose="020B0503020204020204" pitchFamily="34" charset="-122"/>
+                <a:ea typeface="微软雅黑" panose="020B0503020204020204" pitchFamily="34" charset="-122"/>
+              </a:rPr>
+              <a:t>内置数据类型</a:t>
+            </a:r>
+            <a:endParaRPr lang="zh-CN" altLang="en-US" sz="4800" dirty="0">
+              <a:solidFill>
+                <a:schemeClr val="bg1"/>
+              </a:solidFill>
+              <a:latin typeface="微软雅黑" panose="020B0503020204020204" pitchFamily="34" charset="-122"/>
+              <a:ea typeface="微软雅黑" panose="020B0503020204020204" pitchFamily="34" charset="-122"/>
+            </a:endParaRPr>
+          </a:p>
+        </p:txBody>
+      </p:sp>
+      <p:sp>
+        <p:nvSpPr>
+          <p:cNvPr id="5" name="TextBox 4">
+            <a:extLst>
+              <a:ext uri="{FF2B5EF4-FFF2-40B4-BE49-F238E27FC236}">
+                <a16:creationId xmlns:a16="http://schemas.microsoft.com/office/drawing/2014/main" id="{E8A991AE-3688-4E36-95ED-0003B8B99099}"/>
+              </a:ext>
+            </a:extLst>
+          </p:cNvPr>
+          <p:cNvSpPr txBox="1"/>
+          <p:nvPr/>
+        </p:nvSpPr>
+        <p:spPr>
+          <a:xfrm>
+            <a:off x="179512" y="1196752"/>
+            <a:ext cx="8569325" cy="707886"/>
+          </a:xfrm>
+          <a:prstGeom prst="rect">
+            <a:avLst/>
+          </a:prstGeom>
+          <a:noFill/>
+        </p:spPr>
+        <p:txBody>
+          <a:bodyPr>
+            <a:spAutoFit/>
+          </a:bodyPr>
+          <a:lstStyle/>
+          <a:p>
+            <a:pPr marL="571500" indent="-571500">
+              <a:spcBef>
+                <a:spcPts val="600"/>
+              </a:spcBef>
+              <a:buFont typeface="Arial" panose="020B0604020202020204" pitchFamily="34" charset="0"/>
+              <a:buChar char="•"/>
+              <a:defRPr/>
+            </a:pPr>
+            <a:r>
+              <a:rPr lang="en-US" altLang="zh-CN" sz="4000" dirty="0" err="1">
+                <a:solidFill>
+                  <a:srgbClr val="FFC000"/>
+                </a:solidFill>
+                <a:latin typeface="微软雅黑" pitchFamily="34" charset="-122"/>
+                <a:ea typeface="微软雅黑" pitchFamily="34" charset="-122"/>
+              </a:rPr>
+              <a:t>dict</a:t>
+            </a:r>
+            <a:r>
+              <a:rPr lang="en-US" altLang="zh-CN" sz="4000" dirty="0">
+                <a:solidFill>
+                  <a:schemeClr val="bg1"/>
+                </a:solidFill>
+                <a:latin typeface="微软雅黑" pitchFamily="34" charset="-122"/>
+                <a:ea typeface="微软雅黑" pitchFamily="34" charset="-122"/>
+              </a:rPr>
+              <a:t>: </a:t>
+            </a:r>
+            <a:r>
+              <a:rPr lang="zh-CN" altLang="en-US" sz="4000" dirty="0">
+                <a:solidFill>
+                  <a:schemeClr val="bg1"/>
+                </a:solidFill>
+                <a:latin typeface="微软雅黑" pitchFamily="34" charset="-122"/>
+                <a:ea typeface="微软雅黑" pitchFamily="34" charset="-122"/>
+              </a:rPr>
+              <a:t>字典（键值对）</a:t>
+            </a:r>
+            <a:endParaRPr lang="en-US" dirty="0">
+              <a:solidFill>
+                <a:schemeClr val="bg1"/>
+              </a:solidFill>
+              <a:latin typeface="Arial" charset="0"/>
+            </a:endParaRPr>
+          </a:p>
+        </p:txBody>
+      </p:sp>
+      <p:sp>
+        <p:nvSpPr>
+          <p:cNvPr id="6" name="TextBox 5">
+            <a:extLst>
+              <a:ext uri="{FF2B5EF4-FFF2-40B4-BE49-F238E27FC236}">
+                <a16:creationId xmlns:a16="http://schemas.microsoft.com/office/drawing/2014/main" id="{7C719624-08C8-409E-AD93-517EEA1C4534}"/>
+              </a:ext>
+            </a:extLst>
+          </p:cNvPr>
+          <p:cNvSpPr txBox="1"/>
+          <p:nvPr/>
+        </p:nvSpPr>
+        <p:spPr>
+          <a:xfrm>
+            <a:off x="21744" y="4200950"/>
+            <a:ext cx="8569325" cy="707886"/>
+          </a:xfrm>
+          <a:prstGeom prst="rect">
+            <a:avLst/>
+          </a:prstGeom>
+          <a:noFill/>
+        </p:spPr>
+        <p:txBody>
+          <a:bodyPr>
+            <a:spAutoFit/>
+          </a:bodyPr>
+          <a:lstStyle/>
+          <a:p>
+            <a:pPr marL="571500" indent="-571500">
+              <a:spcBef>
+                <a:spcPts val="600"/>
+              </a:spcBef>
+              <a:buFont typeface="Arial" panose="020B0604020202020204" pitchFamily="34" charset="0"/>
+              <a:buChar char="•"/>
+              <a:defRPr/>
+            </a:pPr>
+            <a:r>
+              <a:rPr lang="zh-CN" altLang="en-US" sz="4000" dirty="0">
+                <a:solidFill>
+                  <a:schemeClr val="bg1"/>
+                </a:solidFill>
+                <a:latin typeface="微软雅黑" pitchFamily="34" charset="-122"/>
+                <a:ea typeface="微软雅黑" pitchFamily="34" charset="-122"/>
+              </a:rPr>
+              <a:t>使用</a:t>
+            </a:r>
+            <a:r>
+              <a:rPr lang="en-US" altLang="zh-CN" sz="4000" dirty="0">
+                <a:solidFill>
+                  <a:schemeClr val="bg1"/>
+                </a:solidFill>
+                <a:latin typeface="微软雅黑" pitchFamily="34" charset="-122"/>
+                <a:ea typeface="微软雅黑" pitchFamily="34" charset="-122"/>
+              </a:rPr>
+              <a:t>get()</a:t>
+            </a:r>
+            <a:r>
+              <a:rPr lang="zh-CN" altLang="en-US" sz="4000" dirty="0">
+                <a:solidFill>
+                  <a:schemeClr val="bg1"/>
+                </a:solidFill>
+                <a:latin typeface="微软雅黑" pitchFamily="34" charset="-122"/>
+                <a:ea typeface="微软雅黑" pitchFamily="34" charset="-122"/>
+              </a:rPr>
+              <a:t>获取元素避免异常</a:t>
+            </a:r>
+            <a:endParaRPr lang="en-US" dirty="0">
+              <a:solidFill>
+                <a:schemeClr val="bg1"/>
+              </a:solidFill>
+              <a:latin typeface="Arial" charset="0"/>
+            </a:endParaRPr>
+          </a:p>
+        </p:txBody>
+      </p:sp>
+      <p:pic>
+        <p:nvPicPr>
+          <p:cNvPr id="2" name="Picture 1">
+            <a:extLst>
+              <a:ext uri="{FF2B5EF4-FFF2-40B4-BE49-F238E27FC236}">
+                <a16:creationId xmlns:a16="http://schemas.microsoft.com/office/drawing/2014/main" id="{11868018-69C0-41E7-B58B-EA57D6145DC2}"/>
+              </a:ext>
+            </a:extLst>
+          </p:cNvPr>
+          <p:cNvPicPr>
+            <a:picLocks noChangeAspect="1"/>
+          </p:cNvPicPr>
+          <p:nvPr/>
+        </p:nvPicPr>
+        <p:blipFill>
+          <a:blip r:embed="rId2"/>
+          <a:stretch>
+            <a:fillRect/>
+          </a:stretch>
+        </p:blipFill>
+        <p:spPr>
+          <a:xfrm>
+            <a:off x="1697976" y="1872301"/>
+            <a:ext cx="5532395" cy="2328649"/>
+          </a:xfrm>
+          <a:prstGeom prst="rect">
+            <a:avLst/>
+          </a:prstGeom>
+        </p:spPr>
+      </p:pic>
+      <p:pic>
+        <p:nvPicPr>
+          <p:cNvPr id="7" name="Picture 6">
+            <a:extLst>
+              <a:ext uri="{FF2B5EF4-FFF2-40B4-BE49-F238E27FC236}">
+                <a16:creationId xmlns:a16="http://schemas.microsoft.com/office/drawing/2014/main" id="{FD58415D-8DEA-403F-B06A-A7B95DD8A67A}"/>
+              </a:ext>
+            </a:extLst>
+          </p:cNvPr>
+          <p:cNvPicPr>
+            <a:picLocks noChangeAspect="1"/>
+          </p:cNvPicPr>
+          <p:nvPr/>
+        </p:nvPicPr>
+        <p:blipFill>
+          <a:blip r:embed="rId3"/>
+          <a:stretch>
+            <a:fillRect/>
+          </a:stretch>
+        </p:blipFill>
+        <p:spPr>
+          <a:xfrm>
+            <a:off x="1138684" y="4908836"/>
+            <a:ext cx="6866632" cy="1688516"/>
+          </a:xfrm>
+          <a:prstGeom prst="rect">
+            <a:avLst/>
+          </a:prstGeom>
+        </p:spPr>
+      </p:pic>
+    </p:spTree>
+    <p:extLst>
+      <p:ext uri="{BB962C8B-B14F-4D97-AF65-F5344CB8AC3E}">
+        <p14:creationId xmlns:p14="http://schemas.microsoft.com/office/powerpoint/2010/main" val="235005207"/>
+      </p:ext>
+    </p:extLst>
+  </p:cSld>
+  <p:clrMapOvr>
+    <a:masterClrMapping/>
+  </p:clrMapOvr>
+</p:sld>
+</file>
+
+<file path=ppt/slides/slide25.xml><?xml version="1.0" encoding="utf-8"?>
+<p:sld xmlns:a="http://schemas.openxmlformats.org/drawingml/2006/main" xmlns:r="http://schemas.openxmlformats.org/officeDocument/2006/relationships" xmlns:p="http://schemas.openxmlformats.org/presentationml/2006/main">
+  <p:cSld>
+    <p:spTree>
+      <p:nvGrpSpPr>
+        <p:cNvPr id="1" name=""/>
+        <p:cNvGrpSpPr/>
+        <p:nvPr/>
+      </p:nvGrpSpPr>
+      <p:grpSpPr>
+        <a:xfrm>
+          <a:off x="0" y="0"/>
+          <a:ext cx="0" cy="0"/>
+          <a:chOff x="0" y="0"/>
+          <a:chExt cx="0" cy="0"/>
+        </a:xfrm>
+      </p:grpSpPr>
+      <p:sp>
+        <p:nvSpPr>
+          <p:cNvPr id="5122" name="Rectangle 2">
+            <a:extLst>
+              <a:ext uri="{FF2B5EF4-FFF2-40B4-BE49-F238E27FC236}">
+                <a16:creationId xmlns:a16="http://schemas.microsoft.com/office/drawing/2014/main" id="{DA0A6638-A01B-4ADE-AF93-1C7B857D9914}"/>
+              </a:ext>
+            </a:extLst>
+          </p:cNvPr>
+          <p:cNvSpPr>
+            <a:spLocks noGrp="1" noChangeArrowheads="1"/>
+          </p:cNvSpPr>
+          <p:nvPr>
+            <p:ph type="ctrTitle"/>
+          </p:nvPr>
+        </p:nvSpPr>
+        <p:spPr>
+          <a:xfrm>
+            <a:off x="684213" y="2133600"/>
+            <a:ext cx="7847012" cy="2159000"/>
+          </a:xfrm>
+        </p:spPr>
+        <p:txBody>
+          <a:bodyPr/>
+          <a:lstStyle/>
+          <a:p>
+            <a:pPr eaLnBrk="1" hangingPunct="1"/>
+            <a:br>
+              <a:rPr lang="en-US" altLang="zh-CN" sz="8000" dirty="0">
+                <a:solidFill>
+                  <a:schemeClr val="bg1"/>
+                </a:solidFill>
+                <a:ea typeface="微软雅黑" panose="020B0503020204020204" pitchFamily="34" charset="-122"/>
+              </a:rPr>
+            </a:br>
+            <a:r>
+              <a:rPr lang="en-US" altLang="zh-CN" sz="6600" dirty="0">
+                <a:solidFill>
+                  <a:schemeClr val="bg1"/>
+                </a:solidFill>
+                <a:ea typeface="微软雅黑" panose="020B0503020204020204" pitchFamily="34" charset="-122"/>
+              </a:rPr>
+              <a:t>Q &amp; A</a:t>
+            </a:r>
+            <a:br>
+              <a:rPr lang="zh-CN" altLang="en-US" sz="7200" dirty="0">
+                <a:solidFill>
+                  <a:schemeClr val="bg1"/>
+                </a:solidFill>
+                <a:ea typeface="微软雅黑" panose="020B0503020204020204" pitchFamily="34" charset="-122"/>
+              </a:rPr>
+            </a:br>
+            <a:endParaRPr lang="zh-CN" altLang="en-US" sz="7200" dirty="0">
+              <a:solidFill>
+                <a:schemeClr val="bg1"/>
+              </a:solidFill>
+              <a:ea typeface="微软雅黑" panose="020B0503020204020204" pitchFamily="34" charset="-122"/>
+            </a:endParaRPr>
+          </a:p>
+        </p:txBody>
+      </p:sp>
+    </p:spTree>
+    <p:extLst>
+      <p:ext uri="{BB962C8B-B14F-4D97-AF65-F5344CB8AC3E}">
+        <p14:creationId xmlns:p14="http://schemas.microsoft.com/office/powerpoint/2010/main" val="1068010669"/>
       </p:ext>
     </p:extLst>
   </p:cSld>

</xml_diff>

<commit_message>
Update Ch1 ppt, add reference
</commit_message>
<xml_diff>
--- a/chapter.1/ppt/ML_CH1_Python_Basic.pptx
+++ b/chapter.1/ppt/ML_CH1_Python_Basic.pptx
@@ -44,7 +44,12 @@
     <p:sldId id="327" r:id="rId38"/>
     <p:sldId id="328" r:id="rId39"/>
     <p:sldId id="329" r:id="rId40"/>
-    <p:sldId id="294" r:id="rId41"/>
+    <p:sldId id="330" r:id="rId41"/>
+    <p:sldId id="331" r:id="rId42"/>
+    <p:sldId id="332" r:id="rId43"/>
+    <p:sldId id="333" r:id="rId44"/>
+    <p:sldId id="334" r:id="rId45"/>
+    <p:sldId id="294" r:id="rId46"/>
   </p:sldIdLst>
   <p:sldSz cx="9144000" cy="6858000" type="screen4x3"/>
   <p:notesSz cx="6858000" cy="9144000"/>
@@ -23679,47 +23684,7 @@
                 <a:latin typeface="微软雅黑" pitchFamily="34" charset="-122"/>
                 <a:ea typeface="微软雅黑" pitchFamily="34" charset="-122"/>
               </a:rPr>
-              <a:t>起始位置</a:t>
-            </a:r>
-            <a:r>
-              <a:rPr lang="en-US" altLang="zh-CN" sz="4000" dirty="0">
-                <a:solidFill>
-                  <a:schemeClr val="bg1"/>
-                </a:solidFill>
-                <a:latin typeface="微软雅黑" pitchFamily="34" charset="-122"/>
-                <a:ea typeface="微软雅黑" pitchFamily="34" charset="-122"/>
-              </a:rPr>
-              <a:t>, </a:t>
-            </a:r>
-            <a:r>
-              <a:rPr lang="zh-CN" altLang="en-US" sz="4000" dirty="0">
-                <a:solidFill>
-                  <a:srgbClr val="FFC000"/>
-                </a:solidFill>
-                <a:latin typeface="微软雅黑" pitchFamily="34" charset="-122"/>
-                <a:ea typeface="微软雅黑" pitchFamily="34" charset="-122"/>
-              </a:rPr>
-              <a:t>结束位置</a:t>
-            </a:r>
-            <a:r>
-              <a:rPr lang="en-US" altLang="zh-CN" sz="4000" dirty="0">
-                <a:solidFill>
-                  <a:schemeClr val="bg1"/>
-                </a:solidFill>
-                <a:latin typeface="微软雅黑" pitchFamily="34" charset="-122"/>
-                <a:ea typeface="微软雅黑" pitchFamily="34" charset="-122"/>
-              </a:rPr>
-              <a:t>, </a:t>
-            </a:r>
-            <a:r>
-              <a:rPr lang="zh-CN" altLang="en-US" sz="4000" dirty="0">
-                <a:solidFill>
-                  <a:srgbClr val="FFC000"/>
-                </a:solidFill>
-                <a:latin typeface="微软雅黑" pitchFamily="34" charset="-122"/>
-                <a:ea typeface="微软雅黑" pitchFamily="34" charset="-122"/>
-              </a:rPr>
-              <a:t>步长</a:t>
+              <a:t>起始位置：结束位置：步长</a:t>
             </a:r>
             <a:r>
               <a:rPr lang="en-US" altLang="zh-CN" sz="4000" dirty="0">
@@ -23796,69 +23761,362 @@
       </p:grpSpPr>
       <p:sp>
         <p:nvSpPr>
-          <p:cNvPr id="5122" name="Rectangle 2">
+          <p:cNvPr id="4098" name="TextBox 2">
             <a:extLst>
               <a:ext uri="{FF2B5EF4-FFF2-40B4-BE49-F238E27FC236}">
-                <a16:creationId xmlns:a16="http://schemas.microsoft.com/office/drawing/2014/main" id="{DA0A6638-A01B-4ADE-AF93-1C7B857D9914}"/>
+                <a16:creationId xmlns:a16="http://schemas.microsoft.com/office/drawing/2014/main" id="{5552ED83-0001-4E47-A09B-F49C592A8E24}"/>
               </a:ext>
             </a:extLst>
           </p:cNvPr>
-          <p:cNvSpPr>
-            <a:spLocks noGrp="1" noChangeArrowheads="1"/>
+          <p:cNvSpPr txBox="1">
+            <a:spLocks noChangeArrowheads="1"/>
           </p:cNvSpPr>
-          <p:nvPr>
-            <p:ph type="ctrTitle"/>
-          </p:nvPr>
+          <p:nvPr/>
+        </p:nvSpPr>
+        <p:spPr bwMode="auto">
+          <a:xfrm>
+            <a:off x="-10272" y="0"/>
+            <a:ext cx="8496944" cy="830997"/>
+          </a:xfrm>
+          <a:prstGeom prst="rect">
+            <a:avLst/>
+          </a:prstGeom>
+          <a:noFill/>
+          <a:ln>
+            <a:noFill/>
+          </a:ln>
+          <a:extLst>
+            <a:ext uri="{909E8E84-426E-40DD-AFC4-6F175D3DCCD1}">
+              <a14:hiddenFill xmlns:a14="http://schemas.microsoft.com/office/drawing/2010/main">
+                <a:solidFill>
+                  <a:srgbClr val="FFFFFF"/>
+                </a:solidFill>
+              </a14:hiddenFill>
+            </a:ext>
+            <a:ext uri="{91240B29-F687-4F45-9708-019B960494DF}">
+              <a14:hiddenLine xmlns:a14="http://schemas.microsoft.com/office/drawing/2010/main" w="9525">
+                <a:solidFill>
+                  <a:srgbClr val="000000"/>
+                </a:solidFill>
+                <a:miter lim="800000"/>
+                <a:headEnd/>
+                <a:tailEnd/>
+              </a14:hiddenLine>
+            </a:ext>
+          </a:extLst>
+        </p:spPr>
+        <p:txBody>
+          <a:bodyPr wrap="square">
+            <a:spAutoFit/>
+          </a:bodyPr>
+          <a:lstStyle>
+            <a:lvl1pPr eaLnBrk="0" hangingPunct="0">
+              <a:defRPr>
+                <a:solidFill>
+                  <a:schemeClr val="tx1"/>
+                </a:solidFill>
+                <a:latin typeface="Arial" panose="020B0604020202020204" pitchFamily="34" charset="0"/>
+                <a:ea typeface="宋体" panose="02010600030101010101" pitchFamily="2" charset="-122"/>
+              </a:defRPr>
+            </a:lvl1pPr>
+            <a:lvl2pPr marL="742950" indent="-285750" eaLnBrk="0" hangingPunct="0">
+              <a:defRPr>
+                <a:solidFill>
+                  <a:schemeClr val="tx1"/>
+                </a:solidFill>
+                <a:latin typeface="Arial" panose="020B0604020202020204" pitchFamily="34" charset="0"/>
+                <a:ea typeface="宋体" panose="02010600030101010101" pitchFamily="2" charset="-122"/>
+              </a:defRPr>
+            </a:lvl2pPr>
+            <a:lvl3pPr marL="1143000" indent="-228600" eaLnBrk="0" hangingPunct="0">
+              <a:defRPr>
+                <a:solidFill>
+                  <a:schemeClr val="tx1"/>
+                </a:solidFill>
+                <a:latin typeface="Arial" panose="020B0604020202020204" pitchFamily="34" charset="0"/>
+                <a:ea typeface="宋体" panose="02010600030101010101" pitchFamily="2" charset="-122"/>
+              </a:defRPr>
+            </a:lvl3pPr>
+            <a:lvl4pPr marL="1600200" indent="-228600" eaLnBrk="0" hangingPunct="0">
+              <a:defRPr>
+                <a:solidFill>
+                  <a:schemeClr val="tx1"/>
+                </a:solidFill>
+                <a:latin typeface="Arial" panose="020B0604020202020204" pitchFamily="34" charset="0"/>
+                <a:ea typeface="宋体" panose="02010600030101010101" pitchFamily="2" charset="-122"/>
+              </a:defRPr>
+            </a:lvl4pPr>
+            <a:lvl5pPr marL="2057400" indent="-228600" eaLnBrk="0" hangingPunct="0">
+              <a:defRPr>
+                <a:solidFill>
+                  <a:schemeClr val="tx1"/>
+                </a:solidFill>
+                <a:latin typeface="Arial" panose="020B0604020202020204" pitchFamily="34" charset="0"/>
+                <a:ea typeface="宋体" panose="02010600030101010101" pitchFamily="2" charset="-122"/>
+              </a:defRPr>
+            </a:lvl5pPr>
+            <a:lvl6pPr marL="2514600" indent="-228600" eaLnBrk="0" fontAlgn="base" hangingPunct="0">
+              <a:spcBef>
+                <a:spcPct val="0"/>
+              </a:spcBef>
+              <a:spcAft>
+                <a:spcPct val="0"/>
+              </a:spcAft>
+              <a:defRPr>
+                <a:solidFill>
+                  <a:schemeClr val="tx1"/>
+                </a:solidFill>
+                <a:latin typeface="Arial" panose="020B0604020202020204" pitchFamily="34" charset="0"/>
+                <a:ea typeface="宋体" panose="02010600030101010101" pitchFamily="2" charset="-122"/>
+              </a:defRPr>
+            </a:lvl6pPr>
+            <a:lvl7pPr marL="2971800" indent="-228600" eaLnBrk="0" fontAlgn="base" hangingPunct="0">
+              <a:spcBef>
+                <a:spcPct val="0"/>
+              </a:spcBef>
+              <a:spcAft>
+                <a:spcPct val="0"/>
+              </a:spcAft>
+              <a:defRPr>
+                <a:solidFill>
+                  <a:schemeClr val="tx1"/>
+                </a:solidFill>
+                <a:latin typeface="Arial" panose="020B0604020202020204" pitchFamily="34" charset="0"/>
+                <a:ea typeface="宋体" panose="02010600030101010101" pitchFamily="2" charset="-122"/>
+              </a:defRPr>
+            </a:lvl7pPr>
+            <a:lvl8pPr marL="3429000" indent="-228600" eaLnBrk="0" fontAlgn="base" hangingPunct="0">
+              <a:spcBef>
+                <a:spcPct val="0"/>
+              </a:spcBef>
+              <a:spcAft>
+                <a:spcPct val="0"/>
+              </a:spcAft>
+              <a:defRPr>
+                <a:solidFill>
+                  <a:schemeClr val="tx1"/>
+                </a:solidFill>
+                <a:latin typeface="Arial" panose="020B0604020202020204" pitchFamily="34" charset="0"/>
+                <a:ea typeface="宋体" panose="02010600030101010101" pitchFamily="2" charset="-122"/>
+              </a:defRPr>
+            </a:lvl8pPr>
+            <a:lvl9pPr marL="3886200" indent="-228600" eaLnBrk="0" fontAlgn="base" hangingPunct="0">
+              <a:spcBef>
+                <a:spcPct val="0"/>
+              </a:spcBef>
+              <a:spcAft>
+                <a:spcPct val="0"/>
+              </a:spcAft>
+              <a:defRPr>
+                <a:solidFill>
+                  <a:schemeClr val="tx1"/>
+                </a:solidFill>
+                <a:latin typeface="Arial" panose="020B0604020202020204" pitchFamily="34" charset="0"/>
+                <a:ea typeface="宋体" panose="02010600030101010101" pitchFamily="2" charset="-122"/>
+              </a:defRPr>
+            </a:lvl9pPr>
+          </a:lstStyle>
+          <a:p>
+            <a:pPr eaLnBrk="1" hangingPunct="1"/>
+            <a:r>
+              <a:rPr lang="en-US" altLang="zh-CN" sz="4800" dirty="0">
+                <a:solidFill>
+                  <a:schemeClr val="bg1"/>
+                </a:solidFill>
+                <a:latin typeface="微软雅黑" panose="020B0503020204020204" pitchFamily="34" charset="-122"/>
+                <a:ea typeface="微软雅黑" panose="020B0503020204020204" pitchFamily="34" charset="-122"/>
+              </a:rPr>
+              <a:t>Python</a:t>
+            </a:r>
+            <a:r>
+              <a:rPr lang="zh-CN" altLang="en-US" sz="4800" dirty="0">
+                <a:solidFill>
+                  <a:schemeClr val="bg1"/>
+                </a:solidFill>
+                <a:latin typeface="微软雅黑" panose="020B0503020204020204" pitchFamily="34" charset="-122"/>
+                <a:ea typeface="微软雅黑" panose="020B0503020204020204" pitchFamily="34" charset="-122"/>
+              </a:rPr>
+              <a:t> </a:t>
+            </a:r>
+            <a:r>
+              <a:rPr lang="en-US" altLang="zh-CN" sz="4800" dirty="0">
+                <a:solidFill>
+                  <a:schemeClr val="bg1"/>
+                </a:solidFill>
+                <a:latin typeface="微软雅黑" panose="020B0503020204020204" pitchFamily="34" charset="-122"/>
+                <a:ea typeface="微软雅黑" panose="020B0503020204020204" pitchFamily="34" charset="-122"/>
+              </a:rPr>
+              <a:t>– </a:t>
+            </a:r>
+            <a:r>
+              <a:rPr lang="zh-CN" altLang="en-US" sz="4000" dirty="0">
+                <a:solidFill>
+                  <a:schemeClr val="bg1"/>
+                </a:solidFill>
+                <a:latin typeface="微软雅黑" panose="020B0503020204020204" pitchFamily="34" charset="-122"/>
+                <a:ea typeface="微软雅黑" panose="020B0503020204020204" pitchFamily="34" charset="-122"/>
+              </a:rPr>
+              <a:t>高级特性 </a:t>
+            </a:r>
+            <a:r>
+              <a:rPr lang="en-US" altLang="zh-CN" sz="4000" dirty="0">
+                <a:solidFill>
+                  <a:schemeClr val="bg1"/>
+                </a:solidFill>
+                <a:latin typeface="微软雅黑" panose="020B0503020204020204" pitchFamily="34" charset="-122"/>
+                <a:ea typeface="微软雅黑" panose="020B0503020204020204" pitchFamily="34" charset="-122"/>
+              </a:rPr>
+              <a:t>Generator</a:t>
+            </a:r>
+            <a:endParaRPr lang="zh-CN" altLang="en-US" sz="4800" dirty="0">
+              <a:solidFill>
+                <a:schemeClr val="bg1"/>
+              </a:solidFill>
+              <a:latin typeface="微软雅黑" panose="020B0503020204020204" pitchFamily="34" charset="-122"/>
+              <a:ea typeface="微软雅黑" panose="020B0503020204020204" pitchFamily="34" charset="-122"/>
+            </a:endParaRPr>
+          </a:p>
+        </p:txBody>
+      </p:sp>
+      <p:sp>
+        <p:nvSpPr>
+          <p:cNvPr id="5" name="TextBox 4">
+            <a:extLst>
+              <a:ext uri="{FF2B5EF4-FFF2-40B4-BE49-F238E27FC236}">
+                <a16:creationId xmlns:a16="http://schemas.microsoft.com/office/drawing/2014/main" id="{E8A991AE-3688-4E36-95ED-0003B8B99099}"/>
+              </a:ext>
+            </a:extLst>
+          </p:cNvPr>
+          <p:cNvSpPr txBox="1"/>
+          <p:nvPr/>
         </p:nvSpPr>
         <p:spPr>
           <a:xfrm>
-            <a:off x="684213" y="2133600"/>
-            <a:ext cx="7847012" cy="2159000"/>
+            <a:off x="0" y="802461"/>
+            <a:ext cx="8929365" cy="4016484"/>
           </a:xfrm>
+          <a:prstGeom prst="rect">
+            <a:avLst/>
+          </a:prstGeom>
+          <a:noFill/>
         </p:spPr>
         <p:txBody>
-          <a:bodyPr/>
+          <a:bodyPr wrap="square">
+            <a:spAutoFit/>
+          </a:bodyPr>
           <a:lstStyle/>
           <a:p>
-            <a:pPr eaLnBrk="1" hangingPunct="1"/>
-            <a:br>
-              <a:rPr lang="en-US" altLang="zh-CN" sz="8000" dirty="0">
-                <a:solidFill>
-                  <a:schemeClr val="bg1"/>
-                </a:solidFill>
-                <a:ea typeface="微软雅黑" panose="020B0503020204020204" pitchFamily="34" charset="-122"/>
-              </a:rPr>
-            </a:br>
-            <a:r>
-              <a:rPr lang="en-US" altLang="zh-CN" sz="6600" dirty="0">
-                <a:solidFill>
-                  <a:schemeClr val="bg1"/>
-                </a:solidFill>
-                <a:ea typeface="微软雅黑" panose="020B0503020204020204" pitchFamily="34" charset="-122"/>
-              </a:rPr>
-              <a:t>Q &amp; A</a:t>
-            </a:r>
-            <a:br>
-              <a:rPr lang="zh-CN" altLang="en-US" sz="7200" dirty="0">
-                <a:solidFill>
-                  <a:schemeClr val="bg1"/>
-                </a:solidFill>
-                <a:ea typeface="微软雅黑" panose="020B0503020204020204" pitchFamily="34" charset="-122"/>
-              </a:rPr>
-            </a:br>
-            <a:endParaRPr lang="zh-CN" altLang="en-US" sz="7200" dirty="0">
+            <a:pPr>
+              <a:spcBef>
+                <a:spcPts val="600"/>
+              </a:spcBef>
+              <a:defRPr/>
+            </a:pPr>
+            <a:r>
+              <a:rPr lang="zh-CN" altLang="en-US" sz="4000" dirty="0">
+                <a:solidFill>
+                  <a:schemeClr val="bg1"/>
+                </a:solidFill>
+                <a:latin typeface="微软雅黑" pitchFamily="34" charset="-122"/>
+                <a:ea typeface="微软雅黑" pitchFamily="34" charset="-122"/>
+              </a:rPr>
+              <a:t>场景：假设需要下面这样一个序列：</a:t>
+            </a:r>
+            <a:endParaRPr lang="en-US" altLang="zh-CN" sz="4000" dirty="0">
               <a:solidFill>
                 <a:schemeClr val="bg1"/>
               </a:solidFill>
-              <a:ea typeface="微软雅黑" panose="020B0503020204020204" pitchFamily="34" charset="-122"/>
+              <a:latin typeface="微软雅黑" pitchFamily="34" charset="-122"/>
+              <a:ea typeface="微软雅黑" pitchFamily="34" charset="-122"/>
             </a:endParaRPr>
+          </a:p>
+          <a:p>
+            <a:pPr>
+              <a:spcBef>
+                <a:spcPts val="600"/>
+              </a:spcBef>
+              <a:defRPr/>
+            </a:pPr>
+            <a:r>
+              <a:rPr lang="en-US" altLang="zh-CN" sz="4000" dirty="0">
+                <a:solidFill>
+                  <a:schemeClr val="bg1"/>
+                </a:solidFill>
+                <a:latin typeface="微软雅黑" pitchFamily="34" charset="-122"/>
+                <a:ea typeface="微软雅黑" pitchFamily="34" charset="-122"/>
+              </a:rPr>
+              <a:t>1,4,9,16,25…… (</a:t>
+            </a:r>
+            <a:r>
+              <a:rPr lang="zh-CN" altLang="en-US" sz="4000" dirty="0">
+                <a:solidFill>
+                  <a:schemeClr val="bg1"/>
+                </a:solidFill>
+                <a:latin typeface="微软雅黑" pitchFamily="34" charset="-122"/>
+                <a:ea typeface="微软雅黑" pitchFamily="34" charset="-122"/>
+              </a:rPr>
+              <a:t>上千万个元素，并且每次只取其中一个</a:t>
+            </a:r>
+            <a:r>
+              <a:rPr lang="en-US" altLang="zh-CN" sz="4000" dirty="0">
+                <a:solidFill>
+                  <a:schemeClr val="bg1"/>
+                </a:solidFill>
+                <a:latin typeface="微软雅黑" pitchFamily="34" charset="-122"/>
+                <a:ea typeface="微软雅黑" pitchFamily="34" charset="-122"/>
+              </a:rPr>
+              <a:t>)</a:t>
+            </a:r>
+          </a:p>
+          <a:p>
+            <a:pPr>
+              <a:spcBef>
+                <a:spcPts val="600"/>
+              </a:spcBef>
+              <a:defRPr/>
+            </a:pPr>
+            <a:endParaRPr lang="en-US" altLang="zh-CN" sz="4000" dirty="0">
+              <a:solidFill>
+                <a:schemeClr val="bg1"/>
+              </a:solidFill>
+              <a:latin typeface="微软雅黑" pitchFamily="34" charset="-122"/>
+              <a:ea typeface="微软雅黑" pitchFamily="34" charset="-122"/>
+            </a:endParaRPr>
+          </a:p>
+          <a:p>
+            <a:pPr>
+              <a:spcBef>
+                <a:spcPts val="600"/>
+              </a:spcBef>
+              <a:defRPr/>
+            </a:pPr>
+            <a:r>
+              <a:rPr lang="zh-CN" altLang="en-US" sz="4000" dirty="0">
+                <a:solidFill>
+                  <a:schemeClr val="bg1"/>
+                </a:solidFill>
+                <a:latin typeface="微软雅黑" pitchFamily="34" charset="-122"/>
+                <a:ea typeface="微软雅黑" pitchFamily="34" charset="-122"/>
+              </a:rPr>
+              <a:t>一种办法是可以预先用循环构造出这个</a:t>
+            </a:r>
+            <a:r>
+              <a:rPr lang="en-US" altLang="zh-CN" sz="4000" dirty="0">
+                <a:solidFill>
+                  <a:schemeClr val="bg1"/>
+                </a:solidFill>
+                <a:latin typeface="微软雅黑" pitchFamily="34" charset="-122"/>
+                <a:ea typeface="微软雅黑" pitchFamily="34" charset="-122"/>
+              </a:rPr>
+              <a:t>list = [1,4,9,16,25,……]</a:t>
+            </a:r>
           </a:p>
         </p:txBody>
       </p:sp>
     </p:spTree>
     <p:extLst>
       <p:ext uri="{BB962C8B-B14F-4D97-AF65-F5344CB8AC3E}">
-        <p14:creationId xmlns:p14="http://schemas.microsoft.com/office/powerpoint/2010/main" val="1068010669"/>
+        <p14:creationId xmlns:p14="http://schemas.microsoft.com/office/powerpoint/2010/main" val="851718291"/>
       </p:ext>
     </p:extLst>
   </p:cSld>
@@ -24160,6 +24418,1745 @@
         </p:spPr>
       </p:pic>
     </p:spTree>
+  </p:cSld>
+  <p:clrMapOvr>
+    <a:masterClrMapping/>
+  </p:clrMapOvr>
+</p:sld>
+</file>
+
+<file path=ppt/slides/slide40.xml><?xml version="1.0" encoding="utf-8"?>
+<p:sld xmlns:a="http://schemas.openxmlformats.org/drawingml/2006/main" xmlns:r="http://schemas.openxmlformats.org/officeDocument/2006/relationships" xmlns:p="http://schemas.openxmlformats.org/presentationml/2006/main">
+  <p:cSld>
+    <p:spTree>
+      <p:nvGrpSpPr>
+        <p:cNvPr id="1" name=""/>
+        <p:cNvGrpSpPr/>
+        <p:nvPr/>
+      </p:nvGrpSpPr>
+      <p:grpSpPr>
+        <a:xfrm>
+          <a:off x="0" y="0"/>
+          <a:ext cx="0" cy="0"/>
+          <a:chOff x="0" y="0"/>
+          <a:chExt cx="0" cy="0"/>
+        </a:xfrm>
+      </p:grpSpPr>
+      <p:sp>
+        <p:nvSpPr>
+          <p:cNvPr id="4098" name="TextBox 2">
+            <a:extLst>
+              <a:ext uri="{FF2B5EF4-FFF2-40B4-BE49-F238E27FC236}">
+                <a16:creationId xmlns:a16="http://schemas.microsoft.com/office/drawing/2014/main" id="{5552ED83-0001-4E47-A09B-F49C592A8E24}"/>
+              </a:ext>
+            </a:extLst>
+          </p:cNvPr>
+          <p:cNvSpPr txBox="1">
+            <a:spLocks noChangeArrowheads="1"/>
+          </p:cNvSpPr>
+          <p:nvPr/>
+        </p:nvSpPr>
+        <p:spPr bwMode="auto">
+          <a:xfrm>
+            <a:off x="-10272" y="0"/>
+            <a:ext cx="8496944" cy="830997"/>
+          </a:xfrm>
+          <a:prstGeom prst="rect">
+            <a:avLst/>
+          </a:prstGeom>
+          <a:noFill/>
+          <a:ln>
+            <a:noFill/>
+          </a:ln>
+          <a:extLst>
+            <a:ext uri="{909E8E84-426E-40DD-AFC4-6F175D3DCCD1}">
+              <a14:hiddenFill xmlns:a14="http://schemas.microsoft.com/office/drawing/2010/main">
+                <a:solidFill>
+                  <a:srgbClr val="FFFFFF"/>
+                </a:solidFill>
+              </a14:hiddenFill>
+            </a:ext>
+            <a:ext uri="{91240B29-F687-4F45-9708-019B960494DF}">
+              <a14:hiddenLine xmlns:a14="http://schemas.microsoft.com/office/drawing/2010/main" w="9525">
+                <a:solidFill>
+                  <a:srgbClr val="000000"/>
+                </a:solidFill>
+                <a:miter lim="800000"/>
+                <a:headEnd/>
+                <a:tailEnd/>
+              </a14:hiddenLine>
+            </a:ext>
+          </a:extLst>
+        </p:spPr>
+        <p:txBody>
+          <a:bodyPr wrap="square">
+            <a:spAutoFit/>
+          </a:bodyPr>
+          <a:lstStyle>
+            <a:lvl1pPr eaLnBrk="0" hangingPunct="0">
+              <a:defRPr>
+                <a:solidFill>
+                  <a:schemeClr val="tx1"/>
+                </a:solidFill>
+                <a:latin typeface="Arial" panose="020B0604020202020204" pitchFamily="34" charset="0"/>
+                <a:ea typeface="宋体" panose="02010600030101010101" pitchFamily="2" charset="-122"/>
+              </a:defRPr>
+            </a:lvl1pPr>
+            <a:lvl2pPr marL="742950" indent="-285750" eaLnBrk="0" hangingPunct="0">
+              <a:defRPr>
+                <a:solidFill>
+                  <a:schemeClr val="tx1"/>
+                </a:solidFill>
+                <a:latin typeface="Arial" panose="020B0604020202020204" pitchFamily="34" charset="0"/>
+                <a:ea typeface="宋体" panose="02010600030101010101" pitchFamily="2" charset="-122"/>
+              </a:defRPr>
+            </a:lvl2pPr>
+            <a:lvl3pPr marL="1143000" indent="-228600" eaLnBrk="0" hangingPunct="0">
+              <a:defRPr>
+                <a:solidFill>
+                  <a:schemeClr val="tx1"/>
+                </a:solidFill>
+                <a:latin typeface="Arial" panose="020B0604020202020204" pitchFamily="34" charset="0"/>
+                <a:ea typeface="宋体" panose="02010600030101010101" pitchFamily="2" charset="-122"/>
+              </a:defRPr>
+            </a:lvl3pPr>
+            <a:lvl4pPr marL="1600200" indent="-228600" eaLnBrk="0" hangingPunct="0">
+              <a:defRPr>
+                <a:solidFill>
+                  <a:schemeClr val="tx1"/>
+                </a:solidFill>
+                <a:latin typeface="Arial" panose="020B0604020202020204" pitchFamily="34" charset="0"/>
+                <a:ea typeface="宋体" panose="02010600030101010101" pitchFamily="2" charset="-122"/>
+              </a:defRPr>
+            </a:lvl4pPr>
+            <a:lvl5pPr marL="2057400" indent="-228600" eaLnBrk="0" hangingPunct="0">
+              <a:defRPr>
+                <a:solidFill>
+                  <a:schemeClr val="tx1"/>
+                </a:solidFill>
+                <a:latin typeface="Arial" panose="020B0604020202020204" pitchFamily="34" charset="0"/>
+                <a:ea typeface="宋体" panose="02010600030101010101" pitchFamily="2" charset="-122"/>
+              </a:defRPr>
+            </a:lvl5pPr>
+            <a:lvl6pPr marL="2514600" indent="-228600" eaLnBrk="0" fontAlgn="base" hangingPunct="0">
+              <a:spcBef>
+                <a:spcPct val="0"/>
+              </a:spcBef>
+              <a:spcAft>
+                <a:spcPct val="0"/>
+              </a:spcAft>
+              <a:defRPr>
+                <a:solidFill>
+                  <a:schemeClr val="tx1"/>
+                </a:solidFill>
+                <a:latin typeface="Arial" panose="020B0604020202020204" pitchFamily="34" charset="0"/>
+                <a:ea typeface="宋体" panose="02010600030101010101" pitchFamily="2" charset="-122"/>
+              </a:defRPr>
+            </a:lvl6pPr>
+            <a:lvl7pPr marL="2971800" indent="-228600" eaLnBrk="0" fontAlgn="base" hangingPunct="0">
+              <a:spcBef>
+                <a:spcPct val="0"/>
+              </a:spcBef>
+              <a:spcAft>
+                <a:spcPct val="0"/>
+              </a:spcAft>
+              <a:defRPr>
+                <a:solidFill>
+                  <a:schemeClr val="tx1"/>
+                </a:solidFill>
+                <a:latin typeface="Arial" panose="020B0604020202020204" pitchFamily="34" charset="0"/>
+                <a:ea typeface="宋体" panose="02010600030101010101" pitchFamily="2" charset="-122"/>
+              </a:defRPr>
+            </a:lvl7pPr>
+            <a:lvl8pPr marL="3429000" indent="-228600" eaLnBrk="0" fontAlgn="base" hangingPunct="0">
+              <a:spcBef>
+                <a:spcPct val="0"/>
+              </a:spcBef>
+              <a:spcAft>
+                <a:spcPct val="0"/>
+              </a:spcAft>
+              <a:defRPr>
+                <a:solidFill>
+                  <a:schemeClr val="tx1"/>
+                </a:solidFill>
+                <a:latin typeface="Arial" panose="020B0604020202020204" pitchFamily="34" charset="0"/>
+                <a:ea typeface="宋体" panose="02010600030101010101" pitchFamily="2" charset="-122"/>
+              </a:defRPr>
+            </a:lvl8pPr>
+            <a:lvl9pPr marL="3886200" indent="-228600" eaLnBrk="0" fontAlgn="base" hangingPunct="0">
+              <a:spcBef>
+                <a:spcPct val="0"/>
+              </a:spcBef>
+              <a:spcAft>
+                <a:spcPct val="0"/>
+              </a:spcAft>
+              <a:defRPr>
+                <a:solidFill>
+                  <a:schemeClr val="tx1"/>
+                </a:solidFill>
+                <a:latin typeface="Arial" panose="020B0604020202020204" pitchFamily="34" charset="0"/>
+                <a:ea typeface="宋体" panose="02010600030101010101" pitchFamily="2" charset="-122"/>
+              </a:defRPr>
+            </a:lvl9pPr>
+          </a:lstStyle>
+          <a:p>
+            <a:pPr eaLnBrk="1" hangingPunct="1"/>
+            <a:r>
+              <a:rPr lang="en-US" altLang="zh-CN" sz="4800" dirty="0">
+                <a:solidFill>
+                  <a:schemeClr val="bg1"/>
+                </a:solidFill>
+                <a:latin typeface="微软雅黑" panose="020B0503020204020204" pitchFamily="34" charset="-122"/>
+                <a:ea typeface="微软雅黑" panose="020B0503020204020204" pitchFamily="34" charset="-122"/>
+              </a:rPr>
+              <a:t>Python</a:t>
+            </a:r>
+            <a:r>
+              <a:rPr lang="zh-CN" altLang="en-US" sz="4800" dirty="0">
+                <a:solidFill>
+                  <a:schemeClr val="bg1"/>
+                </a:solidFill>
+                <a:latin typeface="微软雅黑" panose="020B0503020204020204" pitchFamily="34" charset="-122"/>
+                <a:ea typeface="微软雅黑" panose="020B0503020204020204" pitchFamily="34" charset="-122"/>
+              </a:rPr>
+              <a:t> </a:t>
+            </a:r>
+            <a:r>
+              <a:rPr lang="en-US" altLang="zh-CN" sz="4800" dirty="0">
+                <a:solidFill>
+                  <a:schemeClr val="bg1"/>
+                </a:solidFill>
+                <a:latin typeface="微软雅黑" panose="020B0503020204020204" pitchFamily="34" charset="-122"/>
+                <a:ea typeface="微软雅黑" panose="020B0503020204020204" pitchFamily="34" charset="-122"/>
+              </a:rPr>
+              <a:t>– </a:t>
+            </a:r>
+            <a:r>
+              <a:rPr lang="zh-CN" altLang="en-US" sz="4000" dirty="0">
+                <a:solidFill>
+                  <a:schemeClr val="bg1"/>
+                </a:solidFill>
+                <a:latin typeface="微软雅黑" panose="020B0503020204020204" pitchFamily="34" charset="-122"/>
+                <a:ea typeface="微软雅黑" panose="020B0503020204020204" pitchFamily="34" charset="-122"/>
+              </a:rPr>
+              <a:t>高级特性 </a:t>
+            </a:r>
+            <a:r>
+              <a:rPr lang="en-US" altLang="zh-CN" sz="4000" dirty="0">
+                <a:solidFill>
+                  <a:schemeClr val="bg1"/>
+                </a:solidFill>
+                <a:latin typeface="微软雅黑" panose="020B0503020204020204" pitchFamily="34" charset="-122"/>
+                <a:ea typeface="微软雅黑" panose="020B0503020204020204" pitchFamily="34" charset="-122"/>
+              </a:rPr>
+              <a:t>Generator</a:t>
+            </a:r>
+            <a:endParaRPr lang="zh-CN" altLang="en-US" sz="4800" dirty="0">
+              <a:solidFill>
+                <a:schemeClr val="bg1"/>
+              </a:solidFill>
+              <a:latin typeface="微软雅黑" panose="020B0503020204020204" pitchFamily="34" charset="-122"/>
+              <a:ea typeface="微软雅黑" panose="020B0503020204020204" pitchFamily="34" charset="-122"/>
+            </a:endParaRPr>
+          </a:p>
+        </p:txBody>
+      </p:sp>
+      <p:sp>
+        <p:nvSpPr>
+          <p:cNvPr id="5" name="TextBox 4">
+            <a:extLst>
+              <a:ext uri="{FF2B5EF4-FFF2-40B4-BE49-F238E27FC236}">
+                <a16:creationId xmlns:a16="http://schemas.microsoft.com/office/drawing/2014/main" id="{E8A991AE-3688-4E36-95ED-0003B8B99099}"/>
+              </a:ext>
+            </a:extLst>
+          </p:cNvPr>
+          <p:cNvSpPr txBox="1"/>
+          <p:nvPr/>
+        </p:nvSpPr>
+        <p:spPr>
+          <a:xfrm>
+            <a:off x="107317" y="4581128"/>
+            <a:ext cx="8929365" cy="1938992"/>
+          </a:xfrm>
+          <a:prstGeom prst="rect">
+            <a:avLst/>
+          </a:prstGeom>
+          <a:noFill/>
+        </p:spPr>
+        <p:txBody>
+          <a:bodyPr wrap="square">
+            <a:spAutoFit/>
+          </a:bodyPr>
+          <a:lstStyle/>
+          <a:p>
+            <a:pPr>
+              <a:spcBef>
+                <a:spcPts val="600"/>
+              </a:spcBef>
+              <a:defRPr/>
+            </a:pPr>
+            <a:r>
+              <a:rPr lang="zh-CN" altLang="en-US" sz="4000" dirty="0">
+                <a:solidFill>
+                  <a:schemeClr val="bg1"/>
+                </a:solidFill>
+                <a:latin typeface="微软雅黑" pitchFamily="34" charset="-122"/>
+                <a:ea typeface="微软雅黑" pitchFamily="34" charset="-122"/>
+              </a:rPr>
+              <a:t>这种方式有个问题：一次过把所有数字生成出来，会占用大量内存，然而我们并不需要同时使用所有数字</a:t>
+            </a:r>
+            <a:endParaRPr lang="en-US" altLang="zh-CN" sz="4000" dirty="0">
+              <a:solidFill>
+                <a:schemeClr val="bg1"/>
+              </a:solidFill>
+              <a:latin typeface="微软雅黑" pitchFamily="34" charset="-122"/>
+              <a:ea typeface="微软雅黑" pitchFamily="34" charset="-122"/>
+            </a:endParaRPr>
+          </a:p>
+        </p:txBody>
+      </p:sp>
+      <p:pic>
+        <p:nvPicPr>
+          <p:cNvPr id="2" name="Picture 1">
+            <a:extLst>
+              <a:ext uri="{FF2B5EF4-FFF2-40B4-BE49-F238E27FC236}">
+                <a16:creationId xmlns:a16="http://schemas.microsoft.com/office/drawing/2014/main" id="{D015293E-EEDC-413C-ACF9-3CCDC7895A21}"/>
+              </a:ext>
+            </a:extLst>
+          </p:cNvPr>
+          <p:cNvPicPr>
+            <a:picLocks noChangeAspect="1"/>
+          </p:cNvPicPr>
+          <p:nvPr/>
+        </p:nvPicPr>
+        <p:blipFill>
+          <a:blip r:embed="rId2"/>
+          <a:stretch>
+            <a:fillRect/>
+          </a:stretch>
+        </p:blipFill>
+        <p:spPr>
+          <a:xfrm>
+            <a:off x="209564" y="849511"/>
+            <a:ext cx="8486672" cy="3518496"/>
+          </a:xfrm>
+          <a:prstGeom prst="rect">
+            <a:avLst/>
+          </a:prstGeom>
+        </p:spPr>
+      </p:pic>
+    </p:spTree>
+    <p:extLst>
+      <p:ext uri="{BB962C8B-B14F-4D97-AF65-F5344CB8AC3E}">
+        <p14:creationId xmlns:p14="http://schemas.microsoft.com/office/powerpoint/2010/main" val="2165366542"/>
+      </p:ext>
+    </p:extLst>
+  </p:cSld>
+  <p:clrMapOvr>
+    <a:masterClrMapping/>
+  </p:clrMapOvr>
+</p:sld>
+</file>
+
+<file path=ppt/slides/slide41.xml><?xml version="1.0" encoding="utf-8"?>
+<p:sld xmlns:a="http://schemas.openxmlformats.org/drawingml/2006/main" xmlns:r="http://schemas.openxmlformats.org/officeDocument/2006/relationships" xmlns:p="http://schemas.openxmlformats.org/presentationml/2006/main">
+  <p:cSld>
+    <p:spTree>
+      <p:nvGrpSpPr>
+        <p:cNvPr id="1" name=""/>
+        <p:cNvGrpSpPr/>
+        <p:nvPr/>
+      </p:nvGrpSpPr>
+      <p:grpSpPr>
+        <a:xfrm>
+          <a:off x="0" y="0"/>
+          <a:ext cx="0" cy="0"/>
+          <a:chOff x="0" y="0"/>
+          <a:chExt cx="0" cy="0"/>
+        </a:xfrm>
+      </p:grpSpPr>
+      <p:sp>
+        <p:nvSpPr>
+          <p:cNvPr id="4098" name="TextBox 2">
+            <a:extLst>
+              <a:ext uri="{FF2B5EF4-FFF2-40B4-BE49-F238E27FC236}">
+                <a16:creationId xmlns:a16="http://schemas.microsoft.com/office/drawing/2014/main" id="{5552ED83-0001-4E47-A09B-F49C592A8E24}"/>
+              </a:ext>
+            </a:extLst>
+          </p:cNvPr>
+          <p:cNvSpPr txBox="1">
+            <a:spLocks noChangeArrowheads="1"/>
+          </p:cNvSpPr>
+          <p:nvPr/>
+        </p:nvSpPr>
+        <p:spPr bwMode="auto">
+          <a:xfrm>
+            <a:off x="-10272" y="0"/>
+            <a:ext cx="8496944" cy="830997"/>
+          </a:xfrm>
+          <a:prstGeom prst="rect">
+            <a:avLst/>
+          </a:prstGeom>
+          <a:noFill/>
+          <a:ln>
+            <a:noFill/>
+          </a:ln>
+          <a:extLst>
+            <a:ext uri="{909E8E84-426E-40DD-AFC4-6F175D3DCCD1}">
+              <a14:hiddenFill xmlns:a14="http://schemas.microsoft.com/office/drawing/2010/main">
+                <a:solidFill>
+                  <a:srgbClr val="FFFFFF"/>
+                </a:solidFill>
+              </a14:hiddenFill>
+            </a:ext>
+            <a:ext uri="{91240B29-F687-4F45-9708-019B960494DF}">
+              <a14:hiddenLine xmlns:a14="http://schemas.microsoft.com/office/drawing/2010/main" w="9525">
+                <a:solidFill>
+                  <a:srgbClr val="000000"/>
+                </a:solidFill>
+                <a:miter lim="800000"/>
+                <a:headEnd/>
+                <a:tailEnd/>
+              </a14:hiddenLine>
+            </a:ext>
+          </a:extLst>
+        </p:spPr>
+        <p:txBody>
+          <a:bodyPr wrap="square">
+            <a:spAutoFit/>
+          </a:bodyPr>
+          <a:lstStyle>
+            <a:lvl1pPr eaLnBrk="0" hangingPunct="0">
+              <a:defRPr>
+                <a:solidFill>
+                  <a:schemeClr val="tx1"/>
+                </a:solidFill>
+                <a:latin typeface="Arial" panose="020B0604020202020204" pitchFamily="34" charset="0"/>
+                <a:ea typeface="宋体" panose="02010600030101010101" pitchFamily="2" charset="-122"/>
+              </a:defRPr>
+            </a:lvl1pPr>
+            <a:lvl2pPr marL="742950" indent="-285750" eaLnBrk="0" hangingPunct="0">
+              <a:defRPr>
+                <a:solidFill>
+                  <a:schemeClr val="tx1"/>
+                </a:solidFill>
+                <a:latin typeface="Arial" panose="020B0604020202020204" pitchFamily="34" charset="0"/>
+                <a:ea typeface="宋体" panose="02010600030101010101" pitchFamily="2" charset="-122"/>
+              </a:defRPr>
+            </a:lvl2pPr>
+            <a:lvl3pPr marL="1143000" indent="-228600" eaLnBrk="0" hangingPunct="0">
+              <a:defRPr>
+                <a:solidFill>
+                  <a:schemeClr val="tx1"/>
+                </a:solidFill>
+                <a:latin typeface="Arial" panose="020B0604020202020204" pitchFamily="34" charset="0"/>
+                <a:ea typeface="宋体" panose="02010600030101010101" pitchFamily="2" charset="-122"/>
+              </a:defRPr>
+            </a:lvl3pPr>
+            <a:lvl4pPr marL="1600200" indent="-228600" eaLnBrk="0" hangingPunct="0">
+              <a:defRPr>
+                <a:solidFill>
+                  <a:schemeClr val="tx1"/>
+                </a:solidFill>
+                <a:latin typeface="Arial" panose="020B0604020202020204" pitchFamily="34" charset="0"/>
+                <a:ea typeface="宋体" panose="02010600030101010101" pitchFamily="2" charset="-122"/>
+              </a:defRPr>
+            </a:lvl4pPr>
+            <a:lvl5pPr marL="2057400" indent="-228600" eaLnBrk="0" hangingPunct="0">
+              <a:defRPr>
+                <a:solidFill>
+                  <a:schemeClr val="tx1"/>
+                </a:solidFill>
+                <a:latin typeface="Arial" panose="020B0604020202020204" pitchFamily="34" charset="0"/>
+                <a:ea typeface="宋体" panose="02010600030101010101" pitchFamily="2" charset="-122"/>
+              </a:defRPr>
+            </a:lvl5pPr>
+            <a:lvl6pPr marL="2514600" indent="-228600" eaLnBrk="0" fontAlgn="base" hangingPunct="0">
+              <a:spcBef>
+                <a:spcPct val="0"/>
+              </a:spcBef>
+              <a:spcAft>
+                <a:spcPct val="0"/>
+              </a:spcAft>
+              <a:defRPr>
+                <a:solidFill>
+                  <a:schemeClr val="tx1"/>
+                </a:solidFill>
+                <a:latin typeface="Arial" panose="020B0604020202020204" pitchFamily="34" charset="0"/>
+                <a:ea typeface="宋体" panose="02010600030101010101" pitchFamily="2" charset="-122"/>
+              </a:defRPr>
+            </a:lvl6pPr>
+            <a:lvl7pPr marL="2971800" indent="-228600" eaLnBrk="0" fontAlgn="base" hangingPunct="0">
+              <a:spcBef>
+                <a:spcPct val="0"/>
+              </a:spcBef>
+              <a:spcAft>
+                <a:spcPct val="0"/>
+              </a:spcAft>
+              <a:defRPr>
+                <a:solidFill>
+                  <a:schemeClr val="tx1"/>
+                </a:solidFill>
+                <a:latin typeface="Arial" panose="020B0604020202020204" pitchFamily="34" charset="0"/>
+                <a:ea typeface="宋体" panose="02010600030101010101" pitchFamily="2" charset="-122"/>
+              </a:defRPr>
+            </a:lvl7pPr>
+            <a:lvl8pPr marL="3429000" indent="-228600" eaLnBrk="0" fontAlgn="base" hangingPunct="0">
+              <a:spcBef>
+                <a:spcPct val="0"/>
+              </a:spcBef>
+              <a:spcAft>
+                <a:spcPct val="0"/>
+              </a:spcAft>
+              <a:defRPr>
+                <a:solidFill>
+                  <a:schemeClr val="tx1"/>
+                </a:solidFill>
+                <a:latin typeface="Arial" panose="020B0604020202020204" pitchFamily="34" charset="0"/>
+                <a:ea typeface="宋体" panose="02010600030101010101" pitchFamily="2" charset="-122"/>
+              </a:defRPr>
+            </a:lvl8pPr>
+            <a:lvl9pPr marL="3886200" indent="-228600" eaLnBrk="0" fontAlgn="base" hangingPunct="0">
+              <a:spcBef>
+                <a:spcPct val="0"/>
+              </a:spcBef>
+              <a:spcAft>
+                <a:spcPct val="0"/>
+              </a:spcAft>
+              <a:defRPr>
+                <a:solidFill>
+                  <a:schemeClr val="tx1"/>
+                </a:solidFill>
+                <a:latin typeface="Arial" panose="020B0604020202020204" pitchFamily="34" charset="0"/>
+                <a:ea typeface="宋体" panose="02010600030101010101" pitchFamily="2" charset="-122"/>
+              </a:defRPr>
+            </a:lvl9pPr>
+          </a:lstStyle>
+          <a:p>
+            <a:pPr eaLnBrk="1" hangingPunct="1"/>
+            <a:r>
+              <a:rPr lang="en-US" altLang="zh-CN" sz="4800" dirty="0">
+                <a:solidFill>
+                  <a:schemeClr val="bg1"/>
+                </a:solidFill>
+                <a:latin typeface="微软雅黑" panose="020B0503020204020204" pitchFamily="34" charset="-122"/>
+                <a:ea typeface="微软雅黑" panose="020B0503020204020204" pitchFamily="34" charset="-122"/>
+              </a:rPr>
+              <a:t>Python</a:t>
+            </a:r>
+            <a:r>
+              <a:rPr lang="zh-CN" altLang="en-US" sz="4800" dirty="0">
+                <a:solidFill>
+                  <a:schemeClr val="bg1"/>
+                </a:solidFill>
+                <a:latin typeface="微软雅黑" panose="020B0503020204020204" pitchFamily="34" charset="-122"/>
+                <a:ea typeface="微软雅黑" panose="020B0503020204020204" pitchFamily="34" charset="-122"/>
+              </a:rPr>
+              <a:t> </a:t>
+            </a:r>
+            <a:r>
+              <a:rPr lang="en-US" altLang="zh-CN" sz="4800" dirty="0">
+                <a:solidFill>
+                  <a:schemeClr val="bg1"/>
+                </a:solidFill>
+                <a:latin typeface="微软雅黑" panose="020B0503020204020204" pitchFamily="34" charset="-122"/>
+                <a:ea typeface="微软雅黑" panose="020B0503020204020204" pitchFamily="34" charset="-122"/>
+              </a:rPr>
+              <a:t>– </a:t>
+            </a:r>
+            <a:r>
+              <a:rPr lang="zh-CN" altLang="en-US" sz="4000" dirty="0">
+                <a:solidFill>
+                  <a:schemeClr val="bg1"/>
+                </a:solidFill>
+                <a:latin typeface="微软雅黑" panose="020B0503020204020204" pitchFamily="34" charset="-122"/>
+                <a:ea typeface="微软雅黑" panose="020B0503020204020204" pitchFamily="34" charset="-122"/>
+              </a:rPr>
+              <a:t>高级特性 </a:t>
+            </a:r>
+            <a:r>
+              <a:rPr lang="en-US" altLang="zh-CN" sz="4000" dirty="0">
+                <a:solidFill>
+                  <a:schemeClr val="bg1"/>
+                </a:solidFill>
+                <a:latin typeface="微软雅黑" panose="020B0503020204020204" pitchFamily="34" charset="-122"/>
+                <a:ea typeface="微软雅黑" panose="020B0503020204020204" pitchFamily="34" charset="-122"/>
+              </a:rPr>
+              <a:t>Generator</a:t>
+            </a:r>
+            <a:endParaRPr lang="zh-CN" altLang="en-US" sz="4800" dirty="0">
+              <a:solidFill>
+                <a:schemeClr val="bg1"/>
+              </a:solidFill>
+              <a:latin typeface="微软雅黑" panose="020B0503020204020204" pitchFamily="34" charset="-122"/>
+              <a:ea typeface="微软雅黑" panose="020B0503020204020204" pitchFamily="34" charset="-122"/>
+            </a:endParaRPr>
+          </a:p>
+        </p:txBody>
+      </p:sp>
+      <p:sp>
+        <p:nvSpPr>
+          <p:cNvPr id="5" name="TextBox 4">
+            <a:extLst>
+              <a:ext uri="{FF2B5EF4-FFF2-40B4-BE49-F238E27FC236}">
+                <a16:creationId xmlns:a16="http://schemas.microsoft.com/office/drawing/2014/main" id="{E8A991AE-3688-4E36-95ED-0003B8B99099}"/>
+              </a:ext>
+            </a:extLst>
+          </p:cNvPr>
+          <p:cNvSpPr txBox="1"/>
+          <p:nvPr/>
+        </p:nvSpPr>
+        <p:spPr>
+          <a:xfrm>
+            <a:off x="107317" y="830997"/>
+            <a:ext cx="8929365" cy="1938992"/>
+          </a:xfrm>
+          <a:prstGeom prst="rect">
+            <a:avLst/>
+          </a:prstGeom>
+          <a:noFill/>
+        </p:spPr>
+        <p:txBody>
+          <a:bodyPr wrap="square">
+            <a:spAutoFit/>
+          </a:bodyPr>
+          <a:lstStyle/>
+          <a:p>
+            <a:pPr>
+              <a:spcBef>
+                <a:spcPts val="600"/>
+              </a:spcBef>
+              <a:defRPr/>
+            </a:pPr>
+            <a:r>
+              <a:rPr lang="en-US" altLang="zh-CN" sz="4000" dirty="0">
+                <a:solidFill>
+                  <a:schemeClr val="bg1"/>
+                </a:solidFill>
+                <a:latin typeface="微软雅黑" pitchFamily="34" charset="-122"/>
+                <a:ea typeface="微软雅黑" pitchFamily="34" charset="-122"/>
+              </a:rPr>
+              <a:t>Python</a:t>
+            </a:r>
+            <a:r>
+              <a:rPr lang="zh-CN" altLang="en-US" sz="4000" dirty="0">
+                <a:solidFill>
+                  <a:schemeClr val="bg1"/>
+                </a:solidFill>
+                <a:latin typeface="微软雅黑" pitchFamily="34" charset="-122"/>
+                <a:ea typeface="微软雅黑" pitchFamily="34" charset="-122"/>
+              </a:rPr>
+              <a:t>的生成器实际上是一个</a:t>
+            </a:r>
+            <a:r>
+              <a:rPr lang="zh-CN" altLang="en-US" sz="4000" dirty="0">
+                <a:solidFill>
+                  <a:srgbClr val="FFC000"/>
+                </a:solidFill>
+                <a:latin typeface="微软雅黑" pitchFamily="34" charset="-122"/>
+                <a:ea typeface="微软雅黑" pitchFamily="34" charset="-122"/>
+              </a:rPr>
+              <a:t>函数</a:t>
+            </a:r>
+            <a:r>
+              <a:rPr lang="zh-CN" altLang="en-US" sz="4000" dirty="0">
+                <a:solidFill>
+                  <a:schemeClr val="bg1"/>
+                </a:solidFill>
+                <a:latin typeface="微软雅黑" pitchFamily="34" charset="-122"/>
+                <a:ea typeface="微软雅黑" pitchFamily="34" charset="-122"/>
+              </a:rPr>
+              <a:t>，每一次执行可以返回一个值，然后暂停在</a:t>
+            </a:r>
+            <a:r>
+              <a:rPr lang="zh-CN" altLang="en-US" sz="4000" dirty="0">
+                <a:solidFill>
+                  <a:srgbClr val="FFC000"/>
+                </a:solidFill>
+                <a:latin typeface="微软雅黑" pitchFamily="34" charset="-122"/>
+                <a:ea typeface="微软雅黑" pitchFamily="34" charset="-122"/>
+              </a:rPr>
+              <a:t>关键字</a:t>
+            </a:r>
+            <a:r>
+              <a:rPr lang="en-US" altLang="zh-CN" sz="4000" dirty="0">
+                <a:solidFill>
+                  <a:srgbClr val="FFC000"/>
+                </a:solidFill>
+                <a:latin typeface="微软雅黑" pitchFamily="34" charset="-122"/>
+                <a:ea typeface="微软雅黑" pitchFamily="34" charset="-122"/>
+              </a:rPr>
+              <a:t>yield</a:t>
+            </a:r>
+            <a:r>
+              <a:rPr lang="zh-CN" altLang="en-US" sz="4000" dirty="0">
+                <a:solidFill>
+                  <a:schemeClr val="bg1"/>
+                </a:solidFill>
+                <a:latin typeface="微软雅黑" pitchFamily="34" charset="-122"/>
+                <a:ea typeface="微软雅黑" pitchFamily="34" charset="-122"/>
+              </a:rPr>
+              <a:t>的地方</a:t>
+            </a:r>
+            <a:endParaRPr lang="en-US" altLang="zh-CN" sz="4000" dirty="0">
+              <a:solidFill>
+                <a:schemeClr val="bg1"/>
+              </a:solidFill>
+              <a:latin typeface="微软雅黑" pitchFamily="34" charset="-122"/>
+              <a:ea typeface="微软雅黑" pitchFamily="34" charset="-122"/>
+            </a:endParaRPr>
+          </a:p>
+        </p:txBody>
+      </p:sp>
+      <p:pic>
+        <p:nvPicPr>
+          <p:cNvPr id="3" name="Picture 2">
+            <a:extLst>
+              <a:ext uri="{FF2B5EF4-FFF2-40B4-BE49-F238E27FC236}">
+                <a16:creationId xmlns:a16="http://schemas.microsoft.com/office/drawing/2014/main" id="{E71A6CB0-1035-4BD1-8D32-32E1642733E5}"/>
+              </a:ext>
+            </a:extLst>
+          </p:cNvPr>
+          <p:cNvPicPr>
+            <a:picLocks noChangeAspect="1"/>
+          </p:cNvPicPr>
+          <p:nvPr/>
+        </p:nvPicPr>
+        <p:blipFill>
+          <a:blip r:embed="rId2"/>
+          <a:stretch>
+            <a:fillRect/>
+          </a:stretch>
+        </p:blipFill>
+        <p:spPr>
+          <a:xfrm>
+            <a:off x="68691" y="2996952"/>
+            <a:ext cx="9006617" cy="3174067"/>
+          </a:xfrm>
+          <a:prstGeom prst="rect">
+            <a:avLst/>
+          </a:prstGeom>
+        </p:spPr>
+      </p:pic>
+      <p:sp>
+        <p:nvSpPr>
+          <p:cNvPr id="6" name="Rectangle 5">
+            <a:extLst>
+              <a:ext uri="{FF2B5EF4-FFF2-40B4-BE49-F238E27FC236}">
+                <a16:creationId xmlns:a16="http://schemas.microsoft.com/office/drawing/2014/main" id="{CFA02496-ED91-41FA-B792-6FBBD895BB42}"/>
+              </a:ext>
+            </a:extLst>
+          </p:cNvPr>
+          <p:cNvSpPr/>
+          <p:nvPr/>
+        </p:nvSpPr>
+        <p:spPr>
+          <a:xfrm>
+            <a:off x="2195736" y="4935944"/>
+            <a:ext cx="3672408" cy="653296"/>
+          </a:xfrm>
+          <a:prstGeom prst="rect">
+            <a:avLst/>
+          </a:prstGeom>
+          <a:noFill/>
+          <a:ln>
+            <a:solidFill>
+              <a:srgbClr val="FFFF00"/>
+            </a:solidFill>
+          </a:ln>
+        </p:spPr>
+        <p:style>
+          <a:lnRef idx="2">
+            <a:schemeClr val="accent1">
+              <a:shade val="50000"/>
+            </a:schemeClr>
+          </a:lnRef>
+          <a:fillRef idx="1">
+            <a:schemeClr val="accent1"/>
+          </a:fillRef>
+          <a:effectRef idx="0">
+            <a:schemeClr val="accent1"/>
+          </a:effectRef>
+          <a:fontRef idx="minor">
+            <a:schemeClr val="lt1"/>
+          </a:fontRef>
+        </p:style>
+        <p:txBody>
+          <a:bodyPr rtlCol="0" anchor="ctr"/>
+          <a:lstStyle/>
+          <a:p>
+            <a:pPr algn="ctr"/>
+            <a:endParaRPr lang="en-US"/>
+          </a:p>
+        </p:txBody>
+      </p:sp>
+    </p:spTree>
+    <p:extLst>
+      <p:ext uri="{BB962C8B-B14F-4D97-AF65-F5344CB8AC3E}">
+        <p14:creationId xmlns:p14="http://schemas.microsoft.com/office/powerpoint/2010/main" val="4169755658"/>
+      </p:ext>
+    </p:extLst>
+  </p:cSld>
+  <p:clrMapOvr>
+    <a:masterClrMapping/>
+  </p:clrMapOvr>
+  <p:timing>
+    <p:tnLst>
+      <p:par>
+        <p:cTn id="1" dur="indefinite" restart="never" nodeType="tmRoot">
+          <p:childTnLst>
+            <p:seq concurrent="1" nextAc="seek">
+              <p:cTn id="2" dur="indefinite" nodeType="mainSeq">
+                <p:childTnLst>
+                  <p:par>
+                    <p:cTn id="3" fill="hold">
+                      <p:stCondLst>
+                        <p:cond delay="indefinite"/>
+                      </p:stCondLst>
+                      <p:childTnLst>
+                        <p:par>
+                          <p:cTn id="4" fill="hold">
+                            <p:stCondLst>
+                              <p:cond delay="0"/>
+                            </p:stCondLst>
+                            <p:childTnLst>
+                              <p:par>
+                                <p:cTn id="5" presetID="2" presetClass="entr" presetSubtype="4" fill="hold" grpId="0" nodeType="clickEffect">
+                                  <p:stCondLst>
+                                    <p:cond delay="0"/>
+                                  </p:stCondLst>
+                                  <p:childTnLst>
+                                    <p:set>
+                                      <p:cBhvr>
+                                        <p:cTn id="6" dur="1" fill="hold">
+                                          <p:stCondLst>
+                                            <p:cond delay="0"/>
+                                          </p:stCondLst>
+                                        </p:cTn>
+                                        <p:tgtEl>
+                                          <p:spTgt spid="6"/>
+                                        </p:tgtEl>
+                                        <p:attrNameLst>
+                                          <p:attrName>style.visibility</p:attrName>
+                                        </p:attrNameLst>
+                                      </p:cBhvr>
+                                      <p:to>
+                                        <p:strVal val="visible"/>
+                                      </p:to>
+                                    </p:set>
+                                    <p:anim calcmode="lin" valueType="num">
+                                      <p:cBhvr additive="base">
+                                        <p:cTn id="7" dur="500" fill="hold"/>
+                                        <p:tgtEl>
+                                          <p:spTgt spid="6"/>
+                                        </p:tgtEl>
+                                        <p:attrNameLst>
+                                          <p:attrName>ppt_x</p:attrName>
+                                        </p:attrNameLst>
+                                      </p:cBhvr>
+                                      <p:tavLst>
+                                        <p:tav tm="0">
+                                          <p:val>
+                                            <p:strVal val="#ppt_x"/>
+                                          </p:val>
+                                        </p:tav>
+                                        <p:tav tm="100000">
+                                          <p:val>
+                                            <p:strVal val="#ppt_x"/>
+                                          </p:val>
+                                        </p:tav>
+                                      </p:tavLst>
+                                    </p:anim>
+                                    <p:anim calcmode="lin" valueType="num">
+                                      <p:cBhvr additive="base">
+                                        <p:cTn id="8" dur="500" fill="hold"/>
+                                        <p:tgtEl>
+                                          <p:spTgt spid="6"/>
+                                        </p:tgtEl>
+                                        <p:attrNameLst>
+                                          <p:attrName>ppt_y</p:attrName>
+                                        </p:attrNameLst>
+                                      </p:cBhvr>
+                                      <p:tavLst>
+                                        <p:tav tm="0">
+                                          <p:val>
+                                            <p:strVal val="1+#ppt_h/2"/>
+                                          </p:val>
+                                        </p:tav>
+                                        <p:tav tm="100000">
+                                          <p:val>
+                                            <p:strVal val="#ppt_y"/>
+                                          </p:val>
+                                        </p:tav>
+                                      </p:tavLst>
+                                    </p:anim>
+                                  </p:childTnLst>
+                                </p:cTn>
+                              </p:par>
+                            </p:childTnLst>
+                          </p:cTn>
+                        </p:par>
+                      </p:childTnLst>
+                    </p:cTn>
+                  </p:par>
+                </p:childTnLst>
+              </p:cTn>
+              <p:prevCondLst>
+                <p:cond evt="onPrev" delay="0">
+                  <p:tgtEl>
+                    <p:sldTgt/>
+                  </p:tgtEl>
+                </p:cond>
+              </p:prevCondLst>
+              <p:nextCondLst>
+                <p:cond evt="onNext" delay="0">
+                  <p:tgtEl>
+                    <p:sldTgt/>
+                  </p:tgtEl>
+                </p:cond>
+              </p:nextCondLst>
+            </p:seq>
+          </p:childTnLst>
+        </p:cTn>
+      </p:par>
+    </p:tnLst>
+    <p:bldLst>
+      <p:bldP spid="6" grpId="0" animBg="1"/>
+    </p:bldLst>
+  </p:timing>
+</p:sld>
+</file>
+
+<file path=ppt/slides/slide42.xml><?xml version="1.0" encoding="utf-8"?>
+<p:sld xmlns:a="http://schemas.openxmlformats.org/drawingml/2006/main" xmlns:r="http://schemas.openxmlformats.org/officeDocument/2006/relationships" xmlns:p="http://schemas.openxmlformats.org/presentationml/2006/main">
+  <p:cSld>
+    <p:spTree>
+      <p:nvGrpSpPr>
+        <p:cNvPr id="1" name=""/>
+        <p:cNvGrpSpPr/>
+        <p:nvPr/>
+      </p:nvGrpSpPr>
+      <p:grpSpPr>
+        <a:xfrm>
+          <a:off x="0" y="0"/>
+          <a:ext cx="0" cy="0"/>
+          <a:chOff x="0" y="0"/>
+          <a:chExt cx="0" cy="0"/>
+        </a:xfrm>
+      </p:grpSpPr>
+      <p:sp>
+        <p:nvSpPr>
+          <p:cNvPr id="4098" name="TextBox 2">
+            <a:extLst>
+              <a:ext uri="{FF2B5EF4-FFF2-40B4-BE49-F238E27FC236}">
+                <a16:creationId xmlns:a16="http://schemas.microsoft.com/office/drawing/2014/main" id="{5552ED83-0001-4E47-A09B-F49C592A8E24}"/>
+              </a:ext>
+            </a:extLst>
+          </p:cNvPr>
+          <p:cNvSpPr txBox="1">
+            <a:spLocks noChangeArrowheads="1"/>
+          </p:cNvSpPr>
+          <p:nvPr/>
+        </p:nvSpPr>
+        <p:spPr bwMode="auto">
+          <a:xfrm>
+            <a:off x="-10272" y="0"/>
+            <a:ext cx="8496944" cy="830997"/>
+          </a:xfrm>
+          <a:prstGeom prst="rect">
+            <a:avLst/>
+          </a:prstGeom>
+          <a:noFill/>
+          <a:ln>
+            <a:noFill/>
+          </a:ln>
+          <a:extLst>
+            <a:ext uri="{909E8E84-426E-40DD-AFC4-6F175D3DCCD1}">
+              <a14:hiddenFill xmlns:a14="http://schemas.microsoft.com/office/drawing/2010/main">
+                <a:solidFill>
+                  <a:srgbClr val="FFFFFF"/>
+                </a:solidFill>
+              </a14:hiddenFill>
+            </a:ext>
+            <a:ext uri="{91240B29-F687-4F45-9708-019B960494DF}">
+              <a14:hiddenLine xmlns:a14="http://schemas.microsoft.com/office/drawing/2010/main" w="9525">
+                <a:solidFill>
+                  <a:srgbClr val="000000"/>
+                </a:solidFill>
+                <a:miter lim="800000"/>
+                <a:headEnd/>
+                <a:tailEnd/>
+              </a14:hiddenLine>
+            </a:ext>
+          </a:extLst>
+        </p:spPr>
+        <p:txBody>
+          <a:bodyPr wrap="square">
+            <a:spAutoFit/>
+          </a:bodyPr>
+          <a:lstStyle>
+            <a:lvl1pPr eaLnBrk="0" hangingPunct="0">
+              <a:defRPr>
+                <a:solidFill>
+                  <a:schemeClr val="tx1"/>
+                </a:solidFill>
+                <a:latin typeface="Arial" panose="020B0604020202020204" pitchFamily="34" charset="0"/>
+                <a:ea typeface="宋体" panose="02010600030101010101" pitchFamily="2" charset="-122"/>
+              </a:defRPr>
+            </a:lvl1pPr>
+            <a:lvl2pPr marL="742950" indent="-285750" eaLnBrk="0" hangingPunct="0">
+              <a:defRPr>
+                <a:solidFill>
+                  <a:schemeClr val="tx1"/>
+                </a:solidFill>
+                <a:latin typeface="Arial" panose="020B0604020202020204" pitchFamily="34" charset="0"/>
+                <a:ea typeface="宋体" panose="02010600030101010101" pitchFamily="2" charset="-122"/>
+              </a:defRPr>
+            </a:lvl2pPr>
+            <a:lvl3pPr marL="1143000" indent="-228600" eaLnBrk="0" hangingPunct="0">
+              <a:defRPr>
+                <a:solidFill>
+                  <a:schemeClr val="tx1"/>
+                </a:solidFill>
+                <a:latin typeface="Arial" panose="020B0604020202020204" pitchFamily="34" charset="0"/>
+                <a:ea typeface="宋体" panose="02010600030101010101" pitchFamily="2" charset="-122"/>
+              </a:defRPr>
+            </a:lvl3pPr>
+            <a:lvl4pPr marL="1600200" indent="-228600" eaLnBrk="0" hangingPunct="0">
+              <a:defRPr>
+                <a:solidFill>
+                  <a:schemeClr val="tx1"/>
+                </a:solidFill>
+                <a:latin typeface="Arial" panose="020B0604020202020204" pitchFamily="34" charset="0"/>
+                <a:ea typeface="宋体" panose="02010600030101010101" pitchFamily="2" charset="-122"/>
+              </a:defRPr>
+            </a:lvl4pPr>
+            <a:lvl5pPr marL="2057400" indent="-228600" eaLnBrk="0" hangingPunct="0">
+              <a:defRPr>
+                <a:solidFill>
+                  <a:schemeClr val="tx1"/>
+                </a:solidFill>
+                <a:latin typeface="Arial" panose="020B0604020202020204" pitchFamily="34" charset="0"/>
+                <a:ea typeface="宋体" panose="02010600030101010101" pitchFamily="2" charset="-122"/>
+              </a:defRPr>
+            </a:lvl5pPr>
+            <a:lvl6pPr marL="2514600" indent="-228600" eaLnBrk="0" fontAlgn="base" hangingPunct="0">
+              <a:spcBef>
+                <a:spcPct val="0"/>
+              </a:spcBef>
+              <a:spcAft>
+                <a:spcPct val="0"/>
+              </a:spcAft>
+              <a:defRPr>
+                <a:solidFill>
+                  <a:schemeClr val="tx1"/>
+                </a:solidFill>
+                <a:latin typeface="Arial" panose="020B0604020202020204" pitchFamily="34" charset="0"/>
+                <a:ea typeface="宋体" panose="02010600030101010101" pitchFamily="2" charset="-122"/>
+              </a:defRPr>
+            </a:lvl6pPr>
+            <a:lvl7pPr marL="2971800" indent="-228600" eaLnBrk="0" fontAlgn="base" hangingPunct="0">
+              <a:spcBef>
+                <a:spcPct val="0"/>
+              </a:spcBef>
+              <a:spcAft>
+                <a:spcPct val="0"/>
+              </a:spcAft>
+              <a:defRPr>
+                <a:solidFill>
+                  <a:schemeClr val="tx1"/>
+                </a:solidFill>
+                <a:latin typeface="Arial" panose="020B0604020202020204" pitchFamily="34" charset="0"/>
+                <a:ea typeface="宋体" panose="02010600030101010101" pitchFamily="2" charset="-122"/>
+              </a:defRPr>
+            </a:lvl7pPr>
+            <a:lvl8pPr marL="3429000" indent="-228600" eaLnBrk="0" fontAlgn="base" hangingPunct="0">
+              <a:spcBef>
+                <a:spcPct val="0"/>
+              </a:spcBef>
+              <a:spcAft>
+                <a:spcPct val="0"/>
+              </a:spcAft>
+              <a:defRPr>
+                <a:solidFill>
+                  <a:schemeClr val="tx1"/>
+                </a:solidFill>
+                <a:latin typeface="Arial" panose="020B0604020202020204" pitchFamily="34" charset="0"/>
+                <a:ea typeface="宋体" panose="02010600030101010101" pitchFamily="2" charset="-122"/>
+              </a:defRPr>
+            </a:lvl8pPr>
+            <a:lvl9pPr marL="3886200" indent="-228600" eaLnBrk="0" fontAlgn="base" hangingPunct="0">
+              <a:spcBef>
+                <a:spcPct val="0"/>
+              </a:spcBef>
+              <a:spcAft>
+                <a:spcPct val="0"/>
+              </a:spcAft>
+              <a:defRPr>
+                <a:solidFill>
+                  <a:schemeClr val="tx1"/>
+                </a:solidFill>
+                <a:latin typeface="Arial" panose="020B0604020202020204" pitchFamily="34" charset="0"/>
+                <a:ea typeface="宋体" panose="02010600030101010101" pitchFamily="2" charset="-122"/>
+              </a:defRPr>
+            </a:lvl9pPr>
+          </a:lstStyle>
+          <a:p>
+            <a:pPr eaLnBrk="1" hangingPunct="1"/>
+            <a:r>
+              <a:rPr lang="en-US" altLang="zh-CN" sz="4800" dirty="0">
+                <a:solidFill>
+                  <a:schemeClr val="bg1"/>
+                </a:solidFill>
+                <a:latin typeface="微软雅黑" panose="020B0503020204020204" pitchFamily="34" charset="-122"/>
+                <a:ea typeface="微软雅黑" panose="020B0503020204020204" pitchFamily="34" charset="-122"/>
+              </a:rPr>
+              <a:t>Python</a:t>
+            </a:r>
+            <a:r>
+              <a:rPr lang="zh-CN" altLang="en-US" sz="4800" dirty="0">
+                <a:solidFill>
+                  <a:schemeClr val="bg1"/>
+                </a:solidFill>
+                <a:latin typeface="微软雅黑" panose="020B0503020204020204" pitchFamily="34" charset="-122"/>
+                <a:ea typeface="微软雅黑" panose="020B0503020204020204" pitchFamily="34" charset="-122"/>
+              </a:rPr>
+              <a:t> </a:t>
+            </a:r>
+            <a:r>
+              <a:rPr lang="en-US" altLang="zh-CN" sz="4800" dirty="0">
+                <a:solidFill>
+                  <a:schemeClr val="bg1"/>
+                </a:solidFill>
+                <a:latin typeface="微软雅黑" panose="020B0503020204020204" pitchFamily="34" charset="-122"/>
+                <a:ea typeface="微软雅黑" panose="020B0503020204020204" pitchFamily="34" charset="-122"/>
+              </a:rPr>
+              <a:t>– </a:t>
+            </a:r>
+            <a:r>
+              <a:rPr lang="zh-CN" altLang="en-US" sz="4000" dirty="0">
+                <a:solidFill>
+                  <a:schemeClr val="bg1"/>
+                </a:solidFill>
+                <a:latin typeface="微软雅黑" panose="020B0503020204020204" pitchFamily="34" charset="-122"/>
+                <a:ea typeface="微软雅黑" panose="020B0503020204020204" pitchFamily="34" charset="-122"/>
+              </a:rPr>
+              <a:t>高级特性 </a:t>
+            </a:r>
+            <a:r>
+              <a:rPr lang="en-US" altLang="zh-CN" sz="4000" dirty="0">
+                <a:solidFill>
+                  <a:schemeClr val="bg1"/>
+                </a:solidFill>
+                <a:latin typeface="微软雅黑" panose="020B0503020204020204" pitchFamily="34" charset="-122"/>
+                <a:ea typeface="微软雅黑" panose="020B0503020204020204" pitchFamily="34" charset="-122"/>
+              </a:rPr>
+              <a:t>Generator</a:t>
+            </a:r>
+            <a:endParaRPr lang="zh-CN" altLang="en-US" sz="4800" dirty="0">
+              <a:solidFill>
+                <a:schemeClr val="bg1"/>
+              </a:solidFill>
+              <a:latin typeface="微软雅黑" panose="020B0503020204020204" pitchFamily="34" charset="-122"/>
+              <a:ea typeface="微软雅黑" panose="020B0503020204020204" pitchFamily="34" charset="-122"/>
+            </a:endParaRPr>
+          </a:p>
+        </p:txBody>
+      </p:sp>
+      <p:pic>
+        <p:nvPicPr>
+          <p:cNvPr id="3" name="Picture 2">
+            <a:extLst>
+              <a:ext uri="{FF2B5EF4-FFF2-40B4-BE49-F238E27FC236}">
+                <a16:creationId xmlns:a16="http://schemas.microsoft.com/office/drawing/2014/main" id="{E71A6CB0-1035-4BD1-8D32-32E1642733E5}"/>
+              </a:ext>
+            </a:extLst>
+          </p:cNvPr>
+          <p:cNvPicPr>
+            <a:picLocks noChangeAspect="1"/>
+          </p:cNvPicPr>
+          <p:nvPr/>
+        </p:nvPicPr>
+        <p:blipFill>
+          <a:blip r:embed="rId2"/>
+          <a:stretch>
+            <a:fillRect/>
+          </a:stretch>
+        </p:blipFill>
+        <p:spPr>
+          <a:xfrm>
+            <a:off x="484141" y="692696"/>
+            <a:ext cx="8175717" cy="2881245"/>
+          </a:xfrm>
+          <a:prstGeom prst="rect">
+            <a:avLst/>
+          </a:prstGeom>
+        </p:spPr>
+      </p:pic>
+      <p:pic>
+        <p:nvPicPr>
+          <p:cNvPr id="2" name="Picture 1">
+            <a:extLst>
+              <a:ext uri="{FF2B5EF4-FFF2-40B4-BE49-F238E27FC236}">
+                <a16:creationId xmlns:a16="http://schemas.microsoft.com/office/drawing/2014/main" id="{FCCF9AB5-497E-4F99-8DBC-BF867E51D91C}"/>
+              </a:ext>
+            </a:extLst>
+          </p:cNvPr>
+          <p:cNvPicPr>
+            <a:picLocks noChangeAspect="1"/>
+          </p:cNvPicPr>
+          <p:nvPr/>
+        </p:nvPicPr>
+        <p:blipFill>
+          <a:blip r:embed="rId3"/>
+          <a:stretch>
+            <a:fillRect/>
+          </a:stretch>
+        </p:blipFill>
+        <p:spPr>
+          <a:xfrm>
+            <a:off x="383045" y="3930151"/>
+            <a:ext cx="8262135" cy="2088232"/>
+          </a:xfrm>
+          <a:prstGeom prst="rect">
+            <a:avLst/>
+          </a:prstGeom>
+        </p:spPr>
+      </p:pic>
+    </p:spTree>
+    <p:extLst>
+      <p:ext uri="{BB962C8B-B14F-4D97-AF65-F5344CB8AC3E}">
+        <p14:creationId xmlns:p14="http://schemas.microsoft.com/office/powerpoint/2010/main" val="137572876"/>
+      </p:ext>
+    </p:extLst>
+  </p:cSld>
+  <p:clrMapOvr>
+    <a:masterClrMapping/>
+  </p:clrMapOvr>
+</p:sld>
+</file>
+
+<file path=ppt/slides/slide43.xml><?xml version="1.0" encoding="utf-8"?>
+<p:sld xmlns:a="http://schemas.openxmlformats.org/drawingml/2006/main" xmlns:r="http://schemas.openxmlformats.org/officeDocument/2006/relationships" xmlns:p="http://schemas.openxmlformats.org/presentationml/2006/main">
+  <p:cSld>
+    <p:spTree>
+      <p:nvGrpSpPr>
+        <p:cNvPr id="1" name=""/>
+        <p:cNvGrpSpPr/>
+        <p:nvPr/>
+      </p:nvGrpSpPr>
+      <p:grpSpPr>
+        <a:xfrm>
+          <a:off x="0" y="0"/>
+          <a:ext cx="0" cy="0"/>
+          <a:chOff x="0" y="0"/>
+          <a:chExt cx="0" cy="0"/>
+        </a:xfrm>
+      </p:grpSpPr>
+      <p:sp>
+        <p:nvSpPr>
+          <p:cNvPr id="4098" name="TextBox 2">
+            <a:extLst>
+              <a:ext uri="{FF2B5EF4-FFF2-40B4-BE49-F238E27FC236}">
+                <a16:creationId xmlns:a16="http://schemas.microsoft.com/office/drawing/2014/main" id="{5552ED83-0001-4E47-A09B-F49C592A8E24}"/>
+              </a:ext>
+            </a:extLst>
+          </p:cNvPr>
+          <p:cNvSpPr txBox="1">
+            <a:spLocks noChangeArrowheads="1"/>
+          </p:cNvSpPr>
+          <p:nvPr/>
+        </p:nvSpPr>
+        <p:spPr bwMode="auto">
+          <a:xfrm>
+            <a:off x="-10272" y="0"/>
+            <a:ext cx="8496944" cy="830997"/>
+          </a:xfrm>
+          <a:prstGeom prst="rect">
+            <a:avLst/>
+          </a:prstGeom>
+          <a:noFill/>
+          <a:ln>
+            <a:noFill/>
+          </a:ln>
+          <a:extLst>
+            <a:ext uri="{909E8E84-426E-40DD-AFC4-6F175D3DCCD1}">
+              <a14:hiddenFill xmlns:a14="http://schemas.microsoft.com/office/drawing/2010/main">
+                <a:solidFill>
+                  <a:srgbClr val="FFFFFF"/>
+                </a:solidFill>
+              </a14:hiddenFill>
+            </a:ext>
+            <a:ext uri="{91240B29-F687-4F45-9708-019B960494DF}">
+              <a14:hiddenLine xmlns:a14="http://schemas.microsoft.com/office/drawing/2010/main" w="9525">
+                <a:solidFill>
+                  <a:srgbClr val="000000"/>
+                </a:solidFill>
+                <a:miter lim="800000"/>
+                <a:headEnd/>
+                <a:tailEnd/>
+              </a14:hiddenLine>
+            </a:ext>
+          </a:extLst>
+        </p:spPr>
+        <p:txBody>
+          <a:bodyPr wrap="square">
+            <a:spAutoFit/>
+          </a:bodyPr>
+          <a:lstStyle>
+            <a:lvl1pPr eaLnBrk="0" hangingPunct="0">
+              <a:defRPr>
+                <a:solidFill>
+                  <a:schemeClr val="tx1"/>
+                </a:solidFill>
+                <a:latin typeface="Arial" panose="020B0604020202020204" pitchFamily="34" charset="0"/>
+                <a:ea typeface="宋体" panose="02010600030101010101" pitchFamily="2" charset="-122"/>
+              </a:defRPr>
+            </a:lvl1pPr>
+            <a:lvl2pPr marL="742950" indent="-285750" eaLnBrk="0" hangingPunct="0">
+              <a:defRPr>
+                <a:solidFill>
+                  <a:schemeClr val="tx1"/>
+                </a:solidFill>
+                <a:latin typeface="Arial" panose="020B0604020202020204" pitchFamily="34" charset="0"/>
+                <a:ea typeface="宋体" panose="02010600030101010101" pitchFamily="2" charset="-122"/>
+              </a:defRPr>
+            </a:lvl2pPr>
+            <a:lvl3pPr marL="1143000" indent="-228600" eaLnBrk="0" hangingPunct="0">
+              <a:defRPr>
+                <a:solidFill>
+                  <a:schemeClr val="tx1"/>
+                </a:solidFill>
+                <a:latin typeface="Arial" panose="020B0604020202020204" pitchFamily="34" charset="0"/>
+                <a:ea typeface="宋体" panose="02010600030101010101" pitchFamily="2" charset="-122"/>
+              </a:defRPr>
+            </a:lvl3pPr>
+            <a:lvl4pPr marL="1600200" indent="-228600" eaLnBrk="0" hangingPunct="0">
+              <a:defRPr>
+                <a:solidFill>
+                  <a:schemeClr val="tx1"/>
+                </a:solidFill>
+                <a:latin typeface="Arial" panose="020B0604020202020204" pitchFamily="34" charset="0"/>
+                <a:ea typeface="宋体" panose="02010600030101010101" pitchFamily="2" charset="-122"/>
+              </a:defRPr>
+            </a:lvl4pPr>
+            <a:lvl5pPr marL="2057400" indent="-228600" eaLnBrk="0" hangingPunct="0">
+              <a:defRPr>
+                <a:solidFill>
+                  <a:schemeClr val="tx1"/>
+                </a:solidFill>
+                <a:latin typeface="Arial" panose="020B0604020202020204" pitchFamily="34" charset="0"/>
+                <a:ea typeface="宋体" panose="02010600030101010101" pitchFamily="2" charset="-122"/>
+              </a:defRPr>
+            </a:lvl5pPr>
+            <a:lvl6pPr marL="2514600" indent="-228600" eaLnBrk="0" fontAlgn="base" hangingPunct="0">
+              <a:spcBef>
+                <a:spcPct val="0"/>
+              </a:spcBef>
+              <a:spcAft>
+                <a:spcPct val="0"/>
+              </a:spcAft>
+              <a:defRPr>
+                <a:solidFill>
+                  <a:schemeClr val="tx1"/>
+                </a:solidFill>
+                <a:latin typeface="Arial" panose="020B0604020202020204" pitchFamily="34" charset="0"/>
+                <a:ea typeface="宋体" panose="02010600030101010101" pitchFamily="2" charset="-122"/>
+              </a:defRPr>
+            </a:lvl6pPr>
+            <a:lvl7pPr marL="2971800" indent="-228600" eaLnBrk="0" fontAlgn="base" hangingPunct="0">
+              <a:spcBef>
+                <a:spcPct val="0"/>
+              </a:spcBef>
+              <a:spcAft>
+                <a:spcPct val="0"/>
+              </a:spcAft>
+              <a:defRPr>
+                <a:solidFill>
+                  <a:schemeClr val="tx1"/>
+                </a:solidFill>
+                <a:latin typeface="Arial" panose="020B0604020202020204" pitchFamily="34" charset="0"/>
+                <a:ea typeface="宋体" panose="02010600030101010101" pitchFamily="2" charset="-122"/>
+              </a:defRPr>
+            </a:lvl7pPr>
+            <a:lvl8pPr marL="3429000" indent="-228600" eaLnBrk="0" fontAlgn="base" hangingPunct="0">
+              <a:spcBef>
+                <a:spcPct val="0"/>
+              </a:spcBef>
+              <a:spcAft>
+                <a:spcPct val="0"/>
+              </a:spcAft>
+              <a:defRPr>
+                <a:solidFill>
+                  <a:schemeClr val="tx1"/>
+                </a:solidFill>
+                <a:latin typeface="Arial" panose="020B0604020202020204" pitchFamily="34" charset="0"/>
+                <a:ea typeface="宋体" panose="02010600030101010101" pitchFamily="2" charset="-122"/>
+              </a:defRPr>
+            </a:lvl8pPr>
+            <a:lvl9pPr marL="3886200" indent="-228600" eaLnBrk="0" fontAlgn="base" hangingPunct="0">
+              <a:spcBef>
+                <a:spcPct val="0"/>
+              </a:spcBef>
+              <a:spcAft>
+                <a:spcPct val="0"/>
+              </a:spcAft>
+              <a:defRPr>
+                <a:solidFill>
+                  <a:schemeClr val="tx1"/>
+                </a:solidFill>
+                <a:latin typeface="Arial" panose="020B0604020202020204" pitchFamily="34" charset="0"/>
+                <a:ea typeface="宋体" panose="02010600030101010101" pitchFamily="2" charset="-122"/>
+              </a:defRPr>
+            </a:lvl9pPr>
+          </a:lstStyle>
+          <a:p>
+            <a:pPr eaLnBrk="1" hangingPunct="1"/>
+            <a:r>
+              <a:rPr lang="zh-CN" altLang="en-US" sz="4800" dirty="0">
+                <a:solidFill>
+                  <a:schemeClr val="bg1"/>
+                </a:solidFill>
+                <a:latin typeface="微软雅黑" panose="020B0503020204020204" pitchFamily="34" charset="-122"/>
+                <a:ea typeface="微软雅黑" panose="020B0503020204020204" pitchFamily="34" charset="-122"/>
+              </a:rPr>
+              <a:t>参考材料</a:t>
+            </a:r>
+          </a:p>
+        </p:txBody>
+      </p:sp>
+      <p:sp>
+        <p:nvSpPr>
+          <p:cNvPr id="5" name="TextBox 4">
+            <a:extLst>
+              <a:ext uri="{FF2B5EF4-FFF2-40B4-BE49-F238E27FC236}">
+                <a16:creationId xmlns:a16="http://schemas.microsoft.com/office/drawing/2014/main" id="{C5E318B1-BE8C-4520-ACB8-5D1C39900FF9}"/>
+              </a:ext>
+            </a:extLst>
+          </p:cNvPr>
+          <p:cNvSpPr txBox="1"/>
+          <p:nvPr/>
+        </p:nvSpPr>
+        <p:spPr>
+          <a:xfrm>
+            <a:off x="107317" y="620688"/>
+            <a:ext cx="8929365" cy="6786473"/>
+          </a:xfrm>
+          <a:prstGeom prst="rect">
+            <a:avLst/>
+          </a:prstGeom>
+          <a:noFill/>
+        </p:spPr>
+        <p:txBody>
+          <a:bodyPr wrap="square">
+            <a:spAutoFit/>
+          </a:bodyPr>
+          <a:lstStyle/>
+          <a:p>
+            <a:pPr>
+              <a:spcBef>
+                <a:spcPts val="600"/>
+              </a:spcBef>
+              <a:defRPr/>
+            </a:pPr>
+            <a:r>
+              <a:rPr lang="en-US" altLang="zh-CN" sz="4000" dirty="0">
+                <a:solidFill>
+                  <a:schemeClr val="bg1"/>
+                </a:solidFill>
+                <a:latin typeface="微软雅黑" pitchFamily="34" charset="-122"/>
+                <a:ea typeface="微软雅黑" pitchFamily="34" charset="-122"/>
+              </a:rPr>
+              <a:t>(1)</a:t>
+            </a:r>
+            <a:r>
+              <a:rPr lang="zh-CN" altLang="en-US" sz="4000" dirty="0">
+                <a:solidFill>
+                  <a:schemeClr val="bg1"/>
+                </a:solidFill>
+                <a:latin typeface="微软雅黑" pitchFamily="34" charset="-122"/>
+                <a:ea typeface="微软雅黑" pitchFamily="34" charset="-122"/>
+              </a:rPr>
+              <a:t>电子书</a:t>
+            </a:r>
+            <a:endParaRPr lang="en-US" altLang="zh-CN" sz="4000" dirty="0">
+              <a:solidFill>
+                <a:schemeClr val="bg1"/>
+              </a:solidFill>
+              <a:latin typeface="微软雅黑" pitchFamily="34" charset="-122"/>
+              <a:ea typeface="微软雅黑" pitchFamily="34" charset="-122"/>
+            </a:endParaRPr>
+          </a:p>
+          <a:p>
+            <a:pPr marL="571500" indent="-571500">
+              <a:spcBef>
+                <a:spcPts val="600"/>
+              </a:spcBef>
+              <a:buFont typeface="Arial" panose="020B0604020202020204" pitchFamily="34" charset="0"/>
+              <a:buChar char="•"/>
+              <a:defRPr/>
+            </a:pPr>
+            <a:r>
+              <a:rPr lang="zh-CN" altLang="en-US" sz="4000" dirty="0">
+                <a:solidFill>
+                  <a:schemeClr val="bg1"/>
+                </a:solidFill>
+                <a:latin typeface="微软雅黑" pitchFamily="34" charset="-122"/>
+                <a:ea typeface="微软雅黑" pitchFamily="34" charset="-122"/>
+              </a:rPr>
+              <a:t>廖雪峰的</a:t>
+            </a:r>
+            <a:r>
+              <a:rPr lang="en-US" altLang="zh-CN" sz="4000" dirty="0">
+                <a:solidFill>
+                  <a:schemeClr val="bg1"/>
+                </a:solidFill>
+                <a:latin typeface="微软雅黑" pitchFamily="34" charset="-122"/>
+                <a:ea typeface="微软雅黑" pitchFamily="34" charset="-122"/>
+              </a:rPr>
+              <a:t>Python</a:t>
+            </a:r>
+            <a:r>
+              <a:rPr lang="zh-CN" altLang="en-US" sz="4000" dirty="0">
+                <a:solidFill>
+                  <a:schemeClr val="bg1"/>
+                </a:solidFill>
+                <a:latin typeface="微软雅黑" pitchFamily="34" charset="-122"/>
+                <a:ea typeface="微软雅黑" pitchFamily="34" charset="-122"/>
+              </a:rPr>
+              <a:t>教程</a:t>
+            </a:r>
+            <a:endParaRPr lang="en-US" altLang="zh-CN" sz="4000" dirty="0">
+              <a:solidFill>
+                <a:schemeClr val="bg1"/>
+              </a:solidFill>
+              <a:latin typeface="微软雅黑" pitchFamily="34" charset="-122"/>
+              <a:ea typeface="微软雅黑" pitchFamily="34" charset="-122"/>
+            </a:endParaRPr>
+          </a:p>
+          <a:p>
+            <a:pPr marL="571500" indent="-571500">
+              <a:spcBef>
+                <a:spcPts val="600"/>
+              </a:spcBef>
+              <a:buFont typeface="Arial" panose="020B0604020202020204" pitchFamily="34" charset="0"/>
+              <a:buChar char="•"/>
+              <a:defRPr/>
+            </a:pPr>
+            <a:r>
+              <a:rPr lang="en-US" altLang="zh-CN" sz="4000" dirty="0">
+                <a:solidFill>
+                  <a:schemeClr val="bg1"/>
+                </a:solidFill>
+                <a:latin typeface="微软雅黑" pitchFamily="34" charset="-122"/>
+                <a:ea typeface="微软雅黑" pitchFamily="34" charset="-122"/>
+              </a:rPr>
+              <a:t>python3-cookbook</a:t>
+            </a:r>
+          </a:p>
+          <a:p>
+            <a:pPr>
+              <a:spcBef>
+                <a:spcPts val="600"/>
+              </a:spcBef>
+              <a:defRPr/>
+            </a:pPr>
+            <a:endParaRPr lang="en-US" altLang="zh-CN" sz="4000" dirty="0">
+              <a:solidFill>
+                <a:schemeClr val="bg1"/>
+              </a:solidFill>
+              <a:latin typeface="微软雅黑" pitchFamily="34" charset="-122"/>
+              <a:ea typeface="微软雅黑" pitchFamily="34" charset="-122"/>
+            </a:endParaRPr>
+          </a:p>
+          <a:p>
+            <a:pPr>
+              <a:spcBef>
+                <a:spcPts val="600"/>
+              </a:spcBef>
+              <a:defRPr/>
+            </a:pPr>
+            <a:r>
+              <a:rPr lang="en-US" altLang="zh-CN" sz="4000" dirty="0">
+                <a:solidFill>
+                  <a:schemeClr val="bg1"/>
+                </a:solidFill>
+                <a:latin typeface="微软雅黑" pitchFamily="34" charset="-122"/>
+                <a:ea typeface="微软雅黑" pitchFamily="34" charset="-122"/>
+              </a:rPr>
+              <a:t>(2)PPT &amp; code samples</a:t>
+            </a:r>
+          </a:p>
+          <a:p>
+            <a:pPr marL="571500" indent="-571500">
+              <a:spcBef>
+                <a:spcPts val="600"/>
+              </a:spcBef>
+              <a:buFont typeface="Arial" panose="020B0604020202020204" pitchFamily="34" charset="0"/>
+              <a:buChar char="•"/>
+              <a:defRPr/>
+            </a:pPr>
+            <a:r>
+              <a:rPr lang="en-US" altLang="zh-CN" sz="4000" dirty="0">
+                <a:solidFill>
+                  <a:schemeClr val="bg1"/>
+                </a:solidFill>
+                <a:latin typeface="微软雅黑" pitchFamily="34" charset="-122"/>
+                <a:ea typeface="微软雅黑" pitchFamily="34" charset="-122"/>
+                <a:hlinkClick r:id="rId2"/>
+              </a:rPr>
+              <a:t>https://github.com/ouriris/ml-course</a:t>
+            </a:r>
+            <a:endParaRPr lang="en-US" altLang="zh-CN" sz="4000" dirty="0">
+              <a:solidFill>
+                <a:schemeClr val="bg1"/>
+              </a:solidFill>
+              <a:latin typeface="微软雅黑" pitchFamily="34" charset="-122"/>
+              <a:ea typeface="微软雅黑" pitchFamily="34" charset="-122"/>
+            </a:endParaRPr>
+          </a:p>
+          <a:p>
+            <a:pPr marL="571500" indent="-571500">
+              <a:spcBef>
+                <a:spcPts val="600"/>
+              </a:spcBef>
+              <a:buFont typeface="Arial" panose="020B0604020202020204" pitchFamily="34" charset="0"/>
+              <a:buChar char="•"/>
+              <a:defRPr/>
+            </a:pPr>
+            <a:r>
+              <a:rPr lang="en-US" altLang="zh-CN" sz="4000" dirty="0">
+                <a:solidFill>
+                  <a:schemeClr val="bg1"/>
+                </a:solidFill>
+                <a:latin typeface="微软雅黑" pitchFamily="34" charset="-122"/>
+                <a:ea typeface="微软雅黑" pitchFamily="34" charset="-122"/>
+                <a:hlinkClick r:id="rId3"/>
+              </a:rPr>
+              <a:t>https://github.com/yellowb/ml-sample</a:t>
+            </a:r>
+            <a:endParaRPr lang="en-US" altLang="zh-CN" sz="4000" dirty="0">
+              <a:solidFill>
+                <a:schemeClr val="bg1"/>
+              </a:solidFill>
+              <a:latin typeface="微软雅黑" pitchFamily="34" charset="-122"/>
+              <a:ea typeface="微软雅黑" pitchFamily="34" charset="-122"/>
+            </a:endParaRPr>
+          </a:p>
+          <a:p>
+            <a:pPr>
+              <a:spcBef>
+                <a:spcPts val="600"/>
+              </a:spcBef>
+              <a:defRPr/>
+            </a:pPr>
+            <a:endParaRPr lang="en-US" altLang="zh-CN" sz="4000" dirty="0">
+              <a:solidFill>
+                <a:schemeClr val="bg1"/>
+              </a:solidFill>
+              <a:latin typeface="微软雅黑" pitchFamily="34" charset="-122"/>
+              <a:ea typeface="微软雅黑" pitchFamily="34" charset="-122"/>
+            </a:endParaRPr>
+          </a:p>
+        </p:txBody>
+      </p:sp>
+    </p:spTree>
+    <p:extLst>
+      <p:ext uri="{BB962C8B-B14F-4D97-AF65-F5344CB8AC3E}">
+        <p14:creationId xmlns:p14="http://schemas.microsoft.com/office/powerpoint/2010/main" val="2299884029"/>
+      </p:ext>
+    </p:extLst>
+  </p:cSld>
+  <p:clrMapOvr>
+    <a:masterClrMapping/>
+  </p:clrMapOvr>
+</p:sld>
+</file>
+
+<file path=ppt/slides/slide44.xml><?xml version="1.0" encoding="utf-8"?>
+<p:sld xmlns:a="http://schemas.openxmlformats.org/drawingml/2006/main" xmlns:r="http://schemas.openxmlformats.org/officeDocument/2006/relationships" xmlns:p="http://schemas.openxmlformats.org/presentationml/2006/main">
+  <p:cSld>
+    <p:spTree>
+      <p:nvGrpSpPr>
+        <p:cNvPr id="1" name=""/>
+        <p:cNvGrpSpPr/>
+        <p:nvPr/>
+      </p:nvGrpSpPr>
+      <p:grpSpPr>
+        <a:xfrm>
+          <a:off x="0" y="0"/>
+          <a:ext cx="0" cy="0"/>
+          <a:chOff x="0" y="0"/>
+          <a:chExt cx="0" cy="0"/>
+        </a:xfrm>
+      </p:grpSpPr>
+      <p:sp>
+        <p:nvSpPr>
+          <p:cNvPr id="5122" name="Rectangle 2">
+            <a:extLst>
+              <a:ext uri="{FF2B5EF4-FFF2-40B4-BE49-F238E27FC236}">
+                <a16:creationId xmlns:a16="http://schemas.microsoft.com/office/drawing/2014/main" id="{DA0A6638-A01B-4ADE-AF93-1C7B857D9914}"/>
+              </a:ext>
+            </a:extLst>
+          </p:cNvPr>
+          <p:cNvSpPr>
+            <a:spLocks noGrp="1" noChangeArrowheads="1"/>
+          </p:cNvSpPr>
+          <p:nvPr>
+            <p:ph type="ctrTitle"/>
+          </p:nvPr>
+        </p:nvSpPr>
+        <p:spPr>
+          <a:xfrm>
+            <a:off x="684213" y="2133600"/>
+            <a:ext cx="7847012" cy="2159000"/>
+          </a:xfrm>
+        </p:spPr>
+        <p:txBody>
+          <a:bodyPr/>
+          <a:lstStyle/>
+          <a:p>
+            <a:pPr eaLnBrk="1" hangingPunct="1"/>
+            <a:br>
+              <a:rPr lang="en-US" altLang="zh-CN" sz="8000" dirty="0">
+                <a:solidFill>
+                  <a:schemeClr val="bg1"/>
+                </a:solidFill>
+                <a:ea typeface="微软雅黑" panose="020B0503020204020204" pitchFamily="34" charset="-122"/>
+              </a:rPr>
+            </a:br>
+            <a:r>
+              <a:rPr lang="en-US" altLang="zh-CN" sz="6600" dirty="0">
+                <a:solidFill>
+                  <a:schemeClr val="bg1"/>
+                </a:solidFill>
+                <a:ea typeface="微软雅黑" panose="020B0503020204020204" pitchFamily="34" charset="-122"/>
+              </a:rPr>
+              <a:t>Q &amp; A</a:t>
+            </a:r>
+            <a:br>
+              <a:rPr lang="zh-CN" altLang="en-US" sz="7200" dirty="0">
+                <a:solidFill>
+                  <a:schemeClr val="bg1"/>
+                </a:solidFill>
+                <a:ea typeface="微软雅黑" panose="020B0503020204020204" pitchFamily="34" charset="-122"/>
+              </a:rPr>
+            </a:br>
+            <a:endParaRPr lang="zh-CN" altLang="en-US" sz="7200" dirty="0">
+              <a:solidFill>
+                <a:schemeClr val="bg1"/>
+              </a:solidFill>
+              <a:ea typeface="微软雅黑" panose="020B0503020204020204" pitchFamily="34" charset="-122"/>
+            </a:endParaRPr>
+          </a:p>
+        </p:txBody>
+      </p:sp>
+    </p:spTree>
+    <p:extLst>
+      <p:ext uri="{BB962C8B-B14F-4D97-AF65-F5344CB8AC3E}">
+        <p14:creationId xmlns:p14="http://schemas.microsoft.com/office/powerpoint/2010/main" val="1068010669"/>
+      </p:ext>
+    </p:extLst>
   </p:cSld>
   <p:clrMapOvr>
     <a:masterClrMapping/>

</xml_diff>